<commit_message>
updates to pathview figures
</commit_message>
<xml_diff>
--- a/pptx/vanmeter_salamander_exposures.pptx
+++ b/pptx/vanmeter_salamander_exposures.pptx
@@ -24,6 +24,16 @@
     <p:sldId id="259" r:id="rId18"/>
     <p:sldId id="260" r:id="rId19"/>
     <p:sldId id="261" r:id="rId20"/>
+    <p:sldId id="277" r:id="rId21"/>
+    <p:sldId id="281" r:id="rId22"/>
+    <p:sldId id="278" r:id="rId23"/>
+    <p:sldId id="280" r:id="rId24"/>
+    <p:sldId id="282" r:id="rId25"/>
+    <p:sldId id="283" r:id="rId26"/>
+    <p:sldId id="284" r:id="rId27"/>
+    <p:sldId id="285" r:id="rId28"/>
+    <p:sldId id="286" r:id="rId29"/>
+    <p:sldId id="287" r:id="rId30"/>
   </p:sldIdLst>
   <p:sldSz cx="12192000" cy="6858000"/>
   <p:notesSz cx="6858000" cy="9144000"/>
@@ -277,7 +287,7 @@
           <a:p>
             <a:fld id="{A09DAD73-6C51-45AB-A1E3-AD938ED06CDF}" type="datetimeFigureOut">
               <a:rPr lang="en-US" smtClean="0"/>
-              <a:t>2/10/2023</a:t>
+              <a:t>3/10/2023</a:t>
             </a:fld>
             <a:endParaRPr lang="en-US"/>
           </a:p>
@@ -475,7 +485,7 @@
           <a:p>
             <a:fld id="{A09DAD73-6C51-45AB-A1E3-AD938ED06CDF}" type="datetimeFigureOut">
               <a:rPr lang="en-US" smtClean="0"/>
-              <a:t>2/10/2023</a:t>
+              <a:t>3/10/2023</a:t>
             </a:fld>
             <a:endParaRPr lang="en-US"/>
           </a:p>
@@ -683,7 +693,7 @@
           <a:p>
             <a:fld id="{A09DAD73-6C51-45AB-A1E3-AD938ED06CDF}" type="datetimeFigureOut">
               <a:rPr lang="en-US" smtClean="0"/>
-              <a:t>2/10/2023</a:t>
+              <a:t>3/10/2023</a:t>
             </a:fld>
             <a:endParaRPr lang="en-US"/>
           </a:p>
@@ -881,7 +891,7 @@
           <a:p>
             <a:fld id="{A09DAD73-6C51-45AB-A1E3-AD938ED06CDF}" type="datetimeFigureOut">
               <a:rPr lang="en-US" smtClean="0"/>
-              <a:t>2/10/2023</a:t>
+              <a:t>3/10/2023</a:t>
             </a:fld>
             <a:endParaRPr lang="en-US"/>
           </a:p>
@@ -1156,7 +1166,7 @@
           <a:p>
             <a:fld id="{A09DAD73-6C51-45AB-A1E3-AD938ED06CDF}" type="datetimeFigureOut">
               <a:rPr lang="en-US" smtClean="0"/>
-              <a:t>2/10/2023</a:t>
+              <a:t>3/10/2023</a:t>
             </a:fld>
             <a:endParaRPr lang="en-US"/>
           </a:p>
@@ -1421,7 +1431,7 @@
           <a:p>
             <a:fld id="{A09DAD73-6C51-45AB-A1E3-AD938ED06CDF}" type="datetimeFigureOut">
               <a:rPr lang="en-US" smtClean="0"/>
-              <a:t>2/10/2023</a:t>
+              <a:t>3/10/2023</a:t>
             </a:fld>
             <a:endParaRPr lang="en-US"/>
           </a:p>
@@ -1833,7 +1843,7 @@
           <a:p>
             <a:fld id="{A09DAD73-6C51-45AB-A1E3-AD938ED06CDF}" type="datetimeFigureOut">
               <a:rPr lang="en-US" smtClean="0"/>
-              <a:t>2/10/2023</a:t>
+              <a:t>3/10/2023</a:t>
             </a:fld>
             <a:endParaRPr lang="en-US"/>
           </a:p>
@@ -1974,7 +1984,7 @@
           <a:p>
             <a:fld id="{A09DAD73-6C51-45AB-A1E3-AD938ED06CDF}" type="datetimeFigureOut">
               <a:rPr lang="en-US" smtClean="0"/>
-              <a:t>2/10/2023</a:t>
+              <a:t>3/10/2023</a:t>
             </a:fld>
             <a:endParaRPr lang="en-US"/>
           </a:p>
@@ -2087,7 +2097,7 @@
           <a:p>
             <a:fld id="{A09DAD73-6C51-45AB-A1E3-AD938ED06CDF}" type="datetimeFigureOut">
               <a:rPr lang="en-US" smtClean="0"/>
-              <a:t>2/10/2023</a:t>
+              <a:t>3/10/2023</a:t>
             </a:fld>
             <a:endParaRPr lang="en-US"/>
           </a:p>
@@ -2398,7 +2408,7 @@
           <a:p>
             <a:fld id="{A09DAD73-6C51-45AB-A1E3-AD938ED06CDF}" type="datetimeFigureOut">
               <a:rPr lang="en-US" smtClean="0"/>
-              <a:t>2/10/2023</a:t>
+              <a:t>3/10/2023</a:t>
             </a:fld>
             <a:endParaRPr lang="en-US"/>
           </a:p>
@@ -2686,7 +2696,7 @@
           <a:p>
             <a:fld id="{A09DAD73-6C51-45AB-A1E3-AD938ED06CDF}" type="datetimeFigureOut">
               <a:rPr lang="en-US" smtClean="0"/>
-              <a:t>2/10/2023</a:t>
+              <a:t>3/10/2023</a:t>
             </a:fld>
             <a:endParaRPr lang="en-US"/>
           </a:p>
@@ -2927,7 +2937,7 @@
           <a:p>
             <a:fld id="{A09DAD73-6C51-45AB-A1E3-AD938ED06CDF}" type="datetimeFigureOut">
               <a:rPr lang="en-US" smtClean="0"/>
-              <a:t>2/10/2023</a:t>
+              <a:t>3/10/2023</a:t>
             </a:fld>
             <a:endParaRPr lang="en-US"/>
           </a:p>
@@ -5172,6 +5182,1243 @@
 </p:sld>
 </file>
 
+<file path=ppt/slides/slide20.xml><?xml version="1.0" encoding="utf-8"?>
+<p:sld xmlns:a="http://schemas.openxmlformats.org/drawingml/2006/main" xmlns:r="http://schemas.openxmlformats.org/officeDocument/2006/relationships" xmlns:p="http://schemas.openxmlformats.org/presentationml/2006/main">
+  <p:cSld>
+    <p:spTree>
+      <p:nvGrpSpPr>
+        <p:cNvPr id="1" name=""/>
+        <p:cNvGrpSpPr/>
+        <p:nvPr/>
+      </p:nvGrpSpPr>
+      <p:grpSpPr>
+        <a:xfrm>
+          <a:off x="0" y="0"/>
+          <a:ext cx="0" cy="0"/>
+          <a:chOff x="0" y="0"/>
+          <a:chExt cx="0" cy="0"/>
+        </a:xfrm>
+      </p:grpSpPr>
+      <p:sp>
+        <p:nvSpPr>
+          <p:cNvPr id="8" name="TextBox 7">
+            <a:extLst>
+              <a:ext uri="{FF2B5EF4-FFF2-40B4-BE49-F238E27FC236}">
+                <a16:creationId xmlns:a16="http://schemas.microsoft.com/office/drawing/2014/main" id="{2C8C3E8D-0CFB-CCC2-08EC-135F390EF581}"/>
+              </a:ext>
+            </a:extLst>
+          </p:cNvPr>
+          <p:cNvSpPr txBox="1"/>
+          <p:nvPr/>
+        </p:nvSpPr>
+        <p:spPr>
+          <a:xfrm>
+            <a:off x="663191" y="241160"/>
+            <a:ext cx="6712299" cy="369332"/>
+          </a:xfrm>
+          <a:prstGeom prst="rect">
+            <a:avLst/>
+          </a:prstGeom>
+          <a:noFill/>
+        </p:spPr>
+        <p:txBody>
+          <a:bodyPr wrap="square" rtlCol="0">
+            <a:spAutoFit/>
+          </a:bodyPr>
+          <a:lstStyle/>
+          <a:p>
+            <a:r>
+              <a:rPr lang="en-US" dirty="0" err="1"/>
+              <a:t>xla</a:t>
+            </a:r>
+            <a:r>
+              <a:rPr lang="en-US" dirty="0"/>
+              <a:t>; Chlorpyrifos—Arginine biosynthesis (Urea cycle); </a:t>
+            </a:r>
+            <a:r>
+              <a:rPr lang="en-US" dirty="0" err="1"/>
+              <a:t>xla</a:t>
+            </a:r>
+            <a:r>
+              <a:rPr lang="en-US" dirty="0"/>
+              <a:t>=</a:t>
+            </a:r>
+            <a:r>
+              <a:rPr lang="en-US" dirty="0" err="1"/>
+              <a:t>hsa</a:t>
+            </a:r>
+            <a:endParaRPr lang="en-US" dirty="0"/>
+          </a:p>
+        </p:txBody>
+      </p:sp>
+      <p:pic>
+        <p:nvPicPr>
+          <p:cNvPr id="3" name="Picture 2">
+            <a:extLst>
+              <a:ext uri="{FF2B5EF4-FFF2-40B4-BE49-F238E27FC236}">
+                <a16:creationId xmlns:a16="http://schemas.microsoft.com/office/drawing/2014/main" id="{D53015E3-C80E-79A2-D262-31BEA26E994C}"/>
+              </a:ext>
+            </a:extLst>
+          </p:cNvPr>
+          <p:cNvPicPr>
+            <a:picLocks noChangeAspect="1"/>
+          </p:cNvPicPr>
+          <p:nvPr/>
+        </p:nvPicPr>
+        <p:blipFill>
+          <a:blip r:embed="rId2">
+            <a:extLst>
+              <a:ext uri="{28A0092B-C50C-407E-A947-70E740481C1C}">
+                <a14:useLocalDpi xmlns:a14="http://schemas.microsoft.com/office/drawing/2010/main" val="0"/>
+              </a:ext>
+            </a:extLst>
+          </a:blip>
+          <a:stretch>
+            <a:fillRect/>
+          </a:stretch>
+        </p:blipFill>
+        <p:spPr>
+          <a:xfrm>
+            <a:off x="191214" y="610492"/>
+            <a:ext cx="11809572" cy="4963886"/>
+          </a:xfrm>
+          <a:prstGeom prst="rect">
+            <a:avLst/>
+          </a:prstGeom>
+        </p:spPr>
+      </p:pic>
+      <p:pic>
+        <p:nvPicPr>
+          <p:cNvPr id="6" name="Picture 5">
+            <a:extLst>
+              <a:ext uri="{FF2B5EF4-FFF2-40B4-BE49-F238E27FC236}">
+                <a16:creationId xmlns:a16="http://schemas.microsoft.com/office/drawing/2014/main" id="{D3A83DB5-9EF9-7B06-C850-A3AA80E0C457}"/>
+              </a:ext>
+            </a:extLst>
+          </p:cNvPr>
+          <p:cNvPicPr>
+            <a:picLocks noChangeAspect="1"/>
+          </p:cNvPicPr>
+          <p:nvPr/>
+        </p:nvPicPr>
+        <p:blipFill>
+          <a:blip r:embed="rId3"/>
+          <a:stretch>
+            <a:fillRect/>
+          </a:stretch>
+        </p:blipFill>
+        <p:spPr>
+          <a:xfrm>
+            <a:off x="1990613" y="5377181"/>
+            <a:ext cx="10120705" cy="1480819"/>
+          </a:xfrm>
+          <a:prstGeom prst="rect">
+            <a:avLst/>
+          </a:prstGeom>
+        </p:spPr>
+      </p:pic>
+    </p:spTree>
+    <p:extLst>
+      <p:ext uri="{BB962C8B-B14F-4D97-AF65-F5344CB8AC3E}">
+        <p14:creationId xmlns:p14="http://schemas.microsoft.com/office/powerpoint/2010/main" val="3691130347"/>
+      </p:ext>
+    </p:extLst>
+  </p:cSld>
+  <p:clrMapOvr>
+    <a:masterClrMapping/>
+  </p:clrMapOvr>
+</p:sld>
+</file>
+
+<file path=ppt/slides/slide21.xml><?xml version="1.0" encoding="utf-8"?>
+<p:sld xmlns:a="http://schemas.openxmlformats.org/drawingml/2006/main" xmlns:r="http://schemas.openxmlformats.org/officeDocument/2006/relationships" xmlns:p="http://schemas.openxmlformats.org/presentationml/2006/main">
+  <p:cSld>
+    <p:spTree>
+      <p:nvGrpSpPr>
+        <p:cNvPr id="1" name=""/>
+        <p:cNvGrpSpPr/>
+        <p:nvPr/>
+      </p:nvGrpSpPr>
+      <p:grpSpPr>
+        <a:xfrm>
+          <a:off x="0" y="0"/>
+          <a:ext cx="0" cy="0"/>
+          <a:chOff x="0" y="0"/>
+          <a:chExt cx="0" cy="0"/>
+        </a:xfrm>
+      </p:grpSpPr>
+      <p:sp>
+        <p:nvSpPr>
+          <p:cNvPr id="2" name="Title 1">
+            <a:extLst>
+              <a:ext uri="{FF2B5EF4-FFF2-40B4-BE49-F238E27FC236}">
+                <a16:creationId xmlns:a16="http://schemas.microsoft.com/office/drawing/2014/main" id="{29BF9EB6-E5A0-73BE-2C20-F78514A6052F}"/>
+              </a:ext>
+            </a:extLst>
+          </p:cNvPr>
+          <p:cNvSpPr>
+            <a:spLocks noGrp="1"/>
+          </p:cNvSpPr>
+          <p:nvPr>
+            <p:ph type="title"/>
+          </p:nvPr>
+        </p:nvSpPr>
+        <p:spPr>
+          <a:xfrm>
+            <a:off x="656493" y="75414"/>
+            <a:ext cx="10515600" cy="458840"/>
+          </a:xfrm>
+        </p:spPr>
+        <p:txBody>
+          <a:bodyPr>
+            <a:normAutofit fontScale="90000"/>
+          </a:bodyPr>
+          <a:lstStyle/>
+          <a:p>
+            <a:r>
+              <a:rPr lang="en-US" sz="1800" dirty="0" err="1"/>
+              <a:t>xla</a:t>
+            </a:r>
+            <a:r>
+              <a:rPr lang="en-US" sz="1800" dirty="0"/>
+              <a:t>; Chlorpyrifos—; </a:t>
+            </a:r>
+            <a:r>
+              <a:rPr lang="en-US" sz="1800" dirty="0" err="1"/>
+              <a:t>xla</a:t>
+            </a:r>
+            <a:r>
+              <a:rPr lang="en-US" sz="1800" dirty="0"/>
+              <a:t>=</a:t>
+            </a:r>
+            <a:r>
+              <a:rPr lang="en-US" sz="1800" dirty="0" err="1"/>
+              <a:t>hsa</a:t>
+            </a:r>
+            <a:br>
+              <a:rPr lang="en-US" sz="1800" dirty="0"/>
+            </a:br>
+            <a:endParaRPr lang="en-US" sz="1800" dirty="0"/>
+          </a:p>
+        </p:txBody>
+      </p:sp>
+      <p:pic>
+        <p:nvPicPr>
+          <p:cNvPr id="5" name="Content Placeholder 4">
+            <a:extLst>
+              <a:ext uri="{FF2B5EF4-FFF2-40B4-BE49-F238E27FC236}">
+                <a16:creationId xmlns:a16="http://schemas.microsoft.com/office/drawing/2014/main" id="{A7F5E34B-0BDA-F5BF-245A-CE566D6B237E}"/>
+              </a:ext>
+            </a:extLst>
+          </p:cNvPr>
+          <p:cNvPicPr>
+            <a:picLocks noGrp="1" noChangeAspect="1"/>
+          </p:cNvPicPr>
+          <p:nvPr>
+            <p:ph idx="1"/>
+          </p:nvPr>
+        </p:nvPicPr>
+        <p:blipFill>
+          <a:blip r:embed="rId2">
+            <a:extLst>
+              <a:ext uri="{28A0092B-C50C-407E-A947-70E740481C1C}">
+                <a14:useLocalDpi xmlns:a14="http://schemas.microsoft.com/office/drawing/2010/main" val="0"/>
+              </a:ext>
+            </a:extLst>
+          </a:blip>
+          <a:stretch>
+            <a:fillRect/>
+          </a:stretch>
+        </p:blipFill>
+        <p:spPr>
+          <a:xfrm>
+            <a:off x="4612193" y="-32348"/>
+            <a:ext cx="4973934" cy="7120506"/>
+          </a:xfrm>
+        </p:spPr>
+      </p:pic>
+    </p:spTree>
+    <p:extLst>
+      <p:ext uri="{BB962C8B-B14F-4D97-AF65-F5344CB8AC3E}">
+        <p14:creationId xmlns:p14="http://schemas.microsoft.com/office/powerpoint/2010/main" val="2555528081"/>
+      </p:ext>
+    </p:extLst>
+  </p:cSld>
+  <p:clrMapOvr>
+    <a:masterClrMapping/>
+  </p:clrMapOvr>
+</p:sld>
+</file>
+
+<file path=ppt/slides/slide22.xml><?xml version="1.0" encoding="utf-8"?>
+<p:sld xmlns:a="http://schemas.openxmlformats.org/drawingml/2006/main" xmlns:r="http://schemas.openxmlformats.org/officeDocument/2006/relationships" xmlns:p="http://schemas.openxmlformats.org/presentationml/2006/main">
+  <p:cSld>
+    <p:spTree>
+      <p:nvGrpSpPr>
+        <p:cNvPr id="1" name=""/>
+        <p:cNvGrpSpPr/>
+        <p:nvPr/>
+      </p:nvGrpSpPr>
+      <p:grpSpPr>
+        <a:xfrm>
+          <a:off x="0" y="0"/>
+          <a:ext cx="0" cy="0"/>
+          <a:chOff x="0" y="0"/>
+          <a:chExt cx="0" cy="0"/>
+        </a:xfrm>
+      </p:grpSpPr>
+      <p:pic>
+        <p:nvPicPr>
+          <p:cNvPr id="5" name="Content Placeholder 4">
+            <a:extLst>
+              <a:ext uri="{FF2B5EF4-FFF2-40B4-BE49-F238E27FC236}">
+                <a16:creationId xmlns:a16="http://schemas.microsoft.com/office/drawing/2014/main" id="{05AC57BF-9037-B742-C389-A6B8FC66278C}"/>
+              </a:ext>
+            </a:extLst>
+          </p:cNvPr>
+          <p:cNvPicPr>
+            <a:picLocks noGrp="1" noChangeAspect="1"/>
+          </p:cNvPicPr>
+          <p:nvPr>
+            <p:ph idx="1"/>
+          </p:nvPr>
+        </p:nvPicPr>
+        <p:blipFill>
+          <a:blip r:embed="rId2">
+            <a:extLst>
+              <a:ext uri="{28A0092B-C50C-407E-A947-70E740481C1C}">
+                <a14:useLocalDpi xmlns:a14="http://schemas.microsoft.com/office/drawing/2010/main" val="0"/>
+              </a:ext>
+            </a:extLst>
+          </a:blip>
+          <a:stretch>
+            <a:fillRect/>
+          </a:stretch>
+        </p:blipFill>
+        <p:spPr>
+          <a:xfrm>
+            <a:off x="2140299" y="0"/>
+            <a:ext cx="9646417" cy="5621905"/>
+          </a:xfrm>
+        </p:spPr>
+      </p:pic>
+      <p:sp>
+        <p:nvSpPr>
+          <p:cNvPr id="2" name="Title 1">
+            <a:extLst>
+              <a:ext uri="{FF2B5EF4-FFF2-40B4-BE49-F238E27FC236}">
+                <a16:creationId xmlns:a16="http://schemas.microsoft.com/office/drawing/2014/main" id="{29BF9EB6-E5A0-73BE-2C20-F78514A6052F}"/>
+              </a:ext>
+            </a:extLst>
+          </p:cNvPr>
+          <p:cNvSpPr>
+            <a:spLocks noGrp="1"/>
+          </p:cNvSpPr>
+          <p:nvPr>
+            <p:ph type="title"/>
+          </p:nvPr>
+        </p:nvSpPr>
+        <p:spPr>
+          <a:xfrm>
+            <a:off x="127122" y="75414"/>
+            <a:ext cx="10515600" cy="1291162"/>
+          </a:xfrm>
+        </p:spPr>
+        <p:txBody>
+          <a:bodyPr>
+            <a:normAutofit fontScale="90000"/>
+          </a:bodyPr>
+          <a:lstStyle/>
+          <a:p>
+            <a:r>
+              <a:rPr lang="en-US" sz="1800" dirty="0" err="1"/>
+              <a:t>xla</a:t>
+            </a:r>
+            <a:r>
+              <a:rPr lang="en-US" sz="1800" dirty="0"/>
+              <a:t>; Chlorpyrifos—</a:t>
+            </a:r>
+            <a:br>
+              <a:rPr lang="en-US" sz="1800" dirty="0"/>
+            </a:br>
+            <a:r>
+              <a:rPr lang="en-US" sz="1800" dirty="0" err="1"/>
+              <a:t>Proponoate</a:t>
+            </a:r>
+            <a:r>
+              <a:rPr lang="en-US" sz="1800" dirty="0"/>
+              <a:t> metabolism</a:t>
+            </a:r>
+            <a:br>
+              <a:rPr lang="en-US" sz="1800" dirty="0"/>
+            </a:br>
+            <a:r>
+              <a:rPr lang="en-US" sz="1800" dirty="0"/>
+              <a:t>(Gluconeogenesis); </a:t>
+            </a:r>
+            <a:br>
+              <a:rPr lang="en-US" sz="1800" dirty="0"/>
+            </a:br>
+            <a:r>
+              <a:rPr lang="en-US" sz="1800" dirty="0" err="1"/>
+              <a:t>xla</a:t>
+            </a:r>
+            <a:r>
+              <a:rPr lang="en-US" sz="1800" dirty="0"/>
+              <a:t>=</a:t>
+            </a:r>
+            <a:r>
+              <a:rPr lang="en-US" sz="1800" dirty="0" err="1"/>
+              <a:t>hsa</a:t>
+            </a:r>
+            <a:br>
+              <a:rPr lang="en-US" sz="1800" dirty="0"/>
+            </a:br>
+            <a:endParaRPr lang="en-US" sz="1800" dirty="0"/>
+          </a:p>
+        </p:txBody>
+      </p:sp>
+      <p:pic>
+        <p:nvPicPr>
+          <p:cNvPr id="7" name="Picture 6">
+            <a:extLst>
+              <a:ext uri="{FF2B5EF4-FFF2-40B4-BE49-F238E27FC236}">
+                <a16:creationId xmlns:a16="http://schemas.microsoft.com/office/drawing/2014/main" id="{B681C31C-3675-816B-7694-6E40D9D0B2BC}"/>
+              </a:ext>
+            </a:extLst>
+          </p:cNvPr>
+          <p:cNvPicPr>
+            <a:picLocks noChangeAspect="1"/>
+          </p:cNvPicPr>
+          <p:nvPr/>
+        </p:nvPicPr>
+        <p:blipFill>
+          <a:blip r:embed="rId3"/>
+          <a:stretch>
+            <a:fillRect/>
+          </a:stretch>
+        </p:blipFill>
+        <p:spPr>
+          <a:xfrm>
+            <a:off x="127122" y="5331211"/>
+            <a:ext cx="8303445" cy="1526789"/>
+          </a:xfrm>
+          <a:prstGeom prst="rect">
+            <a:avLst/>
+          </a:prstGeom>
+        </p:spPr>
+      </p:pic>
+    </p:spTree>
+    <p:extLst>
+      <p:ext uri="{BB962C8B-B14F-4D97-AF65-F5344CB8AC3E}">
+        <p14:creationId xmlns:p14="http://schemas.microsoft.com/office/powerpoint/2010/main" val="2968135174"/>
+      </p:ext>
+    </p:extLst>
+  </p:cSld>
+  <p:clrMapOvr>
+    <a:masterClrMapping/>
+  </p:clrMapOvr>
+</p:sld>
+</file>
+
+<file path=ppt/slides/slide23.xml><?xml version="1.0" encoding="utf-8"?>
+<p:sld xmlns:a="http://schemas.openxmlformats.org/drawingml/2006/main" xmlns:r="http://schemas.openxmlformats.org/officeDocument/2006/relationships" xmlns:p="http://schemas.openxmlformats.org/presentationml/2006/main">
+  <p:cSld>
+    <p:spTree>
+      <p:nvGrpSpPr>
+        <p:cNvPr id="1" name=""/>
+        <p:cNvGrpSpPr/>
+        <p:nvPr/>
+      </p:nvGrpSpPr>
+      <p:grpSpPr>
+        <a:xfrm>
+          <a:off x="0" y="0"/>
+          <a:ext cx="0" cy="0"/>
+          <a:chOff x="0" y="0"/>
+          <a:chExt cx="0" cy="0"/>
+        </a:xfrm>
+      </p:grpSpPr>
+      <p:sp>
+        <p:nvSpPr>
+          <p:cNvPr id="2" name="Title 1">
+            <a:extLst>
+              <a:ext uri="{FF2B5EF4-FFF2-40B4-BE49-F238E27FC236}">
+                <a16:creationId xmlns:a16="http://schemas.microsoft.com/office/drawing/2014/main" id="{29BF9EB6-E5A0-73BE-2C20-F78514A6052F}"/>
+              </a:ext>
+            </a:extLst>
+          </p:cNvPr>
+          <p:cNvSpPr>
+            <a:spLocks noGrp="1"/>
+          </p:cNvSpPr>
+          <p:nvPr>
+            <p:ph type="title"/>
+          </p:nvPr>
+        </p:nvSpPr>
+        <p:spPr>
+          <a:xfrm>
+            <a:off x="93785" y="105559"/>
+            <a:ext cx="10515600" cy="458840"/>
+          </a:xfrm>
+        </p:spPr>
+        <p:txBody>
+          <a:bodyPr>
+            <a:normAutofit fontScale="90000"/>
+          </a:bodyPr>
+          <a:lstStyle/>
+          <a:p>
+            <a:r>
+              <a:rPr lang="en-US" sz="1800" dirty="0" err="1"/>
+              <a:t>xla</a:t>
+            </a:r>
+            <a:r>
+              <a:rPr lang="en-US" sz="1800" dirty="0"/>
+              <a:t>; Chlorpyrifos—Glycine, serine, and threonine </a:t>
+            </a:r>
+            <a:br>
+              <a:rPr lang="en-US" sz="1800" dirty="0"/>
+            </a:br>
+            <a:r>
+              <a:rPr lang="en-US" sz="1800" dirty="0"/>
+              <a:t>metabolism; </a:t>
+            </a:r>
+            <a:r>
+              <a:rPr lang="en-US" sz="1800" dirty="0" err="1"/>
+              <a:t>xla</a:t>
+            </a:r>
+            <a:r>
+              <a:rPr lang="en-US" sz="1800" dirty="0"/>
+              <a:t>=</a:t>
+            </a:r>
+            <a:r>
+              <a:rPr lang="en-US" sz="1800" dirty="0" err="1"/>
+              <a:t>hsa</a:t>
+            </a:r>
+            <a:br>
+              <a:rPr lang="en-US" sz="1800" dirty="0"/>
+            </a:br>
+            <a:endParaRPr lang="en-US" sz="1800" dirty="0"/>
+          </a:p>
+        </p:txBody>
+      </p:sp>
+      <p:pic>
+        <p:nvPicPr>
+          <p:cNvPr id="8" name="Picture 7">
+            <a:extLst>
+              <a:ext uri="{FF2B5EF4-FFF2-40B4-BE49-F238E27FC236}">
+                <a16:creationId xmlns:a16="http://schemas.microsoft.com/office/drawing/2014/main" id="{A544669F-7781-0BF5-794E-100057A1305B}"/>
+              </a:ext>
+            </a:extLst>
+          </p:cNvPr>
+          <p:cNvPicPr>
+            <a:picLocks noChangeAspect="1"/>
+          </p:cNvPicPr>
+          <p:nvPr/>
+        </p:nvPicPr>
+        <p:blipFill>
+          <a:blip r:embed="rId2">
+            <a:extLst>
+              <a:ext uri="{28A0092B-C50C-407E-A947-70E740481C1C}">
+                <a14:useLocalDpi xmlns:a14="http://schemas.microsoft.com/office/drawing/2010/main" val="0"/>
+              </a:ext>
+            </a:extLst>
+          </a:blip>
+          <a:stretch>
+            <a:fillRect/>
+          </a:stretch>
+        </p:blipFill>
+        <p:spPr>
+          <a:xfrm>
+            <a:off x="4376521" y="-123378"/>
+            <a:ext cx="7721694" cy="7104755"/>
+          </a:xfrm>
+          <a:prstGeom prst="rect">
+            <a:avLst/>
+          </a:prstGeom>
+        </p:spPr>
+      </p:pic>
+    </p:spTree>
+    <p:extLst>
+      <p:ext uri="{BB962C8B-B14F-4D97-AF65-F5344CB8AC3E}">
+        <p14:creationId xmlns:p14="http://schemas.microsoft.com/office/powerpoint/2010/main" val="16467550"/>
+      </p:ext>
+    </p:extLst>
+  </p:cSld>
+  <p:clrMapOvr>
+    <a:masterClrMapping/>
+  </p:clrMapOvr>
+</p:sld>
+</file>
+
+<file path=ppt/slides/slide24.xml><?xml version="1.0" encoding="utf-8"?>
+<p:sld xmlns:a="http://schemas.openxmlformats.org/drawingml/2006/main" xmlns:r="http://schemas.openxmlformats.org/officeDocument/2006/relationships" xmlns:p="http://schemas.openxmlformats.org/presentationml/2006/main">
+  <p:cSld>
+    <p:spTree>
+      <p:nvGrpSpPr>
+        <p:cNvPr id="1" name=""/>
+        <p:cNvGrpSpPr/>
+        <p:nvPr/>
+      </p:nvGrpSpPr>
+      <p:grpSpPr>
+        <a:xfrm>
+          <a:off x="0" y="0"/>
+          <a:ext cx="0" cy="0"/>
+          <a:chOff x="0" y="0"/>
+          <a:chExt cx="0" cy="0"/>
+        </a:xfrm>
+      </p:grpSpPr>
+      <p:sp>
+        <p:nvSpPr>
+          <p:cNvPr id="2" name="Title 1">
+            <a:extLst>
+              <a:ext uri="{FF2B5EF4-FFF2-40B4-BE49-F238E27FC236}">
+                <a16:creationId xmlns:a16="http://schemas.microsoft.com/office/drawing/2014/main" id="{29BF9EB6-E5A0-73BE-2C20-F78514A6052F}"/>
+              </a:ext>
+            </a:extLst>
+          </p:cNvPr>
+          <p:cNvSpPr>
+            <a:spLocks noGrp="1"/>
+          </p:cNvSpPr>
+          <p:nvPr>
+            <p:ph type="title"/>
+          </p:nvPr>
+        </p:nvSpPr>
+        <p:spPr>
+          <a:xfrm>
+            <a:off x="656493" y="75414"/>
+            <a:ext cx="10515600" cy="458840"/>
+          </a:xfrm>
+        </p:spPr>
+        <p:txBody>
+          <a:bodyPr>
+            <a:normAutofit fontScale="90000"/>
+          </a:bodyPr>
+          <a:lstStyle/>
+          <a:p>
+            <a:r>
+              <a:rPr lang="en-US" sz="1800" dirty="0" err="1"/>
+              <a:t>xla</a:t>
+            </a:r>
+            <a:r>
+              <a:rPr lang="en-US" sz="1800" dirty="0"/>
+              <a:t>; Chlorpyrifos—Glucose alanine cycle; </a:t>
+            </a:r>
+            <a:r>
+              <a:rPr lang="en-US" sz="1800" dirty="0" err="1"/>
+              <a:t>xla</a:t>
+            </a:r>
+            <a:r>
+              <a:rPr lang="en-US" sz="1800" dirty="0"/>
+              <a:t>=</a:t>
+            </a:r>
+            <a:r>
+              <a:rPr lang="en-US" sz="1800" dirty="0" err="1"/>
+              <a:t>hsa</a:t>
+            </a:r>
+            <a:br>
+              <a:rPr lang="en-US" sz="1800" dirty="0"/>
+            </a:br>
+            <a:endParaRPr lang="en-US" sz="1800" dirty="0"/>
+          </a:p>
+        </p:txBody>
+      </p:sp>
+      <p:pic>
+        <p:nvPicPr>
+          <p:cNvPr id="5" name="Content Placeholder 4">
+            <a:extLst>
+              <a:ext uri="{FF2B5EF4-FFF2-40B4-BE49-F238E27FC236}">
+                <a16:creationId xmlns:a16="http://schemas.microsoft.com/office/drawing/2014/main" id="{F47F66D7-16CA-9DE2-6523-04A3029BE9F9}"/>
+              </a:ext>
+            </a:extLst>
+          </p:cNvPr>
+          <p:cNvPicPr>
+            <a:picLocks noGrp="1" noChangeAspect="1"/>
+          </p:cNvPicPr>
+          <p:nvPr>
+            <p:ph idx="1"/>
+          </p:nvPr>
+        </p:nvPicPr>
+        <p:blipFill>
+          <a:blip r:embed="rId2">
+            <a:extLst>
+              <a:ext uri="{28A0092B-C50C-407E-A947-70E740481C1C}">
+                <a14:useLocalDpi xmlns:a14="http://schemas.microsoft.com/office/drawing/2010/main" val="0"/>
+              </a:ext>
+            </a:extLst>
+          </a:blip>
+          <a:stretch>
+            <a:fillRect/>
+          </a:stretch>
+        </p:blipFill>
+        <p:spPr>
+          <a:xfrm>
+            <a:off x="2471895" y="286812"/>
+            <a:ext cx="7596553" cy="6794252"/>
+          </a:xfrm>
+        </p:spPr>
+      </p:pic>
+    </p:spTree>
+    <p:extLst>
+      <p:ext uri="{BB962C8B-B14F-4D97-AF65-F5344CB8AC3E}">
+        <p14:creationId xmlns:p14="http://schemas.microsoft.com/office/powerpoint/2010/main" val="3269587091"/>
+      </p:ext>
+    </p:extLst>
+  </p:cSld>
+  <p:clrMapOvr>
+    <a:masterClrMapping/>
+  </p:clrMapOvr>
+</p:sld>
+</file>
+
+<file path=ppt/slides/slide25.xml><?xml version="1.0" encoding="utf-8"?>
+<p:sld xmlns:a="http://schemas.openxmlformats.org/drawingml/2006/main" xmlns:r="http://schemas.openxmlformats.org/officeDocument/2006/relationships" xmlns:p="http://schemas.openxmlformats.org/presentationml/2006/main">
+  <p:cSld>
+    <p:spTree>
+      <p:nvGrpSpPr>
+        <p:cNvPr id="1" name=""/>
+        <p:cNvGrpSpPr/>
+        <p:nvPr/>
+      </p:nvGrpSpPr>
+      <p:grpSpPr>
+        <a:xfrm>
+          <a:off x="0" y="0"/>
+          <a:ext cx="0" cy="0"/>
+          <a:chOff x="0" y="0"/>
+          <a:chExt cx="0" cy="0"/>
+        </a:xfrm>
+      </p:grpSpPr>
+      <p:sp>
+        <p:nvSpPr>
+          <p:cNvPr id="2" name="Title 1">
+            <a:extLst>
+              <a:ext uri="{FF2B5EF4-FFF2-40B4-BE49-F238E27FC236}">
+                <a16:creationId xmlns:a16="http://schemas.microsoft.com/office/drawing/2014/main" id="{29BF9EB6-E5A0-73BE-2C20-F78514A6052F}"/>
+              </a:ext>
+            </a:extLst>
+          </p:cNvPr>
+          <p:cNvSpPr>
+            <a:spLocks noGrp="1"/>
+          </p:cNvSpPr>
+          <p:nvPr>
+            <p:ph type="title"/>
+          </p:nvPr>
+        </p:nvSpPr>
+        <p:spPr>
+          <a:xfrm>
+            <a:off x="656493" y="75414"/>
+            <a:ext cx="10515600" cy="458840"/>
+          </a:xfrm>
+        </p:spPr>
+        <p:txBody>
+          <a:bodyPr>
+            <a:normAutofit fontScale="90000"/>
+          </a:bodyPr>
+          <a:lstStyle/>
+          <a:p>
+            <a:r>
+              <a:rPr lang="en-US" sz="1800" dirty="0" err="1"/>
+              <a:t>xla</a:t>
+            </a:r>
+            <a:r>
+              <a:rPr lang="en-US" sz="1800" dirty="0"/>
+              <a:t>; 24D—; </a:t>
+            </a:r>
+            <a:r>
+              <a:rPr lang="en-US" sz="1800" dirty="0" err="1"/>
+              <a:t>xla</a:t>
+            </a:r>
+            <a:r>
+              <a:rPr lang="en-US" sz="1800" dirty="0"/>
+              <a:t>=</a:t>
+            </a:r>
+            <a:r>
+              <a:rPr lang="en-US" sz="1800" dirty="0" err="1"/>
+              <a:t>hsa</a:t>
+            </a:r>
+            <a:br>
+              <a:rPr lang="en-US" sz="1800" dirty="0"/>
+            </a:br>
+            <a:endParaRPr lang="en-US" sz="1800" dirty="0"/>
+          </a:p>
+        </p:txBody>
+      </p:sp>
+      <p:sp>
+        <p:nvSpPr>
+          <p:cNvPr id="4" name="Content Placeholder 3">
+            <a:extLst>
+              <a:ext uri="{FF2B5EF4-FFF2-40B4-BE49-F238E27FC236}">
+                <a16:creationId xmlns:a16="http://schemas.microsoft.com/office/drawing/2014/main" id="{36394FF9-9274-D0E9-D3CD-A32446AEAA75}"/>
+              </a:ext>
+            </a:extLst>
+          </p:cNvPr>
+          <p:cNvSpPr>
+            <a:spLocks noGrp="1"/>
+          </p:cNvSpPr>
+          <p:nvPr>
+            <p:ph idx="1"/>
+          </p:nvPr>
+        </p:nvSpPr>
+        <p:spPr/>
+        <p:txBody>
+          <a:bodyPr/>
+          <a:lstStyle/>
+          <a:p>
+            <a:endParaRPr lang="en-US"/>
+          </a:p>
+        </p:txBody>
+      </p:sp>
+    </p:spTree>
+    <p:extLst>
+      <p:ext uri="{BB962C8B-B14F-4D97-AF65-F5344CB8AC3E}">
+        <p14:creationId xmlns:p14="http://schemas.microsoft.com/office/powerpoint/2010/main" val="3199991795"/>
+      </p:ext>
+    </p:extLst>
+  </p:cSld>
+  <p:clrMapOvr>
+    <a:masterClrMapping/>
+  </p:clrMapOvr>
+</p:sld>
+</file>
+
+<file path=ppt/slides/slide26.xml><?xml version="1.0" encoding="utf-8"?>
+<p:sld xmlns:a="http://schemas.openxmlformats.org/drawingml/2006/main" xmlns:r="http://schemas.openxmlformats.org/officeDocument/2006/relationships" xmlns:p="http://schemas.openxmlformats.org/presentationml/2006/main">
+  <p:cSld>
+    <p:spTree>
+      <p:nvGrpSpPr>
+        <p:cNvPr id="1" name=""/>
+        <p:cNvGrpSpPr/>
+        <p:nvPr/>
+      </p:nvGrpSpPr>
+      <p:grpSpPr>
+        <a:xfrm>
+          <a:off x="0" y="0"/>
+          <a:ext cx="0" cy="0"/>
+          <a:chOff x="0" y="0"/>
+          <a:chExt cx="0" cy="0"/>
+        </a:xfrm>
+      </p:grpSpPr>
+      <p:sp>
+        <p:nvSpPr>
+          <p:cNvPr id="2" name="Title 1">
+            <a:extLst>
+              <a:ext uri="{FF2B5EF4-FFF2-40B4-BE49-F238E27FC236}">
+                <a16:creationId xmlns:a16="http://schemas.microsoft.com/office/drawing/2014/main" id="{29BF9EB6-E5A0-73BE-2C20-F78514A6052F}"/>
+              </a:ext>
+            </a:extLst>
+          </p:cNvPr>
+          <p:cNvSpPr>
+            <a:spLocks noGrp="1"/>
+          </p:cNvSpPr>
+          <p:nvPr>
+            <p:ph type="title"/>
+          </p:nvPr>
+        </p:nvSpPr>
+        <p:spPr>
+          <a:xfrm>
+            <a:off x="656493" y="75414"/>
+            <a:ext cx="10515600" cy="458840"/>
+          </a:xfrm>
+        </p:spPr>
+        <p:txBody>
+          <a:bodyPr>
+            <a:normAutofit fontScale="90000"/>
+          </a:bodyPr>
+          <a:lstStyle/>
+          <a:p>
+            <a:r>
+              <a:rPr lang="en-US" sz="1800" dirty="0" err="1"/>
+              <a:t>xla</a:t>
+            </a:r>
+            <a:r>
+              <a:rPr lang="en-US" sz="1800" dirty="0"/>
+              <a:t>; 24D—; </a:t>
+            </a:r>
+            <a:r>
+              <a:rPr lang="en-US" sz="1800" dirty="0" err="1"/>
+              <a:t>xla</a:t>
+            </a:r>
+            <a:r>
+              <a:rPr lang="en-US" sz="1800" dirty="0"/>
+              <a:t>=</a:t>
+            </a:r>
+            <a:r>
+              <a:rPr lang="en-US" sz="1800" dirty="0" err="1"/>
+              <a:t>hsa</a:t>
+            </a:r>
+            <a:br>
+              <a:rPr lang="en-US" sz="1800" dirty="0"/>
+            </a:br>
+            <a:endParaRPr lang="en-US" sz="1800" dirty="0"/>
+          </a:p>
+        </p:txBody>
+      </p:sp>
+      <p:sp>
+        <p:nvSpPr>
+          <p:cNvPr id="4" name="Content Placeholder 3">
+            <a:extLst>
+              <a:ext uri="{FF2B5EF4-FFF2-40B4-BE49-F238E27FC236}">
+                <a16:creationId xmlns:a16="http://schemas.microsoft.com/office/drawing/2014/main" id="{36394FF9-9274-D0E9-D3CD-A32446AEAA75}"/>
+              </a:ext>
+            </a:extLst>
+          </p:cNvPr>
+          <p:cNvSpPr>
+            <a:spLocks noGrp="1"/>
+          </p:cNvSpPr>
+          <p:nvPr>
+            <p:ph idx="1"/>
+          </p:nvPr>
+        </p:nvSpPr>
+        <p:spPr/>
+        <p:txBody>
+          <a:bodyPr/>
+          <a:lstStyle/>
+          <a:p>
+            <a:endParaRPr lang="en-US"/>
+          </a:p>
+        </p:txBody>
+      </p:sp>
+    </p:spTree>
+    <p:extLst>
+      <p:ext uri="{BB962C8B-B14F-4D97-AF65-F5344CB8AC3E}">
+        <p14:creationId xmlns:p14="http://schemas.microsoft.com/office/powerpoint/2010/main" val="877039883"/>
+      </p:ext>
+    </p:extLst>
+  </p:cSld>
+  <p:clrMapOvr>
+    <a:masterClrMapping/>
+  </p:clrMapOvr>
+</p:sld>
+</file>
+
+<file path=ppt/slides/slide27.xml><?xml version="1.0" encoding="utf-8"?>
+<p:sld xmlns:a="http://schemas.openxmlformats.org/drawingml/2006/main" xmlns:r="http://schemas.openxmlformats.org/officeDocument/2006/relationships" xmlns:p="http://schemas.openxmlformats.org/presentationml/2006/main">
+  <p:cSld>
+    <p:spTree>
+      <p:nvGrpSpPr>
+        <p:cNvPr id="1" name=""/>
+        <p:cNvGrpSpPr/>
+        <p:nvPr/>
+      </p:nvGrpSpPr>
+      <p:grpSpPr>
+        <a:xfrm>
+          <a:off x="0" y="0"/>
+          <a:ext cx="0" cy="0"/>
+          <a:chOff x="0" y="0"/>
+          <a:chExt cx="0" cy="0"/>
+        </a:xfrm>
+      </p:grpSpPr>
+      <p:sp>
+        <p:nvSpPr>
+          <p:cNvPr id="2" name="Title 1">
+            <a:extLst>
+              <a:ext uri="{FF2B5EF4-FFF2-40B4-BE49-F238E27FC236}">
+                <a16:creationId xmlns:a16="http://schemas.microsoft.com/office/drawing/2014/main" id="{29BF9EB6-E5A0-73BE-2C20-F78514A6052F}"/>
+              </a:ext>
+            </a:extLst>
+          </p:cNvPr>
+          <p:cNvSpPr>
+            <a:spLocks noGrp="1"/>
+          </p:cNvSpPr>
+          <p:nvPr>
+            <p:ph type="title"/>
+          </p:nvPr>
+        </p:nvSpPr>
+        <p:spPr>
+          <a:xfrm>
+            <a:off x="656493" y="75414"/>
+            <a:ext cx="10515600" cy="458840"/>
+          </a:xfrm>
+        </p:spPr>
+        <p:txBody>
+          <a:bodyPr>
+            <a:normAutofit fontScale="90000"/>
+          </a:bodyPr>
+          <a:lstStyle/>
+          <a:p>
+            <a:r>
+              <a:rPr lang="en-US" sz="1800" dirty="0" err="1"/>
+              <a:t>xla</a:t>
+            </a:r>
+            <a:r>
+              <a:rPr lang="en-US" sz="1800" dirty="0"/>
+              <a:t>; 24D—; </a:t>
+            </a:r>
+            <a:r>
+              <a:rPr lang="en-US" sz="1800" dirty="0" err="1"/>
+              <a:t>xla</a:t>
+            </a:r>
+            <a:r>
+              <a:rPr lang="en-US" sz="1800" dirty="0"/>
+              <a:t>=</a:t>
+            </a:r>
+            <a:r>
+              <a:rPr lang="en-US" sz="1800" dirty="0" err="1"/>
+              <a:t>hsa</a:t>
+            </a:r>
+            <a:br>
+              <a:rPr lang="en-US" sz="1800" dirty="0"/>
+            </a:br>
+            <a:endParaRPr lang="en-US" sz="1800" dirty="0"/>
+          </a:p>
+        </p:txBody>
+      </p:sp>
+      <p:sp>
+        <p:nvSpPr>
+          <p:cNvPr id="4" name="Content Placeholder 3">
+            <a:extLst>
+              <a:ext uri="{FF2B5EF4-FFF2-40B4-BE49-F238E27FC236}">
+                <a16:creationId xmlns:a16="http://schemas.microsoft.com/office/drawing/2014/main" id="{36394FF9-9274-D0E9-D3CD-A32446AEAA75}"/>
+              </a:ext>
+            </a:extLst>
+          </p:cNvPr>
+          <p:cNvSpPr>
+            <a:spLocks noGrp="1"/>
+          </p:cNvSpPr>
+          <p:nvPr>
+            <p:ph idx="1"/>
+          </p:nvPr>
+        </p:nvSpPr>
+        <p:spPr/>
+        <p:txBody>
+          <a:bodyPr/>
+          <a:lstStyle/>
+          <a:p>
+            <a:endParaRPr lang="en-US"/>
+          </a:p>
+        </p:txBody>
+      </p:sp>
+    </p:spTree>
+    <p:extLst>
+      <p:ext uri="{BB962C8B-B14F-4D97-AF65-F5344CB8AC3E}">
+        <p14:creationId xmlns:p14="http://schemas.microsoft.com/office/powerpoint/2010/main" val="3423878622"/>
+      </p:ext>
+    </p:extLst>
+  </p:cSld>
+  <p:clrMapOvr>
+    <a:masterClrMapping/>
+  </p:clrMapOvr>
+</p:sld>
+</file>
+
+<file path=ppt/slides/slide28.xml><?xml version="1.0" encoding="utf-8"?>
+<p:sld xmlns:a="http://schemas.openxmlformats.org/drawingml/2006/main" xmlns:r="http://schemas.openxmlformats.org/officeDocument/2006/relationships" xmlns:p="http://schemas.openxmlformats.org/presentationml/2006/main">
+  <p:cSld>
+    <p:spTree>
+      <p:nvGrpSpPr>
+        <p:cNvPr id="1" name=""/>
+        <p:cNvGrpSpPr/>
+        <p:nvPr/>
+      </p:nvGrpSpPr>
+      <p:grpSpPr>
+        <a:xfrm>
+          <a:off x="0" y="0"/>
+          <a:ext cx="0" cy="0"/>
+          <a:chOff x="0" y="0"/>
+          <a:chExt cx="0" cy="0"/>
+        </a:xfrm>
+      </p:grpSpPr>
+      <p:sp>
+        <p:nvSpPr>
+          <p:cNvPr id="2" name="Title 1">
+            <a:extLst>
+              <a:ext uri="{FF2B5EF4-FFF2-40B4-BE49-F238E27FC236}">
+                <a16:creationId xmlns:a16="http://schemas.microsoft.com/office/drawing/2014/main" id="{29BF9EB6-E5A0-73BE-2C20-F78514A6052F}"/>
+              </a:ext>
+            </a:extLst>
+          </p:cNvPr>
+          <p:cNvSpPr>
+            <a:spLocks noGrp="1"/>
+          </p:cNvSpPr>
+          <p:nvPr>
+            <p:ph type="title"/>
+          </p:nvPr>
+        </p:nvSpPr>
+        <p:spPr>
+          <a:xfrm>
+            <a:off x="656493" y="75414"/>
+            <a:ext cx="10515600" cy="458840"/>
+          </a:xfrm>
+        </p:spPr>
+        <p:txBody>
+          <a:bodyPr>
+            <a:normAutofit fontScale="90000"/>
+          </a:bodyPr>
+          <a:lstStyle/>
+          <a:p>
+            <a:r>
+              <a:rPr lang="en-US" sz="1800" dirty="0" err="1"/>
+              <a:t>xla</a:t>
+            </a:r>
+            <a:r>
+              <a:rPr lang="en-US" sz="1800" dirty="0"/>
+              <a:t>; 24D—; </a:t>
+            </a:r>
+            <a:r>
+              <a:rPr lang="en-US" sz="1800" dirty="0" err="1"/>
+              <a:t>xla</a:t>
+            </a:r>
+            <a:r>
+              <a:rPr lang="en-US" sz="1800" dirty="0"/>
+              <a:t>=</a:t>
+            </a:r>
+            <a:r>
+              <a:rPr lang="en-US" sz="1800" dirty="0" err="1"/>
+              <a:t>hsa</a:t>
+            </a:r>
+            <a:br>
+              <a:rPr lang="en-US" sz="1800" dirty="0"/>
+            </a:br>
+            <a:endParaRPr lang="en-US" sz="1800" dirty="0"/>
+          </a:p>
+        </p:txBody>
+      </p:sp>
+      <p:sp>
+        <p:nvSpPr>
+          <p:cNvPr id="4" name="Content Placeholder 3">
+            <a:extLst>
+              <a:ext uri="{FF2B5EF4-FFF2-40B4-BE49-F238E27FC236}">
+                <a16:creationId xmlns:a16="http://schemas.microsoft.com/office/drawing/2014/main" id="{36394FF9-9274-D0E9-D3CD-A32446AEAA75}"/>
+              </a:ext>
+            </a:extLst>
+          </p:cNvPr>
+          <p:cNvSpPr>
+            <a:spLocks noGrp="1"/>
+          </p:cNvSpPr>
+          <p:nvPr>
+            <p:ph idx="1"/>
+          </p:nvPr>
+        </p:nvSpPr>
+        <p:spPr/>
+        <p:txBody>
+          <a:bodyPr/>
+          <a:lstStyle/>
+          <a:p>
+            <a:endParaRPr lang="en-US"/>
+          </a:p>
+        </p:txBody>
+      </p:sp>
+    </p:spTree>
+    <p:extLst>
+      <p:ext uri="{BB962C8B-B14F-4D97-AF65-F5344CB8AC3E}">
+        <p14:creationId xmlns:p14="http://schemas.microsoft.com/office/powerpoint/2010/main" val="2178064077"/>
+      </p:ext>
+    </p:extLst>
+  </p:cSld>
+  <p:clrMapOvr>
+    <a:masterClrMapping/>
+  </p:clrMapOvr>
+</p:sld>
+</file>
+
+<file path=ppt/slides/slide29.xml><?xml version="1.0" encoding="utf-8"?>
+<p:sld xmlns:a="http://schemas.openxmlformats.org/drawingml/2006/main" xmlns:r="http://schemas.openxmlformats.org/officeDocument/2006/relationships" xmlns:p="http://schemas.openxmlformats.org/presentationml/2006/main">
+  <p:cSld>
+    <p:spTree>
+      <p:nvGrpSpPr>
+        <p:cNvPr id="1" name=""/>
+        <p:cNvGrpSpPr/>
+        <p:nvPr/>
+      </p:nvGrpSpPr>
+      <p:grpSpPr>
+        <a:xfrm>
+          <a:off x="0" y="0"/>
+          <a:ext cx="0" cy="0"/>
+          <a:chOff x="0" y="0"/>
+          <a:chExt cx="0" cy="0"/>
+        </a:xfrm>
+      </p:grpSpPr>
+      <p:sp>
+        <p:nvSpPr>
+          <p:cNvPr id="2" name="Title 1">
+            <a:extLst>
+              <a:ext uri="{FF2B5EF4-FFF2-40B4-BE49-F238E27FC236}">
+                <a16:creationId xmlns:a16="http://schemas.microsoft.com/office/drawing/2014/main" id="{29BF9EB6-E5A0-73BE-2C20-F78514A6052F}"/>
+              </a:ext>
+            </a:extLst>
+          </p:cNvPr>
+          <p:cNvSpPr>
+            <a:spLocks noGrp="1"/>
+          </p:cNvSpPr>
+          <p:nvPr>
+            <p:ph type="title"/>
+          </p:nvPr>
+        </p:nvSpPr>
+        <p:spPr>
+          <a:xfrm>
+            <a:off x="656493" y="75414"/>
+            <a:ext cx="10515600" cy="458840"/>
+          </a:xfrm>
+        </p:spPr>
+        <p:txBody>
+          <a:bodyPr>
+            <a:normAutofit fontScale="90000"/>
+          </a:bodyPr>
+          <a:lstStyle/>
+          <a:p>
+            <a:r>
+              <a:rPr lang="en-US" sz="1800" dirty="0" err="1"/>
+              <a:t>xla</a:t>
+            </a:r>
+            <a:r>
+              <a:rPr lang="en-US" sz="1800" dirty="0"/>
+              <a:t>; 24D—; </a:t>
+            </a:r>
+            <a:r>
+              <a:rPr lang="en-US" sz="1800" dirty="0" err="1"/>
+              <a:t>xla</a:t>
+            </a:r>
+            <a:r>
+              <a:rPr lang="en-US" sz="1800" dirty="0"/>
+              <a:t>=</a:t>
+            </a:r>
+            <a:r>
+              <a:rPr lang="en-US" sz="1800" dirty="0" err="1"/>
+              <a:t>hsa</a:t>
+            </a:r>
+            <a:br>
+              <a:rPr lang="en-US" sz="1800" dirty="0"/>
+            </a:br>
+            <a:endParaRPr lang="en-US" sz="1800" dirty="0"/>
+          </a:p>
+        </p:txBody>
+      </p:sp>
+      <p:sp>
+        <p:nvSpPr>
+          <p:cNvPr id="4" name="Content Placeholder 3">
+            <a:extLst>
+              <a:ext uri="{FF2B5EF4-FFF2-40B4-BE49-F238E27FC236}">
+                <a16:creationId xmlns:a16="http://schemas.microsoft.com/office/drawing/2014/main" id="{36394FF9-9274-D0E9-D3CD-A32446AEAA75}"/>
+              </a:ext>
+            </a:extLst>
+          </p:cNvPr>
+          <p:cNvSpPr>
+            <a:spLocks noGrp="1"/>
+          </p:cNvSpPr>
+          <p:nvPr>
+            <p:ph idx="1"/>
+          </p:nvPr>
+        </p:nvSpPr>
+        <p:spPr/>
+        <p:txBody>
+          <a:bodyPr/>
+          <a:lstStyle/>
+          <a:p>
+            <a:endParaRPr lang="en-US"/>
+          </a:p>
+        </p:txBody>
+      </p:sp>
+    </p:spTree>
+    <p:extLst>
+      <p:ext uri="{BB962C8B-B14F-4D97-AF65-F5344CB8AC3E}">
+        <p14:creationId xmlns:p14="http://schemas.microsoft.com/office/powerpoint/2010/main" val="547215275"/>
+      </p:ext>
+    </p:extLst>
+  </p:cSld>
+  <p:clrMapOvr>
+    <a:masterClrMapping/>
+  </p:clrMapOvr>
+</p:sld>
+</file>
+
 <file path=ppt/slides/slide3.xml><?xml version="1.0" encoding="utf-8"?>
 <p:sld xmlns:a="http://schemas.openxmlformats.org/drawingml/2006/main" xmlns:r="http://schemas.openxmlformats.org/officeDocument/2006/relationships" xmlns:p="http://schemas.openxmlformats.org/presentationml/2006/main">
   <p:cSld>

</xml_diff>

<commit_message>
updates including pathway results
</commit_message>
<xml_diff>
--- a/pptx/vanmeter_salamander_exposures.pptx
+++ b/pptx/vanmeter_salamander_exposures.pptx
@@ -17,23 +17,25 @@
     <p:sldId id="270" r:id="rId11"/>
     <p:sldId id="271" r:id="rId12"/>
     <p:sldId id="272" r:id="rId13"/>
-    <p:sldId id="273" r:id="rId14"/>
-    <p:sldId id="274" r:id="rId15"/>
-    <p:sldId id="257" r:id="rId16"/>
-    <p:sldId id="258" r:id="rId17"/>
-    <p:sldId id="259" r:id="rId18"/>
-    <p:sldId id="260" r:id="rId19"/>
-    <p:sldId id="261" r:id="rId20"/>
-    <p:sldId id="277" r:id="rId21"/>
-    <p:sldId id="281" r:id="rId22"/>
-    <p:sldId id="278" r:id="rId23"/>
-    <p:sldId id="280" r:id="rId24"/>
-    <p:sldId id="282" r:id="rId25"/>
-    <p:sldId id="283" r:id="rId26"/>
-    <p:sldId id="284" r:id="rId27"/>
-    <p:sldId id="285" r:id="rId28"/>
-    <p:sldId id="286" r:id="rId29"/>
-    <p:sldId id="287" r:id="rId30"/>
+    <p:sldId id="288" r:id="rId14"/>
+    <p:sldId id="289" r:id="rId15"/>
+    <p:sldId id="273" r:id="rId16"/>
+    <p:sldId id="274" r:id="rId17"/>
+    <p:sldId id="257" r:id="rId18"/>
+    <p:sldId id="258" r:id="rId19"/>
+    <p:sldId id="259" r:id="rId20"/>
+    <p:sldId id="260" r:id="rId21"/>
+    <p:sldId id="261" r:id="rId22"/>
+    <p:sldId id="277" r:id="rId23"/>
+    <p:sldId id="281" r:id="rId24"/>
+    <p:sldId id="278" r:id="rId25"/>
+    <p:sldId id="280" r:id="rId26"/>
+    <p:sldId id="282" r:id="rId27"/>
+    <p:sldId id="283" r:id="rId28"/>
+    <p:sldId id="284" r:id="rId29"/>
+    <p:sldId id="285" r:id="rId30"/>
+    <p:sldId id="286" r:id="rId31"/>
+    <p:sldId id="287" r:id="rId32"/>
   </p:sldIdLst>
   <p:sldSz cx="12192000" cy="6858000"/>
   <p:notesSz cx="6858000" cy="9144000"/>
@@ -287,7 +289,7 @@
           <a:p>
             <a:fld id="{A09DAD73-6C51-45AB-A1E3-AD938ED06CDF}" type="datetimeFigureOut">
               <a:rPr lang="en-US" smtClean="0"/>
-              <a:t>3/10/2023</a:t>
+              <a:t>3/16/2023</a:t>
             </a:fld>
             <a:endParaRPr lang="en-US"/>
           </a:p>
@@ -485,7 +487,7 @@
           <a:p>
             <a:fld id="{A09DAD73-6C51-45AB-A1E3-AD938ED06CDF}" type="datetimeFigureOut">
               <a:rPr lang="en-US" smtClean="0"/>
-              <a:t>3/10/2023</a:t>
+              <a:t>3/16/2023</a:t>
             </a:fld>
             <a:endParaRPr lang="en-US"/>
           </a:p>
@@ -693,7 +695,7 @@
           <a:p>
             <a:fld id="{A09DAD73-6C51-45AB-A1E3-AD938ED06CDF}" type="datetimeFigureOut">
               <a:rPr lang="en-US" smtClean="0"/>
-              <a:t>3/10/2023</a:t>
+              <a:t>3/16/2023</a:t>
             </a:fld>
             <a:endParaRPr lang="en-US"/>
           </a:p>
@@ -891,7 +893,7 @@
           <a:p>
             <a:fld id="{A09DAD73-6C51-45AB-A1E3-AD938ED06CDF}" type="datetimeFigureOut">
               <a:rPr lang="en-US" smtClean="0"/>
-              <a:t>3/10/2023</a:t>
+              <a:t>3/16/2023</a:t>
             </a:fld>
             <a:endParaRPr lang="en-US"/>
           </a:p>
@@ -1166,7 +1168,7 @@
           <a:p>
             <a:fld id="{A09DAD73-6C51-45AB-A1E3-AD938ED06CDF}" type="datetimeFigureOut">
               <a:rPr lang="en-US" smtClean="0"/>
-              <a:t>3/10/2023</a:t>
+              <a:t>3/16/2023</a:t>
             </a:fld>
             <a:endParaRPr lang="en-US"/>
           </a:p>
@@ -1431,7 +1433,7 @@
           <a:p>
             <a:fld id="{A09DAD73-6C51-45AB-A1E3-AD938ED06CDF}" type="datetimeFigureOut">
               <a:rPr lang="en-US" smtClean="0"/>
-              <a:t>3/10/2023</a:t>
+              <a:t>3/16/2023</a:t>
             </a:fld>
             <a:endParaRPr lang="en-US"/>
           </a:p>
@@ -1843,7 +1845,7 @@
           <a:p>
             <a:fld id="{A09DAD73-6C51-45AB-A1E3-AD938ED06CDF}" type="datetimeFigureOut">
               <a:rPr lang="en-US" smtClean="0"/>
-              <a:t>3/10/2023</a:t>
+              <a:t>3/16/2023</a:t>
             </a:fld>
             <a:endParaRPr lang="en-US"/>
           </a:p>
@@ -1984,7 +1986,7 @@
           <a:p>
             <a:fld id="{A09DAD73-6C51-45AB-A1E3-AD938ED06CDF}" type="datetimeFigureOut">
               <a:rPr lang="en-US" smtClean="0"/>
-              <a:t>3/10/2023</a:t>
+              <a:t>3/16/2023</a:t>
             </a:fld>
             <a:endParaRPr lang="en-US"/>
           </a:p>
@@ -2097,7 +2099,7 @@
           <a:p>
             <a:fld id="{A09DAD73-6C51-45AB-A1E3-AD938ED06CDF}" type="datetimeFigureOut">
               <a:rPr lang="en-US" smtClean="0"/>
-              <a:t>3/10/2023</a:t>
+              <a:t>3/16/2023</a:t>
             </a:fld>
             <a:endParaRPr lang="en-US"/>
           </a:p>
@@ -2408,7 +2410,7 @@
           <a:p>
             <a:fld id="{A09DAD73-6C51-45AB-A1E3-AD938ED06CDF}" type="datetimeFigureOut">
               <a:rPr lang="en-US" smtClean="0"/>
-              <a:t>3/10/2023</a:t>
+              <a:t>3/16/2023</a:t>
             </a:fld>
             <a:endParaRPr lang="en-US"/>
           </a:p>
@@ -2696,7 +2698,7 @@
           <a:p>
             <a:fld id="{A09DAD73-6C51-45AB-A1E3-AD938ED06CDF}" type="datetimeFigureOut">
               <a:rPr lang="en-US" smtClean="0"/>
-              <a:t>3/10/2023</a:t>
+              <a:t>3/16/2023</a:t>
             </a:fld>
             <a:endParaRPr lang="en-US"/>
           </a:p>
@@ -2937,7 +2939,7 @@
           <a:p>
             <a:fld id="{A09DAD73-6C51-45AB-A1E3-AD938ED06CDF}" type="datetimeFigureOut">
               <a:rPr lang="en-US" smtClean="0"/>
-              <a:t>3/10/2023</a:t>
+              <a:t>3/16/2023</a:t>
             </a:fld>
             <a:endParaRPr lang="en-US"/>
           </a:p>
@@ -4132,12 +4134,62 @@
           <a:chExt cx="0" cy="0"/>
         </a:xfrm>
       </p:grpSpPr>
+      <p:sp>
+        <p:nvSpPr>
+          <p:cNvPr id="2" name="Title 1">
+            <a:extLst>
+              <a:ext uri="{FF2B5EF4-FFF2-40B4-BE49-F238E27FC236}">
+                <a16:creationId xmlns:a16="http://schemas.microsoft.com/office/drawing/2014/main" id="{106A8024-95DC-E966-0D62-4AFBCA16DAE4}"/>
+              </a:ext>
+            </a:extLst>
+          </p:cNvPr>
+          <p:cNvSpPr>
+            <a:spLocks noGrp="1"/>
+          </p:cNvSpPr>
+          <p:nvPr>
+            <p:ph type="title"/>
+          </p:nvPr>
+        </p:nvSpPr>
+        <p:spPr/>
+        <p:txBody>
+          <a:bodyPr/>
+          <a:lstStyle/>
+          <a:p>
+            <a:endParaRPr lang="en-US"/>
+          </a:p>
+        </p:txBody>
+      </p:sp>
+      <p:sp>
+        <p:nvSpPr>
+          <p:cNvPr id="3" name="Content Placeholder 2">
+            <a:extLst>
+              <a:ext uri="{FF2B5EF4-FFF2-40B4-BE49-F238E27FC236}">
+                <a16:creationId xmlns:a16="http://schemas.microsoft.com/office/drawing/2014/main" id="{19555F0E-E6FC-AB18-0895-7FEF311B8215}"/>
+              </a:ext>
+            </a:extLst>
+          </p:cNvPr>
+          <p:cNvSpPr>
+            <a:spLocks noGrp="1"/>
+          </p:cNvSpPr>
+          <p:nvPr>
+            <p:ph idx="1"/>
+          </p:nvPr>
+        </p:nvSpPr>
+        <p:spPr/>
+        <p:txBody>
+          <a:bodyPr/>
+          <a:lstStyle/>
+          <a:p>
+            <a:endParaRPr lang="en-US"/>
+          </a:p>
+        </p:txBody>
+      </p:sp>
       <p:pic>
         <p:nvPicPr>
           <p:cNvPr id="5" name="Picture 4">
             <a:extLst>
               <a:ext uri="{FF2B5EF4-FFF2-40B4-BE49-F238E27FC236}">
-                <a16:creationId xmlns:a16="http://schemas.microsoft.com/office/drawing/2014/main" id="{28F39AF9-8FA2-1E27-DED7-6C98DEAC6352}"/>
+                <a16:creationId xmlns:a16="http://schemas.microsoft.com/office/drawing/2014/main" id="{BC5F2F71-6EA6-25BF-CF74-0FB0D1394413}"/>
               </a:ext>
             </a:extLst>
           </p:cNvPr>
@@ -4154,55 +4206,18 @@
         </p:blipFill>
         <p:spPr>
           <a:xfrm>
-            <a:off x="397163" y="55996"/>
-            <a:ext cx="9401781" cy="6734892"/>
+            <a:off x="2262535" y="0"/>
+            <a:ext cx="7666929" cy="6858000"/>
           </a:xfrm>
           <a:prstGeom prst="rect">
             <a:avLst/>
           </a:prstGeom>
         </p:spPr>
       </p:pic>
-      <p:sp>
-        <p:nvSpPr>
-          <p:cNvPr id="2" name="Title 1">
-            <a:extLst>
-              <a:ext uri="{FF2B5EF4-FFF2-40B4-BE49-F238E27FC236}">
-                <a16:creationId xmlns:a16="http://schemas.microsoft.com/office/drawing/2014/main" id="{68AC0A0C-1C5A-64F6-8F4A-EF0556EAC1DD}"/>
-              </a:ext>
-            </a:extLst>
-          </p:cNvPr>
-          <p:cNvSpPr>
-            <a:spLocks noGrp="1"/>
-          </p:cNvSpPr>
-          <p:nvPr>
-            <p:ph type="title"/>
-          </p:nvPr>
-        </p:nvSpPr>
-        <p:spPr>
-          <a:xfrm>
-            <a:off x="5834165" y="5465325"/>
-            <a:ext cx="6356927" cy="1325563"/>
-          </a:xfrm>
-        </p:spPr>
-        <p:txBody>
-          <a:bodyPr/>
-          <a:lstStyle/>
-          <a:p>
-            <a:r>
-              <a:rPr lang="en-US" dirty="0" err="1"/>
-              <a:t>Chlorpyrfos</a:t>
-            </a:r>
-            <a:r>
-              <a:rPr lang="en-US" dirty="0"/>
-              <a:t>, log2 v control</a:t>
-            </a:r>
-          </a:p>
-        </p:txBody>
-      </p:sp>
     </p:spTree>
     <p:extLst>
       <p:ext uri="{BB962C8B-B14F-4D97-AF65-F5344CB8AC3E}">
-        <p14:creationId xmlns:p14="http://schemas.microsoft.com/office/powerpoint/2010/main" val="249576630"/>
+        <p14:creationId xmlns:p14="http://schemas.microsoft.com/office/powerpoint/2010/main" val="1904536910"/>
       </p:ext>
     </p:extLst>
   </p:cSld>
@@ -4234,7 +4249,7 @@
           <p:cNvPr id="2" name="Title 1">
             <a:extLst>
               <a:ext uri="{FF2B5EF4-FFF2-40B4-BE49-F238E27FC236}">
-                <a16:creationId xmlns:a16="http://schemas.microsoft.com/office/drawing/2014/main" id="{FA9D0A6F-35B7-989C-777F-70CD6CFA5D84}"/>
+                <a16:creationId xmlns:a16="http://schemas.microsoft.com/office/drawing/2014/main" id="{3A72562A-E104-A744-0A64-BA49A33CD567}"/>
               </a:ext>
             </a:extLst>
           </p:cNvPr>
@@ -4259,7 +4274,7 @@
           <p:cNvPr id="3" name="Content Placeholder 2">
             <a:extLst>
               <a:ext uri="{FF2B5EF4-FFF2-40B4-BE49-F238E27FC236}">
-                <a16:creationId xmlns:a16="http://schemas.microsoft.com/office/drawing/2014/main" id="{E3F2277D-F638-1BA5-1B71-8FEB35A67793}"/>
+                <a16:creationId xmlns:a16="http://schemas.microsoft.com/office/drawing/2014/main" id="{1577E626-24AE-2579-A8F0-0AF9B05032CC}"/>
               </a:ext>
             </a:extLst>
           </p:cNvPr>
@@ -4279,10 +4294,40 @@
           </a:p>
         </p:txBody>
       </p:sp>
+      <p:pic>
+        <p:nvPicPr>
+          <p:cNvPr id="5" name="Picture 4">
+            <a:extLst>
+              <a:ext uri="{FF2B5EF4-FFF2-40B4-BE49-F238E27FC236}">
+                <a16:creationId xmlns:a16="http://schemas.microsoft.com/office/drawing/2014/main" id="{AF5D9412-564C-42FF-D0C2-BA95F6F50B0A}"/>
+              </a:ext>
+            </a:extLst>
+          </p:cNvPr>
+          <p:cNvPicPr>
+            <a:picLocks noChangeAspect="1"/>
+          </p:cNvPicPr>
+          <p:nvPr/>
+        </p:nvPicPr>
+        <p:blipFill>
+          <a:blip r:embed="rId2"/>
+          <a:stretch>
+            <a:fillRect/>
+          </a:stretch>
+        </p:blipFill>
+        <p:spPr>
+          <a:xfrm>
+            <a:off x="2031003" y="0"/>
+            <a:ext cx="8129994" cy="6858000"/>
+          </a:xfrm>
+          <a:prstGeom prst="rect">
+            <a:avLst/>
+          </a:prstGeom>
+        </p:spPr>
+      </p:pic>
     </p:spTree>
     <p:extLst>
       <p:ext uri="{BB962C8B-B14F-4D97-AF65-F5344CB8AC3E}">
-        <p14:creationId xmlns:p14="http://schemas.microsoft.com/office/powerpoint/2010/main" val="1250932286"/>
+        <p14:creationId xmlns:p14="http://schemas.microsoft.com/office/powerpoint/2010/main" val="1989200286"/>
       </p:ext>
     </p:extLst>
   </p:cSld>
@@ -4314,7 +4359,7 @@
           <p:cNvPr id="5" name="Picture 4">
             <a:extLst>
               <a:ext uri="{FF2B5EF4-FFF2-40B4-BE49-F238E27FC236}">
-                <a16:creationId xmlns:a16="http://schemas.microsoft.com/office/drawing/2014/main" id="{AE57FB0C-7DA8-1619-E405-A41462CF60FA}"/>
+                <a16:creationId xmlns:a16="http://schemas.microsoft.com/office/drawing/2014/main" id="{28F39AF9-8FA2-1E27-DED7-6C98DEAC6352}"/>
               </a:ext>
             </a:extLst>
           </p:cNvPr>
@@ -4331,50 +4376,20 @@
         </p:blipFill>
         <p:spPr>
           <a:xfrm>
-            <a:off x="1" y="2049863"/>
-            <a:ext cx="5067130" cy="4617219"/>
+            <a:off x="397163" y="55996"/>
+            <a:ext cx="9401781" cy="6734892"/>
           </a:xfrm>
           <a:prstGeom prst="rect">
             <a:avLst/>
           </a:prstGeom>
         </p:spPr>
       </p:pic>
-      <p:pic>
-        <p:nvPicPr>
-          <p:cNvPr id="7" name="Picture 6">
-            <a:extLst>
-              <a:ext uri="{FF2B5EF4-FFF2-40B4-BE49-F238E27FC236}">
-                <a16:creationId xmlns:a16="http://schemas.microsoft.com/office/drawing/2014/main" id="{275500CE-9CB0-025C-266E-89D70CDC4B1C}"/>
-              </a:ext>
-            </a:extLst>
-          </p:cNvPr>
-          <p:cNvPicPr>
-            <a:picLocks noChangeAspect="1"/>
-          </p:cNvPicPr>
-          <p:nvPr/>
-        </p:nvPicPr>
-        <p:blipFill>
-          <a:blip r:embed="rId3"/>
-          <a:stretch>
-            <a:fillRect/>
-          </a:stretch>
-        </p:blipFill>
-        <p:spPr>
-          <a:xfrm>
-            <a:off x="5067131" y="681037"/>
-            <a:ext cx="7098843" cy="6127739"/>
-          </a:xfrm>
-          <a:prstGeom prst="rect">
-            <a:avLst/>
-          </a:prstGeom>
-        </p:spPr>
-      </p:pic>
       <p:sp>
         <p:nvSpPr>
           <p:cNvPr id="2" name="Title 1">
             <a:extLst>
               <a:ext uri="{FF2B5EF4-FFF2-40B4-BE49-F238E27FC236}">
-                <a16:creationId xmlns:a16="http://schemas.microsoft.com/office/drawing/2014/main" id="{F2992844-C348-ED8E-D093-9ABAE1B2BF35}"/>
+                <a16:creationId xmlns:a16="http://schemas.microsoft.com/office/drawing/2014/main" id="{68AC0A0C-1C5A-64F6-8F4A-EF0556EAC1DD}"/>
               </a:ext>
             </a:extLst>
           </p:cNvPr>
@@ -4387,8 +4402,8 @@
         </p:nvSpPr>
         <p:spPr>
           <a:xfrm>
-            <a:off x="9761135" y="186976"/>
-            <a:ext cx="2095919" cy="1325563"/>
+            <a:off x="5834165" y="5465325"/>
+            <a:ext cx="6356927" cy="1325563"/>
           </a:xfrm>
         </p:spPr>
         <p:txBody>
@@ -4396,8 +4411,12 @@
           <a:lstStyle/>
           <a:p>
             <a:r>
+              <a:rPr lang="en-US" dirty="0" err="1"/>
+              <a:t>Chlorpyrfos</a:t>
+            </a:r>
+            <a:r>
               <a:rPr lang="en-US" dirty="0"/>
-              <a:t>Urea</a:t>
+              <a:t>, log2 v control</a:t>
             </a:r>
           </a:p>
         </p:txBody>
@@ -4405,7 +4424,7 @@
     </p:spTree>
     <p:extLst>
       <p:ext uri="{BB962C8B-B14F-4D97-AF65-F5344CB8AC3E}">
-        <p14:creationId xmlns:p14="http://schemas.microsoft.com/office/powerpoint/2010/main" val="111734949"/>
+        <p14:creationId xmlns:p14="http://schemas.microsoft.com/office/powerpoint/2010/main" val="249576630"/>
       </p:ext>
     </p:extLst>
   </p:cSld>
@@ -4432,42 +4451,12 @@
           <a:chExt cx="0" cy="0"/>
         </a:xfrm>
       </p:grpSpPr>
-      <p:pic>
-        <p:nvPicPr>
-          <p:cNvPr id="6" name="Picture 5">
-            <a:extLst>
-              <a:ext uri="{FF2B5EF4-FFF2-40B4-BE49-F238E27FC236}">
-                <a16:creationId xmlns:a16="http://schemas.microsoft.com/office/drawing/2014/main" id="{9A20F6E2-847E-92EF-CFF4-EBA27A87D7FD}"/>
-              </a:ext>
-            </a:extLst>
-          </p:cNvPr>
-          <p:cNvPicPr>
-            <a:picLocks noChangeAspect="1"/>
-          </p:cNvPicPr>
-          <p:nvPr/>
-        </p:nvPicPr>
-        <p:blipFill>
-          <a:blip r:embed="rId2"/>
-          <a:stretch>
-            <a:fillRect/>
-          </a:stretch>
-        </p:blipFill>
-        <p:spPr>
-          <a:xfrm>
-            <a:off x="4457103" y="0"/>
-            <a:ext cx="7734897" cy="6858000"/>
-          </a:xfrm>
-          <a:prstGeom prst="rect">
-            <a:avLst/>
-          </a:prstGeom>
-        </p:spPr>
-      </p:pic>
       <p:sp>
         <p:nvSpPr>
           <p:cNvPr id="2" name="Title 1">
             <a:extLst>
               <a:ext uri="{FF2B5EF4-FFF2-40B4-BE49-F238E27FC236}">
-                <a16:creationId xmlns:a16="http://schemas.microsoft.com/office/drawing/2014/main" id="{F2992844-C348-ED8E-D093-9ABAE1B2BF35}"/>
+                <a16:creationId xmlns:a16="http://schemas.microsoft.com/office/drawing/2014/main" id="{FA9D0A6F-35B7-989C-777F-70CD6CFA5D84}"/>
               </a:ext>
             </a:extLst>
           </p:cNvPr>
@@ -4478,106 +4467,44 @@
             <p:ph type="title"/>
           </p:nvPr>
         </p:nvSpPr>
-        <p:spPr>
-          <a:xfrm>
-            <a:off x="622998" y="186977"/>
-            <a:ext cx="5627077" cy="827908"/>
-          </a:xfrm>
-        </p:spPr>
-        <p:txBody>
-          <a:bodyPr>
-            <a:normAutofit/>
-          </a:bodyPr>
-          <a:lstStyle/>
-          <a:p>
-            <a:r>
-              <a:rPr lang="en-US" dirty="0"/>
-              <a:t>Gly Ser Metabolism</a:t>
-            </a:r>
-          </a:p>
-        </p:txBody>
-      </p:sp>
-      <p:pic>
-        <p:nvPicPr>
-          <p:cNvPr id="3" name="Picture 2">
-            <a:extLst>
-              <a:ext uri="{FF2B5EF4-FFF2-40B4-BE49-F238E27FC236}">
-                <a16:creationId xmlns:a16="http://schemas.microsoft.com/office/drawing/2014/main" id="{3CCD611F-24A8-177E-E074-F2E7A61949E2}"/>
-              </a:ext>
-            </a:extLst>
-          </p:cNvPr>
-          <p:cNvPicPr>
-            <a:picLocks noChangeAspect="1"/>
-          </p:cNvPicPr>
-          <p:nvPr/>
-        </p:nvPicPr>
-        <p:blipFill>
-          <a:blip r:embed="rId3"/>
-          <a:stretch>
-            <a:fillRect/>
-          </a:stretch>
-        </p:blipFill>
-        <p:spPr>
-          <a:xfrm>
-            <a:off x="0" y="2592474"/>
-            <a:ext cx="4682125" cy="4185139"/>
-          </a:xfrm>
-          <a:prstGeom prst="rect">
-            <a:avLst/>
-          </a:prstGeom>
-        </p:spPr>
-      </p:pic>
-      <p:pic>
-        <p:nvPicPr>
-          <p:cNvPr id="1026" name="Picture 2">
-            <a:extLst>
-              <a:ext uri="{FF2B5EF4-FFF2-40B4-BE49-F238E27FC236}">
-                <a16:creationId xmlns:a16="http://schemas.microsoft.com/office/drawing/2014/main" id="{2EB94BEA-9B71-2CCD-AAA5-014BEB08004E}"/>
-              </a:ext>
-            </a:extLst>
-          </p:cNvPr>
-          <p:cNvPicPr>
-            <a:picLocks noChangeAspect="1" noChangeArrowheads="1"/>
-          </p:cNvPicPr>
-          <p:nvPr/>
-        </p:nvPicPr>
-        <p:blipFill>
-          <a:blip r:embed="rId4">
-            <a:extLst>
-              <a:ext uri="{28A0092B-C50C-407E-A947-70E740481C1C}">
-                <a14:useLocalDpi xmlns:a14="http://schemas.microsoft.com/office/drawing/2010/main" val="0"/>
-              </a:ext>
-            </a:extLst>
-          </a:blip>
-          <a:srcRect/>
-          <a:stretch>
-            <a:fillRect/>
-          </a:stretch>
-        </p:blipFill>
-        <p:spPr bwMode="auto">
-          <a:xfrm>
-            <a:off x="254051" y="186977"/>
-            <a:ext cx="3705000" cy="2392813"/>
-          </a:xfrm>
-          <a:prstGeom prst="rect">
-            <a:avLst/>
-          </a:prstGeom>
-          <a:noFill/>
-          <a:extLst>
-            <a:ext uri="{909E8E84-426E-40DD-AFC4-6F175D3DCCD1}">
-              <a14:hiddenFill xmlns:a14="http://schemas.microsoft.com/office/drawing/2010/main">
-                <a:solidFill>
-                  <a:srgbClr val="FFFFFF"/>
-                </a:solidFill>
-              </a14:hiddenFill>
-            </a:ext>
-          </a:extLst>
-        </p:spPr>
-      </p:pic>
+        <p:spPr/>
+        <p:txBody>
+          <a:bodyPr/>
+          <a:lstStyle/>
+          <a:p>
+            <a:endParaRPr lang="en-US"/>
+          </a:p>
+        </p:txBody>
+      </p:sp>
+      <p:sp>
+        <p:nvSpPr>
+          <p:cNvPr id="3" name="Content Placeholder 2">
+            <a:extLst>
+              <a:ext uri="{FF2B5EF4-FFF2-40B4-BE49-F238E27FC236}">
+                <a16:creationId xmlns:a16="http://schemas.microsoft.com/office/drawing/2014/main" id="{E3F2277D-F638-1BA5-1B71-8FEB35A67793}"/>
+              </a:ext>
+            </a:extLst>
+          </p:cNvPr>
+          <p:cNvSpPr>
+            <a:spLocks noGrp="1"/>
+          </p:cNvSpPr>
+          <p:nvPr>
+            <p:ph idx="1"/>
+          </p:nvPr>
+        </p:nvSpPr>
+        <p:spPr/>
+        <p:txBody>
+          <a:bodyPr/>
+          <a:lstStyle/>
+          <a:p>
+            <a:endParaRPr lang="en-US"/>
+          </a:p>
+        </p:txBody>
+      </p:sp>
     </p:spTree>
     <p:extLst>
       <p:ext uri="{BB962C8B-B14F-4D97-AF65-F5344CB8AC3E}">
-        <p14:creationId xmlns:p14="http://schemas.microsoft.com/office/powerpoint/2010/main" val="1176159520"/>
+        <p14:creationId xmlns:p14="http://schemas.microsoft.com/office/powerpoint/2010/main" val="1250932286"/>
       </p:ext>
     </p:extLst>
   </p:cSld>
@@ -4604,47 +4531,12 @@
           <a:chExt cx="0" cy="0"/>
         </a:xfrm>
       </p:grpSpPr>
-      <p:sp>
-        <p:nvSpPr>
-          <p:cNvPr id="2" name="Title 1">
-            <a:extLst>
-              <a:ext uri="{FF2B5EF4-FFF2-40B4-BE49-F238E27FC236}">
-                <a16:creationId xmlns:a16="http://schemas.microsoft.com/office/drawing/2014/main" id="{F2992844-C348-ED8E-D093-9ABAE1B2BF35}"/>
-              </a:ext>
-            </a:extLst>
-          </p:cNvPr>
-          <p:cNvSpPr>
-            <a:spLocks noGrp="1"/>
-          </p:cNvSpPr>
-          <p:nvPr>
-            <p:ph type="title"/>
-          </p:nvPr>
-        </p:nvSpPr>
-        <p:spPr>
-          <a:xfrm>
-            <a:off x="347435" y="0"/>
-            <a:ext cx="4883498" cy="1325563"/>
-          </a:xfrm>
-        </p:spPr>
-        <p:txBody>
-          <a:bodyPr>
-            <a:normAutofit/>
-          </a:bodyPr>
-          <a:lstStyle/>
-          <a:p>
-            <a:r>
-              <a:rPr lang="en-US" dirty="0"/>
-              <a:t>Glu metabolism</a:t>
-            </a:r>
-          </a:p>
-        </p:txBody>
-      </p:sp>
       <p:pic>
         <p:nvPicPr>
-          <p:cNvPr id="4" name="Picture 3">
-            <a:extLst>
-              <a:ext uri="{FF2B5EF4-FFF2-40B4-BE49-F238E27FC236}">
-                <a16:creationId xmlns:a16="http://schemas.microsoft.com/office/drawing/2014/main" id="{2EC6305B-307E-8F19-1FD8-AC208FA7BC1D}"/>
+          <p:cNvPr id="5" name="Picture 4">
+            <a:extLst>
+              <a:ext uri="{FF2B5EF4-FFF2-40B4-BE49-F238E27FC236}">
+                <a16:creationId xmlns:a16="http://schemas.microsoft.com/office/drawing/2014/main" id="{AE57FB0C-7DA8-1619-E405-A41462CF60FA}"/>
               </a:ext>
             </a:extLst>
           </p:cNvPr>
@@ -4661,8 +4553,8 @@
         </p:blipFill>
         <p:spPr>
           <a:xfrm>
-            <a:off x="80387" y="2150346"/>
-            <a:ext cx="5016149" cy="4577025"/>
+            <a:off x="1" y="2049863"/>
+            <a:ext cx="5067130" cy="4617219"/>
           </a:xfrm>
           <a:prstGeom prst="rect">
             <a:avLst/>
@@ -4671,10 +4563,10 @@
       </p:pic>
       <p:pic>
         <p:nvPicPr>
-          <p:cNvPr id="6" name="Picture 5">
-            <a:extLst>
-              <a:ext uri="{FF2B5EF4-FFF2-40B4-BE49-F238E27FC236}">
-                <a16:creationId xmlns:a16="http://schemas.microsoft.com/office/drawing/2014/main" id="{128E1FEB-74CA-0A13-CE7F-1F51F09DEED0}"/>
+          <p:cNvPr id="7" name="Picture 6">
+            <a:extLst>
+              <a:ext uri="{FF2B5EF4-FFF2-40B4-BE49-F238E27FC236}">
+                <a16:creationId xmlns:a16="http://schemas.microsoft.com/office/drawing/2014/main" id="{275500CE-9CB0-025C-266E-89D70CDC4B1C}"/>
               </a:ext>
             </a:extLst>
           </p:cNvPr>
@@ -4691,18 +4583,51 @@
         </p:blipFill>
         <p:spPr>
           <a:xfrm>
-            <a:off x="5230933" y="874207"/>
-            <a:ext cx="6521344" cy="5983793"/>
+            <a:off x="5067131" y="681037"/>
+            <a:ext cx="7098843" cy="6127739"/>
           </a:xfrm>
           <a:prstGeom prst="rect">
             <a:avLst/>
           </a:prstGeom>
         </p:spPr>
       </p:pic>
+      <p:sp>
+        <p:nvSpPr>
+          <p:cNvPr id="2" name="Title 1">
+            <a:extLst>
+              <a:ext uri="{FF2B5EF4-FFF2-40B4-BE49-F238E27FC236}">
+                <a16:creationId xmlns:a16="http://schemas.microsoft.com/office/drawing/2014/main" id="{F2992844-C348-ED8E-D093-9ABAE1B2BF35}"/>
+              </a:ext>
+            </a:extLst>
+          </p:cNvPr>
+          <p:cNvSpPr>
+            <a:spLocks noGrp="1"/>
+          </p:cNvSpPr>
+          <p:nvPr>
+            <p:ph type="title"/>
+          </p:nvPr>
+        </p:nvSpPr>
+        <p:spPr>
+          <a:xfrm>
+            <a:off x="9761135" y="186976"/>
+            <a:ext cx="2095919" cy="1325563"/>
+          </a:xfrm>
+        </p:spPr>
+        <p:txBody>
+          <a:bodyPr/>
+          <a:lstStyle/>
+          <a:p>
+            <a:r>
+              <a:rPr lang="en-US" dirty="0"/>
+              <a:t>Urea</a:t>
+            </a:r>
+          </a:p>
+        </p:txBody>
+      </p:sp>
     </p:spTree>
     <p:extLst>
       <p:ext uri="{BB962C8B-B14F-4D97-AF65-F5344CB8AC3E}">
-        <p14:creationId xmlns:p14="http://schemas.microsoft.com/office/powerpoint/2010/main" val="1003902108"/>
+        <p14:creationId xmlns:p14="http://schemas.microsoft.com/office/powerpoint/2010/main" val="111734949"/>
       </p:ext>
     </p:extLst>
   </p:cSld>
@@ -4729,47 +4654,12 @@
           <a:chExt cx="0" cy="0"/>
         </a:xfrm>
       </p:grpSpPr>
-      <p:sp>
-        <p:nvSpPr>
-          <p:cNvPr id="2" name="Title 1">
-            <a:extLst>
-              <a:ext uri="{FF2B5EF4-FFF2-40B4-BE49-F238E27FC236}">
-                <a16:creationId xmlns:a16="http://schemas.microsoft.com/office/drawing/2014/main" id="{F2992844-C348-ED8E-D093-9ABAE1B2BF35}"/>
-              </a:ext>
-            </a:extLst>
-          </p:cNvPr>
-          <p:cNvSpPr>
-            <a:spLocks noGrp="1"/>
-          </p:cNvSpPr>
-          <p:nvPr>
-            <p:ph type="title"/>
-          </p:nvPr>
-        </p:nvSpPr>
-        <p:spPr>
-          <a:xfrm>
-            <a:off x="261258" y="86493"/>
-            <a:ext cx="4360984" cy="1325563"/>
-          </a:xfrm>
-        </p:spPr>
-        <p:txBody>
-          <a:bodyPr>
-            <a:normAutofit/>
-          </a:bodyPr>
-          <a:lstStyle/>
-          <a:p>
-            <a:r>
-              <a:rPr lang="en-US" dirty="0"/>
-              <a:t>Gluconeogenesis</a:t>
-            </a:r>
-          </a:p>
-        </p:txBody>
-      </p:sp>
       <p:pic>
         <p:nvPicPr>
-          <p:cNvPr id="4" name="Picture 3">
-            <a:extLst>
-              <a:ext uri="{FF2B5EF4-FFF2-40B4-BE49-F238E27FC236}">
-                <a16:creationId xmlns:a16="http://schemas.microsoft.com/office/drawing/2014/main" id="{E581B02E-B3EF-0FCD-B498-D6682A34A968}"/>
+          <p:cNvPr id="6" name="Picture 5">
+            <a:extLst>
+              <a:ext uri="{FF2B5EF4-FFF2-40B4-BE49-F238E27FC236}">
+                <a16:creationId xmlns:a16="http://schemas.microsoft.com/office/drawing/2014/main" id="{9A20F6E2-847E-92EF-CFF4-EBA27A87D7FD}"/>
               </a:ext>
             </a:extLst>
           </p:cNvPr>
@@ -4786,20 +4676,55 @@
         </p:blipFill>
         <p:spPr>
           <a:xfrm>
-            <a:off x="0" y="1989574"/>
-            <a:ext cx="5260385" cy="4597119"/>
+            <a:off x="4457103" y="0"/>
+            <a:ext cx="7734897" cy="6858000"/>
           </a:xfrm>
           <a:prstGeom prst="rect">
             <a:avLst/>
           </a:prstGeom>
         </p:spPr>
       </p:pic>
+      <p:sp>
+        <p:nvSpPr>
+          <p:cNvPr id="2" name="Title 1">
+            <a:extLst>
+              <a:ext uri="{FF2B5EF4-FFF2-40B4-BE49-F238E27FC236}">
+                <a16:creationId xmlns:a16="http://schemas.microsoft.com/office/drawing/2014/main" id="{F2992844-C348-ED8E-D093-9ABAE1B2BF35}"/>
+              </a:ext>
+            </a:extLst>
+          </p:cNvPr>
+          <p:cNvSpPr>
+            <a:spLocks noGrp="1"/>
+          </p:cNvSpPr>
+          <p:nvPr>
+            <p:ph type="title"/>
+          </p:nvPr>
+        </p:nvSpPr>
+        <p:spPr>
+          <a:xfrm>
+            <a:off x="622998" y="186977"/>
+            <a:ext cx="5627077" cy="827908"/>
+          </a:xfrm>
+        </p:spPr>
+        <p:txBody>
+          <a:bodyPr>
+            <a:normAutofit/>
+          </a:bodyPr>
+          <a:lstStyle/>
+          <a:p>
+            <a:r>
+              <a:rPr lang="en-US" dirty="0"/>
+              <a:t>Gly Ser Metabolism</a:t>
+            </a:r>
+          </a:p>
+        </p:txBody>
+      </p:sp>
       <p:pic>
         <p:nvPicPr>
-          <p:cNvPr id="6" name="Picture 5">
-            <a:extLst>
-              <a:ext uri="{FF2B5EF4-FFF2-40B4-BE49-F238E27FC236}">
-                <a16:creationId xmlns:a16="http://schemas.microsoft.com/office/drawing/2014/main" id="{61807715-DE3A-15A8-3FA7-1C8B15F80413}"/>
+          <p:cNvPr id="3" name="Picture 2">
+            <a:extLst>
+              <a:ext uri="{FF2B5EF4-FFF2-40B4-BE49-F238E27FC236}">
+                <a16:creationId xmlns:a16="http://schemas.microsoft.com/office/drawing/2014/main" id="{3CCD611F-24A8-177E-E074-F2E7A61949E2}"/>
               </a:ext>
             </a:extLst>
           </p:cNvPr>
@@ -4816,18 +4741,65 @@
         </p:blipFill>
         <p:spPr>
           <a:xfrm>
-            <a:off x="5064369" y="429436"/>
-            <a:ext cx="7015441" cy="6291742"/>
+            <a:off x="0" y="2592474"/>
+            <a:ext cx="4682125" cy="4185139"/>
           </a:xfrm>
           <a:prstGeom prst="rect">
             <a:avLst/>
           </a:prstGeom>
+        </p:spPr>
+      </p:pic>
+      <p:pic>
+        <p:nvPicPr>
+          <p:cNvPr id="1026" name="Picture 2">
+            <a:extLst>
+              <a:ext uri="{FF2B5EF4-FFF2-40B4-BE49-F238E27FC236}">
+                <a16:creationId xmlns:a16="http://schemas.microsoft.com/office/drawing/2014/main" id="{2EB94BEA-9B71-2CCD-AAA5-014BEB08004E}"/>
+              </a:ext>
+            </a:extLst>
+          </p:cNvPr>
+          <p:cNvPicPr>
+            <a:picLocks noChangeAspect="1" noChangeArrowheads="1"/>
+          </p:cNvPicPr>
+          <p:nvPr/>
+        </p:nvPicPr>
+        <p:blipFill>
+          <a:blip r:embed="rId4">
+            <a:extLst>
+              <a:ext uri="{28A0092B-C50C-407E-A947-70E740481C1C}">
+                <a14:useLocalDpi xmlns:a14="http://schemas.microsoft.com/office/drawing/2010/main" val="0"/>
+              </a:ext>
+            </a:extLst>
+          </a:blip>
+          <a:srcRect/>
+          <a:stretch>
+            <a:fillRect/>
+          </a:stretch>
+        </p:blipFill>
+        <p:spPr bwMode="auto">
+          <a:xfrm>
+            <a:off x="254051" y="186977"/>
+            <a:ext cx="3705000" cy="2392813"/>
+          </a:xfrm>
+          <a:prstGeom prst="rect">
+            <a:avLst/>
+          </a:prstGeom>
+          <a:noFill/>
+          <a:extLst>
+            <a:ext uri="{909E8E84-426E-40DD-AFC4-6F175D3DCCD1}">
+              <a14:hiddenFill xmlns:a14="http://schemas.microsoft.com/office/drawing/2010/main">
+                <a:solidFill>
+                  <a:srgbClr val="FFFFFF"/>
+                </a:solidFill>
+              </a14:hiddenFill>
+            </a:ext>
+          </a:extLst>
         </p:spPr>
       </p:pic>
     </p:spTree>
     <p:extLst>
       <p:ext uri="{BB962C8B-B14F-4D97-AF65-F5344CB8AC3E}">
-        <p14:creationId xmlns:p14="http://schemas.microsoft.com/office/powerpoint/2010/main" val="164740431"/>
+        <p14:creationId xmlns:p14="http://schemas.microsoft.com/office/powerpoint/2010/main" val="1176159520"/>
       </p:ext>
     </p:extLst>
   </p:cSld>
@@ -4872,25 +4844,87 @@
         </p:nvSpPr>
         <p:spPr>
           <a:xfrm>
-            <a:off x="8591341" y="186976"/>
-            <a:ext cx="3265713" cy="998729"/>
-          </a:xfrm>
-        </p:spPr>
-        <p:txBody>
-          <a:bodyPr/>
+            <a:off x="347435" y="0"/>
+            <a:ext cx="4883498" cy="1325563"/>
+          </a:xfrm>
+        </p:spPr>
+        <p:txBody>
+          <a:bodyPr>
+            <a:normAutofit/>
+          </a:bodyPr>
           <a:lstStyle/>
           <a:p>
             <a:r>
               <a:rPr lang="en-US" dirty="0"/>
-              <a:t>Glu Ala Cycle</a:t>
-            </a:r>
-          </a:p>
-        </p:txBody>
-      </p:sp>
+              <a:t>Glu metabolism</a:t>
+            </a:r>
+          </a:p>
+        </p:txBody>
+      </p:sp>
+      <p:pic>
+        <p:nvPicPr>
+          <p:cNvPr id="4" name="Picture 3">
+            <a:extLst>
+              <a:ext uri="{FF2B5EF4-FFF2-40B4-BE49-F238E27FC236}">
+                <a16:creationId xmlns:a16="http://schemas.microsoft.com/office/drawing/2014/main" id="{2EC6305B-307E-8F19-1FD8-AC208FA7BC1D}"/>
+              </a:ext>
+            </a:extLst>
+          </p:cNvPr>
+          <p:cNvPicPr>
+            <a:picLocks noChangeAspect="1"/>
+          </p:cNvPicPr>
+          <p:nvPr/>
+        </p:nvPicPr>
+        <p:blipFill>
+          <a:blip r:embed="rId2"/>
+          <a:stretch>
+            <a:fillRect/>
+          </a:stretch>
+        </p:blipFill>
+        <p:spPr>
+          <a:xfrm>
+            <a:off x="80387" y="2150346"/>
+            <a:ext cx="5016149" cy="4577025"/>
+          </a:xfrm>
+          <a:prstGeom prst="rect">
+            <a:avLst/>
+          </a:prstGeom>
+        </p:spPr>
+      </p:pic>
+      <p:pic>
+        <p:nvPicPr>
+          <p:cNvPr id="6" name="Picture 5">
+            <a:extLst>
+              <a:ext uri="{FF2B5EF4-FFF2-40B4-BE49-F238E27FC236}">
+                <a16:creationId xmlns:a16="http://schemas.microsoft.com/office/drawing/2014/main" id="{128E1FEB-74CA-0A13-CE7F-1F51F09DEED0}"/>
+              </a:ext>
+            </a:extLst>
+          </p:cNvPr>
+          <p:cNvPicPr>
+            <a:picLocks noChangeAspect="1"/>
+          </p:cNvPicPr>
+          <p:nvPr/>
+        </p:nvPicPr>
+        <p:blipFill>
+          <a:blip r:embed="rId3"/>
+          <a:stretch>
+            <a:fillRect/>
+          </a:stretch>
+        </p:blipFill>
+        <p:spPr>
+          <a:xfrm>
+            <a:off x="5230933" y="874207"/>
+            <a:ext cx="6521344" cy="5983793"/>
+          </a:xfrm>
+          <a:prstGeom prst="rect">
+            <a:avLst/>
+          </a:prstGeom>
+        </p:spPr>
+      </p:pic>
     </p:spTree>
     <p:extLst>
       <p:ext uri="{BB962C8B-B14F-4D97-AF65-F5344CB8AC3E}">
-        <p14:creationId xmlns:p14="http://schemas.microsoft.com/office/powerpoint/2010/main" val="2827528181"/>
+        <p14:creationId xmlns:p14="http://schemas.microsoft.com/office/powerpoint/2010/main" val="1003902108"/>
       </p:ext>
     </p:extLst>
   </p:cSld>
@@ -5201,62 +5235,45 @@
       </p:grpSpPr>
       <p:sp>
         <p:nvSpPr>
-          <p:cNvPr id="8" name="TextBox 7">
-            <a:extLst>
-              <a:ext uri="{FF2B5EF4-FFF2-40B4-BE49-F238E27FC236}">
-                <a16:creationId xmlns:a16="http://schemas.microsoft.com/office/drawing/2014/main" id="{2C8C3E8D-0CFB-CCC2-08EC-135F390EF581}"/>
-              </a:ext>
-            </a:extLst>
-          </p:cNvPr>
-          <p:cNvSpPr txBox="1"/>
-          <p:nvPr/>
-        </p:nvSpPr>
-        <p:spPr>
-          <a:xfrm>
-            <a:off x="663191" y="241160"/>
-            <a:ext cx="6712299" cy="369332"/>
-          </a:xfrm>
-          <a:prstGeom prst="rect">
-            <a:avLst/>
-          </a:prstGeom>
-          <a:noFill/>
-        </p:spPr>
-        <p:txBody>
-          <a:bodyPr wrap="square" rtlCol="0">
-            <a:spAutoFit/>
+          <p:cNvPr id="2" name="Title 1">
+            <a:extLst>
+              <a:ext uri="{FF2B5EF4-FFF2-40B4-BE49-F238E27FC236}">
+                <a16:creationId xmlns:a16="http://schemas.microsoft.com/office/drawing/2014/main" id="{F2992844-C348-ED8E-D093-9ABAE1B2BF35}"/>
+              </a:ext>
+            </a:extLst>
+          </p:cNvPr>
+          <p:cNvSpPr>
+            <a:spLocks noGrp="1"/>
+          </p:cNvSpPr>
+          <p:nvPr>
+            <p:ph type="title"/>
+          </p:nvPr>
+        </p:nvSpPr>
+        <p:spPr>
+          <a:xfrm>
+            <a:off x="261258" y="86493"/>
+            <a:ext cx="4360984" cy="1325563"/>
+          </a:xfrm>
+        </p:spPr>
+        <p:txBody>
+          <a:bodyPr>
+            <a:normAutofit/>
           </a:bodyPr>
           <a:lstStyle/>
           <a:p>
             <a:r>
-              <a:rPr lang="en-US" dirty="0" err="1"/>
-              <a:t>xla</a:t>
-            </a:r>
-            <a:r>
               <a:rPr lang="en-US" dirty="0"/>
-              <a:t>; Chlorpyrifos—Arginine biosynthesis (Urea cycle); </a:t>
-            </a:r>
-            <a:r>
-              <a:rPr lang="en-US" dirty="0" err="1"/>
-              <a:t>xla</a:t>
-            </a:r>
-            <a:r>
-              <a:rPr lang="en-US" dirty="0"/>
-              <a:t>=</a:t>
-            </a:r>
-            <a:r>
-              <a:rPr lang="en-US" dirty="0" err="1"/>
-              <a:t>hsa</a:t>
-            </a:r>
-            <a:endParaRPr lang="en-US" dirty="0"/>
+              <a:t>Gluconeogenesis</a:t>
+            </a:r>
           </a:p>
         </p:txBody>
       </p:sp>
       <p:pic>
         <p:nvPicPr>
-          <p:cNvPr id="3" name="Picture 2">
-            <a:extLst>
-              <a:ext uri="{FF2B5EF4-FFF2-40B4-BE49-F238E27FC236}">
-                <a16:creationId xmlns:a16="http://schemas.microsoft.com/office/drawing/2014/main" id="{D53015E3-C80E-79A2-D262-31BEA26E994C}"/>
+          <p:cNvPr id="4" name="Picture 3">
+            <a:extLst>
+              <a:ext uri="{FF2B5EF4-FFF2-40B4-BE49-F238E27FC236}">
+                <a16:creationId xmlns:a16="http://schemas.microsoft.com/office/drawing/2014/main" id="{E581B02E-B3EF-0FCD-B498-D6682A34A968}"/>
               </a:ext>
             </a:extLst>
           </p:cNvPr>
@@ -5266,21 +5283,15 @@
           <p:nvPr/>
         </p:nvPicPr>
         <p:blipFill>
-          <a:blip r:embed="rId2">
-            <a:extLst>
-              <a:ext uri="{28A0092B-C50C-407E-A947-70E740481C1C}">
-                <a14:useLocalDpi xmlns:a14="http://schemas.microsoft.com/office/drawing/2010/main" val="0"/>
-              </a:ext>
-            </a:extLst>
-          </a:blip>
+          <a:blip r:embed="rId2"/>
           <a:stretch>
             <a:fillRect/>
           </a:stretch>
         </p:blipFill>
         <p:spPr>
           <a:xfrm>
-            <a:off x="191214" y="610492"/>
-            <a:ext cx="11809572" cy="4963886"/>
+            <a:off x="0" y="1989574"/>
+            <a:ext cx="5260385" cy="4597119"/>
           </a:xfrm>
           <a:prstGeom prst="rect">
             <a:avLst/>
@@ -5292,7 +5303,7 @@
           <p:cNvPr id="6" name="Picture 5">
             <a:extLst>
               <a:ext uri="{FF2B5EF4-FFF2-40B4-BE49-F238E27FC236}">
-                <a16:creationId xmlns:a16="http://schemas.microsoft.com/office/drawing/2014/main" id="{D3A83DB5-9EF9-7B06-C850-A3AA80E0C457}"/>
+                <a16:creationId xmlns:a16="http://schemas.microsoft.com/office/drawing/2014/main" id="{61807715-DE3A-15A8-3FA7-1C8B15F80413}"/>
               </a:ext>
             </a:extLst>
           </p:cNvPr>
@@ -5309,8 +5320,8 @@
         </p:blipFill>
         <p:spPr>
           <a:xfrm>
-            <a:off x="1990613" y="5377181"/>
-            <a:ext cx="10120705" cy="1480819"/>
+            <a:off x="5064369" y="429436"/>
+            <a:ext cx="7015441" cy="6291742"/>
           </a:xfrm>
           <a:prstGeom prst="rect">
             <a:avLst/>
@@ -5320,7 +5331,7 @@
     </p:spTree>
     <p:extLst>
       <p:ext uri="{BB962C8B-B14F-4D97-AF65-F5344CB8AC3E}">
-        <p14:creationId xmlns:p14="http://schemas.microsoft.com/office/powerpoint/2010/main" val="3691130347"/>
+        <p14:creationId xmlns:p14="http://schemas.microsoft.com/office/powerpoint/2010/main" val="164740431"/>
       </p:ext>
     </p:extLst>
   </p:cSld>
@@ -5352,7 +5363,7 @@
           <p:cNvPr id="2" name="Title 1">
             <a:extLst>
               <a:ext uri="{FF2B5EF4-FFF2-40B4-BE49-F238E27FC236}">
-                <a16:creationId xmlns:a16="http://schemas.microsoft.com/office/drawing/2014/main" id="{29BF9EB6-E5A0-73BE-2C20-F78514A6052F}"/>
+                <a16:creationId xmlns:a16="http://schemas.microsoft.com/office/drawing/2014/main" id="{F2992844-C348-ED8E-D093-9ABAE1B2BF35}"/>
               </a:ext>
             </a:extLst>
           </p:cNvPr>
@@ -5365,82 +5376,25 @@
         </p:nvSpPr>
         <p:spPr>
           <a:xfrm>
-            <a:off x="656493" y="75414"/>
-            <a:ext cx="10515600" cy="458840"/>
-          </a:xfrm>
-        </p:spPr>
-        <p:txBody>
-          <a:bodyPr>
-            <a:normAutofit fontScale="90000"/>
-          </a:bodyPr>
-          <a:lstStyle/>
-          <a:p>
-            <a:r>
-              <a:rPr lang="en-US" sz="1800" dirty="0" err="1"/>
-              <a:t>xla</a:t>
-            </a:r>
-            <a:r>
-              <a:rPr lang="en-US" sz="1800" dirty="0"/>
-              <a:t>; Chlorpyrifos—; </a:t>
-            </a:r>
-            <a:r>
-              <a:rPr lang="en-US" sz="1800" dirty="0" err="1"/>
-              <a:t>xla</a:t>
-            </a:r>
-            <a:r>
-              <a:rPr lang="en-US" sz="1800" dirty="0"/>
-              <a:t>=</a:t>
-            </a:r>
-            <a:r>
-              <a:rPr lang="en-US" sz="1800" dirty="0" err="1"/>
-              <a:t>hsa</a:t>
-            </a:r>
-            <a:br>
-              <a:rPr lang="en-US" sz="1800" dirty="0"/>
-            </a:br>
-            <a:endParaRPr lang="en-US" sz="1800" dirty="0"/>
-          </a:p>
-        </p:txBody>
-      </p:sp>
-      <p:pic>
-        <p:nvPicPr>
-          <p:cNvPr id="5" name="Content Placeholder 4">
-            <a:extLst>
-              <a:ext uri="{FF2B5EF4-FFF2-40B4-BE49-F238E27FC236}">
-                <a16:creationId xmlns:a16="http://schemas.microsoft.com/office/drawing/2014/main" id="{A7F5E34B-0BDA-F5BF-245A-CE566D6B237E}"/>
-              </a:ext>
-            </a:extLst>
-          </p:cNvPr>
-          <p:cNvPicPr>
-            <a:picLocks noGrp="1" noChangeAspect="1"/>
-          </p:cNvPicPr>
-          <p:nvPr>
-            <p:ph idx="1"/>
-          </p:nvPr>
-        </p:nvPicPr>
-        <p:blipFill>
-          <a:blip r:embed="rId2">
-            <a:extLst>
-              <a:ext uri="{28A0092B-C50C-407E-A947-70E740481C1C}">
-                <a14:useLocalDpi xmlns:a14="http://schemas.microsoft.com/office/drawing/2010/main" val="0"/>
-              </a:ext>
-            </a:extLst>
-          </a:blip>
-          <a:stretch>
-            <a:fillRect/>
-          </a:stretch>
-        </p:blipFill>
-        <p:spPr>
-          <a:xfrm>
-            <a:off x="4612193" y="-32348"/>
-            <a:ext cx="4973934" cy="7120506"/>
-          </a:xfrm>
-        </p:spPr>
-      </p:pic>
+            <a:off x="8591341" y="186976"/>
+            <a:ext cx="3265713" cy="998729"/>
+          </a:xfrm>
+        </p:spPr>
+        <p:txBody>
+          <a:bodyPr/>
+          <a:lstStyle/>
+          <a:p>
+            <a:r>
+              <a:rPr lang="en-US" dirty="0"/>
+              <a:t>Glu Ala Cycle</a:t>
+            </a:r>
+          </a:p>
+        </p:txBody>
+      </p:sp>
     </p:spTree>
     <p:extLst>
       <p:ext uri="{BB962C8B-B14F-4D97-AF65-F5344CB8AC3E}">
-        <p14:creationId xmlns:p14="http://schemas.microsoft.com/office/powerpoint/2010/main" val="2555528081"/>
+        <p14:creationId xmlns:p14="http://schemas.microsoft.com/office/powerpoint/2010/main" val="2827528181"/>
       </p:ext>
     </p:extLst>
   </p:cSld>
@@ -5467,21 +5421,71 @@
           <a:chExt cx="0" cy="0"/>
         </a:xfrm>
       </p:grpSpPr>
+      <p:sp>
+        <p:nvSpPr>
+          <p:cNvPr id="8" name="TextBox 7">
+            <a:extLst>
+              <a:ext uri="{FF2B5EF4-FFF2-40B4-BE49-F238E27FC236}">
+                <a16:creationId xmlns:a16="http://schemas.microsoft.com/office/drawing/2014/main" id="{2C8C3E8D-0CFB-CCC2-08EC-135F390EF581}"/>
+              </a:ext>
+            </a:extLst>
+          </p:cNvPr>
+          <p:cNvSpPr txBox="1"/>
+          <p:nvPr/>
+        </p:nvSpPr>
+        <p:spPr>
+          <a:xfrm>
+            <a:off x="663191" y="241160"/>
+            <a:ext cx="6712299" cy="369332"/>
+          </a:xfrm>
+          <a:prstGeom prst="rect">
+            <a:avLst/>
+          </a:prstGeom>
+          <a:noFill/>
+        </p:spPr>
+        <p:txBody>
+          <a:bodyPr wrap="square" rtlCol="0">
+            <a:spAutoFit/>
+          </a:bodyPr>
+          <a:lstStyle/>
+          <a:p>
+            <a:r>
+              <a:rPr lang="en-US" dirty="0" err="1"/>
+              <a:t>xla</a:t>
+            </a:r>
+            <a:r>
+              <a:rPr lang="en-US" dirty="0"/>
+              <a:t>; Chlorpyrifos—Arginine biosynthesis (Urea cycle); </a:t>
+            </a:r>
+            <a:r>
+              <a:rPr lang="en-US" dirty="0" err="1"/>
+              <a:t>xla</a:t>
+            </a:r>
+            <a:r>
+              <a:rPr lang="en-US" dirty="0"/>
+              <a:t>=</a:t>
+            </a:r>
+            <a:r>
+              <a:rPr lang="en-US" dirty="0" err="1"/>
+              <a:t>hsa</a:t>
+            </a:r>
+            <a:endParaRPr lang="en-US" dirty="0"/>
+          </a:p>
+        </p:txBody>
+      </p:sp>
       <p:pic>
         <p:nvPicPr>
-          <p:cNvPr id="5" name="Content Placeholder 4">
-            <a:extLst>
-              <a:ext uri="{FF2B5EF4-FFF2-40B4-BE49-F238E27FC236}">
-                <a16:creationId xmlns:a16="http://schemas.microsoft.com/office/drawing/2014/main" id="{05AC57BF-9037-B742-C389-A6B8FC66278C}"/>
+          <p:cNvPr id="3" name="Picture 2">
+            <a:extLst>
+              <a:ext uri="{FF2B5EF4-FFF2-40B4-BE49-F238E27FC236}">
+                <a16:creationId xmlns:a16="http://schemas.microsoft.com/office/drawing/2014/main" id="{D53015E3-C80E-79A2-D262-31BEA26E994C}"/>
               </a:ext>
             </a:extLst>
           </p:cNvPr>
           <p:cNvPicPr>
-            <a:picLocks noGrp="1" noChangeAspect="1"/>
+            <a:picLocks noChangeAspect="1"/>
           </p:cNvPicPr>
-          <p:nvPr>
-            <p:ph idx="1"/>
-          </p:nvPr>
+          <p:nvPr/>
         </p:nvPicPr>
         <p:blipFill>
           <a:blip r:embed="rId2">
@@ -5497,93 +5501,20 @@
         </p:blipFill>
         <p:spPr>
           <a:xfrm>
-            <a:off x="2140299" y="0"/>
-            <a:ext cx="9646417" cy="5621905"/>
-          </a:xfrm>
+            <a:off x="191214" y="610492"/>
+            <a:ext cx="11809572" cy="4963886"/>
+          </a:xfrm>
+          <a:prstGeom prst="rect">
+            <a:avLst/>
+          </a:prstGeom>
         </p:spPr>
       </p:pic>
-      <p:sp>
-        <p:nvSpPr>
-          <p:cNvPr id="2" name="Title 1">
-            <a:extLst>
-              <a:ext uri="{FF2B5EF4-FFF2-40B4-BE49-F238E27FC236}">
-                <a16:creationId xmlns:a16="http://schemas.microsoft.com/office/drawing/2014/main" id="{29BF9EB6-E5A0-73BE-2C20-F78514A6052F}"/>
-              </a:ext>
-            </a:extLst>
-          </p:cNvPr>
-          <p:cNvSpPr>
-            <a:spLocks noGrp="1"/>
-          </p:cNvSpPr>
-          <p:nvPr>
-            <p:ph type="title"/>
-          </p:nvPr>
-        </p:nvSpPr>
-        <p:spPr>
-          <a:xfrm>
-            <a:off x="127122" y="75414"/>
-            <a:ext cx="10515600" cy="1291162"/>
-          </a:xfrm>
-        </p:spPr>
-        <p:txBody>
-          <a:bodyPr>
-            <a:normAutofit fontScale="90000"/>
-          </a:bodyPr>
-          <a:lstStyle/>
-          <a:p>
-            <a:r>
-              <a:rPr lang="en-US" sz="1800" dirty="0" err="1"/>
-              <a:t>xla</a:t>
-            </a:r>
-            <a:r>
-              <a:rPr lang="en-US" sz="1800" dirty="0"/>
-              <a:t>; Chlorpyrifos—</a:t>
-            </a:r>
-            <a:br>
-              <a:rPr lang="en-US" sz="1800" dirty="0"/>
-            </a:br>
-            <a:r>
-              <a:rPr lang="en-US" sz="1800" dirty="0" err="1"/>
-              <a:t>Proponoate</a:t>
-            </a:r>
-            <a:r>
-              <a:rPr lang="en-US" sz="1800" dirty="0"/>
-              <a:t> metabolism</a:t>
-            </a:r>
-            <a:br>
-              <a:rPr lang="en-US" sz="1800" dirty="0"/>
-            </a:br>
-            <a:r>
-              <a:rPr lang="en-US" sz="1800" dirty="0"/>
-              <a:t>(Gluconeogenesis); </a:t>
-            </a:r>
-            <a:br>
-              <a:rPr lang="en-US" sz="1800" dirty="0"/>
-            </a:br>
-            <a:r>
-              <a:rPr lang="en-US" sz="1800" dirty="0" err="1"/>
-              <a:t>xla</a:t>
-            </a:r>
-            <a:r>
-              <a:rPr lang="en-US" sz="1800" dirty="0"/>
-              <a:t>=</a:t>
-            </a:r>
-            <a:r>
-              <a:rPr lang="en-US" sz="1800" dirty="0" err="1"/>
-              <a:t>hsa</a:t>
-            </a:r>
-            <a:br>
-              <a:rPr lang="en-US" sz="1800" dirty="0"/>
-            </a:br>
-            <a:endParaRPr lang="en-US" sz="1800" dirty="0"/>
-          </a:p>
-        </p:txBody>
-      </p:sp>
       <p:pic>
         <p:nvPicPr>
-          <p:cNvPr id="7" name="Picture 6">
-            <a:extLst>
-              <a:ext uri="{FF2B5EF4-FFF2-40B4-BE49-F238E27FC236}">
-                <a16:creationId xmlns:a16="http://schemas.microsoft.com/office/drawing/2014/main" id="{B681C31C-3675-816B-7694-6E40D9D0B2BC}"/>
+          <p:cNvPr id="6" name="Picture 5">
+            <a:extLst>
+              <a:ext uri="{FF2B5EF4-FFF2-40B4-BE49-F238E27FC236}">
+                <a16:creationId xmlns:a16="http://schemas.microsoft.com/office/drawing/2014/main" id="{D3A83DB5-9EF9-7B06-C850-A3AA80E0C457}"/>
               </a:ext>
             </a:extLst>
           </p:cNvPr>
@@ -5600,8 +5531,8 @@
         </p:blipFill>
         <p:spPr>
           <a:xfrm>
-            <a:off x="127122" y="5331211"/>
-            <a:ext cx="8303445" cy="1526789"/>
+            <a:off x="1990613" y="5377181"/>
+            <a:ext cx="10120705" cy="1480819"/>
           </a:xfrm>
           <a:prstGeom prst="rect">
             <a:avLst/>
@@ -5611,7 +5542,7 @@
     </p:spTree>
     <p:extLst>
       <p:ext uri="{BB962C8B-B14F-4D97-AF65-F5344CB8AC3E}">
-        <p14:creationId xmlns:p14="http://schemas.microsoft.com/office/powerpoint/2010/main" val="2968135174"/>
+        <p14:creationId xmlns:p14="http://schemas.microsoft.com/office/powerpoint/2010/main" val="3691130347"/>
       </p:ext>
     </p:extLst>
   </p:cSld>
@@ -5656,7 +5587,7 @@
         </p:nvSpPr>
         <p:spPr>
           <a:xfrm>
-            <a:off x="93785" y="105559"/>
+            <a:off x="656493" y="75414"/>
             <a:ext cx="10515600" cy="458840"/>
           </a:xfrm>
         </p:spPr>
@@ -5672,14 +5603,7 @@
             </a:r>
             <a:r>
               <a:rPr lang="en-US" sz="1800" dirty="0"/>
-              <a:t>; Chlorpyrifos—Glycine, serine, and threonine </a:t>
-            </a:r>
-            <a:br>
-              <a:rPr lang="en-US" sz="1800" dirty="0"/>
-            </a:br>
-            <a:r>
-              <a:rPr lang="en-US" sz="1800" dirty="0"/>
-              <a:t>metabolism; </a:t>
+              <a:t>; Chlorpyrifos—; </a:t>
             </a:r>
             <a:r>
               <a:rPr lang="en-US" sz="1800" dirty="0" err="1"/>
@@ -5702,17 +5626,19 @@
       </p:sp>
       <p:pic>
         <p:nvPicPr>
-          <p:cNvPr id="8" name="Picture 7">
-            <a:extLst>
-              <a:ext uri="{FF2B5EF4-FFF2-40B4-BE49-F238E27FC236}">
-                <a16:creationId xmlns:a16="http://schemas.microsoft.com/office/drawing/2014/main" id="{A544669F-7781-0BF5-794E-100057A1305B}"/>
+          <p:cNvPr id="5" name="Content Placeholder 4">
+            <a:extLst>
+              <a:ext uri="{FF2B5EF4-FFF2-40B4-BE49-F238E27FC236}">
+                <a16:creationId xmlns:a16="http://schemas.microsoft.com/office/drawing/2014/main" id="{A7F5E34B-0BDA-F5BF-245A-CE566D6B237E}"/>
               </a:ext>
             </a:extLst>
           </p:cNvPr>
           <p:cNvPicPr>
-            <a:picLocks noChangeAspect="1"/>
+            <a:picLocks noGrp="1" noChangeAspect="1"/>
           </p:cNvPicPr>
-          <p:nvPr/>
+          <p:nvPr>
+            <p:ph idx="1"/>
+          </p:nvPr>
         </p:nvPicPr>
         <p:blipFill>
           <a:blip r:embed="rId2">
@@ -5728,18 +5654,15 @@
         </p:blipFill>
         <p:spPr>
           <a:xfrm>
-            <a:off x="4376521" y="-123378"/>
-            <a:ext cx="7721694" cy="7104755"/>
-          </a:xfrm>
-          <a:prstGeom prst="rect">
-            <a:avLst/>
-          </a:prstGeom>
+            <a:off x="4612193" y="-32348"/>
+            <a:ext cx="4973934" cy="7120506"/>
+          </a:xfrm>
         </p:spPr>
       </p:pic>
     </p:spTree>
     <p:extLst>
       <p:ext uri="{BB962C8B-B14F-4D97-AF65-F5344CB8AC3E}">
-        <p14:creationId xmlns:p14="http://schemas.microsoft.com/office/powerpoint/2010/main" val="16467550"/>
+        <p14:creationId xmlns:p14="http://schemas.microsoft.com/office/powerpoint/2010/main" val="2555528081"/>
       </p:ext>
     </p:extLst>
   </p:cSld>
@@ -5766,67 +5689,12 @@
           <a:chExt cx="0" cy="0"/>
         </a:xfrm>
       </p:grpSpPr>
-      <p:sp>
-        <p:nvSpPr>
-          <p:cNvPr id="2" name="Title 1">
-            <a:extLst>
-              <a:ext uri="{FF2B5EF4-FFF2-40B4-BE49-F238E27FC236}">
-                <a16:creationId xmlns:a16="http://schemas.microsoft.com/office/drawing/2014/main" id="{29BF9EB6-E5A0-73BE-2C20-F78514A6052F}"/>
-              </a:ext>
-            </a:extLst>
-          </p:cNvPr>
-          <p:cNvSpPr>
-            <a:spLocks noGrp="1"/>
-          </p:cNvSpPr>
-          <p:nvPr>
-            <p:ph type="title"/>
-          </p:nvPr>
-        </p:nvSpPr>
-        <p:spPr>
-          <a:xfrm>
-            <a:off x="656493" y="75414"/>
-            <a:ext cx="10515600" cy="458840"/>
-          </a:xfrm>
-        </p:spPr>
-        <p:txBody>
-          <a:bodyPr>
-            <a:normAutofit fontScale="90000"/>
-          </a:bodyPr>
-          <a:lstStyle/>
-          <a:p>
-            <a:r>
-              <a:rPr lang="en-US" sz="1800" dirty="0" err="1"/>
-              <a:t>xla</a:t>
-            </a:r>
-            <a:r>
-              <a:rPr lang="en-US" sz="1800" dirty="0"/>
-              <a:t>; Chlorpyrifos—Glucose alanine cycle; </a:t>
-            </a:r>
-            <a:r>
-              <a:rPr lang="en-US" sz="1800" dirty="0" err="1"/>
-              <a:t>xla</a:t>
-            </a:r>
-            <a:r>
-              <a:rPr lang="en-US" sz="1800" dirty="0"/>
-              <a:t>=</a:t>
-            </a:r>
-            <a:r>
-              <a:rPr lang="en-US" sz="1800" dirty="0" err="1"/>
-              <a:t>hsa</a:t>
-            </a:r>
-            <a:br>
-              <a:rPr lang="en-US" sz="1800" dirty="0"/>
-            </a:br>
-            <a:endParaRPr lang="en-US" sz="1800" dirty="0"/>
-          </a:p>
-        </p:txBody>
-      </p:sp>
       <p:pic>
         <p:nvPicPr>
           <p:cNvPr id="5" name="Content Placeholder 4">
             <a:extLst>
               <a:ext uri="{FF2B5EF4-FFF2-40B4-BE49-F238E27FC236}">
-                <a16:creationId xmlns:a16="http://schemas.microsoft.com/office/drawing/2014/main" id="{F47F66D7-16CA-9DE2-6523-04A3029BE9F9}"/>
+                <a16:creationId xmlns:a16="http://schemas.microsoft.com/office/drawing/2014/main" id="{05AC57BF-9037-B742-C389-A6B8FC66278C}"/>
               </a:ext>
             </a:extLst>
           </p:cNvPr>
@@ -5851,15 +5719,121 @@
         </p:blipFill>
         <p:spPr>
           <a:xfrm>
-            <a:off x="2471895" y="286812"/>
-            <a:ext cx="7596553" cy="6794252"/>
-          </a:xfrm>
+            <a:off x="2140299" y="0"/>
+            <a:ext cx="9646417" cy="5621905"/>
+          </a:xfrm>
+        </p:spPr>
+      </p:pic>
+      <p:sp>
+        <p:nvSpPr>
+          <p:cNvPr id="2" name="Title 1">
+            <a:extLst>
+              <a:ext uri="{FF2B5EF4-FFF2-40B4-BE49-F238E27FC236}">
+                <a16:creationId xmlns:a16="http://schemas.microsoft.com/office/drawing/2014/main" id="{29BF9EB6-E5A0-73BE-2C20-F78514A6052F}"/>
+              </a:ext>
+            </a:extLst>
+          </p:cNvPr>
+          <p:cNvSpPr>
+            <a:spLocks noGrp="1"/>
+          </p:cNvSpPr>
+          <p:nvPr>
+            <p:ph type="title"/>
+          </p:nvPr>
+        </p:nvSpPr>
+        <p:spPr>
+          <a:xfrm>
+            <a:off x="127122" y="75414"/>
+            <a:ext cx="10515600" cy="1291162"/>
+          </a:xfrm>
+        </p:spPr>
+        <p:txBody>
+          <a:bodyPr>
+            <a:normAutofit fontScale="90000"/>
+          </a:bodyPr>
+          <a:lstStyle/>
+          <a:p>
+            <a:r>
+              <a:rPr lang="en-US" sz="1800" dirty="0" err="1"/>
+              <a:t>xla</a:t>
+            </a:r>
+            <a:r>
+              <a:rPr lang="en-US" sz="1800" dirty="0"/>
+              <a:t>; Chlorpyrifos—</a:t>
+            </a:r>
+            <a:br>
+              <a:rPr lang="en-US" sz="1800" dirty="0"/>
+            </a:br>
+            <a:r>
+              <a:rPr lang="en-US" sz="1800" dirty="0" err="1"/>
+              <a:t>Proponoate</a:t>
+            </a:r>
+            <a:r>
+              <a:rPr lang="en-US" sz="1800" dirty="0"/>
+              <a:t> metabolism</a:t>
+            </a:r>
+            <a:br>
+              <a:rPr lang="en-US" sz="1800" dirty="0"/>
+            </a:br>
+            <a:r>
+              <a:rPr lang="en-US" sz="1800" dirty="0"/>
+              <a:t>(Gluconeogenesis); </a:t>
+            </a:r>
+            <a:br>
+              <a:rPr lang="en-US" sz="1800" dirty="0"/>
+            </a:br>
+            <a:r>
+              <a:rPr lang="en-US" sz="1800" dirty="0" err="1"/>
+              <a:t>xla</a:t>
+            </a:r>
+            <a:r>
+              <a:rPr lang="en-US" sz="1800" dirty="0"/>
+              <a:t>=</a:t>
+            </a:r>
+            <a:r>
+              <a:rPr lang="en-US" sz="1800" dirty="0" err="1"/>
+              <a:t>hsa</a:t>
+            </a:r>
+            <a:br>
+              <a:rPr lang="en-US" sz="1800" dirty="0"/>
+            </a:br>
+            <a:endParaRPr lang="en-US" sz="1800" dirty="0"/>
+          </a:p>
+        </p:txBody>
+      </p:sp>
+      <p:pic>
+        <p:nvPicPr>
+          <p:cNvPr id="7" name="Picture 6">
+            <a:extLst>
+              <a:ext uri="{FF2B5EF4-FFF2-40B4-BE49-F238E27FC236}">
+                <a16:creationId xmlns:a16="http://schemas.microsoft.com/office/drawing/2014/main" id="{B681C31C-3675-816B-7694-6E40D9D0B2BC}"/>
+              </a:ext>
+            </a:extLst>
+          </p:cNvPr>
+          <p:cNvPicPr>
+            <a:picLocks noChangeAspect="1"/>
+          </p:cNvPicPr>
+          <p:nvPr/>
+        </p:nvPicPr>
+        <p:blipFill>
+          <a:blip r:embed="rId3"/>
+          <a:stretch>
+            <a:fillRect/>
+          </a:stretch>
+        </p:blipFill>
+        <p:spPr>
+          <a:xfrm>
+            <a:off x="127122" y="5331211"/>
+            <a:ext cx="8303445" cy="1526789"/>
+          </a:xfrm>
+          <a:prstGeom prst="rect">
+            <a:avLst/>
+          </a:prstGeom>
         </p:spPr>
       </p:pic>
     </p:spTree>
     <p:extLst>
       <p:ext uri="{BB962C8B-B14F-4D97-AF65-F5344CB8AC3E}">
-        <p14:creationId xmlns:p14="http://schemas.microsoft.com/office/powerpoint/2010/main" val="3269587091"/>
+        <p14:creationId xmlns:p14="http://schemas.microsoft.com/office/powerpoint/2010/main" val="2968135174"/>
       </p:ext>
     </p:extLst>
   </p:cSld>
@@ -5904,7 +5878,7 @@
         </p:nvSpPr>
         <p:spPr>
           <a:xfrm>
-            <a:off x="656493" y="75414"/>
+            <a:off x="93785" y="105559"/>
             <a:ext cx="10515600" cy="458840"/>
           </a:xfrm>
         </p:spPr>
@@ -5920,7 +5894,14 @@
             </a:r>
             <a:r>
               <a:rPr lang="en-US" sz="1800" dirty="0"/>
-              <a:t>; 24D—; </a:t>
+              <a:t>; Chlorpyrifos—Glycine, serine, and threonine </a:t>
+            </a:r>
+            <a:br>
+              <a:rPr lang="en-US" sz="1800" dirty="0"/>
+            </a:br>
+            <a:r>
+              <a:rPr lang="en-US" sz="1800" dirty="0"/>
+              <a:t>metabolism; </a:t>
             </a:r>
             <a:r>
               <a:rPr lang="en-US" sz="1800" dirty="0" err="1"/>
@@ -5941,35 +5922,46 @@
           </a:p>
         </p:txBody>
       </p:sp>
-      <p:sp>
-        <p:nvSpPr>
-          <p:cNvPr id="4" name="Content Placeholder 3">
-            <a:extLst>
-              <a:ext uri="{FF2B5EF4-FFF2-40B4-BE49-F238E27FC236}">
-                <a16:creationId xmlns:a16="http://schemas.microsoft.com/office/drawing/2014/main" id="{36394FF9-9274-D0E9-D3CD-A32446AEAA75}"/>
-              </a:ext>
-            </a:extLst>
-          </p:cNvPr>
-          <p:cNvSpPr>
-            <a:spLocks noGrp="1"/>
-          </p:cNvSpPr>
-          <p:nvPr>
-            <p:ph idx="1"/>
-          </p:nvPr>
-        </p:nvSpPr>
-        <p:spPr/>
-        <p:txBody>
-          <a:bodyPr/>
-          <a:lstStyle/>
-          <a:p>
-            <a:endParaRPr lang="en-US"/>
-          </a:p>
-        </p:txBody>
-      </p:sp>
+      <p:pic>
+        <p:nvPicPr>
+          <p:cNvPr id="8" name="Picture 7">
+            <a:extLst>
+              <a:ext uri="{FF2B5EF4-FFF2-40B4-BE49-F238E27FC236}">
+                <a16:creationId xmlns:a16="http://schemas.microsoft.com/office/drawing/2014/main" id="{A544669F-7781-0BF5-794E-100057A1305B}"/>
+              </a:ext>
+            </a:extLst>
+          </p:cNvPr>
+          <p:cNvPicPr>
+            <a:picLocks noChangeAspect="1"/>
+          </p:cNvPicPr>
+          <p:nvPr/>
+        </p:nvPicPr>
+        <p:blipFill>
+          <a:blip r:embed="rId2">
+            <a:extLst>
+              <a:ext uri="{28A0092B-C50C-407E-A947-70E740481C1C}">
+                <a14:useLocalDpi xmlns:a14="http://schemas.microsoft.com/office/drawing/2010/main" val="0"/>
+              </a:ext>
+            </a:extLst>
+          </a:blip>
+          <a:stretch>
+            <a:fillRect/>
+          </a:stretch>
+        </p:blipFill>
+        <p:spPr>
+          <a:xfrm>
+            <a:off x="4376521" y="-123378"/>
+            <a:ext cx="7721694" cy="7104755"/>
+          </a:xfrm>
+          <a:prstGeom prst="rect">
+            <a:avLst/>
+          </a:prstGeom>
+        </p:spPr>
+      </p:pic>
     </p:spTree>
     <p:extLst>
       <p:ext uri="{BB962C8B-B14F-4D97-AF65-F5344CB8AC3E}">
-        <p14:creationId xmlns:p14="http://schemas.microsoft.com/office/powerpoint/2010/main" val="3199991795"/>
+        <p14:creationId xmlns:p14="http://schemas.microsoft.com/office/powerpoint/2010/main" val="16467550"/>
       </p:ext>
     </p:extLst>
   </p:cSld>
@@ -6030,7 +6022,7 @@
             </a:r>
             <a:r>
               <a:rPr lang="en-US" sz="1800" dirty="0"/>
-              <a:t>; 24D—; </a:t>
+              <a:t>; Chlorpyrifos—Glucose alanine cycle; </a:t>
             </a:r>
             <a:r>
               <a:rPr lang="en-US" sz="1800" dirty="0" err="1"/>
@@ -6051,35 +6043,45 @@
           </a:p>
         </p:txBody>
       </p:sp>
-      <p:sp>
-        <p:nvSpPr>
-          <p:cNvPr id="4" name="Content Placeholder 3">
-            <a:extLst>
-              <a:ext uri="{FF2B5EF4-FFF2-40B4-BE49-F238E27FC236}">
-                <a16:creationId xmlns:a16="http://schemas.microsoft.com/office/drawing/2014/main" id="{36394FF9-9274-D0E9-D3CD-A32446AEAA75}"/>
-              </a:ext>
-            </a:extLst>
-          </p:cNvPr>
-          <p:cNvSpPr>
-            <a:spLocks noGrp="1"/>
-          </p:cNvSpPr>
+      <p:pic>
+        <p:nvPicPr>
+          <p:cNvPr id="5" name="Content Placeholder 4">
+            <a:extLst>
+              <a:ext uri="{FF2B5EF4-FFF2-40B4-BE49-F238E27FC236}">
+                <a16:creationId xmlns:a16="http://schemas.microsoft.com/office/drawing/2014/main" id="{F47F66D7-16CA-9DE2-6523-04A3029BE9F9}"/>
+              </a:ext>
+            </a:extLst>
+          </p:cNvPr>
+          <p:cNvPicPr>
+            <a:picLocks noGrp="1" noChangeAspect="1"/>
+          </p:cNvPicPr>
           <p:nvPr>
             <p:ph idx="1"/>
           </p:nvPr>
-        </p:nvSpPr>
-        <p:spPr/>
-        <p:txBody>
-          <a:bodyPr/>
-          <a:lstStyle/>
-          <a:p>
-            <a:endParaRPr lang="en-US"/>
-          </a:p>
-        </p:txBody>
-      </p:sp>
+        </p:nvPicPr>
+        <p:blipFill>
+          <a:blip r:embed="rId2">
+            <a:extLst>
+              <a:ext uri="{28A0092B-C50C-407E-A947-70E740481C1C}">
+                <a14:useLocalDpi xmlns:a14="http://schemas.microsoft.com/office/drawing/2010/main" val="0"/>
+              </a:ext>
+            </a:extLst>
+          </a:blip>
+          <a:stretch>
+            <a:fillRect/>
+          </a:stretch>
+        </p:blipFill>
+        <p:spPr>
+          <a:xfrm>
+            <a:off x="2471895" y="286812"/>
+            <a:ext cx="7596553" cy="6794252"/>
+          </a:xfrm>
+        </p:spPr>
+      </p:pic>
     </p:spTree>
     <p:extLst>
       <p:ext uri="{BB962C8B-B14F-4D97-AF65-F5344CB8AC3E}">
-        <p14:creationId xmlns:p14="http://schemas.microsoft.com/office/powerpoint/2010/main" val="877039883"/>
+        <p14:creationId xmlns:p14="http://schemas.microsoft.com/office/powerpoint/2010/main" val="3269587091"/>
       </p:ext>
     </p:extLst>
   </p:cSld>
@@ -6189,7 +6191,7 @@
     </p:spTree>
     <p:extLst>
       <p:ext uri="{BB962C8B-B14F-4D97-AF65-F5344CB8AC3E}">
-        <p14:creationId xmlns:p14="http://schemas.microsoft.com/office/powerpoint/2010/main" val="3423878622"/>
+        <p14:creationId xmlns:p14="http://schemas.microsoft.com/office/powerpoint/2010/main" val="3199991795"/>
       </p:ext>
     </p:extLst>
   </p:cSld>
@@ -6299,7 +6301,7 @@
     </p:spTree>
     <p:extLst>
       <p:ext uri="{BB962C8B-B14F-4D97-AF65-F5344CB8AC3E}">
-        <p14:creationId xmlns:p14="http://schemas.microsoft.com/office/powerpoint/2010/main" val="2178064077"/>
+        <p14:creationId xmlns:p14="http://schemas.microsoft.com/office/powerpoint/2010/main" val="877039883"/>
       </p:ext>
     </p:extLst>
   </p:cSld>
@@ -6409,7 +6411,7 @@
     </p:spTree>
     <p:extLst>
       <p:ext uri="{BB962C8B-B14F-4D97-AF65-F5344CB8AC3E}">
-        <p14:creationId xmlns:p14="http://schemas.microsoft.com/office/powerpoint/2010/main" val="547215275"/>
+        <p14:creationId xmlns:p14="http://schemas.microsoft.com/office/powerpoint/2010/main" val="3423878622"/>
       </p:ext>
     </p:extLst>
   </p:cSld>
@@ -6535,6 +6537,226 @@
     <p:extLst>
       <p:ext uri="{BB962C8B-B14F-4D97-AF65-F5344CB8AC3E}">
         <p14:creationId xmlns:p14="http://schemas.microsoft.com/office/powerpoint/2010/main" val="3714036470"/>
+      </p:ext>
+    </p:extLst>
+  </p:cSld>
+  <p:clrMapOvr>
+    <a:masterClrMapping/>
+  </p:clrMapOvr>
+</p:sld>
+</file>
+
+<file path=ppt/slides/slide30.xml><?xml version="1.0" encoding="utf-8"?>
+<p:sld xmlns:a="http://schemas.openxmlformats.org/drawingml/2006/main" xmlns:r="http://schemas.openxmlformats.org/officeDocument/2006/relationships" xmlns:p="http://schemas.openxmlformats.org/presentationml/2006/main">
+  <p:cSld>
+    <p:spTree>
+      <p:nvGrpSpPr>
+        <p:cNvPr id="1" name=""/>
+        <p:cNvGrpSpPr/>
+        <p:nvPr/>
+      </p:nvGrpSpPr>
+      <p:grpSpPr>
+        <a:xfrm>
+          <a:off x="0" y="0"/>
+          <a:ext cx="0" cy="0"/>
+          <a:chOff x="0" y="0"/>
+          <a:chExt cx="0" cy="0"/>
+        </a:xfrm>
+      </p:grpSpPr>
+      <p:sp>
+        <p:nvSpPr>
+          <p:cNvPr id="2" name="Title 1">
+            <a:extLst>
+              <a:ext uri="{FF2B5EF4-FFF2-40B4-BE49-F238E27FC236}">
+                <a16:creationId xmlns:a16="http://schemas.microsoft.com/office/drawing/2014/main" id="{29BF9EB6-E5A0-73BE-2C20-F78514A6052F}"/>
+              </a:ext>
+            </a:extLst>
+          </p:cNvPr>
+          <p:cNvSpPr>
+            <a:spLocks noGrp="1"/>
+          </p:cNvSpPr>
+          <p:nvPr>
+            <p:ph type="title"/>
+          </p:nvPr>
+        </p:nvSpPr>
+        <p:spPr>
+          <a:xfrm>
+            <a:off x="656493" y="75414"/>
+            <a:ext cx="10515600" cy="458840"/>
+          </a:xfrm>
+        </p:spPr>
+        <p:txBody>
+          <a:bodyPr>
+            <a:normAutofit fontScale="90000"/>
+          </a:bodyPr>
+          <a:lstStyle/>
+          <a:p>
+            <a:r>
+              <a:rPr lang="en-US" sz="1800" dirty="0" err="1"/>
+              <a:t>xla</a:t>
+            </a:r>
+            <a:r>
+              <a:rPr lang="en-US" sz="1800" dirty="0"/>
+              <a:t>; 24D—; </a:t>
+            </a:r>
+            <a:r>
+              <a:rPr lang="en-US" sz="1800" dirty="0" err="1"/>
+              <a:t>xla</a:t>
+            </a:r>
+            <a:r>
+              <a:rPr lang="en-US" sz="1800" dirty="0"/>
+              <a:t>=</a:t>
+            </a:r>
+            <a:r>
+              <a:rPr lang="en-US" sz="1800" dirty="0" err="1"/>
+              <a:t>hsa</a:t>
+            </a:r>
+            <a:br>
+              <a:rPr lang="en-US" sz="1800" dirty="0"/>
+            </a:br>
+            <a:endParaRPr lang="en-US" sz="1800" dirty="0"/>
+          </a:p>
+        </p:txBody>
+      </p:sp>
+      <p:sp>
+        <p:nvSpPr>
+          <p:cNvPr id="4" name="Content Placeholder 3">
+            <a:extLst>
+              <a:ext uri="{FF2B5EF4-FFF2-40B4-BE49-F238E27FC236}">
+                <a16:creationId xmlns:a16="http://schemas.microsoft.com/office/drawing/2014/main" id="{36394FF9-9274-D0E9-D3CD-A32446AEAA75}"/>
+              </a:ext>
+            </a:extLst>
+          </p:cNvPr>
+          <p:cNvSpPr>
+            <a:spLocks noGrp="1"/>
+          </p:cNvSpPr>
+          <p:nvPr>
+            <p:ph idx="1"/>
+          </p:nvPr>
+        </p:nvSpPr>
+        <p:spPr/>
+        <p:txBody>
+          <a:bodyPr/>
+          <a:lstStyle/>
+          <a:p>
+            <a:endParaRPr lang="en-US"/>
+          </a:p>
+        </p:txBody>
+      </p:sp>
+    </p:spTree>
+    <p:extLst>
+      <p:ext uri="{BB962C8B-B14F-4D97-AF65-F5344CB8AC3E}">
+        <p14:creationId xmlns:p14="http://schemas.microsoft.com/office/powerpoint/2010/main" val="2178064077"/>
+      </p:ext>
+    </p:extLst>
+  </p:cSld>
+  <p:clrMapOvr>
+    <a:masterClrMapping/>
+  </p:clrMapOvr>
+</p:sld>
+</file>
+
+<file path=ppt/slides/slide31.xml><?xml version="1.0" encoding="utf-8"?>
+<p:sld xmlns:a="http://schemas.openxmlformats.org/drawingml/2006/main" xmlns:r="http://schemas.openxmlformats.org/officeDocument/2006/relationships" xmlns:p="http://schemas.openxmlformats.org/presentationml/2006/main">
+  <p:cSld>
+    <p:spTree>
+      <p:nvGrpSpPr>
+        <p:cNvPr id="1" name=""/>
+        <p:cNvGrpSpPr/>
+        <p:nvPr/>
+      </p:nvGrpSpPr>
+      <p:grpSpPr>
+        <a:xfrm>
+          <a:off x="0" y="0"/>
+          <a:ext cx="0" cy="0"/>
+          <a:chOff x="0" y="0"/>
+          <a:chExt cx="0" cy="0"/>
+        </a:xfrm>
+      </p:grpSpPr>
+      <p:sp>
+        <p:nvSpPr>
+          <p:cNvPr id="2" name="Title 1">
+            <a:extLst>
+              <a:ext uri="{FF2B5EF4-FFF2-40B4-BE49-F238E27FC236}">
+                <a16:creationId xmlns:a16="http://schemas.microsoft.com/office/drawing/2014/main" id="{29BF9EB6-E5A0-73BE-2C20-F78514A6052F}"/>
+              </a:ext>
+            </a:extLst>
+          </p:cNvPr>
+          <p:cNvSpPr>
+            <a:spLocks noGrp="1"/>
+          </p:cNvSpPr>
+          <p:nvPr>
+            <p:ph type="title"/>
+          </p:nvPr>
+        </p:nvSpPr>
+        <p:spPr>
+          <a:xfrm>
+            <a:off x="656493" y="75414"/>
+            <a:ext cx="10515600" cy="458840"/>
+          </a:xfrm>
+        </p:spPr>
+        <p:txBody>
+          <a:bodyPr>
+            <a:normAutofit fontScale="90000"/>
+          </a:bodyPr>
+          <a:lstStyle/>
+          <a:p>
+            <a:r>
+              <a:rPr lang="en-US" sz="1800" dirty="0" err="1"/>
+              <a:t>xla</a:t>
+            </a:r>
+            <a:r>
+              <a:rPr lang="en-US" sz="1800" dirty="0"/>
+              <a:t>; 24D—; </a:t>
+            </a:r>
+            <a:r>
+              <a:rPr lang="en-US" sz="1800" dirty="0" err="1"/>
+              <a:t>xla</a:t>
+            </a:r>
+            <a:r>
+              <a:rPr lang="en-US" sz="1800" dirty="0"/>
+              <a:t>=</a:t>
+            </a:r>
+            <a:r>
+              <a:rPr lang="en-US" sz="1800" dirty="0" err="1"/>
+              <a:t>hsa</a:t>
+            </a:r>
+            <a:br>
+              <a:rPr lang="en-US" sz="1800" dirty="0"/>
+            </a:br>
+            <a:endParaRPr lang="en-US" sz="1800" dirty="0"/>
+          </a:p>
+        </p:txBody>
+      </p:sp>
+      <p:sp>
+        <p:nvSpPr>
+          <p:cNvPr id="4" name="Content Placeholder 3">
+            <a:extLst>
+              <a:ext uri="{FF2B5EF4-FFF2-40B4-BE49-F238E27FC236}">
+                <a16:creationId xmlns:a16="http://schemas.microsoft.com/office/drawing/2014/main" id="{36394FF9-9274-D0E9-D3CD-A32446AEAA75}"/>
+              </a:ext>
+            </a:extLst>
+          </p:cNvPr>
+          <p:cNvSpPr>
+            <a:spLocks noGrp="1"/>
+          </p:cNvSpPr>
+          <p:nvPr>
+            <p:ph idx="1"/>
+          </p:nvPr>
+        </p:nvSpPr>
+        <p:spPr/>
+        <p:txBody>
+          <a:bodyPr/>
+          <a:lstStyle/>
+          <a:p>
+            <a:endParaRPr lang="en-US"/>
+          </a:p>
+        </p:txBody>
+      </p:sp>
+    </p:spTree>
+    <p:extLst>
+      <p:ext uri="{BB962C8B-B14F-4D97-AF65-F5344CB8AC3E}">
+        <p14:creationId xmlns:p14="http://schemas.microsoft.com/office/powerpoint/2010/main" val="547215275"/>
       </p:ext>
     </p:extLst>
   </p:cSld>

</xml_diff>

<commit_message>
gsh swab outliers and tests
</commit_message>
<xml_diff>
--- a/pptx/vanmeter_salamander_exposures.pptx
+++ b/pptx/vanmeter_salamander_exposures.pptx
@@ -13,29 +13,31 @@
     <p:sldId id="266" r:id="rId7"/>
     <p:sldId id="267" r:id="rId8"/>
     <p:sldId id="268" r:id="rId9"/>
-    <p:sldId id="269" r:id="rId10"/>
-    <p:sldId id="270" r:id="rId11"/>
-    <p:sldId id="271" r:id="rId12"/>
-    <p:sldId id="272" r:id="rId13"/>
-    <p:sldId id="288" r:id="rId14"/>
-    <p:sldId id="289" r:id="rId15"/>
-    <p:sldId id="273" r:id="rId16"/>
-    <p:sldId id="274" r:id="rId17"/>
-    <p:sldId id="257" r:id="rId18"/>
-    <p:sldId id="258" r:id="rId19"/>
-    <p:sldId id="259" r:id="rId20"/>
-    <p:sldId id="260" r:id="rId21"/>
-    <p:sldId id="261" r:id="rId22"/>
-    <p:sldId id="277" r:id="rId23"/>
-    <p:sldId id="281" r:id="rId24"/>
-    <p:sldId id="278" r:id="rId25"/>
-    <p:sldId id="280" r:id="rId26"/>
-    <p:sldId id="282" r:id="rId27"/>
-    <p:sldId id="283" r:id="rId28"/>
-    <p:sldId id="284" r:id="rId29"/>
-    <p:sldId id="285" r:id="rId30"/>
-    <p:sldId id="286" r:id="rId31"/>
-    <p:sldId id="287" r:id="rId32"/>
+    <p:sldId id="292" r:id="rId10"/>
+    <p:sldId id="269" r:id="rId11"/>
+    <p:sldId id="293" r:id="rId12"/>
+    <p:sldId id="270" r:id="rId13"/>
+    <p:sldId id="271" r:id="rId14"/>
+    <p:sldId id="272" r:id="rId15"/>
+    <p:sldId id="288" r:id="rId16"/>
+    <p:sldId id="289" r:id="rId17"/>
+    <p:sldId id="273" r:id="rId18"/>
+    <p:sldId id="274" r:id="rId19"/>
+    <p:sldId id="257" r:id="rId20"/>
+    <p:sldId id="258" r:id="rId21"/>
+    <p:sldId id="259" r:id="rId22"/>
+    <p:sldId id="260" r:id="rId23"/>
+    <p:sldId id="261" r:id="rId24"/>
+    <p:sldId id="277" r:id="rId25"/>
+    <p:sldId id="281" r:id="rId26"/>
+    <p:sldId id="278" r:id="rId27"/>
+    <p:sldId id="280" r:id="rId28"/>
+    <p:sldId id="282" r:id="rId29"/>
+    <p:sldId id="283" r:id="rId30"/>
+    <p:sldId id="284" r:id="rId31"/>
+    <p:sldId id="285" r:id="rId32"/>
+    <p:sldId id="286" r:id="rId33"/>
+    <p:sldId id="287" r:id="rId34"/>
   </p:sldIdLst>
   <p:sldSz cx="12192000" cy="6858000"/>
   <p:notesSz cx="6858000" cy="9144000"/>
@@ -289,7 +291,7 @@
           <a:p>
             <a:fld id="{A09DAD73-6C51-45AB-A1E3-AD938ED06CDF}" type="datetimeFigureOut">
               <a:rPr lang="en-US" smtClean="0"/>
-              <a:t>3/16/2023</a:t>
+              <a:t>4/12/2023</a:t>
             </a:fld>
             <a:endParaRPr lang="en-US"/>
           </a:p>
@@ -487,7 +489,7 @@
           <a:p>
             <a:fld id="{A09DAD73-6C51-45AB-A1E3-AD938ED06CDF}" type="datetimeFigureOut">
               <a:rPr lang="en-US" smtClean="0"/>
-              <a:t>3/16/2023</a:t>
+              <a:t>4/12/2023</a:t>
             </a:fld>
             <a:endParaRPr lang="en-US"/>
           </a:p>
@@ -695,7 +697,7 @@
           <a:p>
             <a:fld id="{A09DAD73-6C51-45AB-A1E3-AD938ED06CDF}" type="datetimeFigureOut">
               <a:rPr lang="en-US" smtClean="0"/>
-              <a:t>3/16/2023</a:t>
+              <a:t>4/12/2023</a:t>
             </a:fld>
             <a:endParaRPr lang="en-US"/>
           </a:p>
@@ -893,7 +895,7 @@
           <a:p>
             <a:fld id="{A09DAD73-6C51-45AB-A1E3-AD938ED06CDF}" type="datetimeFigureOut">
               <a:rPr lang="en-US" smtClean="0"/>
-              <a:t>3/16/2023</a:t>
+              <a:t>4/12/2023</a:t>
             </a:fld>
             <a:endParaRPr lang="en-US"/>
           </a:p>
@@ -1168,7 +1170,7 @@
           <a:p>
             <a:fld id="{A09DAD73-6C51-45AB-A1E3-AD938ED06CDF}" type="datetimeFigureOut">
               <a:rPr lang="en-US" smtClean="0"/>
-              <a:t>3/16/2023</a:t>
+              <a:t>4/12/2023</a:t>
             </a:fld>
             <a:endParaRPr lang="en-US"/>
           </a:p>
@@ -1433,7 +1435,7 @@
           <a:p>
             <a:fld id="{A09DAD73-6C51-45AB-A1E3-AD938ED06CDF}" type="datetimeFigureOut">
               <a:rPr lang="en-US" smtClean="0"/>
-              <a:t>3/16/2023</a:t>
+              <a:t>4/12/2023</a:t>
             </a:fld>
             <a:endParaRPr lang="en-US"/>
           </a:p>
@@ -1845,7 +1847,7 @@
           <a:p>
             <a:fld id="{A09DAD73-6C51-45AB-A1E3-AD938ED06CDF}" type="datetimeFigureOut">
               <a:rPr lang="en-US" smtClean="0"/>
-              <a:t>3/16/2023</a:t>
+              <a:t>4/12/2023</a:t>
             </a:fld>
             <a:endParaRPr lang="en-US"/>
           </a:p>
@@ -1986,7 +1988,7 @@
           <a:p>
             <a:fld id="{A09DAD73-6C51-45AB-A1E3-AD938ED06CDF}" type="datetimeFigureOut">
               <a:rPr lang="en-US" smtClean="0"/>
-              <a:t>3/16/2023</a:t>
+              <a:t>4/12/2023</a:t>
             </a:fld>
             <a:endParaRPr lang="en-US"/>
           </a:p>
@@ -2099,7 +2101,7 @@
           <a:p>
             <a:fld id="{A09DAD73-6C51-45AB-A1E3-AD938ED06CDF}" type="datetimeFigureOut">
               <a:rPr lang="en-US" smtClean="0"/>
-              <a:t>3/16/2023</a:t>
+              <a:t>4/12/2023</a:t>
             </a:fld>
             <a:endParaRPr lang="en-US"/>
           </a:p>
@@ -2410,7 +2412,7 @@
           <a:p>
             <a:fld id="{A09DAD73-6C51-45AB-A1E3-AD938ED06CDF}" type="datetimeFigureOut">
               <a:rPr lang="en-US" smtClean="0"/>
-              <a:t>3/16/2023</a:t>
+              <a:t>4/12/2023</a:t>
             </a:fld>
             <a:endParaRPr lang="en-US"/>
           </a:p>
@@ -2698,7 +2700,7 @@
           <a:p>
             <a:fld id="{A09DAD73-6C51-45AB-A1E3-AD938ED06CDF}" type="datetimeFigureOut">
               <a:rPr lang="en-US" smtClean="0"/>
-              <a:t>3/16/2023</a:t>
+              <a:t>4/12/2023</a:t>
             </a:fld>
             <a:endParaRPr lang="en-US"/>
           </a:p>
@@ -2939,7 +2941,7 @@
           <a:p>
             <a:fld id="{A09DAD73-6C51-45AB-A1E3-AD938ED06CDF}" type="datetimeFigureOut">
               <a:rPr lang="en-US" smtClean="0"/>
-              <a:t>3/16/2023</a:t>
+              <a:t>4/12/2023</a:t>
             </a:fld>
             <a:endParaRPr lang="en-US"/>
           </a:p>
@@ -3446,55 +3448,12 @@
           <a:chExt cx="0" cy="0"/>
         </a:xfrm>
       </p:grpSpPr>
-      <p:sp>
-        <p:nvSpPr>
-          <p:cNvPr id="6" name="TextBox 5">
-            <a:extLst>
-              <a:ext uri="{FF2B5EF4-FFF2-40B4-BE49-F238E27FC236}">
-                <a16:creationId xmlns:a16="http://schemas.microsoft.com/office/drawing/2014/main" id="{394856D6-D891-4E90-A043-86F610FCF429}"/>
-              </a:ext>
-            </a:extLst>
-          </p:cNvPr>
-          <p:cNvSpPr txBox="1"/>
-          <p:nvPr/>
-        </p:nvSpPr>
-        <p:spPr>
-          <a:xfrm>
-            <a:off x="1077530" y="4797436"/>
-            <a:ext cx="9155875" cy="1200329"/>
-          </a:xfrm>
-          <a:prstGeom prst="rect">
-            <a:avLst/>
-          </a:prstGeom>
-          <a:noFill/>
-        </p:spPr>
-        <p:txBody>
-          <a:bodyPr wrap="square" rtlCol="0">
-            <a:spAutoFit/>
-          </a:bodyPr>
-          <a:lstStyle/>
-          <a:p>
-            <a:r>
-              <a:rPr lang="en-US" dirty="0"/>
-              <a:t>Normality tests for </a:t>
-            </a:r>
-            <a:r>
-              <a:rPr lang="en-US" dirty="0" err="1"/>
-              <a:t>gsh</a:t>
-            </a:r>
-            <a:r>
-              <a:rPr lang="en-US" dirty="0"/>
-              <a:t> and ache cleared up after dropping outliers, although ache for chlorpyrifos is still on the edge of rejection (only 24D samples were dropped) due to overdispersion in both directions. Also looked at logging but this did not improve the normality fits overall.</a:t>
-            </a:r>
-          </a:p>
-        </p:txBody>
-      </p:sp>
       <p:pic>
         <p:nvPicPr>
           <p:cNvPr id="3" name="Picture 2">
             <a:extLst>
               <a:ext uri="{FF2B5EF4-FFF2-40B4-BE49-F238E27FC236}">
-                <a16:creationId xmlns:a16="http://schemas.microsoft.com/office/drawing/2014/main" id="{2B9FBE8D-BD70-4868-89CB-BCB97894EE52}"/>
+                <a16:creationId xmlns:a16="http://schemas.microsoft.com/office/drawing/2014/main" id="{F094545D-837A-4604-A077-A23D02F30DFC}"/>
               </a:ext>
             </a:extLst>
           </p:cNvPr>
@@ -3511,20 +3470,135 @@
         </p:blipFill>
         <p:spPr>
           <a:xfrm>
-            <a:off x="1529298" y="324705"/>
-            <a:ext cx="7789927" cy="2141091"/>
+            <a:off x="231250" y="615245"/>
+            <a:ext cx="12049095" cy="1416863"/>
           </a:xfrm>
           <a:prstGeom prst="rect">
             <a:avLst/>
           </a:prstGeom>
         </p:spPr>
       </p:pic>
+      <p:sp>
+        <p:nvSpPr>
+          <p:cNvPr id="5" name="TextBox 4">
+            <a:extLst>
+              <a:ext uri="{FF2B5EF4-FFF2-40B4-BE49-F238E27FC236}">
+                <a16:creationId xmlns:a16="http://schemas.microsoft.com/office/drawing/2014/main" id="{86AF5802-0FF4-4A0D-A3F8-A006C6B62EFC}"/>
+              </a:ext>
+            </a:extLst>
+          </p:cNvPr>
+          <p:cNvSpPr txBox="1"/>
+          <p:nvPr/>
+        </p:nvSpPr>
+        <p:spPr>
+          <a:xfrm>
+            <a:off x="1361615" y="2246117"/>
+            <a:ext cx="9155875" cy="369332"/>
+          </a:xfrm>
+          <a:prstGeom prst="rect">
+            <a:avLst/>
+          </a:prstGeom>
+          <a:noFill/>
+        </p:spPr>
+        <p:txBody>
+          <a:bodyPr wrap="square" rtlCol="0">
+            <a:spAutoFit/>
+          </a:bodyPr>
+          <a:lstStyle/>
+          <a:p>
+            <a:r>
+              <a:rPr lang="en-US" dirty="0"/>
+              <a:t>Identify outliers for averaged </a:t>
+            </a:r>
+            <a:r>
+              <a:rPr lang="en-US" dirty="0" err="1"/>
+              <a:t>gsh</a:t>
+            </a:r>
+            <a:r>
+              <a:rPr lang="en-US" dirty="0"/>
+              <a:t>, the high CONS3 value is identified as an outlier.</a:t>
+            </a:r>
+          </a:p>
+        </p:txBody>
+      </p:sp>
+      <p:sp>
+        <p:nvSpPr>
+          <p:cNvPr id="7" name="TextBox 6">
+            <a:extLst>
+              <a:ext uri="{FF2B5EF4-FFF2-40B4-BE49-F238E27FC236}">
+                <a16:creationId xmlns:a16="http://schemas.microsoft.com/office/drawing/2014/main" id="{E9143364-4761-44F6-B525-8663832274D6}"/>
+              </a:ext>
+            </a:extLst>
+          </p:cNvPr>
+          <p:cNvSpPr txBox="1"/>
+          <p:nvPr/>
+        </p:nvSpPr>
+        <p:spPr>
+          <a:xfrm>
+            <a:off x="1573690" y="648397"/>
+            <a:ext cx="1107366" cy="1313568"/>
+          </a:xfrm>
+          <a:prstGeom prst="rect">
+            <a:avLst/>
+          </a:prstGeom>
+          <a:noFill/>
+          <a:ln w="38100">
+            <a:solidFill>
+              <a:srgbClr val="FF0000"/>
+            </a:solidFill>
+          </a:ln>
+        </p:spPr>
+        <p:txBody>
+          <a:bodyPr wrap="square" rtlCol="0">
+            <a:spAutoFit/>
+          </a:bodyPr>
+          <a:lstStyle/>
+          <a:p>
+            <a:endParaRPr lang="en-US" dirty="0"/>
+          </a:p>
+        </p:txBody>
+      </p:sp>
+      <p:sp>
+        <p:nvSpPr>
+          <p:cNvPr id="8" name="TextBox 7">
+            <a:extLst>
+              <a:ext uri="{FF2B5EF4-FFF2-40B4-BE49-F238E27FC236}">
+                <a16:creationId xmlns:a16="http://schemas.microsoft.com/office/drawing/2014/main" id="{D364A158-DC2E-4DA5-84A1-470A3F6D7DCD}"/>
+              </a:ext>
+            </a:extLst>
+          </p:cNvPr>
+          <p:cNvSpPr txBox="1"/>
+          <p:nvPr/>
+        </p:nvSpPr>
+        <p:spPr>
+          <a:xfrm>
+            <a:off x="1361615" y="5061818"/>
+            <a:ext cx="9155875" cy="369332"/>
+          </a:xfrm>
+          <a:prstGeom prst="rect">
+            <a:avLst/>
+          </a:prstGeom>
+          <a:noFill/>
+        </p:spPr>
+        <p:txBody>
+          <a:bodyPr wrap="square" rtlCol="0">
+            <a:spAutoFit/>
+          </a:bodyPr>
+          <a:lstStyle/>
+          <a:p>
+            <a:r>
+              <a:rPr lang="en-US" dirty="0"/>
+              <a:t>Identify outliers for ache, the two high concentrations (DS4 and DS7) are identified as outliers.</a:t>
+            </a:r>
+          </a:p>
+        </p:txBody>
+      </p:sp>
       <p:pic>
         <p:nvPicPr>
-          <p:cNvPr id="8" name="Picture 7">
-            <a:extLst>
-              <a:ext uri="{FF2B5EF4-FFF2-40B4-BE49-F238E27FC236}">
-                <a16:creationId xmlns:a16="http://schemas.microsoft.com/office/drawing/2014/main" id="{4A145BB0-3C0F-482A-B45A-078479CDE0D3}"/>
+          <p:cNvPr id="10" name="Picture 9">
+            <a:extLst>
+              <a:ext uri="{FF2B5EF4-FFF2-40B4-BE49-F238E27FC236}">
+                <a16:creationId xmlns:a16="http://schemas.microsoft.com/office/drawing/2014/main" id="{21FAF632-EF94-4710-8FEE-15B8D6FCD3C6}"/>
               </a:ext>
             </a:extLst>
           </p:cNvPr>
@@ -3541,8 +3615,8 @@
         </p:blipFill>
         <p:spPr>
           <a:xfrm>
-            <a:off x="1529298" y="2792005"/>
-            <a:ext cx="7789927" cy="1950384"/>
+            <a:off x="472274" y="3071871"/>
+            <a:ext cx="8743950" cy="1533525"/>
           </a:xfrm>
           <a:prstGeom prst="rect">
             <a:avLst/>
@@ -3551,10 +3625,10 @@
       </p:pic>
       <p:sp>
         <p:nvSpPr>
-          <p:cNvPr id="7" name="TextBox 6">
-            <a:extLst>
-              <a:ext uri="{FF2B5EF4-FFF2-40B4-BE49-F238E27FC236}">
-                <a16:creationId xmlns:a16="http://schemas.microsoft.com/office/drawing/2014/main" id="{A76DF30E-A658-4E2B-816C-39CA95EE8083}"/>
+          <p:cNvPr id="11" name="TextBox 10">
+            <a:extLst>
+              <a:ext uri="{FF2B5EF4-FFF2-40B4-BE49-F238E27FC236}">
+                <a16:creationId xmlns:a16="http://schemas.microsoft.com/office/drawing/2014/main" id="{60AAB6B9-84C3-4699-A18E-D61A2851628D}"/>
               </a:ext>
             </a:extLst>
           </p:cNvPr>
@@ -3563,8 +3637,8 @@
         </p:nvSpPr>
         <p:spPr>
           <a:xfrm>
-            <a:off x="5101454" y="4458686"/>
-            <a:ext cx="1484282" cy="283703"/>
+            <a:off x="1361615" y="3291828"/>
+            <a:ext cx="1107366" cy="1313568"/>
           </a:xfrm>
           <a:prstGeom prst="rect">
             <a:avLst/>
@@ -3572,7 +3646,7 @@
           <a:noFill/>
           <a:ln w="38100">
             <a:solidFill>
-              <a:srgbClr val="FFC000"/>
+              <a:srgbClr val="FF0000"/>
             </a:solidFill>
           </a:ln>
         </p:spPr>
@@ -3589,7 +3663,7 @@
     </p:spTree>
     <p:extLst>
       <p:ext uri="{BB962C8B-B14F-4D97-AF65-F5344CB8AC3E}">
-        <p14:creationId xmlns:p14="http://schemas.microsoft.com/office/powerpoint/2010/main" val="1919357964"/>
+        <p14:creationId xmlns:p14="http://schemas.microsoft.com/office/powerpoint/2010/main" val="1615585269"/>
       </p:ext>
     </p:extLst>
   </p:cSld>
@@ -3618,10 +3692,10 @@
       </p:grpSpPr>
       <p:pic>
         <p:nvPicPr>
-          <p:cNvPr id="5" name="Picture 4">
-            <a:extLst>
-              <a:ext uri="{FF2B5EF4-FFF2-40B4-BE49-F238E27FC236}">
-                <a16:creationId xmlns:a16="http://schemas.microsoft.com/office/drawing/2014/main" id="{94D6D720-22F5-4960-A103-497EBA4B54EA}"/>
+          <p:cNvPr id="9" name="Picture 8">
+            <a:extLst>
+              <a:ext uri="{FF2B5EF4-FFF2-40B4-BE49-F238E27FC236}">
+                <a16:creationId xmlns:a16="http://schemas.microsoft.com/office/drawing/2014/main" id="{E7C281C3-B52F-E3CA-4F46-4188E4F8C28E}"/>
               </a:ext>
             </a:extLst>
           </p:cNvPr>
@@ -3638,50 +3712,20 @@
         </p:blipFill>
         <p:spPr>
           <a:xfrm>
-            <a:off x="1885092" y="3694346"/>
-            <a:ext cx="10281793" cy="2357133"/>
+            <a:off x="1059162" y="323485"/>
+            <a:ext cx="6105525" cy="1685925"/>
           </a:xfrm>
           <a:prstGeom prst="rect">
             <a:avLst/>
           </a:prstGeom>
         </p:spPr>
       </p:pic>
-      <p:pic>
-        <p:nvPicPr>
-          <p:cNvPr id="3" name="Picture 2">
-            <a:extLst>
-              <a:ext uri="{FF2B5EF4-FFF2-40B4-BE49-F238E27FC236}">
-                <a16:creationId xmlns:a16="http://schemas.microsoft.com/office/drawing/2014/main" id="{A100F959-275A-4848-A4DF-012B30ECB23C}"/>
-              </a:ext>
-            </a:extLst>
-          </p:cNvPr>
-          <p:cNvPicPr>
-            <a:picLocks noChangeAspect="1"/>
-          </p:cNvPicPr>
-          <p:nvPr/>
-        </p:nvPicPr>
-        <p:blipFill>
-          <a:blip r:embed="rId3"/>
-          <a:stretch>
-            <a:fillRect/>
-          </a:stretch>
-        </p:blipFill>
-        <p:spPr>
-          <a:xfrm>
-            <a:off x="53493" y="23672"/>
-            <a:ext cx="10105674" cy="2282258"/>
-          </a:xfrm>
-          <a:prstGeom prst="rect">
-            <a:avLst/>
-          </a:prstGeom>
-        </p:spPr>
-      </p:pic>
-      <p:sp>
-        <p:nvSpPr>
-          <p:cNvPr id="9" name="TextBox 8">
-            <a:extLst>
-              <a:ext uri="{FF2B5EF4-FFF2-40B4-BE49-F238E27FC236}">
-                <a16:creationId xmlns:a16="http://schemas.microsoft.com/office/drawing/2014/main" id="{BC07244D-294C-4D5B-8815-71CD060CA95A}"/>
+      <p:sp>
+        <p:nvSpPr>
+          <p:cNvPr id="5" name="TextBox 4">
+            <a:extLst>
+              <a:ext uri="{FF2B5EF4-FFF2-40B4-BE49-F238E27FC236}">
+                <a16:creationId xmlns:a16="http://schemas.microsoft.com/office/drawing/2014/main" id="{86AF5802-0FF4-4A0D-A3F8-A006C6B62EFC}"/>
               </a:ext>
             </a:extLst>
           </p:cNvPr>
@@ -3690,8 +3734,8 @@
         </p:nvSpPr>
         <p:spPr>
           <a:xfrm>
-            <a:off x="10459092" y="211547"/>
-            <a:ext cx="1489753" cy="923330"/>
+            <a:off x="1361615" y="2246117"/>
+            <a:ext cx="9155875" cy="369332"/>
           </a:xfrm>
           <a:prstGeom prst="rect">
             <a:avLst/>
@@ -3705,31 +3749,26 @@
           <a:lstStyle/>
           <a:p>
             <a:r>
+              <a:rPr lang="en-US" dirty="0"/>
+              <a:t>Identify outliers for </a:t>
+            </a:r>
+            <a:r>
               <a:rPr lang="en-US" dirty="0" err="1"/>
               <a:t>gsh</a:t>
             </a:r>
-            <a:endParaRPr lang="en-US" dirty="0"/>
-          </a:p>
-          <a:p>
             <a:r>
               <a:rPr lang="en-US" dirty="0"/>
-              <a:t>24d</a:t>
-            </a:r>
-          </a:p>
-          <a:p>
-            <a:r>
-              <a:rPr lang="en-US" dirty="0"/>
-              <a:t>Significant</a:t>
-            </a:r>
-          </a:p>
-        </p:txBody>
-      </p:sp>
-      <p:sp>
-        <p:nvSpPr>
-          <p:cNvPr id="10" name="TextBox 9">
-            <a:extLst>
-              <a:ext uri="{FF2B5EF4-FFF2-40B4-BE49-F238E27FC236}">
-                <a16:creationId xmlns:a16="http://schemas.microsoft.com/office/drawing/2014/main" id="{1871EB22-F10A-4181-8810-3A258E8063BC}"/>
+              <a:t> swab data, 4 points identified.</a:t>
+            </a:r>
+          </a:p>
+        </p:txBody>
+      </p:sp>
+      <p:sp>
+        <p:nvSpPr>
+          <p:cNvPr id="7" name="TextBox 6">
+            <a:extLst>
+              <a:ext uri="{FF2B5EF4-FFF2-40B4-BE49-F238E27FC236}">
+                <a16:creationId xmlns:a16="http://schemas.microsoft.com/office/drawing/2014/main" id="{E9143364-4761-44F6-B525-8663832274D6}"/>
               </a:ext>
             </a:extLst>
           </p:cNvPr>
@@ -3738,56 +3777,8 @@
         </p:nvSpPr>
         <p:spPr>
           <a:xfrm>
-            <a:off x="53494" y="4484878"/>
-            <a:ext cx="1662292" cy="923330"/>
-          </a:xfrm>
-          <a:prstGeom prst="rect">
-            <a:avLst/>
-          </a:prstGeom>
-          <a:noFill/>
-        </p:spPr>
-        <p:txBody>
-          <a:bodyPr wrap="square" rtlCol="0">
-            <a:spAutoFit/>
-          </a:bodyPr>
-          <a:lstStyle/>
-          <a:p>
-            <a:r>
-              <a:rPr lang="en-US" dirty="0" err="1"/>
-              <a:t>gsh</a:t>
-            </a:r>
-            <a:endParaRPr lang="en-US" dirty="0"/>
-          </a:p>
-          <a:p>
-            <a:r>
-              <a:rPr lang="en-US" dirty="0"/>
-              <a:t>Chlorpyrifos</a:t>
-            </a:r>
-          </a:p>
-          <a:p>
-            <a:r>
-              <a:rPr lang="en-US" dirty="0"/>
-              <a:t>Not significant</a:t>
-            </a:r>
-          </a:p>
-        </p:txBody>
-      </p:sp>
-      <p:sp>
-        <p:nvSpPr>
-          <p:cNvPr id="16" name="TextBox 15">
-            <a:extLst>
-              <a:ext uri="{FF2B5EF4-FFF2-40B4-BE49-F238E27FC236}">
-                <a16:creationId xmlns:a16="http://schemas.microsoft.com/office/drawing/2014/main" id="{EBAE140D-EBD1-4737-8B46-7F65C5547E5C}"/>
-              </a:ext>
-            </a:extLst>
-          </p:cNvPr>
-          <p:cNvSpPr txBox="1"/>
-          <p:nvPr/>
-        </p:nvSpPr>
-        <p:spPr>
-          <a:xfrm>
-            <a:off x="4891613" y="4723837"/>
-            <a:ext cx="1947553" cy="298149"/>
+            <a:off x="1906438" y="648397"/>
+            <a:ext cx="774618" cy="1313568"/>
           </a:xfrm>
           <a:prstGeom prst="rect">
             <a:avLst/>
@@ -3809,47 +3800,10 @@
           </a:p>
         </p:txBody>
       </p:sp>
-      <p:sp>
-        <p:nvSpPr>
-          <p:cNvPr id="18" name="TextBox 17">
-            <a:extLst>
-              <a:ext uri="{FF2B5EF4-FFF2-40B4-BE49-F238E27FC236}">
-                <a16:creationId xmlns:a16="http://schemas.microsoft.com/office/drawing/2014/main" id="{E8AE9FBD-946E-4CFE-9BB3-DF300E8A1803}"/>
-              </a:ext>
-            </a:extLst>
-          </p:cNvPr>
-          <p:cNvSpPr txBox="1"/>
-          <p:nvPr/>
-        </p:nvSpPr>
-        <p:spPr>
-          <a:xfrm>
-            <a:off x="3158777" y="1089061"/>
-            <a:ext cx="1156369" cy="224814"/>
-          </a:xfrm>
-          <a:prstGeom prst="rect">
-            <a:avLst/>
-          </a:prstGeom>
-          <a:noFill/>
-          <a:ln w="38100">
-            <a:solidFill>
-              <a:srgbClr val="FF0000"/>
-            </a:solidFill>
-          </a:ln>
-        </p:spPr>
-        <p:txBody>
-          <a:bodyPr wrap="square" rtlCol="0">
-            <a:spAutoFit/>
-          </a:bodyPr>
-          <a:lstStyle/>
-          <a:p>
-            <a:endParaRPr lang="en-US" dirty="0"/>
-          </a:p>
-        </p:txBody>
-      </p:sp>
     </p:spTree>
     <p:extLst>
       <p:ext uri="{BB962C8B-B14F-4D97-AF65-F5344CB8AC3E}">
-        <p14:creationId xmlns:p14="http://schemas.microsoft.com/office/powerpoint/2010/main" val="1444396804"/>
+        <p14:creationId xmlns:p14="http://schemas.microsoft.com/office/powerpoint/2010/main" val="1864765791"/>
       </p:ext>
     </p:extLst>
   </p:cSld>
@@ -3876,12 +3830,55 @@
           <a:chExt cx="0" cy="0"/>
         </a:xfrm>
       </p:grpSpPr>
+      <p:sp>
+        <p:nvSpPr>
+          <p:cNvPr id="6" name="TextBox 5">
+            <a:extLst>
+              <a:ext uri="{FF2B5EF4-FFF2-40B4-BE49-F238E27FC236}">
+                <a16:creationId xmlns:a16="http://schemas.microsoft.com/office/drawing/2014/main" id="{394856D6-D891-4E90-A043-86F610FCF429}"/>
+              </a:ext>
+            </a:extLst>
+          </p:cNvPr>
+          <p:cNvSpPr txBox="1"/>
+          <p:nvPr/>
+        </p:nvSpPr>
+        <p:spPr>
+          <a:xfrm>
+            <a:off x="76866" y="1959345"/>
+            <a:ext cx="3675625" cy="3139321"/>
+          </a:xfrm>
+          <a:prstGeom prst="rect">
+            <a:avLst/>
+          </a:prstGeom>
+          <a:noFill/>
+        </p:spPr>
+        <p:txBody>
+          <a:bodyPr wrap="square" rtlCol="0">
+            <a:spAutoFit/>
+          </a:bodyPr>
+          <a:lstStyle/>
+          <a:p>
+            <a:r>
+              <a:rPr lang="en-US" dirty="0"/>
+              <a:t>Normality tests for </a:t>
+            </a:r>
+            <a:r>
+              <a:rPr lang="en-US" dirty="0" err="1"/>
+              <a:t>gsh</a:t>
+            </a:r>
+            <a:r>
+              <a:rPr lang="en-US" dirty="0"/>
+              <a:t> and ache cleared up after dropping outliers, although ache for chlorpyrifos is still on the edge of rejection (only 24D samples were dropped) due to overdispersion in both directions. GSH swab data also fails to reject normality after dropping outliers.  Also looked at logging for acetylcholinesterase but this did not improve the normality fits overall.</a:t>
+            </a:r>
+          </a:p>
+        </p:txBody>
+      </p:sp>
       <p:pic>
         <p:nvPicPr>
-          <p:cNvPr id="7" name="Picture 6">
-            <a:extLst>
-              <a:ext uri="{FF2B5EF4-FFF2-40B4-BE49-F238E27FC236}">
-                <a16:creationId xmlns:a16="http://schemas.microsoft.com/office/drawing/2014/main" id="{6972E929-A894-4C7E-BDBD-944207D9526B}"/>
+          <p:cNvPr id="3" name="Picture 2">
+            <a:extLst>
+              <a:ext uri="{FF2B5EF4-FFF2-40B4-BE49-F238E27FC236}">
+                <a16:creationId xmlns:a16="http://schemas.microsoft.com/office/drawing/2014/main" id="{2B9FBE8D-BD70-4868-89CB-BCB97894EE52}"/>
               </a:ext>
             </a:extLst>
           </p:cNvPr>
@@ -3898,8 +3895,8 @@
         </p:blipFill>
         <p:spPr>
           <a:xfrm>
-            <a:off x="2338601" y="3483343"/>
-            <a:ext cx="9610725" cy="2695575"/>
+            <a:off x="4505411" y="237706"/>
+            <a:ext cx="7789927" cy="2141091"/>
           </a:xfrm>
           <a:prstGeom prst="rect">
             <a:avLst/>
@@ -3908,10 +3905,10 @@
       </p:pic>
       <p:pic>
         <p:nvPicPr>
-          <p:cNvPr id="5" name="Picture 4">
-            <a:extLst>
-              <a:ext uri="{FF2B5EF4-FFF2-40B4-BE49-F238E27FC236}">
-                <a16:creationId xmlns:a16="http://schemas.microsoft.com/office/drawing/2014/main" id="{CF85D053-C854-49C4-84E5-DC5D4C3266D5}"/>
+          <p:cNvPr id="8" name="Picture 7">
+            <a:extLst>
+              <a:ext uri="{FF2B5EF4-FFF2-40B4-BE49-F238E27FC236}">
+                <a16:creationId xmlns:a16="http://schemas.microsoft.com/office/drawing/2014/main" id="{4A145BB0-3C0F-482A-B45A-078479CDE0D3}"/>
               </a:ext>
             </a:extLst>
           </p:cNvPr>
@@ -3928,8 +3925,8 @@
         </p:blipFill>
         <p:spPr>
           <a:xfrm>
-            <a:off x="-2775" y="131371"/>
-            <a:ext cx="9696450" cy="2305050"/>
+            <a:off x="4402073" y="2518987"/>
+            <a:ext cx="7789927" cy="1950384"/>
           </a:xfrm>
           <a:prstGeom prst="rect">
             <a:avLst/>
@@ -3938,10 +3935,10 @@
       </p:pic>
       <p:sp>
         <p:nvSpPr>
-          <p:cNvPr id="9" name="TextBox 8">
-            <a:extLst>
-              <a:ext uri="{FF2B5EF4-FFF2-40B4-BE49-F238E27FC236}">
-                <a16:creationId xmlns:a16="http://schemas.microsoft.com/office/drawing/2014/main" id="{BC07244D-294C-4D5B-8815-71CD060CA95A}"/>
+          <p:cNvPr id="7" name="TextBox 6">
+            <a:extLst>
+              <a:ext uri="{FF2B5EF4-FFF2-40B4-BE49-F238E27FC236}">
+                <a16:creationId xmlns:a16="http://schemas.microsoft.com/office/drawing/2014/main" id="{A76DF30E-A658-4E2B-816C-39CA95EE8083}"/>
               </a:ext>
             </a:extLst>
           </p:cNvPr>
@@ -3950,102 +3947,8 @@
         </p:nvSpPr>
         <p:spPr>
           <a:xfrm>
-            <a:off x="9814573" y="149902"/>
-            <a:ext cx="1980160" cy="923330"/>
-          </a:xfrm>
-          <a:prstGeom prst="rect">
-            <a:avLst/>
-          </a:prstGeom>
-          <a:noFill/>
-        </p:spPr>
-        <p:txBody>
-          <a:bodyPr wrap="square" rtlCol="0">
-            <a:spAutoFit/>
-          </a:bodyPr>
-          <a:lstStyle/>
-          <a:p>
-            <a:r>
-              <a:rPr lang="en-US" dirty="0"/>
-              <a:t>ache</a:t>
-            </a:r>
-          </a:p>
-          <a:p>
-            <a:r>
-              <a:rPr lang="en-US" dirty="0"/>
-              <a:t>24d</a:t>
-            </a:r>
-          </a:p>
-          <a:p>
-            <a:r>
-              <a:rPr lang="en-US" dirty="0"/>
-              <a:t>Not significant</a:t>
-            </a:r>
-          </a:p>
-        </p:txBody>
-      </p:sp>
-      <p:sp>
-        <p:nvSpPr>
-          <p:cNvPr id="10" name="TextBox 9">
-            <a:extLst>
-              <a:ext uri="{FF2B5EF4-FFF2-40B4-BE49-F238E27FC236}">
-                <a16:creationId xmlns:a16="http://schemas.microsoft.com/office/drawing/2014/main" id="{1871EB22-F10A-4181-8810-3A258E8063BC}"/>
-              </a:ext>
-            </a:extLst>
-          </p:cNvPr>
-          <p:cNvSpPr txBox="1"/>
-          <p:nvPr/>
-        </p:nvSpPr>
-        <p:spPr>
-          <a:xfrm>
-            <a:off x="368469" y="4308907"/>
-            <a:ext cx="1799378" cy="923330"/>
-          </a:xfrm>
-          <a:prstGeom prst="rect">
-            <a:avLst/>
-          </a:prstGeom>
-          <a:noFill/>
-        </p:spPr>
-        <p:txBody>
-          <a:bodyPr wrap="square" rtlCol="0">
-            <a:spAutoFit/>
-          </a:bodyPr>
-          <a:lstStyle/>
-          <a:p>
-            <a:r>
-              <a:rPr lang="en-US" dirty="0"/>
-              <a:t>ache</a:t>
-            </a:r>
-          </a:p>
-          <a:p>
-            <a:r>
-              <a:rPr lang="en-US" dirty="0"/>
-              <a:t>Chlorpyrifos</a:t>
-            </a:r>
-          </a:p>
-          <a:p>
-            <a:r>
-              <a:rPr lang="en-US" dirty="0"/>
-              <a:t>Not significant</a:t>
-            </a:r>
-          </a:p>
-        </p:txBody>
-      </p:sp>
-      <p:sp>
-        <p:nvSpPr>
-          <p:cNvPr id="15" name="TextBox 14">
-            <a:extLst>
-              <a:ext uri="{FF2B5EF4-FFF2-40B4-BE49-F238E27FC236}">
-                <a16:creationId xmlns:a16="http://schemas.microsoft.com/office/drawing/2014/main" id="{1E05821F-7C52-4BD8-B766-EBE0DCA992D6}"/>
-              </a:ext>
-            </a:extLst>
-          </p:cNvPr>
-          <p:cNvSpPr txBox="1"/>
-          <p:nvPr/>
-        </p:nvSpPr>
-        <p:spPr>
-          <a:xfrm>
-            <a:off x="5196410" y="5021518"/>
-            <a:ext cx="1111923" cy="298149"/>
+            <a:off x="7995429" y="4201750"/>
+            <a:ext cx="1484282" cy="283703"/>
           </a:xfrm>
           <a:prstGeom prst="rect">
             <a:avLst/>
@@ -4053,7 +3956,7 @@
           <a:noFill/>
           <a:ln w="38100">
             <a:solidFill>
-              <a:srgbClr val="FF0000"/>
+              <a:srgbClr val="FFC000"/>
             </a:solidFill>
           </a:ln>
         </p:spPr>
@@ -4067,47 +3970,40 @@
           </a:p>
         </p:txBody>
       </p:sp>
-      <p:sp>
-        <p:nvSpPr>
-          <p:cNvPr id="18" name="TextBox 17">
-            <a:extLst>
-              <a:ext uri="{FF2B5EF4-FFF2-40B4-BE49-F238E27FC236}">
-                <a16:creationId xmlns:a16="http://schemas.microsoft.com/office/drawing/2014/main" id="{E8AE9FBD-946E-4CFE-9BB3-DF300E8A1803}"/>
-              </a:ext>
-            </a:extLst>
-          </p:cNvPr>
-          <p:cNvSpPr txBox="1"/>
+      <p:pic>
+        <p:nvPicPr>
+          <p:cNvPr id="4" name="Picture 3">
+            <a:extLst>
+              <a:ext uri="{FF2B5EF4-FFF2-40B4-BE49-F238E27FC236}">
+                <a16:creationId xmlns:a16="http://schemas.microsoft.com/office/drawing/2014/main" id="{D4345B10-0F34-6915-1D6D-B9347E9F6B1E}"/>
+              </a:ext>
+            </a:extLst>
+          </p:cNvPr>
+          <p:cNvPicPr>
+            <a:picLocks noChangeAspect="1"/>
+          </p:cNvPicPr>
           <p:nvPr/>
-        </p:nvSpPr>
-        <p:spPr>
-          <a:xfrm>
-            <a:off x="2498326" y="1243566"/>
-            <a:ext cx="1077082" cy="246187"/>
+        </p:nvPicPr>
+        <p:blipFill>
+          <a:blip r:embed="rId4"/>
+          <a:stretch>
+            <a:fillRect/>
+          </a:stretch>
+        </p:blipFill>
+        <p:spPr>
+          <a:xfrm>
+            <a:off x="4402073" y="4485454"/>
+            <a:ext cx="7789927" cy="2372546"/>
           </a:xfrm>
           <a:prstGeom prst="rect">
             <a:avLst/>
           </a:prstGeom>
-          <a:noFill/>
-          <a:ln w="38100">
-            <a:solidFill>
-              <a:srgbClr val="FF0000"/>
-            </a:solidFill>
-          </a:ln>
-        </p:spPr>
-        <p:txBody>
-          <a:bodyPr wrap="square" rtlCol="0">
-            <a:spAutoFit/>
-          </a:bodyPr>
-          <a:lstStyle/>
-          <a:p>
-            <a:endParaRPr lang="en-US" dirty="0"/>
-          </a:p>
-        </p:txBody>
-      </p:sp>
+        </p:spPr>
+      </p:pic>
     </p:spTree>
     <p:extLst>
       <p:ext uri="{BB962C8B-B14F-4D97-AF65-F5344CB8AC3E}">
-        <p14:creationId xmlns:p14="http://schemas.microsoft.com/office/powerpoint/2010/main" val="1056058616"/>
+        <p14:creationId xmlns:p14="http://schemas.microsoft.com/office/powerpoint/2010/main" val="1919357964"/>
       </p:ext>
     </p:extLst>
   </p:cSld>
@@ -4134,62 +4030,12 @@
           <a:chExt cx="0" cy="0"/>
         </a:xfrm>
       </p:grpSpPr>
-      <p:sp>
-        <p:nvSpPr>
-          <p:cNvPr id="2" name="Title 1">
-            <a:extLst>
-              <a:ext uri="{FF2B5EF4-FFF2-40B4-BE49-F238E27FC236}">
-                <a16:creationId xmlns:a16="http://schemas.microsoft.com/office/drawing/2014/main" id="{106A8024-95DC-E966-0D62-4AFBCA16DAE4}"/>
-              </a:ext>
-            </a:extLst>
-          </p:cNvPr>
-          <p:cNvSpPr>
-            <a:spLocks noGrp="1"/>
-          </p:cNvSpPr>
-          <p:nvPr>
-            <p:ph type="title"/>
-          </p:nvPr>
-        </p:nvSpPr>
-        <p:spPr/>
-        <p:txBody>
-          <a:bodyPr/>
-          <a:lstStyle/>
-          <a:p>
-            <a:endParaRPr lang="en-US"/>
-          </a:p>
-        </p:txBody>
-      </p:sp>
-      <p:sp>
-        <p:nvSpPr>
-          <p:cNvPr id="3" name="Content Placeholder 2">
-            <a:extLst>
-              <a:ext uri="{FF2B5EF4-FFF2-40B4-BE49-F238E27FC236}">
-                <a16:creationId xmlns:a16="http://schemas.microsoft.com/office/drawing/2014/main" id="{19555F0E-E6FC-AB18-0895-7FEF311B8215}"/>
-              </a:ext>
-            </a:extLst>
-          </p:cNvPr>
-          <p:cNvSpPr>
-            <a:spLocks noGrp="1"/>
-          </p:cNvSpPr>
-          <p:nvPr>
-            <p:ph idx="1"/>
-          </p:nvPr>
-        </p:nvSpPr>
-        <p:spPr/>
-        <p:txBody>
-          <a:bodyPr/>
-          <a:lstStyle/>
-          <a:p>
-            <a:endParaRPr lang="en-US"/>
-          </a:p>
-        </p:txBody>
-      </p:sp>
       <p:pic>
         <p:nvPicPr>
           <p:cNvPr id="5" name="Picture 4">
             <a:extLst>
               <a:ext uri="{FF2B5EF4-FFF2-40B4-BE49-F238E27FC236}">
-                <a16:creationId xmlns:a16="http://schemas.microsoft.com/office/drawing/2014/main" id="{BC5F2F71-6EA6-25BF-CF74-0FB0D1394413}"/>
+                <a16:creationId xmlns:a16="http://schemas.microsoft.com/office/drawing/2014/main" id="{94D6D720-22F5-4960-A103-497EBA4B54EA}"/>
               </a:ext>
             </a:extLst>
           </p:cNvPr>
@@ -4206,18 +4052,218 @@
         </p:blipFill>
         <p:spPr>
           <a:xfrm>
-            <a:off x="2262535" y="0"/>
-            <a:ext cx="7666929" cy="6858000"/>
+            <a:off x="1885092" y="2365885"/>
+            <a:ext cx="10281793" cy="2357133"/>
           </a:xfrm>
           <a:prstGeom prst="rect">
             <a:avLst/>
           </a:prstGeom>
         </p:spPr>
       </p:pic>
+      <p:pic>
+        <p:nvPicPr>
+          <p:cNvPr id="3" name="Picture 2">
+            <a:extLst>
+              <a:ext uri="{FF2B5EF4-FFF2-40B4-BE49-F238E27FC236}">
+                <a16:creationId xmlns:a16="http://schemas.microsoft.com/office/drawing/2014/main" id="{A100F959-275A-4848-A4DF-012B30ECB23C}"/>
+              </a:ext>
+            </a:extLst>
+          </p:cNvPr>
+          <p:cNvPicPr>
+            <a:picLocks noChangeAspect="1"/>
+          </p:cNvPicPr>
+          <p:nvPr/>
+        </p:nvPicPr>
+        <p:blipFill>
+          <a:blip r:embed="rId3"/>
+          <a:stretch>
+            <a:fillRect/>
+          </a:stretch>
+        </p:blipFill>
+        <p:spPr>
+          <a:xfrm>
+            <a:off x="53493" y="23672"/>
+            <a:ext cx="10105674" cy="2282258"/>
+          </a:xfrm>
+          <a:prstGeom prst="rect">
+            <a:avLst/>
+          </a:prstGeom>
+        </p:spPr>
+      </p:pic>
+      <p:sp>
+        <p:nvSpPr>
+          <p:cNvPr id="9" name="TextBox 8">
+            <a:extLst>
+              <a:ext uri="{FF2B5EF4-FFF2-40B4-BE49-F238E27FC236}">
+                <a16:creationId xmlns:a16="http://schemas.microsoft.com/office/drawing/2014/main" id="{BC07244D-294C-4D5B-8815-71CD060CA95A}"/>
+              </a:ext>
+            </a:extLst>
+          </p:cNvPr>
+          <p:cNvSpPr txBox="1"/>
+          <p:nvPr/>
+        </p:nvSpPr>
+        <p:spPr>
+          <a:xfrm>
+            <a:off x="10459092" y="211547"/>
+            <a:ext cx="1489753" cy="923330"/>
+          </a:xfrm>
+          <a:prstGeom prst="rect">
+            <a:avLst/>
+          </a:prstGeom>
+          <a:noFill/>
+        </p:spPr>
+        <p:txBody>
+          <a:bodyPr wrap="square" rtlCol="0">
+            <a:spAutoFit/>
+          </a:bodyPr>
+          <a:lstStyle/>
+          <a:p>
+            <a:r>
+              <a:rPr lang="en-US" dirty="0" err="1"/>
+              <a:t>gsh</a:t>
+            </a:r>
+            <a:endParaRPr lang="en-US" dirty="0"/>
+          </a:p>
+          <a:p>
+            <a:r>
+              <a:rPr lang="en-US" dirty="0"/>
+              <a:t>24d</a:t>
+            </a:r>
+          </a:p>
+          <a:p>
+            <a:r>
+              <a:rPr lang="en-US" dirty="0"/>
+              <a:t>Significant</a:t>
+            </a:r>
+          </a:p>
+        </p:txBody>
+      </p:sp>
+      <p:sp>
+        <p:nvSpPr>
+          <p:cNvPr id="10" name="TextBox 9">
+            <a:extLst>
+              <a:ext uri="{FF2B5EF4-FFF2-40B4-BE49-F238E27FC236}">
+                <a16:creationId xmlns:a16="http://schemas.microsoft.com/office/drawing/2014/main" id="{1871EB22-F10A-4181-8810-3A258E8063BC}"/>
+              </a:ext>
+            </a:extLst>
+          </p:cNvPr>
+          <p:cNvSpPr txBox="1"/>
+          <p:nvPr/>
+        </p:nvSpPr>
+        <p:spPr>
+          <a:xfrm>
+            <a:off x="222800" y="2933711"/>
+            <a:ext cx="1662292" cy="923330"/>
+          </a:xfrm>
+          <a:prstGeom prst="rect">
+            <a:avLst/>
+          </a:prstGeom>
+          <a:noFill/>
+        </p:spPr>
+        <p:txBody>
+          <a:bodyPr wrap="square" rtlCol="0">
+            <a:spAutoFit/>
+          </a:bodyPr>
+          <a:lstStyle/>
+          <a:p>
+            <a:r>
+              <a:rPr lang="en-US" dirty="0" err="1"/>
+              <a:t>gsh</a:t>
+            </a:r>
+            <a:endParaRPr lang="en-US" dirty="0"/>
+          </a:p>
+          <a:p>
+            <a:r>
+              <a:rPr lang="en-US" dirty="0"/>
+              <a:t>Chlorpyrifos</a:t>
+            </a:r>
+          </a:p>
+          <a:p>
+            <a:r>
+              <a:rPr lang="en-US" dirty="0"/>
+              <a:t>Not significant</a:t>
+            </a:r>
+          </a:p>
+        </p:txBody>
+      </p:sp>
+      <p:sp>
+        <p:nvSpPr>
+          <p:cNvPr id="16" name="TextBox 15">
+            <a:extLst>
+              <a:ext uri="{FF2B5EF4-FFF2-40B4-BE49-F238E27FC236}">
+                <a16:creationId xmlns:a16="http://schemas.microsoft.com/office/drawing/2014/main" id="{EBAE140D-EBD1-4737-8B46-7F65C5547E5C}"/>
+              </a:ext>
+            </a:extLst>
+          </p:cNvPr>
+          <p:cNvSpPr txBox="1"/>
+          <p:nvPr/>
+        </p:nvSpPr>
+        <p:spPr>
+          <a:xfrm>
+            <a:off x="4891613" y="3395376"/>
+            <a:ext cx="1947553" cy="298149"/>
+          </a:xfrm>
+          <a:prstGeom prst="rect">
+            <a:avLst/>
+          </a:prstGeom>
+          <a:noFill/>
+          <a:ln w="38100">
+            <a:solidFill>
+              <a:srgbClr val="FF0000"/>
+            </a:solidFill>
+          </a:ln>
+        </p:spPr>
+        <p:txBody>
+          <a:bodyPr wrap="square" rtlCol="0">
+            <a:spAutoFit/>
+          </a:bodyPr>
+          <a:lstStyle/>
+          <a:p>
+            <a:endParaRPr lang="en-US" dirty="0"/>
+          </a:p>
+        </p:txBody>
+      </p:sp>
+      <p:sp>
+        <p:nvSpPr>
+          <p:cNvPr id="18" name="TextBox 17">
+            <a:extLst>
+              <a:ext uri="{FF2B5EF4-FFF2-40B4-BE49-F238E27FC236}">
+                <a16:creationId xmlns:a16="http://schemas.microsoft.com/office/drawing/2014/main" id="{E8AE9FBD-946E-4CFE-9BB3-DF300E8A1803}"/>
+              </a:ext>
+            </a:extLst>
+          </p:cNvPr>
+          <p:cNvSpPr txBox="1"/>
+          <p:nvPr/>
+        </p:nvSpPr>
+        <p:spPr>
+          <a:xfrm>
+            <a:off x="3158777" y="1089061"/>
+            <a:ext cx="1156369" cy="224814"/>
+          </a:xfrm>
+          <a:prstGeom prst="rect">
+            <a:avLst/>
+          </a:prstGeom>
+          <a:noFill/>
+          <a:ln w="38100">
+            <a:solidFill>
+              <a:srgbClr val="FF0000"/>
+            </a:solidFill>
+          </a:ln>
+        </p:spPr>
+        <p:txBody>
+          <a:bodyPr wrap="square" rtlCol="0">
+            <a:spAutoFit/>
+          </a:bodyPr>
+          <a:lstStyle/>
+          <a:p>
+            <a:endParaRPr lang="en-US" dirty="0"/>
+          </a:p>
+        </p:txBody>
+      </p:sp>
     </p:spTree>
     <p:extLst>
       <p:ext uri="{BB962C8B-B14F-4D97-AF65-F5344CB8AC3E}">
-        <p14:creationId xmlns:p14="http://schemas.microsoft.com/office/powerpoint/2010/main" val="1904536910"/>
+        <p14:creationId xmlns:p14="http://schemas.microsoft.com/office/powerpoint/2010/main" val="1444396804"/>
       </p:ext>
     </p:extLst>
   </p:cSld>
@@ -4244,62 +4290,12 @@
           <a:chExt cx="0" cy="0"/>
         </a:xfrm>
       </p:grpSpPr>
-      <p:sp>
-        <p:nvSpPr>
-          <p:cNvPr id="2" name="Title 1">
-            <a:extLst>
-              <a:ext uri="{FF2B5EF4-FFF2-40B4-BE49-F238E27FC236}">
-                <a16:creationId xmlns:a16="http://schemas.microsoft.com/office/drawing/2014/main" id="{3A72562A-E104-A744-0A64-BA49A33CD567}"/>
-              </a:ext>
-            </a:extLst>
-          </p:cNvPr>
-          <p:cNvSpPr>
-            <a:spLocks noGrp="1"/>
-          </p:cNvSpPr>
-          <p:nvPr>
-            <p:ph type="title"/>
-          </p:nvPr>
-        </p:nvSpPr>
-        <p:spPr/>
-        <p:txBody>
-          <a:bodyPr/>
-          <a:lstStyle/>
-          <a:p>
-            <a:endParaRPr lang="en-US"/>
-          </a:p>
-        </p:txBody>
-      </p:sp>
-      <p:sp>
-        <p:nvSpPr>
-          <p:cNvPr id="3" name="Content Placeholder 2">
-            <a:extLst>
-              <a:ext uri="{FF2B5EF4-FFF2-40B4-BE49-F238E27FC236}">
-                <a16:creationId xmlns:a16="http://schemas.microsoft.com/office/drawing/2014/main" id="{1577E626-24AE-2579-A8F0-0AF9B05032CC}"/>
-              </a:ext>
-            </a:extLst>
-          </p:cNvPr>
-          <p:cNvSpPr>
-            <a:spLocks noGrp="1"/>
-          </p:cNvSpPr>
-          <p:nvPr>
-            <p:ph idx="1"/>
-          </p:nvPr>
-        </p:nvSpPr>
-        <p:spPr/>
-        <p:txBody>
-          <a:bodyPr/>
-          <a:lstStyle/>
-          <a:p>
-            <a:endParaRPr lang="en-US"/>
-          </a:p>
-        </p:txBody>
-      </p:sp>
       <p:pic>
         <p:nvPicPr>
-          <p:cNvPr id="5" name="Picture 4">
-            <a:extLst>
-              <a:ext uri="{FF2B5EF4-FFF2-40B4-BE49-F238E27FC236}">
-                <a16:creationId xmlns:a16="http://schemas.microsoft.com/office/drawing/2014/main" id="{AF5D9412-564C-42FF-D0C2-BA95F6F50B0A}"/>
+          <p:cNvPr id="7" name="Picture 6">
+            <a:extLst>
+              <a:ext uri="{FF2B5EF4-FFF2-40B4-BE49-F238E27FC236}">
+                <a16:creationId xmlns:a16="http://schemas.microsoft.com/office/drawing/2014/main" id="{6972E929-A894-4C7E-BDBD-944207D9526B}"/>
               </a:ext>
             </a:extLst>
           </p:cNvPr>
@@ -4316,18 +4312,216 @@
         </p:blipFill>
         <p:spPr>
           <a:xfrm>
-            <a:off x="2031003" y="0"/>
-            <a:ext cx="8129994" cy="6858000"/>
+            <a:off x="2338601" y="3483343"/>
+            <a:ext cx="9610725" cy="2695575"/>
           </a:xfrm>
           <a:prstGeom prst="rect">
             <a:avLst/>
           </a:prstGeom>
         </p:spPr>
       </p:pic>
+      <p:pic>
+        <p:nvPicPr>
+          <p:cNvPr id="5" name="Picture 4">
+            <a:extLst>
+              <a:ext uri="{FF2B5EF4-FFF2-40B4-BE49-F238E27FC236}">
+                <a16:creationId xmlns:a16="http://schemas.microsoft.com/office/drawing/2014/main" id="{CF85D053-C854-49C4-84E5-DC5D4C3266D5}"/>
+              </a:ext>
+            </a:extLst>
+          </p:cNvPr>
+          <p:cNvPicPr>
+            <a:picLocks noChangeAspect="1"/>
+          </p:cNvPicPr>
+          <p:nvPr/>
+        </p:nvPicPr>
+        <p:blipFill>
+          <a:blip r:embed="rId3"/>
+          <a:stretch>
+            <a:fillRect/>
+          </a:stretch>
+        </p:blipFill>
+        <p:spPr>
+          <a:xfrm>
+            <a:off x="-2775" y="131371"/>
+            <a:ext cx="9696450" cy="2305050"/>
+          </a:xfrm>
+          <a:prstGeom prst="rect">
+            <a:avLst/>
+          </a:prstGeom>
+        </p:spPr>
+      </p:pic>
+      <p:sp>
+        <p:nvSpPr>
+          <p:cNvPr id="9" name="TextBox 8">
+            <a:extLst>
+              <a:ext uri="{FF2B5EF4-FFF2-40B4-BE49-F238E27FC236}">
+                <a16:creationId xmlns:a16="http://schemas.microsoft.com/office/drawing/2014/main" id="{BC07244D-294C-4D5B-8815-71CD060CA95A}"/>
+              </a:ext>
+            </a:extLst>
+          </p:cNvPr>
+          <p:cNvSpPr txBox="1"/>
+          <p:nvPr/>
+        </p:nvSpPr>
+        <p:spPr>
+          <a:xfrm>
+            <a:off x="9814573" y="149902"/>
+            <a:ext cx="1980160" cy="923330"/>
+          </a:xfrm>
+          <a:prstGeom prst="rect">
+            <a:avLst/>
+          </a:prstGeom>
+          <a:noFill/>
+        </p:spPr>
+        <p:txBody>
+          <a:bodyPr wrap="square" rtlCol="0">
+            <a:spAutoFit/>
+          </a:bodyPr>
+          <a:lstStyle/>
+          <a:p>
+            <a:r>
+              <a:rPr lang="en-US" dirty="0"/>
+              <a:t>ache</a:t>
+            </a:r>
+          </a:p>
+          <a:p>
+            <a:r>
+              <a:rPr lang="en-US" dirty="0"/>
+              <a:t>24d</a:t>
+            </a:r>
+          </a:p>
+          <a:p>
+            <a:r>
+              <a:rPr lang="en-US" dirty="0"/>
+              <a:t>Not significant</a:t>
+            </a:r>
+          </a:p>
+        </p:txBody>
+      </p:sp>
+      <p:sp>
+        <p:nvSpPr>
+          <p:cNvPr id="10" name="TextBox 9">
+            <a:extLst>
+              <a:ext uri="{FF2B5EF4-FFF2-40B4-BE49-F238E27FC236}">
+                <a16:creationId xmlns:a16="http://schemas.microsoft.com/office/drawing/2014/main" id="{1871EB22-F10A-4181-8810-3A258E8063BC}"/>
+              </a:ext>
+            </a:extLst>
+          </p:cNvPr>
+          <p:cNvSpPr txBox="1"/>
+          <p:nvPr/>
+        </p:nvSpPr>
+        <p:spPr>
+          <a:xfrm>
+            <a:off x="368469" y="4308907"/>
+            <a:ext cx="1799378" cy="923330"/>
+          </a:xfrm>
+          <a:prstGeom prst="rect">
+            <a:avLst/>
+          </a:prstGeom>
+          <a:noFill/>
+        </p:spPr>
+        <p:txBody>
+          <a:bodyPr wrap="square" rtlCol="0">
+            <a:spAutoFit/>
+          </a:bodyPr>
+          <a:lstStyle/>
+          <a:p>
+            <a:r>
+              <a:rPr lang="en-US" dirty="0"/>
+              <a:t>ache</a:t>
+            </a:r>
+          </a:p>
+          <a:p>
+            <a:r>
+              <a:rPr lang="en-US" dirty="0"/>
+              <a:t>Chlorpyrifos</a:t>
+            </a:r>
+          </a:p>
+          <a:p>
+            <a:r>
+              <a:rPr lang="en-US" dirty="0"/>
+              <a:t>Not significant</a:t>
+            </a:r>
+          </a:p>
+        </p:txBody>
+      </p:sp>
+      <p:sp>
+        <p:nvSpPr>
+          <p:cNvPr id="15" name="TextBox 14">
+            <a:extLst>
+              <a:ext uri="{FF2B5EF4-FFF2-40B4-BE49-F238E27FC236}">
+                <a16:creationId xmlns:a16="http://schemas.microsoft.com/office/drawing/2014/main" id="{1E05821F-7C52-4BD8-B766-EBE0DCA992D6}"/>
+              </a:ext>
+            </a:extLst>
+          </p:cNvPr>
+          <p:cNvSpPr txBox="1"/>
+          <p:nvPr/>
+        </p:nvSpPr>
+        <p:spPr>
+          <a:xfrm>
+            <a:off x="5196410" y="5021518"/>
+            <a:ext cx="1111923" cy="298149"/>
+          </a:xfrm>
+          <a:prstGeom prst="rect">
+            <a:avLst/>
+          </a:prstGeom>
+          <a:noFill/>
+          <a:ln w="38100">
+            <a:solidFill>
+              <a:srgbClr val="FF0000"/>
+            </a:solidFill>
+          </a:ln>
+        </p:spPr>
+        <p:txBody>
+          <a:bodyPr wrap="square" rtlCol="0">
+            <a:spAutoFit/>
+          </a:bodyPr>
+          <a:lstStyle/>
+          <a:p>
+            <a:endParaRPr lang="en-US" dirty="0"/>
+          </a:p>
+        </p:txBody>
+      </p:sp>
+      <p:sp>
+        <p:nvSpPr>
+          <p:cNvPr id="18" name="TextBox 17">
+            <a:extLst>
+              <a:ext uri="{FF2B5EF4-FFF2-40B4-BE49-F238E27FC236}">
+                <a16:creationId xmlns:a16="http://schemas.microsoft.com/office/drawing/2014/main" id="{E8AE9FBD-946E-4CFE-9BB3-DF300E8A1803}"/>
+              </a:ext>
+            </a:extLst>
+          </p:cNvPr>
+          <p:cNvSpPr txBox="1"/>
+          <p:nvPr/>
+        </p:nvSpPr>
+        <p:spPr>
+          <a:xfrm>
+            <a:off x="2498326" y="1243566"/>
+            <a:ext cx="1077082" cy="246187"/>
+          </a:xfrm>
+          <a:prstGeom prst="rect">
+            <a:avLst/>
+          </a:prstGeom>
+          <a:noFill/>
+          <a:ln w="38100">
+            <a:solidFill>
+              <a:srgbClr val="FF0000"/>
+            </a:solidFill>
+          </a:ln>
+        </p:spPr>
+        <p:txBody>
+          <a:bodyPr wrap="square" rtlCol="0">
+            <a:spAutoFit/>
+          </a:bodyPr>
+          <a:lstStyle/>
+          <a:p>
+            <a:endParaRPr lang="en-US" dirty="0"/>
+          </a:p>
+        </p:txBody>
+      </p:sp>
     </p:spTree>
     <p:extLst>
       <p:ext uri="{BB962C8B-B14F-4D97-AF65-F5344CB8AC3E}">
-        <p14:creationId xmlns:p14="http://schemas.microsoft.com/office/powerpoint/2010/main" val="1989200286"/>
+        <p14:creationId xmlns:p14="http://schemas.microsoft.com/office/powerpoint/2010/main" val="1056058616"/>
       </p:ext>
     </p:extLst>
   </p:cSld>
@@ -4354,12 +4548,62 @@
           <a:chExt cx="0" cy="0"/>
         </a:xfrm>
       </p:grpSpPr>
+      <p:sp>
+        <p:nvSpPr>
+          <p:cNvPr id="2" name="Title 1">
+            <a:extLst>
+              <a:ext uri="{FF2B5EF4-FFF2-40B4-BE49-F238E27FC236}">
+                <a16:creationId xmlns:a16="http://schemas.microsoft.com/office/drawing/2014/main" id="{106A8024-95DC-E966-0D62-4AFBCA16DAE4}"/>
+              </a:ext>
+            </a:extLst>
+          </p:cNvPr>
+          <p:cNvSpPr>
+            <a:spLocks noGrp="1"/>
+          </p:cNvSpPr>
+          <p:nvPr>
+            <p:ph type="title"/>
+          </p:nvPr>
+        </p:nvSpPr>
+        <p:spPr/>
+        <p:txBody>
+          <a:bodyPr/>
+          <a:lstStyle/>
+          <a:p>
+            <a:endParaRPr lang="en-US"/>
+          </a:p>
+        </p:txBody>
+      </p:sp>
+      <p:sp>
+        <p:nvSpPr>
+          <p:cNvPr id="3" name="Content Placeholder 2">
+            <a:extLst>
+              <a:ext uri="{FF2B5EF4-FFF2-40B4-BE49-F238E27FC236}">
+                <a16:creationId xmlns:a16="http://schemas.microsoft.com/office/drawing/2014/main" id="{19555F0E-E6FC-AB18-0895-7FEF311B8215}"/>
+              </a:ext>
+            </a:extLst>
+          </p:cNvPr>
+          <p:cNvSpPr>
+            <a:spLocks noGrp="1"/>
+          </p:cNvSpPr>
+          <p:nvPr>
+            <p:ph idx="1"/>
+          </p:nvPr>
+        </p:nvSpPr>
+        <p:spPr/>
+        <p:txBody>
+          <a:bodyPr/>
+          <a:lstStyle/>
+          <a:p>
+            <a:endParaRPr lang="en-US"/>
+          </a:p>
+        </p:txBody>
+      </p:sp>
       <p:pic>
         <p:nvPicPr>
           <p:cNvPr id="5" name="Picture 4">
             <a:extLst>
               <a:ext uri="{FF2B5EF4-FFF2-40B4-BE49-F238E27FC236}">
-                <a16:creationId xmlns:a16="http://schemas.microsoft.com/office/drawing/2014/main" id="{28F39AF9-8FA2-1E27-DED7-6C98DEAC6352}"/>
+                <a16:creationId xmlns:a16="http://schemas.microsoft.com/office/drawing/2014/main" id="{BC5F2F71-6EA6-25BF-CF74-0FB0D1394413}"/>
               </a:ext>
             </a:extLst>
           </p:cNvPr>
@@ -4376,55 +4620,18 @@
         </p:blipFill>
         <p:spPr>
           <a:xfrm>
-            <a:off x="397163" y="55996"/>
-            <a:ext cx="9401781" cy="6734892"/>
+            <a:off x="2262535" y="0"/>
+            <a:ext cx="7666929" cy="6858000"/>
           </a:xfrm>
           <a:prstGeom prst="rect">
             <a:avLst/>
           </a:prstGeom>
         </p:spPr>
       </p:pic>
-      <p:sp>
-        <p:nvSpPr>
-          <p:cNvPr id="2" name="Title 1">
-            <a:extLst>
-              <a:ext uri="{FF2B5EF4-FFF2-40B4-BE49-F238E27FC236}">
-                <a16:creationId xmlns:a16="http://schemas.microsoft.com/office/drawing/2014/main" id="{68AC0A0C-1C5A-64F6-8F4A-EF0556EAC1DD}"/>
-              </a:ext>
-            </a:extLst>
-          </p:cNvPr>
-          <p:cNvSpPr>
-            <a:spLocks noGrp="1"/>
-          </p:cNvSpPr>
-          <p:nvPr>
-            <p:ph type="title"/>
-          </p:nvPr>
-        </p:nvSpPr>
-        <p:spPr>
-          <a:xfrm>
-            <a:off x="5834165" y="5465325"/>
-            <a:ext cx="6356927" cy="1325563"/>
-          </a:xfrm>
-        </p:spPr>
-        <p:txBody>
-          <a:bodyPr/>
-          <a:lstStyle/>
-          <a:p>
-            <a:r>
-              <a:rPr lang="en-US" dirty="0" err="1"/>
-              <a:t>Chlorpyrfos</a:t>
-            </a:r>
-            <a:r>
-              <a:rPr lang="en-US" dirty="0"/>
-              <a:t>, log2 v control</a:t>
-            </a:r>
-          </a:p>
-        </p:txBody>
-      </p:sp>
     </p:spTree>
     <p:extLst>
       <p:ext uri="{BB962C8B-B14F-4D97-AF65-F5344CB8AC3E}">
-        <p14:creationId xmlns:p14="http://schemas.microsoft.com/office/powerpoint/2010/main" val="249576630"/>
+        <p14:creationId xmlns:p14="http://schemas.microsoft.com/office/powerpoint/2010/main" val="1904536910"/>
       </p:ext>
     </p:extLst>
   </p:cSld>
@@ -4456,7 +4663,7 @@
           <p:cNvPr id="2" name="Title 1">
             <a:extLst>
               <a:ext uri="{FF2B5EF4-FFF2-40B4-BE49-F238E27FC236}">
-                <a16:creationId xmlns:a16="http://schemas.microsoft.com/office/drawing/2014/main" id="{FA9D0A6F-35B7-989C-777F-70CD6CFA5D84}"/>
+                <a16:creationId xmlns:a16="http://schemas.microsoft.com/office/drawing/2014/main" id="{3A72562A-E104-A744-0A64-BA49A33CD567}"/>
               </a:ext>
             </a:extLst>
           </p:cNvPr>
@@ -4481,7 +4688,7 @@
           <p:cNvPr id="3" name="Content Placeholder 2">
             <a:extLst>
               <a:ext uri="{FF2B5EF4-FFF2-40B4-BE49-F238E27FC236}">
-                <a16:creationId xmlns:a16="http://schemas.microsoft.com/office/drawing/2014/main" id="{E3F2277D-F638-1BA5-1B71-8FEB35A67793}"/>
+                <a16:creationId xmlns:a16="http://schemas.microsoft.com/office/drawing/2014/main" id="{1577E626-24AE-2579-A8F0-0AF9B05032CC}"/>
               </a:ext>
             </a:extLst>
           </p:cNvPr>
@@ -4501,10 +4708,40 @@
           </a:p>
         </p:txBody>
       </p:sp>
+      <p:pic>
+        <p:nvPicPr>
+          <p:cNvPr id="5" name="Picture 4">
+            <a:extLst>
+              <a:ext uri="{FF2B5EF4-FFF2-40B4-BE49-F238E27FC236}">
+                <a16:creationId xmlns:a16="http://schemas.microsoft.com/office/drawing/2014/main" id="{AF5D9412-564C-42FF-D0C2-BA95F6F50B0A}"/>
+              </a:ext>
+            </a:extLst>
+          </p:cNvPr>
+          <p:cNvPicPr>
+            <a:picLocks noChangeAspect="1"/>
+          </p:cNvPicPr>
+          <p:nvPr/>
+        </p:nvPicPr>
+        <p:blipFill>
+          <a:blip r:embed="rId2"/>
+          <a:stretch>
+            <a:fillRect/>
+          </a:stretch>
+        </p:blipFill>
+        <p:spPr>
+          <a:xfrm>
+            <a:off x="2031003" y="0"/>
+            <a:ext cx="8129994" cy="6858000"/>
+          </a:xfrm>
+          <a:prstGeom prst="rect">
+            <a:avLst/>
+          </a:prstGeom>
+        </p:spPr>
+      </p:pic>
     </p:spTree>
     <p:extLst>
       <p:ext uri="{BB962C8B-B14F-4D97-AF65-F5344CB8AC3E}">
-        <p14:creationId xmlns:p14="http://schemas.microsoft.com/office/powerpoint/2010/main" val="1250932286"/>
+        <p14:creationId xmlns:p14="http://schemas.microsoft.com/office/powerpoint/2010/main" val="1989200286"/>
       </p:ext>
     </p:extLst>
   </p:cSld>
@@ -4536,7 +4773,7 @@
           <p:cNvPr id="5" name="Picture 4">
             <a:extLst>
               <a:ext uri="{FF2B5EF4-FFF2-40B4-BE49-F238E27FC236}">
-                <a16:creationId xmlns:a16="http://schemas.microsoft.com/office/drawing/2014/main" id="{AE57FB0C-7DA8-1619-E405-A41462CF60FA}"/>
+                <a16:creationId xmlns:a16="http://schemas.microsoft.com/office/drawing/2014/main" id="{28F39AF9-8FA2-1E27-DED7-6C98DEAC6352}"/>
               </a:ext>
             </a:extLst>
           </p:cNvPr>
@@ -4553,50 +4790,20 @@
         </p:blipFill>
         <p:spPr>
           <a:xfrm>
-            <a:off x="1" y="2049863"/>
-            <a:ext cx="5067130" cy="4617219"/>
+            <a:off x="397163" y="55996"/>
+            <a:ext cx="9401781" cy="6734892"/>
           </a:xfrm>
           <a:prstGeom prst="rect">
             <a:avLst/>
           </a:prstGeom>
         </p:spPr>
       </p:pic>
-      <p:pic>
-        <p:nvPicPr>
-          <p:cNvPr id="7" name="Picture 6">
-            <a:extLst>
-              <a:ext uri="{FF2B5EF4-FFF2-40B4-BE49-F238E27FC236}">
-                <a16:creationId xmlns:a16="http://schemas.microsoft.com/office/drawing/2014/main" id="{275500CE-9CB0-025C-266E-89D70CDC4B1C}"/>
-              </a:ext>
-            </a:extLst>
-          </p:cNvPr>
-          <p:cNvPicPr>
-            <a:picLocks noChangeAspect="1"/>
-          </p:cNvPicPr>
-          <p:nvPr/>
-        </p:nvPicPr>
-        <p:blipFill>
-          <a:blip r:embed="rId3"/>
-          <a:stretch>
-            <a:fillRect/>
-          </a:stretch>
-        </p:blipFill>
-        <p:spPr>
-          <a:xfrm>
-            <a:off x="5067131" y="681037"/>
-            <a:ext cx="7098843" cy="6127739"/>
-          </a:xfrm>
-          <a:prstGeom prst="rect">
-            <a:avLst/>
-          </a:prstGeom>
-        </p:spPr>
-      </p:pic>
       <p:sp>
         <p:nvSpPr>
           <p:cNvPr id="2" name="Title 1">
             <a:extLst>
               <a:ext uri="{FF2B5EF4-FFF2-40B4-BE49-F238E27FC236}">
-                <a16:creationId xmlns:a16="http://schemas.microsoft.com/office/drawing/2014/main" id="{F2992844-C348-ED8E-D093-9ABAE1B2BF35}"/>
+                <a16:creationId xmlns:a16="http://schemas.microsoft.com/office/drawing/2014/main" id="{68AC0A0C-1C5A-64F6-8F4A-EF0556EAC1DD}"/>
               </a:ext>
             </a:extLst>
           </p:cNvPr>
@@ -4609,8 +4816,8 @@
         </p:nvSpPr>
         <p:spPr>
           <a:xfrm>
-            <a:off x="9761135" y="186976"/>
-            <a:ext cx="2095919" cy="1325563"/>
+            <a:off x="5834165" y="5465325"/>
+            <a:ext cx="6356927" cy="1325563"/>
           </a:xfrm>
         </p:spPr>
         <p:txBody>
@@ -4618,8 +4825,12 @@
           <a:lstStyle/>
           <a:p>
             <a:r>
+              <a:rPr lang="en-US" dirty="0" err="1"/>
+              <a:t>Chlorpyrfos</a:t>
+            </a:r>
+            <a:r>
               <a:rPr lang="en-US" dirty="0"/>
-              <a:t>Urea</a:t>
+              <a:t>, log2 v control</a:t>
             </a:r>
           </a:p>
         </p:txBody>
@@ -4627,7 +4838,7 @@
     </p:spTree>
     <p:extLst>
       <p:ext uri="{BB962C8B-B14F-4D97-AF65-F5344CB8AC3E}">
-        <p14:creationId xmlns:p14="http://schemas.microsoft.com/office/powerpoint/2010/main" val="111734949"/>
+        <p14:creationId xmlns:p14="http://schemas.microsoft.com/office/powerpoint/2010/main" val="249576630"/>
       </p:ext>
     </p:extLst>
   </p:cSld>
@@ -4654,42 +4865,12 @@
           <a:chExt cx="0" cy="0"/>
         </a:xfrm>
       </p:grpSpPr>
-      <p:pic>
-        <p:nvPicPr>
-          <p:cNvPr id="6" name="Picture 5">
-            <a:extLst>
-              <a:ext uri="{FF2B5EF4-FFF2-40B4-BE49-F238E27FC236}">
-                <a16:creationId xmlns:a16="http://schemas.microsoft.com/office/drawing/2014/main" id="{9A20F6E2-847E-92EF-CFF4-EBA27A87D7FD}"/>
-              </a:ext>
-            </a:extLst>
-          </p:cNvPr>
-          <p:cNvPicPr>
-            <a:picLocks noChangeAspect="1"/>
-          </p:cNvPicPr>
-          <p:nvPr/>
-        </p:nvPicPr>
-        <p:blipFill>
-          <a:blip r:embed="rId2"/>
-          <a:stretch>
-            <a:fillRect/>
-          </a:stretch>
-        </p:blipFill>
-        <p:spPr>
-          <a:xfrm>
-            <a:off x="4457103" y="0"/>
-            <a:ext cx="7734897" cy="6858000"/>
-          </a:xfrm>
-          <a:prstGeom prst="rect">
-            <a:avLst/>
-          </a:prstGeom>
-        </p:spPr>
-      </p:pic>
       <p:sp>
         <p:nvSpPr>
           <p:cNvPr id="2" name="Title 1">
             <a:extLst>
               <a:ext uri="{FF2B5EF4-FFF2-40B4-BE49-F238E27FC236}">
-                <a16:creationId xmlns:a16="http://schemas.microsoft.com/office/drawing/2014/main" id="{F2992844-C348-ED8E-D093-9ABAE1B2BF35}"/>
+                <a16:creationId xmlns:a16="http://schemas.microsoft.com/office/drawing/2014/main" id="{FA9D0A6F-35B7-989C-777F-70CD6CFA5D84}"/>
               </a:ext>
             </a:extLst>
           </p:cNvPr>
@@ -4700,106 +4881,44 @@
             <p:ph type="title"/>
           </p:nvPr>
         </p:nvSpPr>
-        <p:spPr>
-          <a:xfrm>
-            <a:off x="622998" y="186977"/>
-            <a:ext cx="5627077" cy="827908"/>
-          </a:xfrm>
-        </p:spPr>
-        <p:txBody>
-          <a:bodyPr>
-            <a:normAutofit/>
-          </a:bodyPr>
-          <a:lstStyle/>
-          <a:p>
-            <a:r>
-              <a:rPr lang="en-US" dirty="0"/>
-              <a:t>Gly Ser Metabolism</a:t>
-            </a:r>
-          </a:p>
-        </p:txBody>
-      </p:sp>
-      <p:pic>
-        <p:nvPicPr>
-          <p:cNvPr id="3" name="Picture 2">
-            <a:extLst>
-              <a:ext uri="{FF2B5EF4-FFF2-40B4-BE49-F238E27FC236}">
-                <a16:creationId xmlns:a16="http://schemas.microsoft.com/office/drawing/2014/main" id="{3CCD611F-24A8-177E-E074-F2E7A61949E2}"/>
-              </a:ext>
-            </a:extLst>
-          </p:cNvPr>
-          <p:cNvPicPr>
-            <a:picLocks noChangeAspect="1"/>
-          </p:cNvPicPr>
-          <p:nvPr/>
-        </p:nvPicPr>
-        <p:blipFill>
-          <a:blip r:embed="rId3"/>
-          <a:stretch>
-            <a:fillRect/>
-          </a:stretch>
-        </p:blipFill>
-        <p:spPr>
-          <a:xfrm>
-            <a:off x="0" y="2592474"/>
-            <a:ext cx="4682125" cy="4185139"/>
-          </a:xfrm>
-          <a:prstGeom prst="rect">
-            <a:avLst/>
-          </a:prstGeom>
-        </p:spPr>
-      </p:pic>
-      <p:pic>
-        <p:nvPicPr>
-          <p:cNvPr id="1026" name="Picture 2">
-            <a:extLst>
-              <a:ext uri="{FF2B5EF4-FFF2-40B4-BE49-F238E27FC236}">
-                <a16:creationId xmlns:a16="http://schemas.microsoft.com/office/drawing/2014/main" id="{2EB94BEA-9B71-2CCD-AAA5-014BEB08004E}"/>
-              </a:ext>
-            </a:extLst>
-          </p:cNvPr>
-          <p:cNvPicPr>
-            <a:picLocks noChangeAspect="1" noChangeArrowheads="1"/>
-          </p:cNvPicPr>
-          <p:nvPr/>
-        </p:nvPicPr>
-        <p:blipFill>
-          <a:blip r:embed="rId4">
-            <a:extLst>
-              <a:ext uri="{28A0092B-C50C-407E-A947-70E740481C1C}">
-                <a14:useLocalDpi xmlns:a14="http://schemas.microsoft.com/office/drawing/2010/main" val="0"/>
-              </a:ext>
-            </a:extLst>
-          </a:blip>
-          <a:srcRect/>
-          <a:stretch>
-            <a:fillRect/>
-          </a:stretch>
-        </p:blipFill>
-        <p:spPr bwMode="auto">
-          <a:xfrm>
-            <a:off x="254051" y="186977"/>
-            <a:ext cx="3705000" cy="2392813"/>
-          </a:xfrm>
-          <a:prstGeom prst="rect">
-            <a:avLst/>
-          </a:prstGeom>
-          <a:noFill/>
-          <a:extLst>
-            <a:ext uri="{909E8E84-426E-40DD-AFC4-6F175D3DCCD1}">
-              <a14:hiddenFill xmlns:a14="http://schemas.microsoft.com/office/drawing/2010/main">
-                <a:solidFill>
-                  <a:srgbClr val="FFFFFF"/>
-                </a:solidFill>
-              </a14:hiddenFill>
-            </a:ext>
-          </a:extLst>
-        </p:spPr>
-      </p:pic>
+        <p:spPr/>
+        <p:txBody>
+          <a:bodyPr/>
+          <a:lstStyle/>
+          <a:p>
+            <a:endParaRPr lang="en-US"/>
+          </a:p>
+        </p:txBody>
+      </p:sp>
+      <p:sp>
+        <p:nvSpPr>
+          <p:cNvPr id="3" name="Content Placeholder 2">
+            <a:extLst>
+              <a:ext uri="{FF2B5EF4-FFF2-40B4-BE49-F238E27FC236}">
+                <a16:creationId xmlns:a16="http://schemas.microsoft.com/office/drawing/2014/main" id="{E3F2277D-F638-1BA5-1B71-8FEB35A67793}"/>
+              </a:ext>
+            </a:extLst>
+          </p:cNvPr>
+          <p:cNvSpPr>
+            <a:spLocks noGrp="1"/>
+          </p:cNvSpPr>
+          <p:nvPr>
+            <p:ph idx="1"/>
+          </p:nvPr>
+        </p:nvSpPr>
+        <p:spPr/>
+        <p:txBody>
+          <a:bodyPr/>
+          <a:lstStyle/>
+          <a:p>
+            <a:endParaRPr lang="en-US"/>
+          </a:p>
+        </p:txBody>
+      </p:sp>
     </p:spTree>
     <p:extLst>
       <p:ext uri="{BB962C8B-B14F-4D97-AF65-F5344CB8AC3E}">
-        <p14:creationId xmlns:p14="http://schemas.microsoft.com/office/powerpoint/2010/main" val="1176159520"/>
+        <p14:creationId xmlns:p14="http://schemas.microsoft.com/office/powerpoint/2010/main" val="1250932286"/>
       </p:ext>
     </p:extLst>
   </p:cSld>
@@ -4826,47 +4945,12 @@
           <a:chExt cx="0" cy="0"/>
         </a:xfrm>
       </p:grpSpPr>
-      <p:sp>
-        <p:nvSpPr>
-          <p:cNvPr id="2" name="Title 1">
-            <a:extLst>
-              <a:ext uri="{FF2B5EF4-FFF2-40B4-BE49-F238E27FC236}">
-                <a16:creationId xmlns:a16="http://schemas.microsoft.com/office/drawing/2014/main" id="{F2992844-C348-ED8E-D093-9ABAE1B2BF35}"/>
-              </a:ext>
-            </a:extLst>
-          </p:cNvPr>
-          <p:cNvSpPr>
-            <a:spLocks noGrp="1"/>
-          </p:cNvSpPr>
-          <p:nvPr>
-            <p:ph type="title"/>
-          </p:nvPr>
-        </p:nvSpPr>
-        <p:spPr>
-          <a:xfrm>
-            <a:off x="347435" y="0"/>
-            <a:ext cx="4883498" cy="1325563"/>
-          </a:xfrm>
-        </p:spPr>
-        <p:txBody>
-          <a:bodyPr>
-            <a:normAutofit/>
-          </a:bodyPr>
-          <a:lstStyle/>
-          <a:p>
-            <a:r>
-              <a:rPr lang="en-US" dirty="0"/>
-              <a:t>Glu metabolism</a:t>
-            </a:r>
-          </a:p>
-        </p:txBody>
-      </p:sp>
       <p:pic>
         <p:nvPicPr>
-          <p:cNvPr id="4" name="Picture 3">
-            <a:extLst>
-              <a:ext uri="{FF2B5EF4-FFF2-40B4-BE49-F238E27FC236}">
-                <a16:creationId xmlns:a16="http://schemas.microsoft.com/office/drawing/2014/main" id="{2EC6305B-307E-8F19-1FD8-AC208FA7BC1D}"/>
+          <p:cNvPr id="5" name="Picture 4">
+            <a:extLst>
+              <a:ext uri="{FF2B5EF4-FFF2-40B4-BE49-F238E27FC236}">
+                <a16:creationId xmlns:a16="http://schemas.microsoft.com/office/drawing/2014/main" id="{AE57FB0C-7DA8-1619-E405-A41462CF60FA}"/>
               </a:ext>
             </a:extLst>
           </p:cNvPr>
@@ -4883,8 +4967,8 @@
         </p:blipFill>
         <p:spPr>
           <a:xfrm>
-            <a:off x="80387" y="2150346"/>
-            <a:ext cx="5016149" cy="4577025"/>
+            <a:off x="1" y="2049863"/>
+            <a:ext cx="5067130" cy="4617219"/>
           </a:xfrm>
           <a:prstGeom prst="rect">
             <a:avLst/>
@@ -4893,10 +4977,10 @@
       </p:pic>
       <p:pic>
         <p:nvPicPr>
-          <p:cNvPr id="6" name="Picture 5">
-            <a:extLst>
-              <a:ext uri="{FF2B5EF4-FFF2-40B4-BE49-F238E27FC236}">
-                <a16:creationId xmlns:a16="http://schemas.microsoft.com/office/drawing/2014/main" id="{128E1FEB-74CA-0A13-CE7F-1F51F09DEED0}"/>
+          <p:cNvPr id="7" name="Picture 6">
+            <a:extLst>
+              <a:ext uri="{FF2B5EF4-FFF2-40B4-BE49-F238E27FC236}">
+                <a16:creationId xmlns:a16="http://schemas.microsoft.com/office/drawing/2014/main" id="{275500CE-9CB0-025C-266E-89D70CDC4B1C}"/>
               </a:ext>
             </a:extLst>
           </p:cNvPr>
@@ -4913,18 +4997,51 @@
         </p:blipFill>
         <p:spPr>
           <a:xfrm>
-            <a:off x="5230933" y="874207"/>
-            <a:ext cx="6521344" cy="5983793"/>
+            <a:off x="5067131" y="681037"/>
+            <a:ext cx="7098843" cy="6127739"/>
           </a:xfrm>
           <a:prstGeom prst="rect">
             <a:avLst/>
           </a:prstGeom>
         </p:spPr>
       </p:pic>
+      <p:sp>
+        <p:nvSpPr>
+          <p:cNvPr id="2" name="Title 1">
+            <a:extLst>
+              <a:ext uri="{FF2B5EF4-FFF2-40B4-BE49-F238E27FC236}">
+                <a16:creationId xmlns:a16="http://schemas.microsoft.com/office/drawing/2014/main" id="{F2992844-C348-ED8E-D093-9ABAE1B2BF35}"/>
+              </a:ext>
+            </a:extLst>
+          </p:cNvPr>
+          <p:cNvSpPr>
+            <a:spLocks noGrp="1"/>
+          </p:cNvSpPr>
+          <p:nvPr>
+            <p:ph type="title"/>
+          </p:nvPr>
+        </p:nvSpPr>
+        <p:spPr>
+          <a:xfrm>
+            <a:off x="9761135" y="186976"/>
+            <a:ext cx="2095919" cy="1325563"/>
+          </a:xfrm>
+        </p:spPr>
+        <p:txBody>
+          <a:bodyPr/>
+          <a:lstStyle/>
+          <a:p>
+            <a:r>
+              <a:rPr lang="en-US" dirty="0"/>
+              <a:t>Urea</a:t>
+            </a:r>
+          </a:p>
+        </p:txBody>
+      </p:sp>
     </p:spTree>
     <p:extLst>
       <p:ext uri="{BB962C8B-B14F-4D97-AF65-F5344CB8AC3E}">
-        <p14:creationId xmlns:p14="http://schemas.microsoft.com/office/powerpoint/2010/main" val="1003902108"/>
+        <p14:creationId xmlns:p14="http://schemas.microsoft.com/office/powerpoint/2010/main" val="111734949"/>
       </p:ext>
     </p:extLst>
   </p:cSld>
@@ -5233,47 +5350,12 @@
           <a:chExt cx="0" cy="0"/>
         </a:xfrm>
       </p:grpSpPr>
-      <p:sp>
-        <p:nvSpPr>
-          <p:cNvPr id="2" name="Title 1">
-            <a:extLst>
-              <a:ext uri="{FF2B5EF4-FFF2-40B4-BE49-F238E27FC236}">
-                <a16:creationId xmlns:a16="http://schemas.microsoft.com/office/drawing/2014/main" id="{F2992844-C348-ED8E-D093-9ABAE1B2BF35}"/>
-              </a:ext>
-            </a:extLst>
-          </p:cNvPr>
-          <p:cNvSpPr>
-            <a:spLocks noGrp="1"/>
-          </p:cNvSpPr>
-          <p:nvPr>
-            <p:ph type="title"/>
-          </p:nvPr>
-        </p:nvSpPr>
-        <p:spPr>
-          <a:xfrm>
-            <a:off x="261258" y="86493"/>
-            <a:ext cx="4360984" cy="1325563"/>
-          </a:xfrm>
-        </p:spPr>
-        <p:txBody>
-          <a:bodyPr>
-            <a:normAutofit/>
-          </a:bodyPr>
-          <a:lstStyle/>
-          <a:p>
-            <a:r>
-              <a:rPr lang="en-US" dirty="0"/>
-              <a:t>Gluconeogenesis</a:t>
-            </a:r>
-          </a:p>
-        </p:txBody>
-      </p:sp>
       <p:pic>
         <p:nvPicPr>
-          <p:cNvPr id="4" name="Picture 3">
-            <a:extLst>
-              <a:ext uri="{FF2B5EF4-FFF2-40B4-BE49-F238E27FC236}">
-                <a16:creationId xmlns:a16="http://schemas.microsoft.com/office/drawing/2014/main" id="{E581B02E-B3EF-0FCD-B498-D6682A34A968}"/>
+          <p:cNvPr id="6" name="Picture 5">
+            <a:extLst>
+              <a:ext uri="{FF2B5EF4-FFF2-40B4-BE49-F238E27FC236}">
+                <a16:creationId xmlns:a16="http://schemas.microsoft.com/office/drawing/2014/main" id="{9A20F6E2-847E-92EF-CFF4-EBA27A87D7FD}"/>
               </a:ext>
             </a:extLst>
           </p:cNvPr>
@@ -5290,20 +5372,55 @@
         </p:blipFill>
         <p:spPr>
           <a:xfrm>
-            <a:off x="0" y="1989574"/>
-            <a:ext cx="5260385" cy="4597119"/>
+            <a:off x="4457103" y="0"/>
+            <a:ext cx="7734897" cy="6858000"/>
           </a:xfrm>
           <a:prstGeom prst="rect">
             <a:avLst/>
           </a:prstGeom>
         </p:spPr>
       </p:pic>
+      <p:sp>
+        <p:nvSpPr>
+          <p:cNvPr id="2" name="Title 1">
+            <a:extLst>
+              <a:ext uri="{FF2B5EF4-FFF2-40B4-BE49-F238E27FC236}">
+                <a16:creationId xmlns:a16="http://schemas.microsoft.com/office/drawing/2014/main" id="{F2992844-C348-ED8E-D093-9ABAE1B2BF35}"/>
+              </a:ext>
+            </a:extLst>
+          </p:cNvPr>
+          <p:cNvSpPr>
+            <a:spLocks noGrp="1"/>
+          </p:cNvSpPr>
+          <p:nvPr>
+            <p:ph type="title"/>
+          </p:nvPr>
+        </p:nvSpPr>
+        <p:spPr>
+          <a:xfrm>
+            <a:off x="622998" y="186977"/>
+            <a:ext cx="5627077" cy="827908"/>
+          </a:xfrm>
+        </p:spPr>
+        <p:txBody>
+          <a:bodyPr>
+            <a:normAutofit/>
+          </a:bodyPr>
+          <a:lstStyle/>
+          <a:p>
+            <a:r>
+              <a:rPr lang="en-US" dirty="0"/>
+              <a:t>Gly Ser Metabolism</a:t>
+            </a:r>
+          </a:p>
+        </p:txBody>
+      </p:sp>
       <p:pic>
         <p:nvPicPr>
-          <p:cNvPr id="6" name="Picture 5">
-            <a:extLst>
-              <a:ext uri="{FF2B5EF4-FFF2-40B4-BE49-F238E27FC236}">
-                <a16:creationId xmlns:a16="http://schemas.microsoft.com/office/drawing/2014/main" id="{61807715-DE3A-15A8-3FA7-1C8B15F80413}"/>
+          <p:cNvPr id="3" name="Picture 2">
+            <a:extLst>
+              <a:ext uri="{FF2B5EF4-FFF2-40B4-BE49-F238E27FC236}">
+                <a16:creationId xmlns:a16="http://schemas.microsoft.com/office/drawing/2014/main" id="{3CCD611F-24A8-177E-E074-F2E7A61949E2}"/>
               </a:ext>
             </a:extLst>
           </p:cNvPr>
@@ -5320,18 +5437,65 @@
         </p:blipFill>
         <p:spPr>
           <a:xfrm>
-            <a:off x="5064369" y="429436"/>
-            <a:ext cx="7015441" cy="6291742"/>
+            <a:off x="0" y="2592474"/>
+            <a:ext cx="4682125" cy="4185139"/>
           </a:xfrm>
           <a:prstGeom prst="rect">
             <a:avLst/>
           </a:prstGeom>
+        </p:spPr>
+      </p:pic>
+      <p:pic>
+        <p:nvPicPr>
+          <p:cNvPr id="1026" name="Picture 2">
+            <a:extLst>
+              <a:ext uri="{FF2B5EF4-FFF2-40B4-BE49-F238E27FC236}">
+                <a16:creationId xmlns:a16="http://schemas.microsoft.com/office/drawing/2014/main" id="{2EB94BEA-9B71-2CCD-AAA5-014BEB08004E}"/>
+              </a:ext>
+            </a:extLst>
+          </p:cNvPr>
+          <p:cNvPicPr>
+            <a:picLocks noChangeAspect="1" noChangeArrowheads="1"/>
+          </p:cNvPicPr>
+          <p:nvPr/>
+        </p:nvPicPr>
+        <p:blipFill>
+          <a:blip r:embed="rId4">
+            <a:extLst>
+              <a:ext uri="{28A0092B-C50C-407E-A947-70E740481C1C}">
+                <a14:useLocalDpi xmlns:a14="http://schemas.microsoft.com/office/drawing/2010/main" val="0"/>
+              </a:ext>
+            </a:extLst>
+          </a:blip>
+          <a:srcRect/>
+          <a:stretch>
+            <a:fillRect/>
+          </a:stretch>
+        </p:blipFill>
+        <p:spPr bwMode="auto">
+          <a:xfrm>
+            <a:off x="254051" y="186977"/>
+            <a:ext cx="3705000" cy="2392813"/>
+          </a:xfrm>
+          <a:prstGeom prst="rect">
+            <a:avLst/>
+          </a:prstGeom>
+          <a:noFill/>
+          <a:extLst>
+            <a:ext uri="{909E8E84-426E-40DD-AFC4-6F175D3DCCD1}">
+              <a14:hiddenFill xmlns:a14="http://schemas.microsoft.com/office/drawing/2010/main">
+                <a:solidFill>
+                  <a:srgbClr val="FFFFFF"/>
+                </a:solidFill>
+              </a14:hiddenFill>
+            </a:ext>
+          </a:extLst>
         </p:spPr>
       </p:pic>
     </p:spTree>
     <p:extLst>
       <p:ext uri="{BB962C8B-B14F-4D97-AF65-F5344CB8AC3E}">
-        <p14:creationId xmlns:p14="http://schemas.microsoft.com/office/powerpoint/2010/main" val="164740431"/>
+        <p14:creationId xmlns:p14="http://schemas.microsoft.com/office/powerpoint/2010/main" val="1176159520"/>
       </p:ext>
     </p:extLst>
   </p:cSld>
@@ -5376,25 +5540,87 @@
         </p:nvSpPr>
         <p:spPr>
           <a:xfrm>
-            <a:off x="8591341" y="186976"/>
-            <a:ext cx="3265713" cy="998729"/>
-          </a:xfrm>
-        </p:spPr>
-        <p:txBody>
-          <a:bodyPr/>
+            <a:off x="347435" y="0"/>
+            <a:ext cx="4883498" cy="1325563"/>
+          </a:xfrm>
+        </p:spPr>
+        <p:txBody>
+          <a:bodyPr>
+            <a:normAutofit/>
+          </a:bodyPr>
           <a:lstStyle/>
           <a:p>
             <a:r>
               <a:rPr lang="en-US" dirty="0"/>
-              <a:t>Glu Ala Cycle</a:t>
-            </a:r>
-          </a:p>
-        </p:txBody>
-      </p:sp>
+              <a:t>Glu metabolism</a:t>
+            </a:r>
+          </a:p>
+        </p:txBody>
+      </p:sp>
+      <p:pic>
+        <p:nvPicPr>
+          <p:cNvPr id="4" name="Picture 3">
+            <a:extLst>
+              <a:ext uri="{FF2B5EF4-FFF2-40B4-BE49-F238E27FC236}">
+                <a16:creationId xmlns:a16="http://schemas.microsoft.com/office/drawing/2014/main" id="{2EC6305B-307E-8F19-1FD8-AC208FA7BC1D}"/>
+              </a:ext>
+            </a:extLst>
+          </p:cNvPr>
+          <p:cNvPicPr>
+            <a:picLocks noChangeAspect="1"/>
+          </p:cNvPicPr>
+          <p:nvPr/>
+        </p:nvPicPr>
+        <p:blipFill>
+          <a:blip r:embed="rId2"/>
+          <a:stretch>
+            <a:fillRect/>
+          </a:stretch>
+        </p:blipFill>
+        <p:spPr>
+          <a:xfrm>
+            <a:off x="80387" y="2150346"/>
+            <a:ext cx="5016149" cy="4577025"/>
+          </a:xfrm>
+          <a:prstGeom prst="rect">
+            <a:avLst/>
+          </a:prstGeom>
+        </p:spPr>
+      </p:pic>
+      <p:pic>
+        <p:nvPicPr>
+          <p:cNvPr id="6" name="Picture 5">
+            <a:extLst>
+              <a:ext uri="{FF2B5EF4-FFF2-40B4-BE49-F238E27FC236}">
+                <a16:creationId xmlns:a16="http://schemas.microsoft.com/office/drawing/2014/main" id="{128E1FEB-74CA-0A13-CE7F-1F51F09DEED0}"/>
+              </a:ext>
+            </a:extLst>
+          </p:cNvPr>
+          <p:cNvPicPr>
+            <a:picLocks noChangeAspect="1"/>
+          </p:cNvPicPr>
+          <p:nvPr/>
+        </p:nvPicPr>
+        <p:blipFill>
+          <a:blip r:embed="rId3"/>
+          <a:stretch>
+            <a:fillRect/>
+          </a:stretch>
+        </p:blipFill>
+        <p:spPr>
+          <a:xfrm>
+            <a:off x="5230933" y="874207"/>
+            <a:ext cx="6521344" cy="5983793"/>
+          </a:xfrm>
+          <a:prstGeom prst="rect">
+            <a:avLst/>
+          </a:prstGeom>
+        </p:spPr>
+      </p:pic>
     </p:spTree>
     <p:extLst>
       <p:ext uri="{BB962C8B-B14F-4D97-AF65-F5344CB8AC3E}">
-        <p14:creationId xmlns:p14="http://schemas.microsoft.com/office/powerpoint/2010/main" val="2827528181"/>
+        <p14:creationId xmlns:p14="http://schemas.microsoft.com/office/powerpoint/2010/main" val="1003902108"/>
       </p:ext>
     </p:extLst>
   </p:cSld>
@@ -5423,62 +5649,45 @@
       </p:grpSpPr>
       <p:sp>
         <p:nvSpPr>
-          <p:cNvPr id="8" name="TextBox 7">
-            <a:extLst>
-              <a:ext uri="{FF2B5EF4-FFF2-40B4-BE49-F238E27FC236}">
-                <a16:creationId xmlns:a16="http://schemas.microsoft.com/office/drawing/2014/main" id="{2C8C3E8D-0CFB-CCC2-08EC-135F390EF581}"/>
-              </a:ext>
-            </a:extLst>
-          </p:cNvPr>
-          <p:cNvSpPr txBox="1"/>
-          <p:nvPr/>
-        </p:nvSpPr>
-        <p:spPr>
-          <a:xfrm>
-            <a:off x="663191" y="241160"/>
-            <a:ext cx="6712299" cy="369332"/>
-          </a:xfrm>
-          <a:prstGeom prst="rect">
-            <a:avLst/>
-          </a:prstGeom>
-          <a:noFill/>
-        </p:spPr>
-        <p:txBody>
-          <a:bodyPr wrap="square" rtlCol="0">
-            <a:spAutoFit/>
+          <p:cNvPr id="2" name="Title 1">
+            <a:extLst>
+              <a:ext uri="{FF2B5EF4-FFF2-40B4-BE49-F238E27FC236}">
+                <a16:creationId xmlns:a16="http://schemas.microsoft.com/office/drawing/2014/main" id="{F2992844-C348-ED8E-D093-9ABAE1B2BF35}"/>
+              </a:ext>
+            </a:extLst>
+          </p:cNvPr>
+          <p:cNvSpPr>
+            <a:spLocks noGrp="1"/>
+          </p:cNvSpPr>
+          <p:nvPr>
+            <p:ph type="title"/>
+          </p:nvPr>
+        </p:nvSpPr>
+        <p:spPr>
+          <a:xfrm>
+            <a:off x="261258" y="86493"/>
+            <a:ext cx="4360984" cy="1325563"/>
+          </a:xfrm>
+        </p:spPr>
+        <p:txBody>
+          <a:bodyPr>
+            <a:normAutofit/>
           </a:bodyPr>
           <a:lstStyle/>
           <a:p>
             <a:r>
-              <a:rPr lang="en-US" dirty="0" err="1"/>
-              <a:t>xla</a:t>
-            </a:r>
-            <a:r>
               <a:rPr lang="en-US" dirty="0"/>
-              <a:t>; Chlorpyrifos—Arginine biosynthesis (Urea cycle); </a:t>
-            </a:r>
-            <a:r>
-              <a:rPr lang="en-US" dirty="0" err="1"/>
-              <a:t>xla</a:t>
-            </a:r>
-            <a:r>
-              <a:rPr lang="en-US" dirty="0"/>
-              <a:t>=</a:t>
-            </a:r>
-            <a:r>
-              <a:rPr lang="en-US" dirty="0" err="1"/>
-              <a:t>hsa</a:t>
-            </a:r>
-            <a:endParaRPr lang="en-US" dirty="0"/>
+              <a:t>Gluconeogenesis</a:t>
+            </a:r>
           </a:p>
         </p:txBody>
       </p:sp>
       <p:pic>
         <p:nvPicPr>
-          <p:cNvPr id="3" name="Picture 2">
-            <a:extLst>
-              <a:ext uri="{FF2B5EF4-FFF2-40B4-BE49-F238E27FC236}">
-                <a16:creationId xmlns:a16="http://schemas.microsoft.com/office/drawing/2014/main" id="{D53015E3-C80E-79A2-D262-31BEA26E994C}"/>
+          <p:cNvPr id="4" name="Picture 3">
+            <a:extLst>
+              <a:ext uri="{FF2B5EF4-FFF2-40B4-BE49-F238E27FC236}">
+                <a16:creationId xmlns:a16="http://schemas.microsoft.com/office/drawing/2014/main" id="{E581B02E-B3EF-0FCD-B498-D6682A34A968}"/>
               </a:ext>
             </a:extLst>
           </p:cNvPr>
@@ -5488,21 +5697,15 @@
           <p:nvPr/>
         </p:nvPicPr>
         <p:blipFill>
-          <a:blip r:embed="rId2">
-            <a:extLst>
-              <a:ext uri="{28A0092B-C50C-407E-A947-70E740481C1C}">
-                <a14:useLocalDpi xmlns:a14="http://schemas.microsoft.com/office/drawing/2010/main" val="0"/>
-              </a:ext>
-            </a:extLst>
-          </a:blip>
+          <a:blip r:embed="rId2"/>
           <a:stretch>
             <a:fillRect/>
           </a:stretch>
         </p:blipFill>
         <p:spPr>
           <a:xfrm>
-            <a:off x="191214" y="610492"/>
-            <a:ext cx="11809572" cy="4963886"/>
+            <a:off x="0" y="1989574"/>
+            <a:ext cx="5260385" cy="4597119"/>
           </a:xfrm>
           <a:prstGeom prst="rect">
             <a:avLst/>
@@ -5514,7 +5717,7 @@
           <p:cNvPr id="6" name="Picture 5">
             <a:extLst>
               <a:ext uri="{FF2B5EF4-FFF2-40B4-BE49-F238E27FC236}">
-                <a16:creationId xmlns:a16="http://schemas.microsoft.com/office/drawing/2014/main" id="{D3A83DB5-9EF9-7B06-C850-A3AA80E0C457}"/>
+                <a16:creationId xmlns:a16="http://schemas.microsoft.com/office/drawing/2014/main" id="{61807715-DE3A-15A8-3FA7-1C8B15F80413}"/>
               </a:ext>
             </a:extLst>
           </p:cNvPr>
@@ -5531,8 +5734,8 @@
         </p:blipFill>
         <p:spPr>
           <a:xfrm>
-            <a:off x="1990613" y="5377181"/>
-            <a:ext cx="10120705" cy="1480819"/>
+            <a:off x="5064369" y="429436"/>
+            <a:ext cx="7015441" cy="6291742"/>
           </a:xfrm>
           <a:prstGeom prst="rect">
             <a:avLst/>
@@ -5542,7 +5745,7 @@
     </p:spTree>
     <p:extLst>
       <p:ext uri="{BB962C8B-B14F-4D97-AF65-F5344CB8AC3E}">
-        <p14:creationId xmlns:p14="http://schemas.microsoft.com/office/powerpoint/2010/main" val="3691130347"/>
+        <p14:creationId xmlns:p14="http://schemas.microsoft.com/office/powerpoint/2010/main" val="164740431"/>
       </p:ext>
     </p:extLst>
   </p:cSld>
@@ -5574,7 +5777,7 @@
           <p:cNvPr id="2" name="Title 1">
             <a:extLst>
               <a:ext uri="{FF2B5EF4-FFF2-40B4-BE49-F238E27FC236}">
-                <a16:creationId xmlns:a16="http://schemas.microsoft.com/office/drawing/2014/main" id="{29BF9EB6-E5A0-73BE-2C20-F78514A6052F}"/>
+                <a16:creationId xmlns:a16="http://schemas.microsoft.com/office/drawing/2014/main" id="{F2992844-C348-ED8E-D093-9ABAE1B2BF35}"/>
               </a:ext>
             </a:extLst>
           </p:cNvPr>
@@ -5587,82 +5790,25 @@
         </p:nvSpPr>
         <p:spPr>
           <a:xfrm>
-            <a:off x="656493" y="75414"/>
-            <a:ext cx="10515600" cy="458840"/>
-          </a:xfrm>
-        </p:spPr>
-        <p:txBody>
-          <a:bodyPr>
-            <a:normAutofit fontScale="90000"/>
-          </a:bodyPr>
-          <a:lstStyle/>
-          <a:p>
-            <a:r>
-              <a:rPr lang="en-US" sz="1800" dirty="0" err="1"/>
-              <a:t>xla</a:t>
-            </a:r>
-            <a:r>
-              <a:rPr lang="en-US" sz="1800" dirty="0"/>
-              <a:t>; Chlorpyrifos—; </a:t>
-            </a:r>
-            <a:r>
-              <a:rPr lang="en-US" sz="1800" dirty="0" err="1"/>
-              <a:t>xla</a:t>
-            </a:r>
-            <a:r>
-              <a:rPr lang="en-US" sz="1800" dirty="0"/>
-              <a:t>=</a:t>
-            </a:r>
-            <a:r>
-              <a:rPr lang="en-US" sz="1800" dirty="0" err="1"/>
-              <a:t>hsa</a:t>
-            </a:r>
-            <a:br>
-              <a:rPr lang="en-US" sz="1800" dirty="0"/>
-            </a:br>
-            <a:endParaRPr lang="en-US" sz="1800" dirty="0"/>
-          </a:p>
-        </p:txBody>
-      </p:sp>
-      <p:pic>
-        <p:nvPicPr>
-          <p:cNvPr id="5" name="Content Placeholder 4">
-            <a:extLst>
-              <a:ext uri="{FF2B5EF4-FFF2-40B4-BE49-F238E27FC236}">
-                <a16:creationId xmlns:a16="http://schemas.microsoft.com/office/drawing/2014/main" id="{A7F5E34B-0BDA-F5BF-245A-CE566D6B237E}"/>
-              </a:ext>
-            </a:extLst>
-          </p:cNvPr>
-          <p:cNvPicPr>
-            <a:picLocks noGrp="1" noChangeAspect="1"/>
-          </p:cNvPicPr>
-          <p:nvPr>
-            <p:ph idx="1"/>
-          </p:nvPr>
-        </p:nvPicPr>
-        <p:blipFill>
-          <a:blip r:embed="rId2">
-            <a:extLst>
-              <a:ext uri="{28A0092B-C50C-407E-A947-70E740481C1C}">
-                <a14:useLocalDpi xmlns:a14="http://schemas.microsoft.com/office/drawing/2010/main" val="0"/>
-              </a:ext>
-            </a:extLst>
-          </a:blip>
-          <a:stretch>
-            <a:fillRect/>
-          </a:stretch>
-        </p:blipFill>
-        <p:spPr>
-          <a:xfrm>
-            <a:off x="4612193" y="-32348"/>
-            <a:ext cx="4973934" cy="7120506"/>
-          </a:xfrm>
-        </p:spPr>
-      </p:pic>
+            <a:off x="8591341" y="186976"/>
+            <a:ext cx="3265713" cy="998729"/>
+          </a:xfrm>
+        </p:spPr>
+        <p:txBody>
+          <a:bodyPr/>
+          <a:lstStyle/>
+          <a:p>
+            <a:r>
+              <a:rPr lang="en-US" dirty="0"/>
+              <a:t>Glu Ala Cycle</a:t>
+            </a:r>
+          </a:p>
+        </p:txBody>
+      </p:sp>
     </p:spTree>
     <p:extLst>
       <p:ext uri="{BB962C8B-B14F-4D97-AF65-F5344CB8AC3E}">
-        <p14:creationId xmlns:p14="http://schemas.microsoft.com/office/powerpoint/2010/main" val="2555528081"/>
+        <p14:creationId xmlns:p14="http://schemas.microsoft.com/office/powerpoint/2010/main" val="2827528181"/>
       </p:ext>
     </p:extLst>
   </p:cSld>
@@ -5689,21 +5835,71 @@
           <a:chExt cx="0" cy="0"/>
         </a:xfrm>
       </p:grpSpPr>
+      <p:sp>
+        <p:nvSpPr>
+          <p:cNvPr id="8" name="TextBox 7">
+            <a:extLst>
+              <a:ext uri="{FF2B5EF4-FFF2-40B4-BE49-F238E27FC236}">
+                <a16:creationId xmlns:a16="http://schemas.microsoft.com/office/drawing/2014/main" id="{2C8C3E8D-0CFB-CCC2-08EC-135F390EF581}"/>
+              </a:ext>
+            </a:extLst>
+          </p:cNvPr>
+          <p:cNvSpPr txBox="1"/>
+          <p:nvPr/>
+        </p:nvSpPr>
+        <p:spPr>
+          <a:xfrm>
+            <a:off x="663191" y="241160"/>
+            <a:ext cx="6712299" cy="369332"/>
+          </a:xfrm>
+          <a:prstGeom prst="rect">
+            <a:avLst/>
+          </a:prstGeom>
+          <a:noFill/>
+        </p:spPr>
+        <p:txBody>
+          <a:bodyPr wrap="square" rtlCol="0">
+            <a:spAutoFit/>
+          </a:bodyPr>
+          <a:lstStyle/>
+          <a:p>
+            <a:r>
+              <a:rPr lang="en-US" dirty="0" err="1"/>
+              <a:t>xla</a:t>
+            </a:r>
+            <a:r>
+              <a:rPr lang="en-US" dirty="0"/>
+              <a:t>; Chlorpyrifos—Arginine biosynthesis (Urea cycle); </a:t>
+            </a:r>
+            <a:r>
+              <a:rPr lang="en-US" dirty="0" err="1"/>
+              <a:t>xla</a:t>
+            </a:r>
+            <a:r>
+              <a:rPr lang="en-US" dirty="0"/>
+              <a:t>=</a:t>
+            </a:r>
+            <a:r>
+              <a:rPr lang="en-US" dirty="0" err="1"/>
+              <a:t>hsa</a:t>
+            </a:r>
+            <a:endParaRPr lang="en-US" dirty="0"/>
+          </a:p>
+        </p:txBody>
+      </p:sp>
       <p:pic>
         <p:nvPicPr>
-          <p:cNvPr id="5" name="Content Placeholder 4">
-            <a:extLst>
-              <a:ext uri="{FF2B5EF4-FFF2-40B4-BE49-F238E27FC236}">
-                <a16:creationId xmlns:a16="http://schemas.microsoft.com/office/drawing/2014/main" id="{05AC57BF-9037-B742-C389-A6B8FC66278C}"/>
+          <p:cNvPr id="3" name="Picture 2">
+            <a:extLst>
+              <a:ext uri="{FF2B5EF4-FFF2-40B4-BE49-F238E27FC236}">
+                <a16:creationId xmlns:a16="http://schemas.microsoft.com/office/drawing/2014/main" id="{D53015E3-C80E-79A2-D262-31BEA26E994C}"/>
               </a:ext>
             </a:extLst>
           </p:cNvPr>
           <p:cNvPicPr>
-            <a:picLocks noGrp="1" noChangeAspect="1"/>
+            <a:picLocks noChangeAspect="1"/>
           </p:cNvPicPr>
-          <p:nvPr>
-            <p:ph idx="1"/>
-          </p:nvPr>
+          <p:nvPr/>
         </p:nvPicPr>
         <p:blipFill>
           <a:blip r:embed="rId2">
@@ -5719,93 +5915,20 @@
         </p:blipFill>
         <p:spPr>
           <a:xfrm>
-            <a:off x="2140299" y="0"/>
-            <a:ext cx="9646417" cy="5621905"/>
-          </a:xfrm>
+            <a:off x="191214" y="610492"/>
+            <a:ext cx="11809572" cy="4963886"/>
+          </a:xfrm>
+          <a:prstGeom prst="rect">
+            <a:avLst/>
+          </a:prstGeom>
         </p:spPr>
       </p:pic>
-      <p:sp>
-        <p:nvSpPr>
-          <p:cNvPr id="2" name="Title 1">
-            <a:extLst>
-              <a:ext uri="{FF2B5EF4-FFF2-40B4-BE49-F238E27FC236}">
-                <a16:creationId xmlns:a16="http://schemas.microsoft.com/office/drawing/2014/main" id="{29BF9EB6-E5A0-73BE-2C20-F78514A6052F}"/>
-              </a:ext>
-            </a:extLst>
-          </p:cNvPr>
-          <p:cNvSpPr>
-            <a:spLocks noGrp="1"/>
-          </p:cNvSpPr>
-          <p:nvPr>
-            <p:ph type="title"/>
-          </p:nvPr>
-        </p:nvSpPr>
-        <p:spPr>
-          <a:xfrm>
-            <a:off x="127122" y="75414"/>
-            <a:ext cx="10515600" cy="1291162"/>
-          </a:xfrm>
-        </p:spPr>
-        <p:txBody>
-          <a:bodyPr>
-            <a:normAutofit fontScale="90000"/>
-          </a:bodyPr>
-          <a:lstStyle/>
-          <a:p>
-            <a:r>
-              <a:rPr lang="en-US" sz="1800" dirty="0" err="1"/>
-              <a:t>xla</a:t>
-            </a:r>
-            <a:r>
-              <a:rPr lang="en-US" sz="1800" dirty="0"/>
-              <a:t>; Chlorpyrifos—</a:t>
-            </a:r>
-            <a:br>
-              <a:rPr lang="en-US" sz="1800" dirty="0"/>
-            </a:br>
-            <a:r>
-              <a:rPr lang="en-US" sz="1800" dirty="0" err="1"/>
-              <a:t>Proponoate</a:t>
-            </a:r>
-            <a:r>
-              <a:rPr lang="en-US" sz="1800" dirty="0"/>
-              <a:t> metabolism</a:t>
-            </a:r>
-            <a:br>
-              <a:rPr lang="en-US" sz="1800" dirty="0"/>
-            </a:br>
-            <a:r>
-              <a:rPr lang="en-US" sz="1800" dirty="0"/>
-              <a:t>(Gluconeogenesis); </a:t>
-            </a:r>
-            <a:br>
-              <a:rPr lang="en-US" sz="1800" dirty="0"/>
-            </a:br>
-            <a:r>
-              <a:rPr lang="en-US" sz="1800" dirty="0" err="1"/>
-              <a:t>xla</a:t>
-            </a:r>
-            <a:r>
-              <a:rPr lang="en-US" sz="1800" dirty="0"/>
-              <a:t>=</a:t>
-            </a:r>
-            <a:r>
-              <a:rPr lang="en-US" sz="1800" dirty="0" err="1"/>
-              <a:t>hsa</a:t>
-            </a:r>
-            <a:br>
-              <a:rPr lang="en-US" sz="1800" dirty="0"/>
-            </a:br>
-            <a:endParaRPr lang="en-US" sz="1800" dirty="0"/>
-          </a:p>
-        </p:txBody>
-      </p:sp>
       <p:pic>
         <p:nvPicPr>
-          <p:cNvPr id="7" name="Picture 6">
-            <a:extLst>
-              <a:ext uri="{FF2B5EF4-FFF2-40B4-BE49-F238E27FC236}">
-                <a16:creationId xmlns:a16="http://schemas.microsoft.com/office/drawing/2014/main" id="{B681C31C-3675-816B-7694-6E40D9D0B2BC}"/>
+          <p:cNvPr id="6" name="Picture 5">
+            <a:extLst>
+              <a:ext uri="{FF2B5EF4-FFF2-40B4-BE49-F238E27FC236}">
+                <a16:creationId xmlns:a16="http://schemas.microsoft.com/office/drawing/2014/main" id="{D3A83DB5-9EF9-7B06-C850-A3AA80E0C457}"/>
               </a:ext>
             </a:extLst>
           </p:cNvPr>
@@ -5822,8 +5945,8 @@
         </p:blipFill>
         <p:spPr>
           <a:xfrm>
-            <a:off x="127122" y="5331211"/>
-            <a:ext cx="8303445" cy="1526789"/>
+            <a:off x="1990613" y="5377181"/>
+            <a:ext cx="10120705" cy="1480819"/>
           </a:xfrm>
           <a:prstGeom prst="rect">
             <a:avLst/>
@@ -5833,7 +5956,7 @@
     </p:spTree>
     <p:extLst>
       <p:ext uri="{BB962C8B-B14F-4D97-AF65-F5344CB8AC3E}">
-        <p14:creationId xmlns:p14="http://schemas.microsoft.com/office/powerpoint/2010/main" val="2968135174"/>
+        <p14:creationId xmlns:p14="http://schemas.microsoft.com/office/powerpoint/2010/main" val="3691130347"/>
       </p:ext>
     </p:extLst>
   </p:cSld>
@@ -5878,7 +6001,7 @@
         </p:nvSpPr>
         <p:spPr>
           <a:xfrm>
-            <a:off x="93785" y="105559"/>
+            <a:off x="656493" y="75414"/>
             <a:ext cx="10515600" cy="458840"/>
           </a:xfrm>
         </p:spPr>
@@ -5894,14 +6017,7 @@
             </a:r>
             <a:r>
               <a:rPr lang="en-US" sz="1800" dirty="0"/>
-              <a:t>; Chlorpyrifos—Glycine, serine, and threonine </a:t>
-            </a:r>
-            <a:br>
-              <a:rPr lang="en-US" sz="1800" dirty="0"/>
-            </a:br>
-            <a:r>
-              <a:rPr lang="en-US" sz="1800" dirty="0"/>
-              <a:t>metabolism; </a:t>
+              <a:t>; Chlorpyrifos—; </a:t>
             </a:r>
             <a:r>
               <a:rPr lang="en-US" sz="1800" dirty="0" err="1"/>
@@ -5924,17 +6040,19 @@
       </p:sp>
       <p:pic>
         <p:nvPicPr>
-          <p:cNvPr id="8" name="Picture 7">
-            <a:extLst>
-              <a:ext uri="{FF2B5EF4-FFF2-40B4-BE49-F238E27FC236}">
-                <a16:creationId xmlns:a16="http://schemas.microsoft.com/office/drawing/2014/main" id="{A544669F-7781-0BF5-794E-100057A1305B}"/>
+          <p:cNvPr id="5" name="Content Placeholder 4">
+            <a:extLst>
+              <a:ext uri="{FF2B5EF4-FFF2-40B4-BE49-F238E27FC236}">
+                <a16:creationId xmlns:a16="http://schemas.microsoft.com/office/drawing/2014/main" id="{A7F5E34B-0BDA-F5BF-245A-CE566D6B237E}"/>
               </a:ext>
             </a:extLst>
           </p:cNvPr>
           <p:cNvPicPr>
-            <a:picLocks noChangeAspect="1"/>
+            <a:picLocks noGrp="1" noChangeAspect="1"/>
           </p:cNvPicPr>
-          <p:nvPr/>
+          <p:nvPr>
+            <p:ph idx="1"/>
+          </p:nvPr>
         </p:nvPicPr>
         <p:blipFill>
           <a:blip r:embed="rId2">
@@ -5950,18 +6068,15 @@
         </p:blipFill>
         <p:spPr>
           <a:xfrm>
-            <a:off x="4376521" y="-123378"/>
-            <a:ext cx="7721694" cy="7104755"/>
-          </a:xfrm>
-          <a:prstGeom prst="rect">
-            <a:avLst/>
-          </a:prstGeom>
+            <a:off x="4612193" y="-32348"/>
+            <a:ext cx="4973934" cy="7120506"/>
+          </a:xfrm>
         </p:spPr>
       </p:pic>
     </p:spTree>
     <p:extLst>
       <p:ext uri="{BB962C8B-B14F-4D97-AF65-F5344CB8AC3E}">
-        <p14:creationId xmlns:p14="http://schemas.microsoft.com/office/powerpoint/2010/main" val="16467550"/>
+        <p14:creationId xmlns:p14="http://schemas.microsoft.com/office/powerpoint/2010/main" val="2555528081"/>
       </p:ext>
     </p:extLst>
   </p:cSld>
@@ -5988,67 +6103,12 @@
           <a:chExt cx="0" cy="0"/>
         </a:xfrm>
       </p:grpSpPr>
-      <p:sp>
-        <p:nvSpPr>
-          <p:cNvPr id="2" name="Title 1">
-            <a:extLst>
-              <a:ext uri="{FF2B5EF4-FFF2-40B4-BE49-F238E27FC236}">
-                <a16:creationId xmlns:a16="http://schemas.microsoft.com/office/drawing/2014/main" id="{29BF9EB6-E5A0-73BE-2C20-F78514A6052F}"/>
-              </a:ext>
-            </a:extLst>
-          </p:cNvPr>
-          <p:cNvSpPr>
-            <a:spLocks noGrp="1"/>
-          </p:cNvSpPr>
-          <p:nvPr>
-            <p:ph type="title"/>
-          </p:nvPr>
-        </p:nvSpPr>
-        <p:spPr>
-          <a:xfrm>
-            <a:off x="656493" y="75414"/>
-            <a:ext cx="10515600" cy="458840"/>
-          </a:xfrm>
-        </p:spPr>
-        <p:txBody>
-          <a:bodyPr>
-            <a:normAutofit fontScale="90000"/>
-          </a:bodyPr>
-          <a:lstStyle/>
-          <a:p>
-            <a:r>
-              <a:rPr lang="en-US" sz="1800" dirty="0" err="1"/>
-              <a:t>xla</a:t>
-            </a:r>
-            <a:r>
-              <a:rPr lang="en-US" sz="1800" dirty="0"/>
-              <a:t>; Chlorpyrifos—Glucose alanine cycle; </a:t>
-            </a:r>
-            <a:r>
-              <a:rPr lang="en-US" sz="1800" dirty="0" err="1"/>
-              <a:t>xla</a:t>
-            </a:r>
-            <a:r>
-              <a:rPr lang="en-US" sz="1800" dirty="0"/>
-              <a:t>=</a:t>
-            </a:r>
-            <a:r>
-              <a:rPr lang="en-US" sz="1800" dirty="0" err="1"/>
-              <a:t>hsa</a:t>
-            </a:r>
-            <a:br>
-              <a:rPr lang="en-US" sz="1800" dirty="0"/>
-            </a:br>
-            <a:endParaRPr lang="en-US" sz="1800" dirty="0"/>
-          </a:p>
-        </p:txBody>
-      </p:sp>
       <p:pic>
         <p:nvPicPr>
           <p:cNvPr id="5" name="Content Placeholder 4">
             <a:extLst>
               <a:ext uri="{FF2B5EF4-FFF2-40B4-BE49-F238E27FC236}">
-                <a16:creationId xmlns:a16="http://schemas.microsoft.com/office/drawing/2014/main" id="{F47F66D7-16CA-9DE2-6523-04A3029BE9F9}"/>
+                <a16:creationId xmlns:a16="http://schemas.microsoft.com/office/drawing/2014/main" id="{05AC57BF-9037-B742-C389-A6B8FC66278C}"/>
               </a:ext>
             </a:extLst>
           </p:cNvPr>
@@ -6073,15 +6133,121 @@
         </p:blipFill>
         <p:spPr>
           <a:xfrm>
-            <a:off x="2471895" y="286812"/>
-            <a:ext cx="7596553" cy="6794252"/>
-          </a:xfrm>
+            <a:off x="2140299" y="0"/>
+            <a:ext cx="9646417" cy="5621905"/>
+          </a:xfrm>
+        </p:spPr>
+      </p:pic>
+      <p:sp>
+        <p:nvSpPr>
+          <p:cNvPr id="2" name="Title 1">
+            <a:extLst>
+              <a:ext uri="{FF2B5EF4-FFF2-40B4-BE49-F238E27FC236}">
+                <a16:creationId xmlns:a16="http://schemas.microsoft.com/office/drawing/2014/main" id="{29BF9EB6-E5A0-73BE-2C20-F78514A6052F}"/>
+              </a:ext>
+            </a:extLst>
+          </p:cNvPr>
+          <p:cNvSpPr>
+            <a:spLocks noGrp="1"/>
+          </p:cNvSpPr>
+          <p:nvPr>
+            <p:ph type="title"/>
+          </p:nvPr>
+        </p:nvSpPr>
+        <p:spPr>
+          <a:xfrm>
+            <a:off x="127122" y="75414"/>
+            <a:ext cx="10515600" cy="1291162"/>
+          </a:xfrm>
+        </p:spPr>
+        <p:txBody>
+          <a:bodyPr>
+            <a:normAutofit fontScale="90000"/>
+          </a:bodyPr>
+          <a:lstStyle/>
+          <a:p>
+            <a:r>
+              <a:rPr lang="en-US" sz="1800" dirty="0" err="1"/>
+              <a:t>xla</a:t>
+            </a:r>
+            <a:r>
+              <a:rPr lang="en-US" sz="1800" dirty="0"/>
+              <a:t>; Chlorpyrifos—</a:t>
+            </a:r>
+            <a:br>
+              <a:rPr lang="en-US" sz="1800" dirty="0"/>
+            </a:br>
+            <a:r>
+              <a:rPr lang="en-US" sz="1800" dirty="0" err="1"/>
+              <a:t>Proponoate</a:t>
+            </a:r>
+            <a:r>
+              <a:rPr lang="en-US" sz="1800" dirty="0"/>
+              <a:t> metabolism</a:t>
+            </a:r>
+            <a:br>
+              <a:rPr lang="en-US" sz="1800" dirty="0"/>
+            </a:br>
+            <a:r>
+              <a:rPr lang="en-US" sz="1800" dirty="0"/>
+              <a:t>(Gluconeogenesis); </a:t>
+            </a:r>
+            <a:br>
+              <a:rPr lang="en-US" sz="1800" dirty="0"/>
+            </a:br>
+            <a:r>
+              <a:rPr lang="en-US" sz="1800" dirty="0" err="1"/>
+              <a:t>xla</a:t>
+            </a:r>
+            <a:r>
+              <a:rPr lang="en-US" sz="1800" dirty="0"/>
+              <a:t>=</a:t>
+            </a:r>
+            <a:r>
+              <a:rPr lang="en-US" sz="1800" dirty="0" err="1"/>
+              <a:t>hsa</a:t>
+            </a:r>
+            <a:br>
+              <a:rPr lang="en-US" sz="1800" dirty="0"/>
+            </a:br>
+            <a:endParaRPr lang="en-US" sz="1800" dirty="0"/>
+          </a:p>
+        </p:txBody>
+      </p:sp>
+      <p:pic>
+        <p:nvPicPr>
+          <p:cNvPr id="7" name="Picture 6">
+            <a:extLst>
+              <a:ext uri="{FF2B5EF4-FFF2-40B4-BE49-F238E27FC236}">
+                <a16:creationId xmlns:a16="http://schemas.microsoft.com/office/drawing/2014/main" id="{B681C31C-3675-816B-7694-6E40D9D0B2BC}"/>
+              </a:ext>
+            </a:extLst>
+          </p:cNvPr>
+          <p:cNvPicPr>
+            <a:picLocks noChangeAspect="1"/>
+          </p:cNvPicPr>
+          <p:nvPr/>
+        </p:nvPicPr>
+        <p:blipFill>
+          <a:blip r:embed="rId3"/>
+          <a:stretch>
+            <a:fillRect/>
+          </a:stretch>
+        </p:blipFill>
+        <p:spPr>
+          <a:xfrm>
+            <a:off x="127122" y="5331211"/>
+            <a:ext cx="8303445" cy="1526789"/>
+          </a:xfrm>
+          <a:prstGeom prst="rect">
+            <a:avLst/>
+          </a:prstGeom>
         </p:spPr>
       </p:pic>
     </p:spTree>
     <p:extLst>
       <p:ext uri="{BB962C8B-B14F-4D97-AF65-F5344CB8AC3E}">
-        <p14:creationId xmlns:p14="http://schemas.microsoft.com/office/powerpoint/2010/main" val="3269587091"/>
+        <p14:creationId xmlns:p14="http://schemas.microsoft.com/office/powerpoint/2010/main" val="2968135174"/>
       </p:ext>
     </p:extLst>
   </p:cSld>
@@ -6126,7 +6292,7 @@
         </p:nvSpPr>
         <p:spPr>
           <a:xfrm>
-            <a:off x="656493" y="75414"/>
+            <a:off x="93785" y="105559"/>
             <a:ext cx="10515600" cy="458840"/>
           </a:xfrm>
         </p:spPr>
@@ -6142,7 +6308,14 @@
             </a:r>
             <a:r>
               <a:rPr lang="en-US" sz="1800" dirty="0"/>
-              <a:t>; 24D—; </a:t>
+              <a:t>; Chlorpyrifos—Glycine, serine, and threonine </a:t>
+            </a:r>
+            <a:br>
+              <a:rPr lang="en-US" sz="1800" dirty="0"/>
+            </a:br>
+            <a:r>
+              <a:rPr lang="en-US" sz="1800" dirty="0"/>
+              <a:t>metabolism; </a:t>
             </a:r>
             <a:r>
               <a:rPr lang="en-US" sz="1800" dirty="0" err="1"/>
@@ -6163,35 +6336,46 @@
           </a:p>
         </p:txBody>
       </p:sp>
-      <p:sp>
-        <p:nvSpPr>
-          <p:cNvPr id="4" name="Content Placeholder 3">
-            <a:extLst>
-              <a:ext uri="{FF2B5EF4-FFF2-40B4-BE49-F238E27FC236}">
-                <a16:creationId xmlns:a16="http://schemas.microsoft.com/office/drawing/2014/main" id="{36394FF9-9274-D0E9-D3CD-A32446AEAA75}"/>
-              </a:ext>
-            </a:extLst>
-          </p:cNvPr>
-          <p:cNvSpPr>
-            <a:spLocks noGrp="1"/>
-          </p:cNvSpPr>
-          <p:nvPr>
-            <p:ph idx="1"/>
-          </p:nvPr>
-        </p:nvSpPr>
-        <p:spPr/>
-        <p:txBody>
-          <a:bodyPr/>
-          <a:lstStyle/>
-          <a:p>
-            <a:endParaRPr lang="en-US"/>
-          </a:p>
-        </p:txBody>
-      </p:sp>
+      <p:pic>
+        <p:nvPicPr>
+          <p:cNvPr id="8" name="Picture 7">
+            <a:extLst>
+              <a:ext uri="{FF2B5EF4-FFF2-40B4-BE49-F238E27FC236}">
+                <a16:creationId xmlns:a16="http://schemas.microsoft.com/office/drawing/2014/main" id="{A544669F-7781-0BF5-794E-100057A1305B}"/>
+              </a:ext>
+            </a:extLst>
+          </p:cNvPr>
+          <p:cNvPicPr>
+            <a:picLocks noChangeAspect="1"/>
+          </p:cNvPicPr>
+          <p:nvPr/>
+        </p:nvPicPr>
+        <p:blipFill>
+          <a:blip r:embed="rId2">
+            <a:extLst>
+              <a:ext uri="{28A0092B-C50C-407E-A947-70E740481C1C}">
+                <a14:useLocalDpi xmlns:a14="http://schemas.microsoft.com/office/drawing/2010/main" val="0"/>
+              </a:ext>
+            </a:extLst>
+          </a:blip>
+          <a:stretch>
+            <a:fillRect/>
+          </a:stretch>
+        </p:blipFill>
+        <p:spPr>
+          <a:xfrm>
+            <a:off x="4376521" y="-123378"/>
+            <a:ext cx="7721694" cy="7104755"/>
+          </a:xfrm>
+          <a:prstGeom prst="rect">
+            <a:avLst/>
+          </a:prstGeom>
+        </p:spPr>
+      </p:pic>
     </p:spTree>
     <p:extLst>
       <p:ext uri="{BB962C8B-B14F-4D97-AF65-F5344CB8AC3E}">
-        <p14:creationId xmlns:p14="http://schemas.microsoft.com/office/powerpoint/2010/main" val="3199991795"/>
+        <p14:creationId xmlns:p14="http://schemas.microsoft.com/office/powerpoint/2010/main" val="16467550"/>
       </p:ext>
     </p:extLst>
   </p:cSld>
@@ -6252,7 +6436,7 @@
             </a:r>
             <a:r>
               <a:rPr lang="en-US" sz="1800" dirty="0"/>
-              <a:t>; 24D—; </a:t>
+              <a:t>; Chlorpyrifos—Glucose alanine cycle; </a:t>
             </a:r>
             <a:r>
               <a:rPr lang="en-US" sz="1800" dirty="0" err="1"/>
@@ -6273,35 +6457,45 @@
           </a:p>
         </p:txBody>
       </p:sp>
-      <p:sp>
-        <p:nvSpPr>
-          <p:cNvPr id="4" name="Content Placeholder 3">
-            <a:extLst>
-              <a:ext uri="{FF2B5EF4-FFF2-40B4-BE49-F238E27FC236}">
-                <a16:creationId xmlns:a16="http://schemas.microsoft.com/office/drawing/2014/main" id="{36394FF9-9274-D0E9-D3CD-A32446AEAA75}"/>
-              </a:ext>
-            </a:extLst>
-          </p:cNvPr>
-          <p:cNvSpPr>
-            <a:spLocks noGrp="1"/>
-          </p:cNvSpPr>
+      <p:pic>
+        <p:nvPicPr>
+          <p:cNvPr id="5" name="Content Placeholder 4">
+            <a:extLst>
+              <a:ext uri="{FF2B5EF4-FFF2-40B4-BE49-F238E27FC236}">
+                <a16:creationId xmlns:a16="http://schemas.microsoft.com/office/drawing/2014/main" id="{F47F66D7-16CA-9DE2-6523-04A3029BE9F9}"/>
+              </a:ext>
+            </a:extLst>
+          </p:cNvPr>
+          <p:cNvPicPr>
+            <a:picLocks noGrp="1" noChangeAspect="1"/>
+          </p:cNvPicPr>
           <p:nvPr>
             <p:ph idx="1"/>
           </p:nvPr>
-        </p:nvSpPr>
-        <p:spPr/>
-        <p:txBody>
-          <a:bodyPr/>
-          <a:lstStyle/>
-          <a:p>
-            <a:endParaRPr lang="en-US"/>
-          </a:p>
-        </p:txBody>
-      </p:sp>
+        </p:nvPicPr>
+        <p:blipFill>
+          <a:blip r:embed="rId2">
+            <a:extLst>
+              <a:ext uri="{28A0092B-C50C-407E-A947-70E740481C1C}">
+                <a14:useLocalDpi xmlns:a14="http://schemas.microsoft.com/office/drawing/2010/main" val="0"/>
+              </a:ext>
+            </a:extLst>
+          </a:blip>
+          <a:stretch>
+            <a:fillRect/>
+          </a:stretch>
+        </p:blipFill>
+        <p:spPr>
+          <a:xfrm>
+            <a:off x="2471895" y="286812"/>
+            <a:ext cx="7596553" cy="6794252"/>
+          </a:xfrm>
+        </p:spPr>
+      </p:pic>
     </p:spTree>
     <p:extLst>
       <p:ext uri="{BB962C8B-B14F-4D97-AF65-F5344CB8AC3E}">
-        <p14:creationId xmlns:p14="http://schemas.microsoft.com/office/powerpoint/2010/main" val="877039883"/>
+        <p14:creationId xmlns:p14="http://schemas.microsoft.com/office/powerpoint/2010/main" val="3269587091"/>
       </p:ext>
     </p:extLst>
   </p:cSld>
@@ -6411,7 +6605,7 @@
     </p:spTree>
     <p:extLst>
       <p:ext uri="{BB962C8B-B14F-4D97-AF65-F5344CB8AC3E}">
-        <p14:creationId xmlns:p14="http://schemas.microsoft.com/office/powerpoint/2010/main" val="3423878622"/>
+        <p14:creationId xmlns:p14="http://schemas.microsoft.com/office/powerpoint/2010/main" val="3199991795"/>
       </p:ext>
     </p:extLst>
   </p:cSld>
@@ -6453,7 +6647,7 @@
         <p:spPr>
           <a:xfrm>
             <a:off x="1176817" y="4797436"/>
-            <a:ext cx="9155875" cy="646331"/>
+            <a:ext cx="9155875" cy="923330"/>
           </a:xfrm>
           <a:prstGeom prst="rect">
             <a:avLst/>
@@ -6468,7 +6662,7 @@
           <a:p>
             <a:r>
               <a:rPr lang="en-US" dirty="0"/>
-              <a:t>Summary stats for glutathione and acetylcholinesterase before investigating outliers. Note that this summary for ache only reported to one significant digit, but the data and tests go deeper.</a:t>
+              <a:t>Summary stats for glutathione and acetylcholinesterase before investigating outliers (and the swab data for glutathione. Note that this summary for ache only reported to one significant digit, but the data and tests go deeper.</a:t>
             </a:r>
           </a:p>
         </p:txBody>
@@ -6525,8 +6719,38 @@
         </p:blipFill>
         <p:spPr>
           <a:xfrm>
-            <a:off x="2681519" y="2358963"/>
+            <a:off x="2681519" y="1746488"/>
             <a:ext cx="7301028" cy="1280882"/>
+          </a:xfrm>
+          <a:prstGeom prst="rect">
+            <a:avLst/>
+          </a:prstGeom>
+        </p:spPr>
+      </p:pic>
+      <p:pic>
+        <p:nvPicPr>
+          <p:cNvPr id="4" name="Picture 3">
+            <a:extLst>
+              <a:ext uri="{FF2B5EF4-FFF2-40B4-BE49-F238E27FC236}">
+                <a16:creationId xmlns:a16="http://schemas.microsoft.com/office/drawing/2014/main" id="{1F1B737C-F0C1-149F-E065-5A1A10885306}"/>
+              </a:ext>
+            </a:extLst>
+          </p:cNvPr>
+          <p:cNvPicPr>
+            <a:picLocks noChangeAspect="1"/>
+          </p:cNvPicPr>
+          <p:nvPr/>
+        </p:nvPicPr>
+        <p:blipFill>
+          <a:blip r:embed="rId4"/>
+          <a:stretch>
+            <a:fillRect/>
+          </a:stretch>
+        </p:blipFill>
+        <p:spPr>
+          <a:xfrm>
+            <a:off x="2777795" y="3317921"/>
+            <a:ext cx="7323290" cy="1049798"/>
           </a:xfrm>
           <a:prstGeom prst="rect">
             <a:avLst/>
@@ -6646,6 +6870,226 @@
     </p:spTree>
     <p:extLst>
       <p:ext uri="{BB962C8B-B14F-4D97-AF65-F5344CB8AC3E}">
+        <p14:creationId xmlns:p14="http://schemas.microsoft.com/office/powerpoint/2010/main" val="877039883"/>
+      </p:ext>
+    </p:extLst>
+  </p:cSld>
+  <p:clrMapOvr>
+    <a:masterClrMapping/>
+  </p:clrMapOvr>
+</p:sld>
+</file>
+
+<file path=ppt/slides/slide31.xml><?xml version="1.0" encoding="utf-8"?>
+<p:sld xmlns:a="http://schemas.openxmlformats.org/drawingml/2006/main" xmlns:r="http://schemas.openxmlformats.org/officeDocument/2006/relationships" xmlns:p="http://schemas.openxmlformats.org/presentationml/2006/main">
+  <p:cSld>
+    <p:spTree>
+      <p:nvGrpSpPr>
+        <p:cNvPr id="1" name=""/>
+        <p:cNvGrpSpPr/>
+        <p:nvPr/>
+      </p:nvGrpSpPr>
+      <p:grpSpPr>
+        <a:xfrm>
+          <a:off x="0" y="0"/>
+          <a:ext cx="0" cy="0"/>
+          <a:chOff x="0" y="0"/>
+          <a:chExt cx="0" cy="0"/>
+        </a:xfrm>
+      </p:grpSpPr>
+      <p:sp>
+        <p:nvSpPr>
+          <p:cNvPr id="2" name="Title 1">
+            <a:extLst>
+              <a:ext uri="{FF2B5EF4-FFF2-40B4-BE49-F238E27FC236}">
+                <a16:creationId xmlns:a16="http://schemas.microsoft.com/office/drawing/2014/main" id="{29BF9EB6-E5A0-73BE-2C20-F78514A6052F}"/>
+              </a:ext>
+            </a:extLst>
+          </p:cNvPr>
+          <p:cNvSpPr>
+            <a:spLocks noGrp="1"/>
+          </p:cNvSpPr>
+          <p:nvPr>
+            <p:ph type="title"/>
+          </p:nvPr>
+        </p:nvSpPr>
+        <p:spPr>
+          <a:xfrm>
+            <a:off x="656493" y="75414"/>
+            <a:ext cx="10515600" cy="458840"/>
+          </a:xfrm>
+        </p:spPr>
+        <p:txBody>
+          <a:bodyPr>
+            <a:normAutofit fontScale="90000"/>
+          </a:bodyPr>
+          <a:lstStyle/>
+          <a:p>
+            <a:r>
+              <a:rPr lang="en-US" sz="1800" dirty="0" err="1"/>
+              <a:t>xla</a:t>
+            </a:r>
+            <a:r>
+              <a:rPr lang="en-US" sz="1800" dirty="0"/>
+              <a:t>; 24D—; </a:t>
+            </a:r>
+            <a:r>
+              <a:rPr lang="en-US" sz="1800" dirty="0" err="1"/>
+              <a:t>xla</a:t>
+            </a:r>
+            <a:r>
+              <a:rPr lang="en-US" sz="1800" dirty="0"/>
+              <a:t>=</a:t>
+            </a:r>
+            <a:r>
+              <a:rPr lang="en-US" sz="1800" dirty="0" err="1"/>
+              <a:t>hsa</a:t>
+            </a:r>
+            <a:br>
+              <a:rPr lang="en-US" sz="1800" dirty="0"/>
+            </a:br>
+            <a:endParaRPr lang="en-US" sz="1800" dirty="0"/>
+          </a:p>
+        </p:txBody>
+      </p:sp>
+      <p:sp>
+        <p:nvSpPr>
+          <p:cNvPr id="4" name="Content Placeholder 3">
+            <a:extLst>
+              <a:ext uri="{FF2B5EF4-FFF2-40B4-BE49-F238E27FC236}">
+                <a16:creationId xmlns:a16="http://schemas.microsoft.com/office/drawing/2014/main" id="{36394FF9-9274-D0E9-D3CD-A32446AEAA75}"/>
+              </a:ext>
+            </a:extLst>
+          </p:cNvPr>
+          <p:cNvSpPr>
+            <a:spLocks noGrp="1"/>
+          </p:cNvSpPr>
+          <p:nvPr>
+            <p:ph idx="1"/>
+          </p:nvPr>
+        </p:nvSpPr>
+        <p:spPr/>
+        <p:txBody>
+          <a:bodyPr/>
+          <a:lstStyle/>
+          <a:p>
+            <a:endParaRPr lang="en-US"/>
+          </a:p>
+        </p:txBody>
+      </p:sp>
+    </p:spTree>
+    <p:extLst>
+      <p:ext uri="{BB962C8B-B14F-4D97-AF65-F5344CB8AC3E}">
+        <p14:creationId xmlns:p14="http://schemas.microsoft.com/office/powerpoint/2010/main" val="3423878622"/>
+      </p:ext>
+    </p:extLst>
+  </p:cSld>
+  <p:clrMapOvr>
+    <a:masterClrMapping/>
+  </p:clrMapOvr>
+</p:sld>
+</file>
+
+<file path=ppt/slides/slide32.xml><?xml version="1.0" encoding="utf-8"?>
+<p:sld xmlns:a="http://schemas.openxmlformats.org/drawingml/2006/main" xmlns:r="http://schemas.openxmlformats.org/officeDocument/2006/relationships" xmlns:p="http://schemas.openxmlformats.org/presentationml/2006/main">
+  <p:cSld>
+    <p:spTree>
+      <p:nvGrpSpPr>
+        <p:cNvPr id="1" name=""/>
+        <p:cNvGrpSpPr/>
+        <p:nvPr/>
+      </p:nvGrpSpPr>
+      <p:grpSpPr>
+        <a:xfrm>
+          <a:off x="0" y="0"/>
+          <a:ext cx="0" cy="0"/>
+          <a:chOff x="0" y="0"/>
+          <a:chExt cx="0" cy="0"/>
+        </a:xfrm>
+      </p:grpSpPr>
+      <p:sp>
+        <p:nvSpPr>
+          <p:cNvPr id="2" name="Title 1">
+            <a:extLst>
+              <a:ext uri="{FF2B5EF4-FFF2-40B4-BE49-F238E27FC236}">
+                <a16:creationId xmlns:a16="http://schemas.microsoft.com/office/drawing/2014/main" id="{29BF9EB6-E5A0-73BE-2C20-F78514A6052F}"/>
+              </a:ext>
+            </a:extLst>
+          </p:cNvPr>
+          <p:cNvSpPr>
+            <a:spLocks noGrp="1"/>
+          </p:cNvSpPr>
+          <p:nvPr>
+            <p:ph type="title"/>
+          </p:nvPr>
+        </p:nvSpPr>
+        <p:spPr>
+          <a:xfrm>
+            <a:off x="656493" y="75414"/>
+            <a:ext cx="10515600" cy="458840"/>
+          </a:xfrm>
+        </p:spPr>
+        <p:txBody>
+          <a:bodyPr>
+            <a:normAutofit fontScale="90000"/>
+          </a:bodyPr>
+          <a:lstStyle/>
+          <a:p>
+            <a:r>
+              <a:rPr lang="en-US" sz="1800" dirty="0" err="1"/>
+              <a:t>xla</a:t>
+            </a:r>
+            <a:r>
+              <a:rPr lang="en-US" sz="1800" dirty="0"/>
+              <a:t>; 24D—; </a:t>
+            </a:r>
+            <a:r>
+              <a:rPr lang="en-US" sz="1800" dirty="0" err="1"/>
+              <a:t>xla</a:t>
+            </a:r>
+            <a:r>
+              <a:rPr lang="en-US" sz="1800" dirty="0"/>
+              <a:t>=</a:t>
+            </a:r>
+            <a:r>
+              <a:rPr lang="en-US" sz="1800" dirty="0" err="1"/>
+              <a:t>hsa</a:t>
+            </a:r>
+            <a:br>
+              <a:rPr lang="en-US" sz="1800" dirty="0"/>
+            </a:br>
+            <a:endParaRPr lang="en-US" sz="1800" dirty="0"/>
+          </a:p>
+        </p:txBody>
+      </p:sp>
+      <p:sp>
+        <p:nvSpPr>
+          <p:cNvPr id="4" name="Content Placeholder 3">
+            <a:extLst>
+              <a:ext uri="{FF2B5EF4-FFF2-40B4-BE49-F238E27FC236}">
+                <a16:creationId xmlns:a16="http://schemas.microsoft.com/office/drawing/2014/main" id="{36394FF9-9274-D0E9-D3CD-A32446AEAA75}"/>
+              </a:ext>
+            </a:extLst>
+          </p:cNvPr>
+          <p:cNvSpPr>
+            <a:spLocks noGrp="1"/>
+          </p:cNvSpPr>
+          <p:nvPr>
+            <p:ph idx="1"/>
+          </p:nvPr>
+        </p:nvSpPr>
+        <p:spPr/>
+        <p:txBody>
+          <a:bodyPr/>
+          <a:lstStyle/>
+          <a:p>
+            <a:endParaRPr lang="en-US"/>
+          </a:p>
+        </p:txBody>
+      </p:sp>
+    </p:spTree>
+    <p:extLst>
+      <p:ext uri="{BB962C8B-B14F-4D97-AF65-F5344CB8AC3E}">
         <p14:creationId xmlns:p14="http://schemas.microsoft.com/office/powerpoint/2010/main" val="2178064077"/>
       </p:ext>
     </p:extLst>
@@ -6656,7 +7100,7 @@
 </p:sld>
 </file>
 
-<file path=ppt/slides/slide31.xml><?xml version="1.0" encoding="utf-8"?>
+<file path=ppt/slides/slide33.xml><?xml version="1.0" encoding="utf-8"?>
 <p:sld xmlns:a="http://schemas.openxmlformats.org/drawingml/2006/main" xmlns:r="http://schemas.openxmlformats.org/officeDocument/2006/relationships" xmlns:p="http://schemas.openxmlformats.org/presentationml/2006/main">
   <p:cSld>
     <p:spTree>
@@ -6993,8 +7437,8 @@
         </p:nvSpPr>
         <p:spPr>
           <a:xfrm>
-            <a:off x="1046188" y="5142390"/>
-            <a:ext cx="9802325" cy="1754326"/>
+            <a:off x="940280" y="5142390"/>
+            <a:ext cx="9908234" cy="1477328"/>
           </a:xfrm>
           <a:prstGeom prst="rect">
             <a:avLst/>
@@ -7009,7 +7453,7 @@
           <a:p>
             <a:r>
               <a:rPr lang="en-US" dirty="0"/>
-              <a:t>Glutathione variants. Glutathione used 1:5 and 1:8 dilutions, we are using the averaged concentration for the manuscript. The high control was dropped for the statistical comparisons. The points plot appears to be doubling that outlier, but that is a combination of both the boxplot showing that as an outlier and the points plot--these are now differentiated with the colors of black (part of the boxplot) and purple (the jittered sample point). We do not plan to use this plot is not used for the manuscript, it is </a:t>
+              <a:t>Glutathione variants. Glutathione used 1:5 and 1:8 dilutions, we are using the averaged concentration for the manuscript. The high control was dropped for the statistical comparisons. The points plot appears to be doubling that outlier, but that is a combination of both the boxplot showing that as an outlier and the points plot--these are now differentiated with the colors of black (part of the boxplot) and purple (the jittered sample point). We do not plan to use this plot for the manuscript, it is simply </a:t>
             </a:r>
             <a:r>
               <a:rPr lang="en-US" dirty="0" err="1"/>
@@ -7058,6 +7502,43 @@
           </a:prstGeom>
         </p:spPr>
       </p:pic>
+      <p:sp>
+        <p:nvSpPr>
+          <p:cNvPr id="2" name="TextBox 1">
+            <a:extLst>
+              <a:ext uri="{FF2B5EF4-FFF2-40B4-BE49-F238E27FC236}">
+                <a16:creationId xmlns:a16="http://schemas.microsoft.com/office/drawing/2014/main" id="{177A3172-3CC6-5326-81EA-DBF19996CDB9}"/>
+              </a:ext>
+            </a:extLst>
+          </p:cNvPr>
+          <p:cNvSpPr txBox="1"/>
+          <p:nvPr/>
+        </p:nvSpPr>
+        <p:spPr>
+          <a:xfrm>
+            <a:off x="1544669" y="195308"/>
+            <a:ext cx="2509746" cy="4947081"/>
+          </a:xfrm>
+          <a:prstGeom prst="rect">
+            <a:avLst/>
+          </a:prstGeom>
+          <a:noFill/>
+          <a:ln w="38100">
+            <a:solidFill>
+              <a:srgbClr val="FF0000"/>
+            </a:solidFill>
+          </a:ln>
+        </p:spPr>
+        <p:txBody>
+          <a:bodyPr wrap="square" rtlCol="0">
+            <a:spAutoFit/>
+          </a:bodyPr>
+          <a:lstStyle/>
+          <a:p>
+            <a:endParaRPr lang="en-US" dirty="0"/>
+          </a:p>
+        </p:txBody>
+      </p:sp>
     </p:spTree>
     <p:extLst>
       <p:ext uri="{BB962C8B-B14F-4D97-AF65-F5344CB8AC3E}">
@@ -7102,8 +7583,8 @@
         </p:nvSpPr>
         <p:spPr>
           <a:xfrm>
-            <a:off x="1025640" y="4982966"/>
-            <a:ext cx="9155875" cy="1754326"/>
+            <a:off x="1111905" y="4396369"/>
+            <a:ext cx="9155875" cy="2585323"/>
           </a:xfrm>
           <a:prstGeom prst="rect">
             <a:avLst/>
@@ -7118,17 +7599,17 @@
           <a:p>
             <a:r>
               <a:rPr lang="en-US" dirty="0"/>
-              <a:t>This is the descriptive concentration figure for the manuscript with acetylcholinesterase and the averaged glutathione concentrations versus the treatments. The high control for glutathione, the low 24D glutathione, and 2 high acetylcholinesterase points were all dropped for the statistical comparisons. The points plot appears to be doubling outliers, but that is a combination of both the boxplot showing that as an outlier and the points plot--these are now differentiated with the colors of black (part of the boxplot) and purple (the jittered sample point).</a:t>
+              <a:t>This is the descriptive concentration figure for the manuscript with acetylcholinesterase and the averaged glutathione concentrations versus the treatments. The high control for glutathione, the low 24D glutathione, and 2 high acetylcholinesterase points were all dropped for the statistical comparisons. For the glutathione swab data (we don’t have acetylcholinesterase swab data), multiple outliers were also dropped. The points plot appears to be doubling outliers, but that is a combination of both the boxplot showing that as an outlier and the points plot--these are now differentiated with the colors of black (part of the boxplot) and purple (the jittered sample point). The only significant results is the glutathione data for 24D (with the high glutathione and the low 24D value dropped for normality reasons).</a:t>
             </a:r>
           </a:p>
         </p:txBody>
       </p:sp>
       <p:pic>
         <p:nvPicPr>
-          <p:cNvPr id="10" name="Picture 9" descr="Chart, box and whisker chart&#10;&#10;Description automatically generated">
-            <a:extLst>
-              <a:ext uri="{FF2B5EF4-FFF2-40B4-BE49-F238E27FC236}">
-                <a16:creationId xmlns:a16="http://schemas.microsoft.com/office/drawing/2014/main" id="{80CE7136-E2AA-4895-BD7B-B154A2B886C0}"/>
+          <p:cNvPr id="3" name="Picture 2" descr="Chart, box and whisker chart&#10;&#10;Description automatically generated">
+            <a:extLst>
+              <a:ext uri="{FF2B5EF4-FFF2-40B4-BE49-F238E27FC236}">
+                <a16:creationId xmlns:a16="http://schemas.microsoft.com/office/drawing/2014/main" id="{C08274FE-BE74-1EDD-6D5D-0A9F6C64C4AB}"/>
               </a:ext>
             </a:extLst>
           </p:cNvPr>
@@ -7151,8 +7632,8 @@
         </p:blipFill>
         <p:spPr>
           <a:xfrm>
-            <a:off x="1732027" y="228587"/>
-            <a:ext cx="8239256" cy="4708146"/>
+            <a:off x="1676688" y="625415"/>
+            <a:ext cx="8321040" cy="3657600"/>
           </a:xfrm>
           <a:prstGeom prst="rect">
             <a:avLst/>
@@ -7438,7 +7919,7 @@
           <p:cNvPr id="3" name="Picture 2">
             <a:extLst>
               <a:ext uri="{FF2B5EF4-FFF2-40B4-BE49-F238E27FC236}">
-                <a16:creationId xmlns:a16="http://schemas.microsoft.com/office/drawing/2014/main" id="{F094545D-837A-4604-A077-A23D02F30DFC}"/>
+                <a16:creationId xmlns:a16="http://schemas.microsoft.com/office/drawing/2014/main" id="{FA793A10-F3FA-D3B0-BB64-3D1BBA3647D9}"/>
               </a:ext>
             </a:extLst>
           </p:cNvPr>
@@ -7455,8 +7936,8 @@
         </p:blipFill>
         <p:spPr>
           <a:xfrm>
-            <a:off x="231250" y="615245"/>
-            <a:ext cx="12049095" cy="1416863"/>
+            <a:off x="1118239" y="1253966"/>
+            <a:ext cx="9955521" cy="2762050"/>
           </a:xfrm>
           <a:prstGeom prst="rect">
             <a:avLst/>
@@ -7468,7 +7949,7 @@
           <p:cNvPr id="5" name="TextBox 4">
             <a:extLst>
               <a:ext uri="{FF2B5EF4-FFF2-40B4-BE49-F238E27FC236}">
-                <a16:creationId xmlns:a16="http://schemas.microsoft.com/office/drawing/2014/main" id="{86AF5802-0FF4-4A0D-A3F8-A006C6B62EFC}"/>
+                <a16:creationId xmlns:a16="http://schemas.microsoft.com/office/drawing/2014/main" id="{CB8C9757-AC18-4F55-ABD7-E7FDC8B82537}"/>
               </a:ext>
             </a:extLst>
           </p:cNvPr>
@@ -7477,8 +7958,8 @@
         </p:nvSpPr>
         <p:spPr>
           <a:xfrm>
-            <a:off x="1361615" y="2246117"/>
-            <a:ext cx="9155875" cy="369332"/>
+            <a:off x="1077530" y="4797436"/>
+            <a:ext cx="9155875" cy="923330"/>
           </a:xfrm>
           <a:prstGeom prst="rect">
             <a:avLst/>
@@ -7493,7 +7974,7 @@
           <a:p>
             <a:r>
               <a:rPr lang="en-US" dirty="0"/>
-              <a:t>Identify outliers for averaged </a:t>
+              <a:t>Normality tests for </a:t>
             </a:r>
             <a:r>
               <a:rPr lang="en-US" dirty="0" err="1"/>
@@ -7501,17 +7982,17 @@
             </a:r>
             <a:r>
               <a:rPr lang="en-US" dirty="0"/>
-              <a:t>, the high CONS3 value is identified as an outlier.</a:t>
-            </a:r>
-          </a:p>
-        </p:txBody>
-      </p:sp>
-      <p:sp>
-        <p:nvSpPr>
-          <p:cNvPr id="7" name="TextBox 6">
-            <a:extLst>
-              <a:ext uri="{FF2B5EF4-FFF2-40B4-BE49-F238E27FC236}">
-                <a16:creationId xmlns:a16="http://schemas.microsoft.com/office/drawing/2014/main" id="{E9143364-4761-44F6-B525-8663832274D6}"/>
+              <a:t> swab data. We run Shapiro tests to test for normality. Red boxes include those sets with data that reject a normality assumption (orange nearly reject). Swab data is not normally distributed.</a:t>
+            </a:r>
+          </a:p>
+        </p:txBody>
+      </p:sp>
+      <p:sp>
+        <p:nvSpPr>
+          <p:cNvPr id="9" name="TextBox 8">
+            <a:extLst>
+              <a:ext uri="{FF2B5EF4-FFF2-40B4-BE49-F238E27FC236}">
+                <a16:creationId xmlns:a16="http://schemas.microsoft.com/office/drawing/2014/main" id="{AB7830FD-54A8-4634-9DAE-AED1379742F9}"/>
               </a:ext>
             </a:extLst>
           </p:cNvPr>
@@ -7520,8 +8001,8 @@
         </p:nvSpPr>
         <p:spPr>
           <a:xfrm>
-            <a:off x="1573690" y="648397"/>
-            <a:ext cx="1107366" cy="1313568"/>
+            <a:off x="4236942" y="3217697"/>
+            <a:ext cx="1823844" cy="235199"/>
           </a:xfrm>
           <a:prstGeom prst="rect">
             <a:avLst/>
@@ -7545,10 +8026,10 @@
       </p:sp>
       <p:sp>
         <p:nvSpPr>
-          <p:cNvPr id="8" name="TextBox 7">
-            <a:extLst>
-              <a:ext uri="{FF2B5EF4-FFF2-40B4-BE49-F238E27FC236}">
-                <a16:creationId xmlns:a16="http://schemas.microsoft.com/office/drawing/2014/main" id="{D364A158-DC2E-4DA5-84A1-470A3F6D7DCD}"/>
+          <p:cNvPr id="12" name="TextBox 11">
+            <a:extLst>
+              <a:ext uri="{FF2B5EF4-FFF2-40B4-BE49-F238E27FC236}">
+                <a16:creationId xmlns:a16="http://schemas.microsoft.com/office/drawing/2014/main" id="{7C816C55-B4B4-4E3A-9FF8-13D7E0D3A85C}"/>
               </a:ext>
             </a:extLst>
           </p:cNvPr>
@@ -7557,13 +8038,18 @@
         </p:nvSpPr>
         <p:spPr>
           <a:xfrm>
-            <a:off x="1361615" y="5061818"/>
-            <a:ext cx="9155875" cy="369332"/>
+            <a:off x="4246670" y="3463912"/>
+            <a:ext cx="1823844" cy="235199"/>
           </a:xfrm>
           <a:prstGeom prst="rect">
             <a:avLst/>
           </a:prstGeom>
           <a:noFill/>
+          <a:ln w="38100">
+            <a:solidFill>
+              <a:srgbClr val="FFC000"/>
+            </a:solidFill>
+          </a:ln>
         </p:spPr>
         <p:txBody>
           <a:bodyPr wrap="square" rtlCol="0">
@@ -7571,49 +8057,16 @@
           </a:bodyPr>
           <a:lstStyle/>
           <a:p>
-            <a:r>
-              <a:rPr lang="en-US" dirty="0"/>
-              <a:t>Identify outliers for ache, the two high concentrations (DS4 and DS7) are identified as outliers.</a:t>
-            </a:r>
-          </a:p>
-        </p:txBody>
-      </p:sp>
-      <p:pic>
-        <p:nvPicPr>
-          <p:cNvPr id="10" name="Picture 9">
-            <a:extLst>
-              <a:ext uri="{FF2B5EF4-FFF2-40B4-BE49-F238E27FC236}">
-                <a16:creationId xmlns:a16="http://schemas.microsoft.com/office/drawing/2014/main" id="{21FAF632-EF94-4710-8FEE-15B8D6FCD3C6}"/>
-              </a:ext>
-            </a:extLst>
-          </p:cNvPr>
-          <p:cNvPicPr>
-            <a:picLocks noChangeAspect="1"/>
-          </p:cNvPicPr>
-          <p:nvPr/>
-        </p:nvPicPr>
-        <p:blipFill>
-          <a:blip r:embed="rId3"/>
-          <a:stretch>
-            <a:fillRect/>
-          </a:stretch>
-        </p:blipFill>
-        <p:spPr>
-          <a:xfrm>
-            <a:off x="472274" y="3071871"/>
-            <a:ext cx="8743950" cy="1533525"/>
-          </a:xfrm>
-          <a:prstGeom prst="rect">
-            <a:avLst/>
-          </a:prstGeom>
-        </p:spPr>
-      </p:pic>
-      <p:sp>
-        <p:nvSpPr>
-          <p:cNvPr id="11" name="TextBox 10">
-            <a:extLst>
-              <a:ext uri="{FF2B5EF4-FFF2-40B4-BE49-F238E27FC236}">
-                <a16:creationId xmlns:a16="http://schemas.microsoft.com/office/drawing/2014/main" id="{60AAB6B9-84C3-4699-A18E-D61A2851628D}"/>
+            <a:endParaRPr lang="en-US" dirty="0"/>
+          </a:p>
+        </p:txBody>
+      </p:sp>
+      <p:sp>
+        <p:nvSpPr>
+          <p:cNvPr id="4" name="TextBox 3">
+            <a:extLst>
+              <a:ext uri="{FF2B5EF4-FFF2-40B4-BE49-F238E27FC236}">
+                <a16:creationId xmlns:a16="http://schemas.microsoft.com/office/drawing/2014/main" id="{B05F1B26-CF77-00A0-E8EE-50F47E904672}"/>
               </a:ext>
             </a:extLst>
           </p:cNvPr>
@@ -7622,8 +8075,8 @@
         </p:nvSpPr>
         <p:spPr>
           <a:xfrm>
-            <a:off x="1361615" y="3291828"/>
-            <a:ext cx="1107366" cy="1313568"/>
+            <a:off x="4253158" y="3732181"/>
+            <a:ext cx="1823844" cy="235199"/>
           </a:xfrm>
           <a:prstGeom prst="rect">
             <a:avLst/>
@@ -7648,7 +8101,7 @@
     </p:spTree>
     <p:extLst>
       <p:ext uri="{BB962C8B-B14F-4D97-AF65-F5344CB8AC3E}">
-        <p14:creationId xmlns:p14="http://schemas.microsoft.com/office/powerpoint/2010/main" val="1615585269"/>
+        <p14:creationId xmlns:p14="http://schemas.microsoft.com/office/powerpoint/2010/main" val="2616102985"/>
       </p:ext>
     </p:extLst>
   </p:cSld>

</xml_diff>

<commit_message>
swab test results and kernel density figures
</commit_message>
<xml_diff>
--- a/pptx/vanmeter_salamander_exposures.pptx
+++ b/pptx/vanmeter_salamander_exposures.pptx
@@ -19,25 +19,33 @@
     <p:sldId id="270" r:id="rId13"/>
     <p:sldId id="271" r:id="rId14"/>
     <p:sldId id="272" r:id="rId15"/>
-    <p:sldId id="288" r:id="rId16"/>
-    <p:sldId id="289" r:id="rId17"/>
-    <p:sldId id="273" r:id="rId18"/>
-    <p:sldId id="274" r:id="rId19"/>
-    <p:sldId id="257" r:id="rId20"/>
-    <p:sldId id="258" r:id="rId21"/>
-    <p:sldId id="259" r:id="rId22"/>
-    <p:sldId id="260" r:id="rId23"/>
-    <p:sldId id="261" r:id="rId24"/>
-    <p:sldId id="277" r:id="rId25"/>
-    <p:sldId id="281" r:id="rId26"/>
-    <p:sldId id="278" r:id="rId27"/>
-    <p:sldId id="280" r:id="rId28"/>
-    <p:sldId id="282" r:id="rId29"/>
-    <p:sldId id="283" r:id="rId30"/>
-    <p:sldId id="284" r:id="rId31"/>
-    <p:sldId id="285" r:id="rId32"/>
-    <p:sldId id="286" r:id="rId33"/>
-    <p:sldId id="287" r:id="rId34"/>
+    <p:sldId id="294" r:id="rId16"/>
+    <p:sldId id="288" r:id="rId17"/>
+    <p:sldId id="295" r:id="rId18"/>
+    <p:sldId id="289" r:id="rId19"/>
+    <p:sldId id="273" r:id="rId20"/>
+    <p:sldId id="296" r:id="rId21"/>
+    <p:sldId id="274" r:id="rId22"/>
+    <p:sldId id="257" r:id="rId23"/>
+    <p:sldId id="277" r:id="rId24"/>
+    <p:sldId id="297" r:id="rId25"/>
+    <p:sldId id="300" r:id="rId26"/>
+    <p:sldId id="258" r:id="rId27"/>
+    <p:sldId id="298" r:id="rId28"/>
+    <p:sldId id="301" r:id="rId29"/>
+    <p:sldId id="259" r:id="rId30"/>
+    <p:sldId id="299" r:id="rId31"/>
+    <p:sldId id="260" r:id="rId32"/>
+    <p:sldId id="261" r:id="rId33"/>
+    <p:sldId id="281" r:id="rId34"/>
+    <p:sldId id="278" r:id="rId35"/>
+    <p:sldId id="280" r:id="rId36"/>
+    <p:sldId id="282" r:id="rId37"/>
+    <p:sldId id="283" r:id="rId38"/>
+    <p:sldId id="284" r:id="rId39"/>
+    <p:sldId id="285" r:id="rId40"/>
+    <p:sldId id="286" r:id="rId41"/>
+    <p:sldId id="287" r:id="rId42"/>
   </p:sldIdLst>
   <p:sldSz cx="12192000" cy="6858000"/>
   <p:notesSz cx="6858000" cy="9144000"/>
@@ -291,7 +299,7 @@
           <a:p>
             <a:fld id="{A09DAD73-6C51-45AB-A1E3-AD938ED06CDF}" type="datetimeFigureOut">
               <a:rPr lang="en-US" smtClean="0"/>
-              <a:t>4/12/2023</a:t>
+              <a:t>4/20/2023</a:t>
             </a:fld>
             <a:endParaRPr lang="en-US"/>
           </a:p>
@@ -489,7 +497,7 @@
           <a:p>
             <a:fld id="{A09DAD73-6C51-45AB-A1E3-AD938ED06CDF}" type="datetimeFigureOut">
               <a:rPr lang="en-US" smtClean="0"/>
-              <a:t>4/12/2023</a:t>
+              <a:t>4/20/2023</a:t>
             </a:fld>
             <a:endParaRPr lang="en-US"/>
           </a:p>
@@ -697,7 +705,7 @@
           <a:p>
             <a:fld id="{A09DAD73-6C51-45AB-A1E3-AD938ED06CDF}" type="datetimeFigureOut">
               <a:rPr lang="en-US" smtClean="0"/>
-              <a:t>4/12/2023</a:t>
+              <a:t>4/20/2023</a:t>
             </a:fld>
             <a:endParaRPr lang="en-US"/>
           </a:p>
@@ -895,7 +903,7 @@
           <a:p>
             <a:fld id="{A09DAD73-6C51-45AB-A1E3-AD938ED06CDF}" type="datetimeFigureOut">
               <a:rPr lang="en-US" smtClean="0"/>
-              <a:t>4/12/2023</a:t>
+              <a:t>4/20/2023</a:t>
             </a:fld>
             <a:endParaRPr lang="en-US"/>
           </a:p>
@@ -1170,7 +1178,7 @@
           <a:p>
             <a:fld id="{A09DAD73-6C51-45AB-A1E3-AD938ED06CDF}" type="datetimeFigureOut">
               <a:rPr lang="en-US" smtClean="0"/>
-              <a:t>4/12/2023</a:t>
+              <a:t>4/20/2023</a:t>
             </a:fld>
             <a:endParaRPr lang="en-US"/>
           </a:p>
@@ -1435,7 +1443,7 @@
           <a:p>
             <a:fld id="{A09DAD73-6C51-45AB-A1E3-AD938ED06CDF}" type="datetimeFigureOut">
               <a:rPr lang="en-US" smtClean="0"/>
-              <a:t>4/12/2023</a:t>
+              <a:t>4/20/2023</a:t>
             </a:fld>
             <a:endParaRPr lang="en-US"/>
           </a:p>
@@ -1847,7 +1855,7 @@
           <a:p>
             <a:fld id="{A09DAD73-6C51-45AB-A1E3-AD938ED06CDF}" type="datetimeFigureOut">
               <a:rPr lang="en-US" smtClean="0"/>
-              <a:t>4/12/2023</a:t>
+              <a:t>4/20/2023</a:t>
             </a:fld>
             <a:endParaRPr lang="en-US"/>
           </a:p>
@@ -1988,7 +1996,7 @@
           <a:p>
             <a:fld id="{A09DAD73-6C51-45AB-A1E3-AD938ED06CDF}" type="datetimeFigureOut">
               <a:rPr lang="en-US" smtClean="0"/>
-              <a:t>4/12/2023</a:t>
+              <a:t>4/20/2023</a:t>
             </a:fld>
             <a:endParaRPr lang="en-US"/>
           </a:p>
@@ -2101,7 +2109,7 @@
           <a:p>
             <a:fld id="{A09DAD73-6C51-45AB-A1E3-AD938ED06CDF}" type="datetimeFigureOut">
               <a:rPr lang="en-US" smtClean="0"/>
-              <a:t>4/12/2023</a:t>
+              <a:t>4/20/2023</a:t>
             </a:fld>
             <a:endParaRPr lang="en-US"/>
           </a:p>
@@ -2412,7 +2420,7 @@
           <a:p>
             <a:fld id="{A09DAD73-6C51-45AB-A1E3-AD938ED06CDF}" type="datetimeFigureOut">
               <a:rPr lang="en-US" smtClean="0"/>
-              <a:t>4/12/2023</a:t>
+              <a:t>4/20/2023</a:t>
             </a:fld>
             <a:endParaRPr lang="en-US"/>
           </a:p>
@@ -2700,7 +2708,7 @@
           <a:p>
             <a:fld id="{A09DAD73-6C51-45AB-A1E3-AD938ED06CDF}" type="datetimeFigureOut">
               <a:rPr lang="en-US" smtClean="0"/>
-              <a:t>4/12/2023</a:t>
+              <a:t>4/20/2023</a:t>
             </a:fld>
             <a:endParaRPr lang="en-US"/>
           </a:p>
@@ -2941,7 +2949,7 @@
           <a:p>
             <a:fld id="{A09DAD73-6C51-45AB-A1E3-AD938ED06CDF}" type="datetimeFigureOut">
               <a:rPr lang="en-US" smtClean="0"/>
-              <a:t>4/12/2023</a:t>
+              <a:t>4/20/2023</a:t>
             </a:fld>
             <a:endParaRPr lang="en-US"/>
           </a:p>
@@ -3470,7 +3478,7 @@
         </p:blipFill>
         <p:spPr>
           <a:xfrm>
-            <a:off x="231250" y="615245"/>
+            <a:off x="231250" y="1229965"/>
             <a:ext cx="12049095" cy="1416863"/>
           </a:xfrm>
           <a:prstGeom prst="rect">
@@ -3492,7 +3500,7 @@
         </p:nvSpPr>
         <p:spPr>
           <a:xfrm>
-            <a:off x="1361615" y="2246117"/>
+            <a:off x="1361615" y="2860837"/>
             <a:ext cx="9155875" cy="369332"/>
           </a:xfrm>
           <a:prstGeom prst="rect">
@@ -3535,7 +3543,7 @@
         </p:nvSpPr>
         <p:spPr>
           <a:xfrm>
-            <a:off x="1573690" y="648397"/>
+            <a:off x="1573690" y="1263117"/>
             <a:ext cx="1107366" cy="1313568"/>
           </a:xfrm>
           <a:prstGeom prst="rect">
@@ -3572,7 +3580,7 @@
         </p:nvSpPr>
         <p:spPr>
           <a:xfrm>
-            <a:off x="1361615" y="5061818"/>
+            <a:off x="1361615" y="5676538"/>
             <a:ext cx="9155875" cy="369332"/>
           </a:xfrm>
           <a:prstGeom prst="rect">
@@ -3615,7 +3623,7 @@
         </p:blipFill>
         <p:spPr>
           <a:xfrm>
-            <a:off x="472274" y="3071871"/>
+            <a:off x="472274" y="3686591"/>
             <a:ext cx="8743950" cy="1533525"/>
           </a:xfrm>
           <a:prstGeom prst="rect">
@@ -3637,7 +3645,7 @@
         </p:nvSpPr>
         <p:spPr>
           <a:xfrm>
-            <a:off x="1361615" y="3291828"/>
+            <a:off x="1361615" y="3906548"/>
             <a:ext cx="1107366" cy="1313568"/>
           </a:xfrm>
           <a:prstGeom prst="rect">
@@ -3657,6 +3665,41 @@
           <a:lstStyle/>
           <a:p>
             <a:endParaRPr lang="en-US" dirty="0"/>
+          </a:p>
+        </p:txBody>
+      </p:sp>
+      <p:sp>
+        <p:nvSpPr>
+          <p:cNvPr id="2" name="TextBox 1">
+            <a:extLst>
+              <a:ext uri="{FF2B5EF4-FFF2-40B4-BE49-F238E27FC236}">
+                <a16:creationId xmlns:a16="http://schemas.microsoft.com/office/drawing/2014/main" id="{40EE38D2-2BAF-BC28-2BEF-87C34B765468}"/>
+              </a:ext>
+            </a:extLst>
+          </p:cNvPr>
+          <p:cNvSpPr txBox="1"/>
+          <p:nvPr/>
+        </p:nvSpPr>
+        <p:spPr>
+          <a:xfrm>
+            <a:off x="1736591" y="230521"/>
+            <a:ext cx="8573048" cy="369332"/>
+          </a:xfrm>
+          <a:prstGeom prst="rect">
+            <a:avLst/>
+          </a:prstGeom>
+          <a:noFill/>
+        </p:spPr>
+        <p:txBody>
+          <a:bodyPr wrap="square" rtlCol="0">
+            <a:spAutoFit/>
+          </a:bodyPr>
+          <a:lstStyle/>
+          <a:p>
+            <a:r>
+              <a:rPr lang="en-US" dirty="0"/>
+              <a:t>Identifying outliers for glutathione and acetylcholinesterase—liver data</a:t>
+            </a:r>
           </a:p>
         </p:txBody>
       </p:sp>
@@ -3712,7 +3755,7 @@
         </p:blipFill>
         <p:spPr>
           <a:xfrm>
-            <a:off x="1059162" y="323485"/>
+            <a:off x="2488386" y="2359745"/>
             <a:ext cx="6105525" cy="1685925"/>
           </a:xfrm>
           <a:prstGeom prst="rect">
@@ -3734,7 +3777,7 @@
         </p:nvSpPr>
         <p:spPr>
           <a:xfrm>
-            <a:off x="1361615" y="2246117"/>
+            <a:off x="1653608" y="4459118"/>
             <a:ext cx="9155875" cy="369332"/>
           </a:xfrm>
           <a:prstGeom prst="rect">
@@ -3777,7 +3820,7 @@
         </p:nvSpPr>
         <p:spPr>
           <a:xfrm>
-            <a:off x="1906438" y="648397"/>
+            <a:off x="3335662" y="2684657"/>
             <a:ext cx="774618" cy="1313568"/>
           </a:xfrm>
           <a:prstGeom prst="rect">
@@ -3797,6 +3840,41 @@
           <a:lstStyle/>
           <a:p>
             <a:endParaRPr lang="en-US" dirty="0"/>
+          </a:p>
+        </p:txBody>
+      </p:sp>
+      <p:sp>
+        <p:nvSpPr>
+          <p:cNvPr id="2" name="TextBox 1">
+            <a:extLst>
+              <a:ext uri="{FF2B5EF4-FFF2-40B4-BE49-F238E27FC236}">
+                <a16:creationId xmlns:a16="http://schemas.microsoft.com/office/drawing/2014/main" id="{572958AA-9C8C-C8F8-7968-A8BE63712C70}"/>
+              </a:ext>
+            </a:extLst>
+          </p:cNvPr>
+          <p:cNvSpPr txBox="1"/>
+          <p:nvPr/>
+        </p:nvSpPr>
+        <p:spPr>
+          <a:xfrm>
+            <a:off x="1809476" y="553250"/>
+            <a:ext cx="8573048" cy="369332"/>
+          </a:xfrm>
+          <a:prstGeom prst="rect">
+            <a:avLst/>
+          </a:prstGeom>
+          <a:noFill/>
+        </p:spPr>
+        <p:txBody>
+          <a:bodyPr wrap="square" rtlCol="0">
+            <a:spAutoFit/>
+          </a:bodyPr>
+          <a:lstStyle/>
+          <a:p>
+            <a:r>
+              <a:rPr lang="en-US" dirty="0"/>
+              <a:t>Identifying outliers for glutathione—swab data</a:t>
+            </a:r>
           </a:p>
         </p:txBody>
       </p:sp>
@@ -3992,14 +4070,49 @@
         </p:blipFill>
         <p:spPr>
           <a:xfrm>
-            <a:off x="4402073" y="4485454"/>
-            <a:ext cx="7789927" cy="2372546"/>
+            <a:off x="5033016" y="4485454"/>
+            <a:ext cx="7082118" cy="2372546"/>
           </a:xfrm>
           <a:prstGeom prst="rect">
             <a:avLst/>
           </a:prstGeom>
         </p:spPr>
       </p:pic>
+      <p:sp>
+        <p:nvSpPr>
+          <p:cNvPr id="2" name="TextBox 1">
+            <a:extLst>
+              <a:ext uri="{FF2B5EF4-FFF2-40B4-BE49-F238E27FC236}">
+                <a16:creationId xmlns:a16="http://schemas.microsoft.com/office/drawing/2014/main" id="{69FDF81A-03BB-036C-7B5D-A7D480599871}"/>
+              </a:ext>
+            </a:extLst>
+          </p:cNvPr>
+          <p:cNvSpPr txBox="1"/>
+          <p:nvPr/>
+        </p:nvSpPr>
+        <p:spPr>
+          <a:xfrm>
+            <a:off x="218887" y="228808"/>
+            <a:ext cx="4183186" cy="923330"/>
+          </a:xfrm>
+          <a:prstGeom prst="rect">
+            <a:avLst/>
+          </a:prstGeom>
+          <a:noFill/>
+        </p:spPr>
+        <p:txBody>
+          <a:bodyPr wrap="square" rtlCol="0">
+            <a:spAutoFit/>
+          </a:bodyPr>
+          <a:lstStyle/>
+          <a:p>
+            <a:r>
+              <a:rPr lang="en-US" dirty="0"/>
+              <a:t>Normality tests for glutathione and acetylcholinesterase after dropping outliers—liver and swab data</a:t>
+            </a:r>
+          </a:p>
+        </p:txBody>
+      </p:sp>
     </p:spTree>
     <p:extLst>
       <p:ext uri="{BB962C8B-B14F-4D97-AF65-F5344CB8AC3E}">
@@ -4052,7 +4165,7 @@
         </p:blipFill>
         <p:spPr>
           <a:xfrm>
-            <a:off x="1885092" y="2365885"/>
+            <a:off x="1885092" y="3672165"/>
             <a:ext cx="10281793" cy="2357133"/>
           </a:xfrm>
           <a:prstGeom prst="rect">
@@ -4082,7 +4195,7 @@
         </p:blipFill>
         <p:spPr>
           <a:xfrm>
-            <a:off x="53493" y="23672"/>
+            <a:off x="53493" y="1329952"/>
             <a:ext cx="10105674" cy="2282258"/>
           </a:xfrm>
           <a:prstGeom prst="rect">
@@ -4104,7 +4217,7 @@
         </p:nvSpPr>
         <p:spPr>
           <a:xfrm>
-            <a:off x="10459092" y="211547"/>
+            <a:off x="10459092" y="1517827"/>
             <a:ext cx="1489753" cy="923330"/>
           </a:xfrm>
           <a:prstGeom prst="rect">
@@ -4152,7 +4265,7 @@
         </p:nvSpPr>
         <p:spPr>
           <a:xfrm>
-            <a:off x="222800" y="2933711"/>
+            <a:off x="222800" y="4239991"/>
             <a:ext cx="1662292" cy="923330"/>
           </a:xfrm>
           <a:prstGeom prst="rect">
@@ -4200,7 +4313,7 @@
         </p:nvSpPr>
         <p:spPr>
           <a:xfrm>
-            <a:off x="4891613" y="3395376"/>
+            <a:off x="4891613" y="4701656"/>
             <a:ext cx="1947553" cy="298149"/>
           </a:xfrm>
           <a:prstGeom prst="rect">
@@ -4237,7 +4350,7 @@
         </p:nvSpPr>
         <p:spPr>
           <a:xfrm>
-            <a:off x="3158777" y="1089061"/>
+            <a:off x="3158777" y="2395341"/>
             <a:ext cx="1156369" cy="224814"/>
           </a:xfrm>
           <a:prstGeom prst="rect">
@@ -4257,6 +4370,41 @@
           <a:lstStyle/>
           <a:p>
             <a:endParaRPr lang="en-US" dirty="0"/>
+          </a:p>
+        </p:txBody>
+      </p:sp>
+      <p:sp>
+        <p:nvSpPr>
+          <p:cNvPr id="2" name="TextBox 1">
+            <a:extLst>
+              <a:ext uri="{FF2B5EF4-FFF2-40B4-BE49-F238E27FC236}">
+                <a16:creationId xmlns:a16="http://schemas.microsoft.com/office/drawing/2014/main" id="{0A8E5955-4D45-2605-5CAC-308954676C1F}"/>
+              </a:ext>
+            </a:extLst>
+          </p:cNvPr>
+          <p:cNvSpPr txBox="1"/>
+          <p:nvPr/>
+        </p:nvSpPr>
+        <p:spPr>
+          <a:xfrm>
+            <a:off x="1809476" y="553250"/>
+            <a:ext cx="8573048" cy="369332"/>
+          </a:xfrm>
+          <a:prstGeom prst="rect">
+            <a:avLst/>
+          </a:prstGeom>
+          <a:noFill/>
+        </p:spPr>
+        <p:txBody>
+          <a:bodyPr wrap="square" rtlCol="0">
+            <a:spAutoFit/>
+          </a:bodyPr>
+          <a:lstStyle/>
+          <a:p>
+            <a:r>
+              <a:rPr lang="en-US" dirty="0"/>
+              <a:t>t-tests (after dropping outliers)—liver data; glutathione</a:t>
+            </a:r>
           </a:p>
         </p:txBody>
       </p:sp>
@@ -4312,7 +4460,7 @@
         </p:blipFill>
         <p:spPr>
           <a:xfrm>
-            <a:off x="2338601" y="3483343"/>
+            <a:off x="2338601" y="3929015"/>
             <a:ext cx="9610725" cy="2695575"/>
           </a:xfrm>
           <a:prstGeom prst="rect">
@@ -4342,7 +4490,7 @@
         </p:blipFill>
         <p:spPr>
           <a:xfrm>
-            <a:off x="-2775" y="131371"/>
+            <a:off x="143221" y="1399231"/>
             <a:ext cx="9696450" cy="2305050"/>
           </a:xfrm>
           <a:prstGeom prst="rect">
@@ -4364,7 +4512,7 @@
         </p:nvSpPr>
         <p:spPr>
           <a:xfrm>
-            <a:off x="9814573" y="149902"/>
+            <a:off x="9960569" y="1417762"/>
             <a:ext cx="1980160" cy="923330"/>
           </a:xfrm>
           <a:prstGeom prst="rect">
@@ -4411,7 +4559,7 @@
         </p:nvSpPr>
         <p:spPr>
           <a:xfrm>
-            <a:off x="368469" y="4308907"/>
+            <a:off x="368469" y="4754579"/>
             <a:ext cx="1799378" cy="923330"/>
           </a:xfrm>
           <a:prstGeom prst="rect">
@@ -4458,7 +4606,7 @@
         </p:nvSpPr>
         <p:spPr>
           <a:xfrm>
-            <a:off x="5196410" y="5021518"/>
+            <a:off x="5196410" y="5467190"/>
             <a:ext cx="1111923" cy="298149"/>
           </a:xfrm>
           <a:prstGeom prst="rect">
@@ -4495,7 +4643,7 @@
         </p:nvSpPr>
         <p:spPr>
           <a:xfrm>
-            <a:off x="2498326" y="1243566"/>
+            <a:off x="2644322" y="2511426"/>
             <a:ext cx="1077082" cy="246187"/>
           </a:xfrm>
           <a:prstGeom prst="rect">
@@ -4515,6 +4663,41 @@
           <a:lstStyle/>
           <a:p>
             <a:endParaRPr lang="en-US" dirty="0"/>
+          </a:p>
+        </p:txBody>
+      </p:sp>
+      <p:sp>
+        <p:nvSpPr>
+          <p:cNvPr id="2" name="TextBox 1">
+            <a:extLst>
+              <a:ext uri="{FF2B5EF4-FFF2-40B4-BE49-F238E27FC236}">
+                <a16:creationId xmlns:a16="http://schemas.microsoft.com/office/drawing/2014/main" id="{7FE246A4-0540-8CDF-1289-95E2FFC56006}"/>
+              </a:ext>
+            </a:extLst>
+          </p:cNvPr>
+          <p:cNvSpPr txBox="1"/>
+          <p:nvPr/>
+        </p:nvSpPr>
+        <p:spPr>
+          <a:xfrm>
+            <a:off x="1809476" y="553250"/>
+            <a:ext cx="8573048" cy="369332"/>
+          </a:xfrm>
+          <a:prstGeom prst="rect">
+            <a:avLst/>
+          </a:prstGeom>
+          <a:noFill/>
+        </p:spPr>
+        <p:txBody>
+          <a:bodyPr wrap="square" rtlCol="0">
+            <a:spAutoFit/>
+          </a:bodyPr>
+          <a:lstStyle/>
+          <a:p>
+            <a:r>
+              <a:rPr lang="en-US" dirty="0"/>
+              <a:t>t-tests (after dropping outliers)—liver data; acetylcholinesterase</a:t>
+            </a:r>
           </a:p>
         </p:txBody>
       </p:sp>
@@ -4548,62 +4731,12 @@
           <a:chExt cx="0" cy="0"/>
         </a:xfrm>
       </p:grpSpPr>
-      <p:sp>
-        <p:nvSpPr>
-          <p:cNvPr id="2" name="Title 1">
-            <a:extLst>
-              <a:ext uri="{FF2B5EF4-FFF2-40B4-BE49-F238E27FC236}">
-                <a16:creationId xmlns:a16="http://schemas.microsoft.com/office/drawing/2014/main" id="{106A8024-95DC-E966-0D62-4AFBCA16DAE4}"/>
-              </a:ext>
-            </a:extLst>
-          </p:cNvPr>
-          <p:cNvSpPr>
-            <a:spLocks noGrp="1"/>
-          </p:cNvSpPr>
-          <p:nvPr>
-            <p:ph type="title"/>
-          </p:nvPr>
-        </p:nvSpPr>
-        <p:spPr/>
-        <p:txBody>
-          <a:bodyPr/>
-          <a:lstStyle/>
-          <a:p>
-            <a:endParaRPr lang="en-US"/>
-          </a:p>
-        </p:txBody>
-      </p:sp>
-      <p:sp>
-        <p:nvSpPr>
-          <p:cNvPr id="3" name="Content Placeholder 2">
-            <a:extLst>
-              <a:ext uri="{FF2B5EF4-FFF2-40B4-BE49-F238E27FC236}">
-                <a16:creationId xmlns:a16="http://schemas.microsoft.com/office/drawing/2014/main" id="{19555F0E-E6FC-AB18-0895-7FEF311B8215}"/>
-              </a:ext>
-            </a:extLst>
-          </p:cNvPr>
-          <p:cNvSpPr>
-            <a:spLocks noGrp="1"/>
-          </p:cNvSpPr>
-          <p:nvPr>
-            <p:ph idx="1"/>
-          </p:nvPr>
-        </p:nvSpPr>
-        <p:spPr/>
-        <p:txBody>
-          <a:bodyPr/>
-          <a:lstStyle/>
-          <a:p>
-            <a:endParaRPr lang="en-US"/>
-          </a:p>
-        </p:txBody>
-      </p:sp>
       <p:pic>
         <p:nvPicPr>
-          <p:cNvPr id="5" name="Picture 4">
-            <a:extLst>
-              <a:ext uri="{FF2B5EF4-FFF2-40B4-BE49-F238E27FC236}">
-                <a16:creationId xmlns:a16="http://schemas.microsoft.com/office/drawing/2014/main" id="{BC5F2F71-6EA6-25BF-CF74-0FB0D1394413}"/>
+          <p:cNvPr id="6" name="Picture 5">
+            <a:extLst>
+              <a:ext uri="{FF2B5EF4-FFF2-40B4-BE49-F238E27FC236}">
+                <a16:creationId xmlns:a16="http://schemas.microsoft.com/office/drawing/2014/main" id="{2C96D84D-FAA8-A2FA-5F87-D036992D3C08}"/>
               </a:ext>
             </a:extLst>
           </p:cNvPr>
@@ -4620,18 +4753,259 @@
         </p:blipFill>
         <p:spPr>
           <a:xfrm>
-            <a:off x="2262535" y="0"/>
-            <a:ext cx="7666929" cy="6858000"/>
+            <a:off x="1809476" y="4010564"/>
+            <a:ext cx="9658350" cy="2438400"/>
           </a:xfrm>
           <a:prstGeom prst="rect">
             <a:avLst/>
           </a:prstGeom>
         </p:spPr>
       </p:pic>
+      <p:pic>
+        <p:nvPicPr>
+          <p:cNvPr id="4" name="Picture 3">
+            <a:extLst>
+              <a:ext uri="{FF2B5EF4-FFF2-40B4-BE49-F238E27FC236}">
+                <a16:creationId xmlns:a16="http://schemas.microsoft.com/office/drawing/2014/main" id="{56C0D759-EF4C-8A02-389E-00066439A2C4}"/>
+              </a:ext>
+            </a:extLst>
+          </p:cNvPr>
+          <p:cNvPicPr>
+            <a:picLocks noChangeAspect="1"/>
+          </p:cNvPicPr>
+          <p:nvPr/>
+        </p:nvPicPr>
+        <p:blipFill>
+          <a:blip r:embed="rId3"/>
+          <a:stretch>
+            <a:fillRect/>
+          </a:stretch>
+        </p:blipFill>
+        <p:spPr>
+          <a:xfrm>
+            <a:off x="971070" y="1404500"/>
+            <a:ext cx="9220200" cy="2381250"/>
+          </a:xfrm>
+          <a:prstGeom prst="rect">
+            <a:avLst/>
+          </a:prstGeom>
+        </p:spPr>
+      </p:pic>
+      <p:sp>
+        <p:nvSpPr>
+          <p:cNvPr id="9" name="TextBox 8">
+            <a:extLst>
+              <a:ext uri="{FF2B5EF4-FFF2-40B4-BE49-F238E27FC236}">
+                <a16:creationId xmlns:a16="http://schemas.microsoft.com/office/drawing/2014/main" id="{BC07244D-294C-4D5B-8815-71CD060CA95A}"/>
+              </a:ext>
+            </a:extLst>
+          </p:cNvPr>
+          <p:cNvSpPr txBox="1"/>
+          <p:nvPr/>
+        </p:nvSpPr>
+        <p:spPr>
+          <a:xfrm>
+            <a:off x="10265870" y="1717611"/>
+            <a:ext cx="1682976" cy="923330"/>
+          </a:xfrm>
+          <a:prstGeom prst="rect">
+            <a:avLst/>
+          </a:prstGeom>
+          <a:noFill/>
+        </p:spPr>
+        <p:txBody>
+          <a:bodyPr wrap="square" rtlCol="0">
+            <a:spAutoFit/>
+          </a:bodyPr>
+          <a:lstStyle/>
+          <a:p>
+            <a:r>
+              <a:rPr lang="en-US" dirty="0" err="1"/>
+              <a:t>Gsh</a:t>
+            </a:r>
+            <a:r>
+              <a:rPr lang="en-US" dirty="0"/>
+              <a:t>-swabs</a:t>
+            </a:r>
+          </a:p>
+          <a:p>
+            <a:r>
+              <a:rPr lang="en-US" dirty="0"/>
+              <a:t>24d</a:t>
+            </a:r>
+          </a:p>
+          <a:p>
+            <a:r>
+              <a:rPr lang="en-US" dirty="0"/>
+              <a:t>Not significant</a:t>
+            </a:r>
+          </a:p>
+        </p:txBody>
+      </p:sp>
+      <p:sp>
+        <p:nvSpPr>
+          <p:cNvPr id="10" name="TextBox 9">
+            <a:extLst>
+              <a:ext uri="{FF2B5EF4-FFF2-40B4-BE49-F238E27FC236}">
+                <a16:creationId xmlns:a16="http://schemas.microsoft.com/office/drawing/2014/main" id="{1871EB22-F10A-4181-8810-3A258E8063BC}"/>
+              </a:ext>
+            </a:extLst>
+          </p:cNvPr>
+          <p:cNvSpPr txBox="1"/>
+          <p:nvPr/>
+        </p:nvSpPr>
+        <p:spPr>
+          <a:xfrm>
+            <a:off x="222800" y="4439775"/>
+            <a:ext cx="1662292" cy="923330"/>
+          </a:xfrm>
+          <a:prstGeom prst="rect">
+            <a:avLst/>
+          </a:prstGeom>
+          <a:noFill/>
+        </p:spPr>
+        <p:txBody>
+          <a:bodyPr wrap="square" rtlCol="0">
+            <a:spAutoFit/>
+          </a:bodyPr>
+          <a:lstStyle/>
+          <a:p>
+            <a:r>
+              <a:rPr lang="en-US" dirty="0" err="1"/>
+              <a:t>Gsh</a:t>
+            </a:r>
+            <a:r>
+              <a:rPr lang="en-US" dirty="0"/>
+              <a:t>-swabs</a:t>
+            </a:r>
+          </a:p>
+          <a:p>
+            <a:r>
+              <a:rPr lang="en-US" dirty="0"/>
+              <a:t>Chlorpyrifos</a:t>
+            </a:r>
+          </a:p>
+          <a:p>
+            <a:r>
+              <a:rPr lang="en-US" dirty="0"/>
+              <a:t>Not significant</a:t>
+            </a:r>
+          </a:p>
+        </p:txBody>
+      </p:sp>
+      <p:sp>
+        <p:nvSpPr>
+          <p:cNvPr id="16" name="TextBox 15">
+            <a:extLst>
+              <a:ext uri="{FF2B5EF4-FFF2-40B4-BE49-F238E27FC236}">
+                <a16:creationId xmlns:a16="http://schemas.microsoft.com/office/drawing/2014/main" id="{EBAE140D-EBD1-4737-8B46-7F65C5547E5C}"/>
+              </a:ext>
+            </a:extLst>
+          </p:cNvPr>
+          <p:cNvSpPr txBox="1"/>
+          <p:nvPr/>
+        </p:nvSpPr>
+        <p:spPr>
+          <a:xfrm>
+            <a:off x="3795912" y="5146694"/>
+            <a:ext cx="1947553" cy="298149"/>
+          </a:xfrm>
+          <a:prstGeom prst="rect">
+            <a:avLst/>
+          </a:prstGeom>
+          <a:noFill/>
+          <a:ln w="38100">
+            <a:solidFill>
+              <a:srgbClr val="FF0000"/>
+            </a:solidFill>
+          </a:ln>
+        </p:spPr>
+        <p:txBody>
+          <a:bodyPr wrap="square" rtlCol="0">
+            <a:spAutoFit/>
+          </a:bodyPr>
+          <a:lstStyle/>
+          <a:p>
+            <a:endParaRPr lang="en-US" dirty="0"/>
+          </a:p>
+        </p:txBody>
+      </p:sp>
+      <p:sp>
+        <p:nvSpPr>
+          <p:cNvPr id="18" name="TextBox 17">
+            <a:extLst>
+              <a:ext uri="{FF2B5EF4-FFF2-40B4-BE49-F238E27FC236}">
+                <a16:creationId xmlns:a16="http://schemas.microsoft.com/office/drawing/2014/main" id="{E8AE9FBD-946E-4CFE-9BB3-DF300E8A1803}"/>
+              </a:ext>
+            </a:extLst>
+          </p:cNvPr>
+          <p:cNvSpPr txBox="1"/>
+          <p:nvPr/>
+        </p:nvSpPr>
+        <p:spPr>
+          <a:xfrm>
+            <a:off x="3081297" y="2595125"/>
+            <a:ext cx="1429231" cy="224814"/>
+          </a:xfrm>
+          <a:prstGeom prst="rect">
+            <a:avLst/>
+          </a:prstGeom>
+          <a:noFill/>
+          <a:ln w="38100">
+            <a:solidFill>
+              <a:srgbClr val="FF0000"/>
+            </a:solidFill>
+          </a:ln>
+        </p:spPr>
+        <p:txBody>
+          <a:bodyPr wrap="square" rtlCol="0">
+            <a:spAutoFit/>
+          </a:bodyPr>
+          <a:lstStyle/>
+          <a:p>
+            <a:endParaRPr lang="en-US" dirty="0"/>
+          </a:p>
+        </p:txBody>
+      </p:sp>
+      <p:sp>
+        <p:nvSpPr>
+          <p:cNvPr id="2" name="TextBox 1">
+            <a:extLst>
+              <a:ext uri="{FF2B5EF4-FFF2-40B4-BE49-F238E27FC236}">
+                <a16:creationId xmlns:a16="http://schemas.microsoft.com/office/drawing/2014/main" id="{32FD3F72-5FEC-2733-839C-71706122FAB7}"/>
+              </a:ext>
+            </a:extLst>
+          </p:cNvPr>
+          <p:cNvSpPr txBox="1"/>
+          <p:nvPr/>
+        </p:nvSpPr>
+        <p:spPr>
+          <a:xfrm>
+            <a:off x="1809476" y="553250"/>
+            <a:ext cx="8573048" cy="369332"/>
+          </a:xfrm>
+          <a:prstGeom prst="rect">
+            <a:avLst/>
+          </a:prstGeom>
+          <a:noFill/>
+        </p:spPr>
+        <p:txBody>
+          <a:bodyPr wrap="square" rtlCol="0">
+            <a:spAutoFit/>
+          </a:bodyPr>
+          <a:lstStyle/>
+          <a:p>
+            <a:r>
+              <a:rPr lang="en-US" dirty="0"/>
+              <a:t>t-tests (after dropping outliers)—swab data; glutathione</a:t>
+            </a:r>
+          </a:p>
+        </p:txBody>
+      </p:sp>
     </p:spTree>
     <p:extLst>
       <p:ext uri="{BB962C8B-B14F-4D97-AF65-F5344CB8AC3E}">
-        <p14:creationId xmlns:p14="http://schemas.microsoft.com/office/powerpoint/2010/main" val="1904536910"/>
+        <p14:creationId xmlns:p14="http://schemas.microsoft.com/office/powerpoint/2010/main" val="1760663845"/>
       </p:ext>
     </p:extLst>
   </p:cSld>
@@ -4663,7 +5037,7 @@
           <p:cNvPr id="2" name="Title 1">
             <a:extLst>
               <a:ext uri="{FF2B5EF4-FFF2-40B4-BE49-F238E27FC236}">
-                <a16:creationId xmlns:a16="http://schemas.microsoft.com/office/drawing/2014/main" id="{3A72562A-E104-A744-0A64-BA49A33CD567}"/>
+                <a16:creationId xmlns:a16="http://schemas.microsoft.com/office/drawing/2014/main" id="{106A8024-95DC-E966-0D62-4AFBCA16DAE4}"/>
               </a:ext>
             </a:extLst>
           </p:cNvPr>
@@ -4674,12 +5048,17 @@
             <p:ph type="title"/>
           </p:nvPr>
         </p:nvSpPr>
-        <p:spPr/>
+        <p:spPr>
+          <a:xfrm>
+            <a:off x="284949" y="549541"/>
+            <a:ext cx="10515600" cy="1325563"/>
+          </a:xfrm>
+        </p:spPr>
         <p:txBody>
           <a:bodyPr/>
           <a:lstStyle/>
           <a:p>
-            <a:endParaRPr lang="en-US"/>
+            <a:endParaRPr lang="en-US" dirty="0"/>
           </a:p>
         </p:txBody>
       </p:sp>
@@ -4688,7 +5067,7 @@
           <p:cNvPr id="3" name="Content Placeholder 2">
             <a:extLst>
               <a:ext uri="{FF2B5EF4-FFF2-40B4-BE49-F238E27FC236}">
-                <a16:creationId xmlns:a16="http://schemas.microsoft.com/office/drawing/2014/main" id="{1577E626-24AE-2579-A8F0-0AF9B05032CC}"/>
+                <a16:creationId xmlns:a16="http://schemas.microsoft.com/office/drawing/2014/main" id="{19555F0E-E6FC-AB18-0895-7FEF311B8215}"/>
               </a:ext>
             </a:extLst>
           </p:cNvPr>
@@ -4699,12 +5078,26 @@
             <p:ph idx="1"/>
           </p:nvPr>
         </p:nvSpPr>
-        <p:spPr/>
+        <p:spPr>
+          <a:xfrm>
+            <a:off x="177373" y="2060255"/>
+            <a:ext cx="10515600" cy="4351338"/>
+          </a:xfrm>
+        </p:spPr>
         <p:txBody>
           <a:bodyPr/>
           <a:lstStyle/>
           <a:p>
-            <a:endParaRPr lang="en-US"/>
+            <a:r>
+              <a:rPr lang="en-US" dirty="0"/>
+              <a:t>Metabolite correlations</a:t>
+            </a:r>
+          </a:p>
+          <a:p>
+            <a:r>
+              <a:rPr lang="en-US" dirty="0"/>
+              <a:t>Across all treatments</a:t>
+            </a:r>
           </a:p>
         </p:txBody>
       </p:sp>
@@ -4713,7 +5106,7 @@
           <p:cNvPr id="5" name="Picture 4">
             <a:extLst>
               <a:ext uri="{FF2B5EF4-FFF2-40B4-BE49-F238E27FC236}">
-                <a16:creationId xmlns:a16="http://schemas.microsoft.com/office/drawing/2014/main" id="{AF5D9412-564C-42FF-D0C2-BA95F6F50B0A}"/>
+                <a16:creationId xmlns:a16="http://schemas.microsoft.com/office/drawing/2014/main" id="{BC5F2F71-6EA6-25BF-CF74-0FB0D1394413}"/>
               </a:ext>
             </a:extLst>
           </p:cNvPr>
@@ -4730,8 +5123,8 @@
         </p:blipFill>
         <p:spPr>
           <a:xfrm>
-            <a:off x="2031003" y="0"/>
-            <a:ext cx="8129994" cy="6858000"/>
+            <a:off x="3929971" y="-76840"/>
+            <a:ext cx="7666929" cy="6858000"/>
           </a:xfrm>
           <a:prstGeom prst="rect">
             <a:avLst/>
@@ -4741,7 +5134,7 @@
     </p:spTree>
     <p:extLst>
       <p:ext uri="{BB962C8B-B14F-4D97-AF65-F5344CB8AC3E}">
-        <p14:creationId xmlns:p14="http://schemas.microsoft.com/office/powerpoint/2010/main" val="1989200286"/>
+        <p14:creationId xmlns:p14="http://schemas.microsoft.com/office/powerpoint/2010/main" val="1904536910"/>
       </p:ext>
     </p:extLst>
   </p:cSld>
@@ -4768,42 +5161,12 @@
           <a:chExt cx="0" cy="0"/>
         </a:xfrm>
       </p:grpSpPr>
-      <p:pic>
-        <p:nvPicPr>
-          <p:cNvPr id="5" name="Picture 4">
-            <a:extLst>
-              <a:ext uri="{FF2B5EF4-FFF2-40B4-BE49-F238E27FC236}">
-                <a16:creationId xmlns:a16="http://schemas.microsoft.com/office/drawing/2014/main" id="{28F39AF9-8FA2-1E27-DED7-6C98DEAC6352}"/>
-              </a:ext>
-            </a:extLst>
-          </p:cNvPr>
-          <p:cNvPicPr>
-            <a:picLocks noChangeAspect="1"/>
-          </p:cNvPicPr>
-          <p:nvPr/>
-        </p:nvPicPr>
-        <p:blipFill>
-          <a:blip r:embed="rId2"/>
-          <a:stretch>
-            <a:fillRect/>
-          </a:stretch>
-        </p:blipFill>
-        <p:spPr>
-          <a:xfrm>
-            <a:off x="397163" y="55996"/>
-            <a:ext cx="9401781" cy="6734892"/>
-          </a:xfrm>
-          <a:prstGeom prst="rect">
-            <a:avLst/>
-          </a:prstGeom>
-        </p:spPr>
-      </p:pic>
       <p:sp>
         <p:nvSpPr>
           <p:cNvPr id="2" name="Title 1">
             <a:extLst>
               <a:ext uri="{FF2B5EF4-FFF2-40B4-BE49-F238E27FC236}">
-                <a16:creationId xmlns:a16="http://schemas.microsoft.com/office/drawing/2014/main" id="{68AC0A0C-1C5A-64F6-8F4A-EF0556EAC1DD}"/>
+                <a16:creationId xmlns:a16="http://schemas.microsoft.com/office/drawing/2014/main" id="{8A75050E-6113-38FA-C8D8-7073FFAAD710}"/>
               </a:ext>
             </a:extLst>
           </p:cNvPr>
@@ -4816,8 +5179,8 @@
         </p:nvSpPr>
         <p:spPr>
           <a:xfrm>
-            <a:off x="5834165" y="5465325"/>
-            <a:ext cx="6356927" cy="1325563"/>
+            <a:off x="838200" y="165341"/>
+            <a:ext cx="10515600" cy="733692"/>
           </a:xfrm>
         </p:spPr>
         <p:txBody>
@@ -4825,12 +5188,61 @@
           <a:lstStyle/>
           <a:p>
             <a:r>
-              <a:rPr lang="en-US" dirty="0" err="1"/>
-              <a:t>Chlorpyrfos</a:t>
-            </a:r>
-            <a:r>
               <a:rPr lang="en-US" dirty="0"/>
-              <a:t>, log2 v control</a:t>
+              <a:t>Metabolic pathway networks</a:t>
+            </a:r>
+          </a:p>
+        </p:txBody>
+      </p:sp>
+      <p:sp>
+        <p:nvSpPr>
+          <p:cNvPr id="3" name="Content Placeholder 2">
+            <a:extLst>
+              <a:ext uri="{FF2B5EF4-FFF2-40B4-BE49-F238E27FC236}">
+                <a16:creationId xmlns:a16="http://schemas.microsoft.com/office/drawing/2014/main" id="{C49A335B-0963-4966-60A7-F4067DC4D338}"/>
+              </a:ext>
+            </a:extLst>
+          </p:cNvPr>
+          <p:cNvSpPr>
+            <a:spLocks noGrp="1"/>
+          </p:cNvSpPr>
+          <p:nvPr>
+            <p:ph idx="1"/>
+          </p:nvPr>
+        </p:nvSpPr>
+        <p:spPr>
+          <a:xfrm>
+            <a:off x="838200" y="1172482"/>
+            <a:ext cx="10515600" cy="4351338"/>
+          </a:xfrm>
+        </p:spPr>
+        <p:txBody>
+          <a:bodyPr>
+            <a:normAutofit lnSpcReduction="10000"/>
+          </a:bodyPr>
+          <a:lstStyle/>
+          <a:p>
+            <a:r>
+              <a:rPr lang="en-US" dirty="0"/>
+              <a:t>None of the network diagrams are satisfactory</a:t>
+            </a:r>
+          </a:p>
+          <a:p>
+            <a:r>
+              <a:rPr lang="en-US" dirty="0"/>
+              <a:t>Methods work for some pathways if all the treatments are lumped together, but that is not helpful for the manuscript</a:t>
+            </a:r>
+          </a:p>
+          <a:p>
+            <a:r>
+              <a:rPr lang="en-US" dirty="0"/>
+              <a:t>To do specific treatments, need to be more careful about the tuning parameter, optimize it not on results but on number of retained metabolites, essentially it quickly flips from having too many metabolites (not enough degrees of freedom to calculate the partial correlations) to aggressively dropping all the metabolites and not having an interesting network to look at</a:t>
+            </a:r>
+          </a:p>
+          <a:p>
+            <a:r>
+              <a:rPr lang="en-US" dirty="0"/>
+              <a:t>Kernel density plots are useful for visualizing the overall differences in (z score transformed) metabolite concentrations between treatments</a:t>
             </a:r>
           </a:p>
         </p:txBody>
@@ -4838,7 +5250,7 @@
     </p:spTree>
     <p:extLst>
       <p:ext uri="{BB962C8B-B14F-4D97-AF65-F5344CB8AC3E}">
-        <p14:creationId xmlns:p14="http://schemas.microsoft.com/office/powerpoint/2010/main" val="249576630"/>
+        <p14:creationId xmlns:p14="http://schemas.microsoft.com/office/powerpoint/2010/main" val="2113154115"/>
       </p:ext>
     </p:extLst>
   </p:cSld>
@@ -4870,7 +5282,7 @@
           <p:cNvPr id="2" name="Title 1">
             <a:extLst>
               <a:ext uri="{FF2B5EF4-FFF2-40B4-BE49-F238E27FC236}">
-                <a16:creationId xmlns:a16="http://schemas.microsoft.com/office/drawing/2014/main" id="{FA9D0A6F-35B7-989C-777F-70CD6CFA5D84}"/>
+                <a16:creationId xmlns:a16="http://schemas.microsoft.com/office/drawing/2014/main" id="{3A72562A-E104-A744-0A64-BA49A33CD567}"/>
               </a:ext>
             </a:extLst>
           </p:cNvPr>
@@ -4895,7 +5307,7 @@
           <p:cNvPr id="3" name="Content Placeholder 2">
             <a:extLst>
               <a:ext uri="{FF2B5EF4-FFF2-40B4-BE49-F238E27FC236}">
-                <a16:creationId xmlns:a16="http://schemas.microsoft.com/office/drawing/2014/main" id="{E3F2277D-F638-1BA5-1B71-8FEB35A67793}"/>
+                <a16:creationId xmlns:a16="http://schemas.microsoft.com/office/drawing/2014/main" id="{1577E626-24AE-2579-A8F0-0AF9B05032CC}"/>
               </a:ext>
             </a:extLst>
           </p:cNvPr>
@@ -4915,10 +5327,40 @@
           </a:p>
         </p:txBody>
       </p:sp>
+      <p:pic>
+        <p:nvPicPr>
+          <p:cNvPr id="5" name="Picture 4">
+            <a:extLst>
+              <a:ext uri="{FF2B5EF4-FFF2-40B4-BE49-F238E27FC236}">
+                <a16:creationId xmlns:a16="http://schemas.microsoft.com/office/drawing/2014/main" id="{AF5D9412-564C-42FF-D0C2-BA95F6F50B0A}"/>
+              </a:ext>
+            </a:extLst>
+          </p:cNvPr>
+          <p:cNvPicPr>
+            <a:picLocks noChangeAspect="1"/>
+          </p:cNvPicPr>
+          <p:nvPr/>
+        </p:nvPicPr>
+        <p:blipFill>
+          <a:blip r:embed="rId2"/>
+          <a:stretch>
+            <a:fillRect/>
+          </a:stretch>
+        </p:blipFill>
+        <p:spPr>
+          <a:xfrm>
+            <a:off x="2031003" y="0"/>
+            <a:ext cx="8129994" cy="6858000"/>
+          </a:xfrm>
+          <a:prstGeom prst="rect">
+            <a:avLst/>
+          </a:prstGeom>
+        </p:spPr>
+      </p:pic>
     </p:spTree>
     <p:extLst>
       <p:ext uri="{BB962C8B-B14F-4D97-AF65-F5344CB8AC3E}">
-        <p14:creationId xmlns:p14="http://schemas.microsoft.com/office/powerpoint/2010/main" val="1250932286"/>
+        <p14:creationId xmlns:p14="http://schemas.microsoft.com/office/powerpoint/2010/main" val="1989200286"/>
       </p:ext>
     </p:extLst>
   </p:cSld>
@@ -4950,7 +5392,7 @@
           <p:cNvPr id="5" name="Picture 4">
             <a:extLst>
               <a:ext uri="{FF2B5EF4-FFF2-40B4-BE49-F238E27FC236}">
-                <a16:creationId xmlns:a16="http://schemas.microsoft.com/office/drawing/2014/main" id="{AE57FB0C-7DA8-1619-E405-A41462CF60FA}"/>
+                <a16:creationId xmlns:a16="http://schemas.microsoft.com/office/drawing/2014/main" id="{28F39AF9-8FA2-1E27-DED7-6C98DEAC6352}"/>
               </a:ext>
             </a:extLst>
           </p:cNvPr>
@@ -4967,50 +5409,20 @@
         </p:blipFill>
         <p:spPr>
           <a:xfrm>
-            <a:off x="1" y="2049863"/>
-            <a:ext cx="5067130" cy="4617219"/>
+            <a:off x="397163" y="55996"/>
+            <a:ext cx="9401781" cy="6734892"/>
           </a:xfrm>
           <a:prstGeom prst="rect">
             <a:avLst/>
           </a:prstGeom>
         </p:spPr>
       </p:pic>
-      <p:pic>
-        <p:nvPicPr>
-          <p:cNvPr id="7" name="Picture 6">
-            <a:extLst>
-              <a:ext uri="{FF2B5EF4-FFF2-40B4-BE49-F238E27FC236}">
-                <a16:creationId xmlns:a16="http://schemas.microsoft.com/office/drawing/2014/main" id="{275500CE-9CB0-025C-266E-89D70CDC4B1C}"/>
-              </a:ext>
-            </a:extLst>
-          </p:cNvPr>
-          <p:cNvPicPr>
-            <a:picLocks noChangeAspect="1"/>
-          </p:cNvPicPr>
-          <p:nvPr/>
-        </p:nvPicPr>
-        <p:blipFill>
-          <a:blip r:embed="rId3"/>
-          <a:stretch>
-            <a:fillRect/>
-          </a:stretch>
-        </p:blipFill>
-        <p:spPr>
-          <a:xfrm>
-            <a:off x="5067131" y="681037"/>
-            <a:ext cx="7098843" cy="6127739"/>
-          </a:xfrm>
-          <a:prstGeom prst="rect">
-            <a:avLst/>
-          </a:prstGeom>
-        </p:spPr>
-      </p:pic>
       <p:sp>
         <p:nvSpPr>
           <p:cNvPr id="2" name="Title 1">
             <a:extLst>
               <a:ext uri="{FF2B5EF4-FFF2-40B4-BE49-F238E27FC236}">
-                <a16:creationId xmlns:a16="http://schemas.microsoft.com/office/drawing/2014/main" id="{F2992844-C348-ED8E-D093-9ABAE1B2BF35}"/>
+                <a16:creationId xmlns:a16="http://schemas.microsoft.com/office/drawing/2014/main" id="{68AC0A0C-1C5A-64F6-8F4A-EF0556EAC1DD}"/>
               </a:ext>
             </a:extLst>
           </p:cNvPr>
@@ -5023,8 +5435,8 @@
         </p:nvSpPr>
         <p:spPr>
           <a:xfrm>
-            <a:off x="9761135" y="186976"/>
-            <a:ext cx="2095919" cy="1325563"/>
+            <a:off x="5834165" y="5465325"/>
+            <a:ext cx="6356927" cy="1325563"/>
           </a:xfrm>
         </p:spPr>
         <p:txBody>
@@ -5032,8 +5444,12 @@
           <a:lstStyle/>
           <a:p>
             <a:r>
+              <a:rPr lang="en-US" dirty="0" err="1"/>
+              <a:t>Chlorpyrfos</a:t>
+            </a:r>
+            <a:r>
               <a:rPr lang="en-US" dirty="0"/>
-              <a:t>Urea</a:t>
+              <a:t>, log2 v control</a:t>
             </a:r>
           </a:p>
         </p:txBody>
@@ -5041,7 +5457,7 @@
     </p:spTree>
     <p:extLst>
       <p:ext uri="{BB962C8B-B14F-4D97-AF65-F5344CB8AC3E}">
-        <p14:creationId xmlns:p14="http://schemas.microsoft.com/office/powerpoint/2010/main" val="111734949"/>
+        <p14:creationId xmlns:p14="http://schemas.microsoft.com/office/powerpoint/2010/main" val="249576630"/>
       </p:ext>
     </p:extLst>
   </p:cSld>
@@ -5350,42 +5766,12 @@
           <a:chExt cx="0" cy="0"/>
         </a:xfrm>
       </p:grpSpPr>
-      <p:pic>
-        <p:nvPicPr>
-          <p:cNvPr id="6" name="Picture 5">
-            <a:extLst>
-              <a:ext uri="{FF2B5EF4-FFF2-40B4-BE49-F238E27FC236}">
-                <a16:creationId xmlns:a16="http://schemas.microsoft.com/office/drawing/2014/main" id="{9A20F6E2-847E-92EF-CFF4-EBA27A87D7FD}"/>
-              </a:ext>
-            </a:extLst>
-          </p:cNvPr>
-          <p:cNvPicPr>
-            <a:picLocks noChangeAspect="1"/>
-          </p:cNvPicPr>
-          <p:nvPr/>
-        </p:nvPicPr>
-        <p:blipFill>
-          <a:blip r:embed="rId2"/>
-          <a:stretch>
-            <a:fillRect/>
-          </a:stretch>
-        </p:blipFill>
-        <p:spPr>
-          <a:xfrm>
-            <a:off x="4457103" y="0"/>
-            <a:ext cx="7734897" cy="6858000"/>
-          </a:xfrm>
-          <a:prstGeom prst="rect">
-            <a:avLst/>
-          </a:prstGeom>
-        </p:spPr>
-      </p:pic>
       <p:sp>
         <p:nvSpPr>
           <p:cNvPr id="2" name="Title 1">
             <a:extLst>
               <a:ext uri="{FF2B5EF4-FFF2-40B4-BE49-F238E27FC236}">
-                <a16:creationId xmlns:a16="http://schemas.microsoft.com/office/drawing/2014/main" id="{F2992844-C348-ED8E-D093-9ABAE1B2BF35}"/>
+                <a16:creationId xmlns:a16="http://schemas.microsoft.com/office/drawing/2014/main" id="{5D17C12E-F71B-7881-B93B-8EF329A1AC88}"/>
               </a:ext>
             </a:extLst>
           </p:cNvPr>
@@ -5396,106 +5782,47 @@
             <p:ph type="title"/>
           </p:nvPr>
         </p:nvSpPr>
-        <p:spPr>
-          <a:xfrm>
-            <a:off x="622998" y="186977"/>
-            <a:ext cx="5627077" cy="827908"/>
-          </a:xfrm>
-        </p:spPr>
-        <p:txBody>
-          <a:bodyPr>
-            <a:normAutofit/>
-          </a:bodyPr>
+        <p:spPr/>
+        <p:txBody>
+          <a:bodyPr/>
           <a:lstStyle/>
           <a:p>
             <a:r>
               <a:rPr lang="en-US" dirty="0"/>
-              <a:t>Gly Ser Metabolism</a:t>
-            </a:r>
-          </a:p>
-        </p:txBody>
-      </p:sp>
-      <p:pic>
-        <p:nvPicPr>
-          <p:cNvPr id="3" name="Picture 2">
-            <a:extLst>
-              <a:ext uri="{FF2B5EF4-FFF2-40B4-BE49-F238E27FC236}">
-                <a16:creationId xmlns:a16="http://schemas.microsoft.com/office/drawing/2014/main" id="{3CCD611F-24A8-177E-E074-F2E7A61949E2}"/>
-              </a:ext>
-            </a:extLst>
-          </p:cNvPr>
-          <p:cNvPicPr>
-            <a:picLocks noChangeAspect="1"/>
-          </p:cNvPicPr>
-          <p:nvPr/>
-        </p:nvPicPr>
-        <p:blipFill>
-          <a:blip r:embed="rId3"/>
-          <a:stretch>
-            <a:fillRect/>
-          </a:stretch>
-        </p:blipFill>
-        <p:spPr>
-          <a:xfrm>
-            <a:off x="0" y="2592474"/>
-            <a:ext cx="4682125" cy="4185139"/>
-          </a:xfrm>
-          <a:prstGeom prst="rect">
-            <a:avLst/>
-          </a:prstGeom>
-        </p:spPr>
-      </p:pic>
-      <p:pic>
-        <p:nvPicPr>
-          <p:cNvPr id="1026" name="Picture 2">
-            <a:extLst>
-              <a:ext uri="{FF2B5EF4-FFF2-40B4-BE49-F238E27FC236}">
-                <a16:creationId xmlns:a16="http://schemas.microsoft.com/office/drawing/2014/main" id="{2EB94BEA-9B71-2CCD-AAA5-014BEB08004E}"/>
-              </a:ext>
-            </a:extLst>
-          </p:cNvPr>
-          <p:cNvPicPr>
-            <a:picLocks noChangeAspect="1" noChangeArrowheads="1"/>
-          </p:cNvPicPr>
-          <p:nvPr/>
-        </p:nvPicPr>
-        <p:blipFill>
-          <a:blip r:embed="rId4">
-            <a:extLst>
-              <a:ext uri="{28A0092B-C50C-407E-A947-70E740481C1C}">
-                <a14:useLocalDpi xmlns:a14="http://schemas.microsoft.com/office/drawing/2010/main" val="0"/>
-              </a:ext>
-            </a:extLst>
-          </a:blip>
-          <a:srcRect/>
-          <a:stretch>
-            <a:fillRect/>
-          </a:stretch>
-        </p:blipFill>
-        <p:spPr bwMode="auto">
-          <a:xfrm>
-            <a:off x="254051" y="186977"/>
-            <a:ext cx="3705000" cy="2392813"/>
-          </a:xfrm>
-          <a:prstGeom prst="rect">
-            <a:avLst/>
-          </a:prstGeom>
-          <a:noFill/>
-          <a:extLst>
-            <a:ext uri="{909E8E84-426E-40DD-AFC4-6F175D3DCCD1}">
-              <a14:hiddenFill xmlns:a14="http://schemas.microsoft.com/office/drawing/2010/main">
-                <a:solidFill>
-                  <a:srgbClr val="FFFFFF"/>
-                </a:solidFill>
-              </a14:hiddenFill>
-            </a:ext>
-          </a:extLst>
-        </p:spPr>
-      </p:pic>
+              <a:t>Urea cycle</a:t>
+            </a:r>
+          </a:p>
+        </p:txBody>
+      </p:sp>
+      <p:sp>
+        <p:nvSpPr>
+          <p:cNvPr id="3" name="Content Placeholder 2">
+            <a:extLst>
+              <a:ext uri="{FF2B5EF4-FFF2-40B4-BE49-F238E27FC236}">
+                <a16:creationId xmlns:a16="http://schemas.microsoft.com/office/drawing/2014/main" id="{E6E6A899-67B6-266F-E825-3EC76F5B8304}"/>
+              </a:ext>
+            </a:extLst>
+          </p:cNvPr>
+          <p:cNvSpPr>
+            <a:spLocks noGrp="1"/>
+          </p:cNvSpPr>
+          <p:nvPr>
+            <p:ph idx="1"/>
+          </p:nvPr>
+        </p:nvSpPr>
+        <p:spPr/>
+        <p:txBody>
+          <a:bodyPr/>
+          <a:lstStyle/>
+          <a:p>
+            <a:endParaRPr lang="en-US"/>
+          </a:p>
+        </p:txBody>
+      </p:sp>
     </p:spTree>
     <p:extLst>
       <p:ext uri="{BB962C8B-B14F-4D97-AF65-F5344CB8AC3E}">
-        <p14:creationId xmlns:p14="http://schemas.microsoft.com/office/powerpoint/2010/main" val="1176159520"/>
+        <p14:creationId xmlns:p14="http://schemas.microsoft.com/office/powerpoint/2010/main" val="3800070027"/>
       </p:ext>
     </p:extLst>
   </p:cSld>
@@ -5527,7 +5854,7 @@
           <p:cNvPr id="2" name="Title 1">
             <a:extLst>
               <a:ext uri="{FF2B5EF4-FFF2-40B4-BE49-F238E27FC236}">
-                <a16:creationId xmlns:a16="http://schemas.microsoft.com/office/drawing/2014/main" id="{F2992844-C348-ED8E-D093-9ABAE1B2BF35}"/>
+                <a16:creationId xmlns:a16="http://schemas.microsoft.com/office/drawing/2014/main" id="{FA9D0A6F-35B7-989C-777F-70CD6CFA5D84}"/>
               </a:ext>
             </a:extLst>
           </p:cNvPr>
@@ -5538,31 +5865,46 @@
             <p:ph type="title"/>
           </p:nvPr>
         </p:nvSpPr>
-        <p:spPr>
-          <a:xfrm>
-            <a:off x="347435" y="0"/>
-            <a:ext cx="4883498" cy="1325563"/>
-          </a:xfrm>
-        </p:spPr>
-        <p:txBody>
-          <a:bodyPr>
-            <a:normAutofit/>
-          </a:bodyPr>
-          <a:lstStyle/>
-          <a:p>
-            <a:r>
-              <a:rPr lang="en-US" dirty="0"/>
-              <a:t>Glu metabolism</a:t>
-            </a:r>
+        <p:spPr/>
+        <p:txBody>
+          <a:bodyPr/>
+          <a:lstStyle/>
+          <a:p>
+            <a:endParaRPr lang="en-US"/>
+          </a:p>
+        </p:txBody>
+      </p:sp>
+      <p:sp>
+        <p:nvSpPr>
+          <p:cNvPr id="3" name="Content Placeholder 2">
+            <a:extLst>
+              <a:ext uri="{FF2B5EF4-FFF2-40B4-BE49-F238E27FC236}">
+                <a16:creationId xmlns:a16="http://schemas.microsoft.com/office/drawing/2014/main" id="{E3F2277D-F638-1BA5-1B71-8FEB35A67793}"/>
+              </a:ext>
+            </a:extLst>
+          </p:cNvPr>
+          <p:cNvSpPr>
+            <a:spLocks noGrp="1"/>
+          </p:cNvSpPr>
+          <p:nvPr>
+            <p:ph idx="1"/>
+          </p:nvPr>
+        </p:nvSpPr>
+        <p:spPr/>
+        <p:txBody>
+          <a:bodyPr/>
+          <a:lstStyle/>
+          <a:p>
+            <a:endParaRPr lang="en-US"/>
           </a:p>
         </p:txBody>
       </p:sp>
       <p:pic>
         <p:nvPicPr>
-          <p:cNvPr id="4" name="Picture 3">
-            <a:extLst>
-              <a:ext uri="{FF2B5EF4-FFF2-40B4-BE49-F238E27FC236}">
-                <a16:creationId xmlns:a16="http://schemas.microsoft.com/office/drawing/2014/main" id="{2EC6305B-307E-8F19-1FD8-AC208FA7BC1D}"/>
+          <p:cNvPr id="5" name="Picture 4">
+            <a:extLst>
+              <a:ext uri="{FF2B5EF4-FFF2-40B4-BE49-F238E27FC236}">
+                <a16:creationId xmlns:a16="http://schemas.microsoft.com/office/drawing/2014/main" id="{F2057CBC-5322-EDAD-66BB-1A40670032E7}"/>
               </a:ext>
             </a:extLst>
           </p:cNvPr>
@@ -5579,38 +5921,8 @@
         </p:blipFill>
         <p:spPr>
           <a:xfrm>
-            <a:off x="80387" y="2150346"/>
-            <a:ext cx="5016149" cy="4577025"/>
-          </a:xfrm>
-          <a:prstGeom prst="rect">
-            <a:avLst/>
-          </a:prstGeom>
-        </p:spPr>
-      </p:pic>
-      <p:pic>
-        <p:nvPicPr>
-          <p:cNvPr id="6" name="Picture 5">
-            <a:extLst>
-              <a:ext uri="{FF2B5EF4-FFF2-40B4-BE49-F238E27FC236}">
-                <a16:creationId xmlns:a16="http://schemas.microsoft.com/office/drawing/2014/main" id="{128E1FEB-74CA-0A13-CE7F-1F51F09DEED0}"/>
-              </a:ext>
-            </a:extLst>
-          </p:cNvPr>
-          <p:cNvPicPr>
-            <a:picLocks noChangeAspect="1"/>
-          </p:cNvPicPr>
-          <p:nvPr/>
-        </p:nvPicPr>
-        <p:blipFill>
-          <a:blip r:embed="rId3"/>
-          <a:stretch>
-            <a:fillRect/>
-          </a:stretch>
-        </p:blipFill>
-        <p:spPr>
-          <a:xfrm>
-            <a:off x="5230933" y="874207"/>
-            <a:ext cx="6521344" cy="5983793"/>
+            <a:off x="73455" y="0"/>
+            <a:ext cx="12045089" cy="6858000"/>
           </a:xfrm>
           <a:prstGeom prst="rect">
             <a:avLst/>
@@ -5620,7 +5932,7 @@
     </p:spTree>
     <p:extLst>
       <p:ext uri="{BB962C8B-B14F-4D97-AF65-F5344CB8AC3E}">
-        <p14:creationId xmlns:p14="http://schemas.microsoft.com/office/powerpoint/2010/main" val="1003902108"/>
+        <p14:creationId xmlns:p14="http://schemas.microsoft.com/office/powerpoint/2010/main" val="1250932286"/>
       </p:ext>
     </p:extLst>
   </p:cSld>
@@ -5647,47 +5959,12 @@
           <a:chExt cx="0" cy="0"/>
         </a:xfrm>
       </p:grpSpPr>
-      <p:sp>
-        <p:nvSpPr>
-          <p:cNvPr id="2" name="Title 1">
-            <a:extLst>
-              <a:ext uri="{FF2B5EF4-FFF2-40B4-BE49-F238E27FC236}">
-                <a16:creationId xmlns:a16="http://schemas.microsoft.com/office/drawing/2014/main" id="{F2992844-C348-ED8E-D093-9ABAE1B2BF35}"/>
-              </a:ext>
-            </a:extLst>
-          </p:cNvPr>
-          <p:cNvSpPr>
-            <a:spLocks noGrp="1"/>
-          </p:cNvSpPr>
-          <p:nvPr>
-            <p:ph type="title"/>
-          </p:nvPr>
-        </p:nvSpPr>
-        <p:spPr>
-          <a:xfrm>
-            <a:off x="261258" y="86493"/>
-            <a:ext cx="4360984" cy="1325563"/>
-          </a:xfrm>
-        </p:spPr>
-        <p:txBody>
-          <a:bodyPr>
-            <a:normAutofit/>
-          </a:bodyPr>
-          <a:lstStyle/>
-          <a:p>
-            <a:r>
-              <a:rPr lang="en-US" dirty="0"/>
-              <a:t>Gluconeogenesis</a:t>
-            </a:r>
-          </a:p>
-        </p:txBody>
-      </p:sp>
       <p:pic>
         <p:nvPicPr>
-          <p:cNvPr id="4" name="Picture 3">
-            <a:extLst>
-              <a:ext uri="{FF2B5EF4-FFF2-40B4-BE49-F238E27FC236}">
-                <a16:creationId xmlns:a16="http://schemas.microsoft.com/office/drawing/2014/main" id="{E581B02E-B3EF-0FCD-B498-D6682A34A968}"/>
+          <p:cNvPr id="5" name="Picture 4">
+            <a:extLst>
+              <a:ext uri="{FF2B5EF4-FFF2-40B4-BE49-F238E27FC236}">
+                <a16:creationId xmlns:a16="http://schemas.microsoft.com/office/drawing/2014/main" id="{AE57FB0C-7DA8-1619-E405-A41462CF60FA}"/>
               </a:ext>
             </a:extLst>
           </p:cNvPr>
@@ -5704,8 +5981,8 @@
         </p:blipFill>
         <p:spPr>
           <a:xfrm>
-            <a:off x="0" y="1989574"/>
-            <a:ext cx="5260385" cy="4597119"/>
+            <a:off x="1" y="2049863"/>
+            <a:ext cx="5067130" cy="4617219"/>
           </a:xfrm>
           <a:prstGeom prst="rect">
             <a:avLst/>
@@ -5714,10 +5991,10 @@
       </p:pic>
       <p:pic>
         <p:nvPicPr>
-          <p:cNvPr id="6" name="Picture 5">
-            <a:extLst>
-              <a:ext uri="{FF2B5EF4-FFF2-40B4-BE49-F238E27FC236}">
-                <a16:creationId xmlns:a16="http://schemas.microsoft.com/office/drawing/2014/main" id="{61807715-DE3A-15A8-3FA7-1C8B15F80413}"/>
+          <p:cNvPr id="7" name="Picture 6">
+            <a:extLst>
+              <a:ext uri="{FF2B5EF4-FFF2-40B4-BE49-F238E27FC236}">
+                <a16:creationId xmlns:a16="http://schemas.microsoft.com/office/drawing/2014/main" id="{275500CE-9CB0-025C-266E-89D70CDC4B1C}"/>
               </a:ext>
             </a:extLst>
           </p:cNvPr>
@@ -5734,18 +6011,51 @@
         </p:blipFill>
         <p:spPr>
           <a:xfrm>
-            <a:off x="5064369" y="429436"/>
-            <a:ext cx="7015441" cy="6291742"/>
+            <a:off x="5067131" y="681037"/>
+            <a:ext cx="7098843" cy="6127739"/>
           </a:xfrm>
           <a:prstGeom prst="rect">
             <a:avLst/>
           </a:prstGeom>
         </p:spPr>
       </p:pic>
+      <p:sp>
+        <p:nvSpPr>
+          <p:cNvPr id="2" name="Title 1">
+            <a:extLst>
+              <a:ext uri="{FF2B5EF4-FFF2-40B4-BE49-F238E27FC236}">
+                <a16:creationId xmlns:a16="http://schemas.microsoft.com/office/drawing/2014/main" id="{F2992844-C348-ED8E-D093-9ABAE1B2BF35}"/>
+              </a:ext>
+            </a:extLst>
+          </p:cNvPr>
+          <p:cNvSpPr>
+            <a:spLocks noGrp="1"/>
+          </p:cNvSpPr>
+          <p:nvPr>
+            <p:ph type="title"/>
+          </p:nvPr>
+        </p:nvSpPr>
+        <p:spPr>
+          <a:xfrm>
+            <a:off x="9761135" y="186976"/>
+            <a:ext cx="2095919" cy="1325563"/>
+          </a:xfrm>
+        </p:spPr>
+        <p:txBody>
+          <a:bodyPr/>
+          <a:lstStyle/>
+          <a:p>
+            <a:r>
+              <a:rPr lang="en-US" dirty="0"/>
+              <a:t>Urea</a:t>
+            </a:r>
+          </a:p>
+        </p:txBody>
+      </p:sp>
     </p:spTree>
     <p:extLst>
       <p:ext uri="{BB962C8B-B14F-4D97-AF65-F5344CB8AC3E}">
-        <p14:creationId xmlns:p14="http://schemas.microsoft.com/office/powerpoint/2010/main" val="164740431"/>
+        <p14:creationId xmlns:p14="http://schemas.microsoft.com/office/powerpoint/2010/main" val="111734949"/>
       </p:ext>
     </p:extLst>
   </p:cSld>
@@ -5774,41 +6084,126 @@
       </p:grpSpPr>
       <p:sp>
         <p:nvSpPr>
-          <p:cNvPr id="2" name="Title 1">
-            <a:extLst>
-              <a:ext uri="{FF2B5EF4-FFF2-40B4-BE49-F238E27FC236}">
-                <a16:creationId xmlns:a16="http://schemas.microsoft.com/office/drawing/2014/main" id="{F2992844-C348-ED8E-D093-9ABAE1B2BF35}"/>
-              </a:ext>
-            </a:extLst>
-          </p:cNvPr>
-          <p:cNvSpPr>
-            <a:spLocks noGrp="1"/>
-          </p:cNvSpPr>
-          <p:nvPr>
-            <p:ph type="title"/>
-          </p:nvPr>
-        </p:nvSpPr>
-        <p:spPr>
-          <a:xfrm>
-            <a:off x="8591341" y="186976"/>
-            <a:ext cx="3265713" cy="998729"/>
-          </a:xfrm>
-        </p:spPr>
-        <p:txBody>
-          <a:bodyPr/>
-          <a:lstStyle/>
-          <a:p>
+          <p:cNvPr id="8" name="TextBox 7">
+            <a:extLst>
+              <a:ext uri="{FF2B5EF4-FFF2-40B4-BE49-F238E27FC236}">
+                <a16:creationId xmlns:a16="http://schemas.microsoft.com/office/drawing/2014/main" id="{2C8C3E8D-0CFB-CCC2-08EC-135F390EF581}"/>
+              </a:ext>
+            </a:extLst>
+          </p:cNvPr>
+          <p:cNvSpPr txBox="1"/>
+          <p:nvPr/>
+        </p:nvSpPr>
+        <p:spPr>
+          <a:xfrm>
+            <a:off x="663191" y="241160"/>
+            <a:ext cx="6712299" cy="369332"/>
+          </a:xfrm>
+          <a:prstGeom prst="rect">
+            <a:avLst/>
+          </a:prstGeom>
+          <a:noFill/>
+        </p:spPr>
+        <p:txBody>
+          <a:bodyPr wrap="square" rtlCol="0">
+            <a:spAutoFit/>
+          </a:bodyPr>
+          <a:lstStyle/>
+          <a:p>
+            <a:r>
+              <a:rPr lang="en-US" dirty="0" err="1"/>
+              <a:t>xla</a:t>
+            </a:r>
             <a:r>
               <a:rPr lang="en-US" dirty="0"/>
-              <a:t>Glu Ala Cycle</a:t>
-            </a:r>
-          </a:p>
-        </p:txBody>
-      </p:sp>
+              <a:t>; Chlorpyrifos—Arginine biosynthesis (Urea cycle); </a:t>
+            </a:r>
+            <a:r>
+              <a:rPr lang="en-US" dirty="0" err="1"/>
+              <a:t>xla</a:t>
+            </a:r>
+            <a:r>
+              <a:rPr lang="en-US" dirty="0"/>
+              <a:t>=</a:t>
+            </a:r>
+            <a:r>
+              <a:rPr lang="en-US" dirty="0" err="1"/>
+              <a:t>hsa</a:t>
+            </a:r>
+            <a:endParaRPr lang="en-US" dirty="0"/>
+          </a:p>
+        </p:txBody>
+      </p:sp>
+      <p:pic>
+        <p:nvPicPr>
+          <p:cNvPr id="3" name="Picture 2">
+            <a:extLst>
+              <a:ext uri="{FF2B5EF4-FFF2-40B4-BE49-F238E27FC236}">
+                <a16:creationId xmlns:a16="http://schemas.microsoft.com/office/drawing/2014/main" id="{D53015E3-C80E-79A2-D262-31BEA26E994C}"/>
+              </a:ext>
+            </a:extLst>
+          </p:cNvPr>
+          <p:cNvPicPr>
+            <a:picLocks noChangeAspect="1"/>
+          </p:cNvPicPr>
+          <p:nvPr/>
+        </p:nvPicPr>
+        <p:blipFill>
+          <a:blip r:embed="rId2">
+            <a:extLst>
+              <a:ext uri="{28A0092B-C50C-407E-A947-70E740481C1C}">
+                <a14:useLocalDpi xmlns:a14="http://schemas.microsoft.com/office/drawing/2010/main" val="0"/>
+              </a:ext>
+            </a:extLst>
+          </a:blip>
+          <a:stretch>
+            <a:fillRect/>
+          </a:stretch>
+        </p:blipFill>
+        <p:spPr>
+          <a:xfrm>
+            <a:off x="191214" y="610492"/>
+            <a:ext cx="11809572" cy="4963886"/>
+          </a:xfrm>
+          <a:prstGeom prst="rect">
+            <a:avLst/>
+          </a:prstGeom>
+        </p:spPr>
+      </p:pic>
+      <p:pic>
+        <p:nvPicPr>
+          <p:cNvPr id="6" name="Picture 5">
+            <a:extLst>
+              <a:ext uri="{FF2B5EF4-FFF2-40B4-BE49-F238E27FC236}">
+                <a16:creationId xmlns:a16="http://schemas.microsoft.com/office/drawing/2014/main" id="{D3A83DB5-9EF9-7B06-C850-A3AA80E0C457}"/>
+              </a:ext>
+            </a:extLst>
+          </p:cNvPr>
+          <p:cNvPicPr>
+            <a:picLocks noChangeAspect="1"/>
+          </p:cNvPicPr>
+          <p:nvPr/>
+        </p:nvPicPr>
+        <p:blipFill>
+          <a:blip r:embed="rId3"/>
+          <a:stretch>
+            <a:fillRect/>
+          </a:stretch>
+        </p:blipFill>
+        <p:spPr>
+          <a:xfrm>
+            <a:off x="1990613" y="5377181"/>
+            <a:ext cx="10120705" cy="1480819"/>
+          </a:xfrm>
+          <a:prstGeom prst="rect">
+            <a:avLst/>
+          </a:prstGeom>
+        </p:spPr>
+      </p:pic>
     </p:spTree>
     <p:extLst>
       <p:ext uri="{BB962C8B-B14F-4D97-AF65-F5344CB8AC3E}">
-        <p14:creationId xmlns:p14="http://schemas.microsoft.com/office/powerpoint/2010/main" val="2827528181"/>
+        <p14:creationId xmlns:p14="http://schemas.microsoft.com/office/powerpoint/2010/main" val="3691130347"/>
       </p:ext>
     </p:extLst>
   </p:cSld>
@@ -5837,126 +6232,61 @@
       </p:grpSpPr>
       <p:sp>
         <p:nvSpPr>
-          <p:cNvPr id="8" name="TextBox 7">
-            <a:extLst>
-              <a:ext uri="{FF2B5EF4-FFF2-40B4-BE49-F238E27FC236}">
-                <a16:creationId xmlns:a16="http://schemas.microsoft.com/office/drawing/2014/main" id="{2C8C3E8D-0CFB-CCC2-08EC-135F390EF581}"/>
-              </a:ext>
-            </a:extLst>
-          </p:cNvPr>
-          <p:cNvSpPr txBox="1"/>
-          <p:nvPr/>
-        </p:nvSpPr>
-        <p:spPr>
-          <a:xfrm>
-            <a:off x="663191" y="241160"/>
-            <a:ext cx="6712299" cy="369332"/>
-          </a:xfrm>
-          <a:prstGeom prst="rect">
-            <a:avLst/>
-          </a:prstGeom>
-          <a:noFill/>
-        </p:spPr>
-        <p:txBody>
-          <a:bodyPr wrap="square" rtlCol="0">
-            <a:spAutoFit/>
-          </a:bodyPr>
-          <a:lstStyle/>
-          <a:p>
-            <a:r>
-              <a:rPr lang="en-US" dirty="0" err="1"/>
-              <a:t>xla</a:t>
-            </a:r>
+          <p:cNvPr id="2" name="Title 1">
+            <a:extLst>
+              <a:ext uri="{FF2B5EF4-FFF2-40B4-BE49-F238E27FC236}">
+                <a16:creationId xmlns:a16="http://schemas.microsoft.com/office/drawing/2014/main" id="{5D17C12E-F71B-7881-B93B-8EF329A1AC88}"/>
+              </a:ext>
+            </a:extLst>
+          </p:cNvPr>
+          <p:cNvSpPr>
+            <a:spLocks noGrp="1"/>
+          </p:cNvSpPr>
+          <p:nvPr>
+            <p:ph type="title"/>
+          </p:nvPr>
+        </p:nvSpPr>
+        <p:spPr/>
+        <p:txBody>
+          <a:bodyPr/>
+          <a:lstStyle/>
+          <a:p>
             <a:r>
               <a:rPr lang="en-US" dirty="0"/>
-              <a:t>; Chlorpyrifos—Arginine biosynthesis (Urea cycle); </a:t>
-            </a:r>
-            <a:r>
-              <a:rPr lang="en-US" dirty="0" err="1"/>
-              <a:t>xla</a:t>
-            </a:r>
-            <a:r>
-              <a:rPr lang="en-US" dirty="0"/>
-              <a:t>=</a:t>
-            </a:r>
-            <a:r>
-              <a:rPr lang="en-US" dirty="0" err="1"/>
-              <a:t>hsa</a:t>
-            </a:r>
-            <a:endParaRPr lang="en-US" dirty="0"/>
-          </a:p>
-        </p:txBody>
-      </p:sp>
-      <p:pic>
-        <p:nvPicPr>
-          <p:cNvPr id="3" name="Picture 2">
-            <a:extLst>
-              <a:ext uri="{FF2B5EF4-FFF2-40B4-BE49-F238E27FC236}">
-                <a16:creationId xmlns:a16="http://schemas.microsoft.com/office/drawing/2014/main" id="{D53015E3-C80E-79A2-D262-31BEA26E994C}"/>
-              </a:ext>
-            </a:extLst>
-          </p:cNvPr>
-          <p:cNvPicPr>
-            <a:picLocks noChangeAspect="1"/>
-          </p:cNvPicPr>
-          <p:nvPr/>
-        </p:nvPicPr>
-        <p:blipFill>
-          <a:blip r:embed="rId2">
-            <a:extLst>
-              <a:ext uri="{28A0092B-C50C-407E-A947-70E740481C1C}">
-                <a14:useLocalDpi xmlns:a14="http://schemas.microsoft.com/office/drawing/2010/main" val="0"/>
-              </a:ext>
-            </a:extLst>
-          </a:blip>
-          <a:stretch>
-            <a:fillRect/>
-          </a:stretch>
-        </p:blipFill>
-        <p:spPr>
-          <a:xfrm>
-            <a:off x="191214" y="610492"/>
-            <a:ext cx="11809572" cy="4963886"/>
-          </a:xfrm>
-          <a:prstGeom prst="rect">
-            <a:avLst/>
-          </a:prstGeom>
-        </p:spPr>
-      </p:pic>
-      <p:pic>
-        <p:nvPicPr>
-          <p:cNvPr id="6" name="Picture 5">
-            <a:extLst>
-              <a:ext uri="{FF2B5EF4-FFF2-40B4-BE49-F238E27FC236}">
-                <a16:creationId xmlns:a16="http://schemas.microsoft.com/office/drawing/2014/main" id="{D3A83DB5-9EF9-7B06-C850-A3AA80E0C457}"/>
-              </a:ext>
-            </a:extLst>
-          </p:cNvPr>
-          <p:cNvPicPr>
-            <a:picLocks noChangeAspect="1"/>
-          </p:cNvPicPr>
-          <p:nvPr/>
-        </p:nvPicPr>
-        <p:blipFill>
-          <a:blip r:embed="rId3"/>
-          <a:stretch>
-            <a:fillRect/>
-          </a:stretch>
-        </p:blipFill>
-        <p:spPr>
-          <a:xfrm>
-            <a:off x="1990613" y="5377181"/>
-            <a:ext cx="10120705" cy="1480819"/>
-          </a:xfrm>
-          <a:prstGeom prst="rect">
-            <a:avLst/>
-          </a:prstGeom>
-        </p:spPr>
-      </p:pic>
+              <a:t>Gly ser metabolism</a:t>
+            </a:r>
+          </a:p>
+        </p:txBody>
+      </p:sp>
+      <p:sp>
+        <p:nvSpPr>
+          <p:cNvPr id="3" name="Content Placeholder 2">
+            <a:extLst>
+              <a:ext uri="{FF2B5EF4-FFF2-40B4-BE49-F238E27FC236}">
+                <a16:creationId xmlns:a16="http://schemas.microsoft.com/office/drawing/2014/main" id="{E6E6A899-67B6-266F-E825-3EC76F5B8304}"/>
+              </a:ext>
+            </a:extLst>
+          </p:cNvPr>
+          <p:cNvSpPr>
+            <a:spLocks noGrp="1"/>
+          </p:cNvSpPr>
+          <p:nvPr>
+            <p:ph idx="1"/>
+          </p:nvPr>
+        </p:nvSpPr>
+        <p:spPr/>
+        <p:txBody>
+          <a:bodyPr/>
+          <a:lstStyle/>
+          <a:p>
+            <a:endParaRPr lang="en-US"/>
+          </a:p>
+        </p:txBody>
+      </p:sp>
     </p:spTree>
     <p:extLst>
       <p:ext uri="{BB962C8B-B14F-4D97-AF65-F5344CB8AC3E}">
-        <p14:creationId xmlns:p14="http://schemas.microsoft.com/office/powerpoint/2010/main" val="3691130347"/>
+        <p14:creationId xmlns:p14="http://schemas.microsoft.com/office/powerpoint/2010/main" val="3218192869"/>
       </p:ext>
     </p:extLst>
   </p:cSld>
@@ -5988,7 +6318,7 @@
           <p:cNvPr id="2" name="Title 1">
             <a:extLst>
               <a:ext uri="{FF2B5EF4-FFF2-40B4-BE49-F238E27FC236}">
-                <a16:creationId xmlns:a16="http://schemas.microsoft.com/office/drawing/2014/main" id="{29BF9EB6-E5A0-73BE-2C20-F78514A6052F}"/>
+                <a16:creationId xmlns:a16="http://schemas.microsoft.com/office/drawing/2014/main" id="{5C4BDA5B-8091-AE66-FB05-A3181A9F0F64}"/>
               </a:ext>
             </a:extLst>
           </p:cNvPr>
@@ -5999,84 +6329,74 @@
             <p:ph type="title"/>
           </p:nvPr>
         </p:nvSpPr>
-        <p:spPr>
-          <a:xfrm>
-            <a:off x="656493" y="75414"/>
-            <a:ext cx="10515600" cy="458840"/>
-          </a:xfrm>
-        </p:spPr>
-        <p:txBody>
-          <a:bodyPr>
-            <a:normAutofit fontScale="90000"/>
-          </a:bodyPr>
-          <a:lstStyle/>
-          <a:p>
-            <a:r>
-              <a:rPr lang="en-US" sz="1800" dirty="0" err="1"/>
-              <a:t>xla</a:t>
-            </a:r>
-            <a:r>
-              <a:rPr lang="en-US" sz="1800" dirty="0"/>
-              <a:t>; Chlorpyrifos—; </a:t>
-            </a:r>
-            <a:r>
-              <a:rPr lang="en-US" sz="1800" dirty="0" err="1"/>
-              <a:t>xla</a:t>
-            </a:r>
-            <a:r>
-              <a:rPr lang="en-US" sz="1800" dirty="0"/>
-              <a:t>=</a:t>
-            </a:r>
-            <a:r>
-              <a:rPr lang="en-US" sz="1800" dirty="0" err="1"/>
-              <a:t>hsa</a:t>
-            </a:r>
-            <a:br>
-              <a:rPr lang="en-US" sz="1800" dirty="0"/>
-            </a:br>
-            <a:endParaRPr lang="en-US" sz="1800" dirty="0"/>
+        <p:spPr/>
+        <p:txBody>
+          <a:bodyPr/>
+          <a:lstStyle/>
+          <a:p>
+            <a:endParaRPr lang="en-US"/>
+          </a:p>
+        </p:txBody>
+      </p:sp>
+      <p:sp>
+        <p:nvSpPr>
+          <p:cNvPr id="3" name="Content Placeholder 2">
+            <a:extLst>
+              <a:ext uri="{FF2B5EF4-FFF2-40B4-BE49-F238E27FC236}">
+                <a16:creationId xmlns:a16="http://schemas.microsoft.com/office/drawing/2014/main" id="{9FDF5E98-9F75-8BE1-4305-E5C1A7BD2633}"/>
+              </a:ext>
+            </a:extLst>
+          </p:cNvPr>
+          <p:cNvSpPr>
+            <a:spLocks noGrp="1"/>
+          </p:cNvSpPr>
+          <p:nvPr>
+            <p:ph idx="1"/>
+          </p:nvPr>
+        </p:nvSpPr>
+        <p:spPr/>
+        <p:txBody>
+          <a:bodyPr/>
+          <a:lstStyle/>
+          <a:p>
+            <a:endParaRPr lang="en-US"/>
           </a:p>
         </p:txBody>
       </p:sp>
       <p:pic>
         <p:nvPicPr>
-          <p:cNvPr id="5" name="Content Placeholder 4">
-            <a:extLst>
-              <a:ext uri="{FF2B5EF4-FFF2-40B4-BE49-F238E27FC236}">
-                <a16:creationId xmlns:a16="http://schemas.microsoft.com/office/drawing/2014/main" id="{A7F5E34B-0BDA-F5BF-245A-CE566D6B237E}"/>
+          <p:cNvPr id="5" name="Picture 4">
+            <a:extLst>
+              <a:ext uri="{FF2B5EF4-FFF2-40B4-BE49-F238E27FC236}">
+                <a16:creationId xmlns:a16="http://schemas.microsoft.com/office/drawing/2014/main" id="{378D7449-A2E0-1A08-3148-D44C803FBE88}"/>
               </a:ext>
             </a:extLst>
           </p:cNvPr>
           <p:cNvPicPr>
-            <a:picLocks noGrp="1" noChangeAspect="1"/>
+            <a:picLocks noChangeAspect="1"/>
           </p:cNvPicPr>
-          <p:nvPr>
-            <p:ph idx="1"/>
-          </p:nvPr>
+          <p:nvPr/>
         </p:nvPicPr>
         <p:blipFill>
-          <a:blip r:embed="rId2">
-            <a:extLst>
-              <a:ext uri="{28A0092B-C50C-407E-A947-70E740481C1C}">
-                <a14:useLocalDpi xmlns:a14="http://schemas.microsoft.com/office/drawing/2010/main" val="0"/>
-              </a:ext>
-            </a:extLst>
-          </a:blip>
+          <a:blip r:embed="rId2"/>
           <a:stretch>
             <a:fillRect/>
           </a:stretch>
         </p:blipFill>
         <p:spPr>
           <a:xfrm>
-            <a:off x="4612193" y="-32348"/>
-            <a:ext cx="4973934" cy="7120506"/>
-          </a:xfrm>
+            <a:off x="85292" y="0"/>
+            <a:ext cx="12021415" cy="6858000"/>
+          </a:xfrm>
+          <a:prstGeom prst="rect">
+            <a:avLst/>
+          </a:prstGeom>
         </p:spPr>
       </p:pic>
     </p:spTree>
     <p:extLst>
       <p:ext uri="{BB962C8B-B14F-4D97-AF65-F5344CB8AC3E}">
-        <p14:creationId xmlns:p14="http://schemas.microsoft.com/office/powerpoint/2010/main" val="2555528081"/>
+        <p14:creationId xmlns:p14="http://schemas.microsoft.com/office/powerpoint/2010/main" val="2079991671"/>
       </p:ext>
     </p:extLst>
   </p:cSld>
@@ -6105,37 +6425,32 @@
       </p:grpSpPr>
       <p:pic>
         <p:nvPicPr>
-          <p:cNvPr id="5" name="Content Placeholder 4">
-            <a:extLst>
-              <a:ext uri="{FF2B5EF4-FFF2-40B4-BE49-F238E27FC236}">
-                <a16:creationId xmlns:a16="http://schemas.microsoft.com/office/drawing/2014/main" id="{05AC57BF-9037-B742-C389-A6B8FC66278C}"/>
+          <p:cNvPr id="6" name="Picture 5">
+            <a:extLst>
+              <a:ext uri="{FF2B5EF4-FFF2-40B4-BE49-F238E27FC236}">
+                <a16:creationId xmlns:a16="http://schemas.microsoft.com/office/drawing/2014/main" id="{9A20F6E2-847E-92EF-CFF4-EBA27A87D7FD}"/>
               </a:ext>
             </a:extLst>
           </p:cNvPr>
           <p:cNvPicPr>
-            <a:picLocks noGrp="1" noChangeAspect="1"/>
+            <a:picLocks noChangeAspect="1"/>
           </p:cNvPicPr>
-          <p:nvPr>
-            <p:ph idx="1"/>
-          </p:nvPr>
+          <p:nvPr/>
         </p:nvPicPr>
         <p:blipFill>
-          <a:blip r:embed="rId2">
-            <a:extLst>
-              <a:ext uri="{28A0092B-C50C-407E-A947-70E740481C1C}">
-                <a14:useLocalDpi xmlns:a14="http://schemas.microsoft.com/office/drawing/2010/main" val="0"/>
-              </a:ext>
-            </a:extLst>
-          </a:blip>
+          <a:blip r:embed="rId2"/>
           <a:stretch>
             <a:fillRect/>
           </a:stretch>
         </p:blipFill>
         <p:spPr>
           <a:xfrm>
-            <a:off x="2140299" y="0"/>
-            <a:ext cx="9646417" cy="5621905"/>
-          </a:xfrm>
+            <a:off x="4457103" y="0"/>
+            <a:ext cx="7734897" cy="6858000"/>
+          </a:xfrm>
+          <a:prstGeom prst="rect">
+            <a:avLst/>
+          </a:prstGeom>
         </p:spPr>
       </p:pic>
       <p:sp>
@@ -6143,7 +6458,7 @@
           <p:cNvPr id="2" name="Title 1">
             <a:extLst>
               <a:ext uri="{FF2B5EF4-FFF2-40B4-BE49-F238E27FC236}">
-                <a16:creationId xmlns:a16="http://schemas.microsoft.com/office/drawing/2014/main" id="{29BF9EB6-E5A0-73BE-2C20-F78514A6052F}"/>
+                <a16:creationId xmlns:a16="http://schemas.microsoft.com/office/drawing/2014/main" id="{F2992844-C348-ED8E-D093-9ABAE1B2BF35}"/>
               </a:ext>
             </a:extLst>
           </p:cNvPr>
@@ -6156,70 +6471,29 @@
         </p:nvSpPr>
         <p:spPr>
           <a:xfrm>
-            <a:off x="127122" y="75414"/>
-            <a:ext cx="10515600" cy="1291162"/>
+            <a:off x="4280598" y="80387"/>
+            <a:ext cx="5627077" cy="827908"/>
           </a:xfrm>
         </p:spPr>
         <p:txBody>
           <a:bodyPr>
-            <a:normAutofit fontScale="90000"/>
+            <a:normAutofit/>
           </a:bodyPr>
           <a:lstStyle/>
           <a:p>
             <a:r>
-              <a:rPr lang="en-US" sz="1800" dirty="0" err="1"/>
-              <a:t>xla</a:t>
-            </a:r>
-            <a:r>
-              <a:rPr lang="en-US" sz="1800" dirty="0"/>
-              <a:t>; Chlorpyrifos—</a:t>
-            </a:r>
-            <a:br>
-              <a:rPr lang="en-US" sz="1800" dirty="0"/>
-            </a:br>
-            <a:r>
-              <a:rPr lang="en-US" sz="1800" dirty="0" err="1"/>
-              <a:t>Proponoate</a:t>
-            </a:r>
-            <a:r>
-              <a:rPr lang="en-US" sz="1800" dirty="0"/>
-              <a:t> metabolism</a:t>
-            </a:r>
-            <a:br>
-              <a:rPr lang="en-US" sz="1800" dirty="0"/>
-            </a:br>
-            <a:r>
-              <a:rPr lang="en-US" sz="1800" dirty="0"/>
-              <a:t>(Gluconeogenesis); </a:t>
-            </a:r>
-            <a:br>
-              <a:rPr lang="en-US" sz="1800" dirty="0"/>
-            </a:br>
-            <a:r>
-              <a:rPr lang="en-US" sz="1800" dirty="0" err="1"/>
-              <a:t>xla</a:t>
-            </a:r>
-            <a:r>
-              <a:rPr lang="en-US" sz="1800" dirty="0"/>
-              <a:t>=</a:t>
-            </a:r>
-            <a:r>
-              <a:rPr lang="en-US" sz="1800" dirty="0" err="1"/>
-              <a:t>hsa</a:t>
-            </a:r>
-            <a:br>
-              <a:rPr lang="en-US" sz="1800" dirty="0"/>
-            </a:br>
-            <a:endParaRPr lang="en-US" sz="1800" dirty="0"/>
+              <a:rPr lang="en-US" dirty="0"/>
+              <a:t>Gly Ser Metabolism</a:t>
+            </a:r>
           </a:p>
         </p:txBody>
       </p:sp>
       <p:pic>
         <p:nvPicPr>
-          <p:cNvPr id="7" name="Picture 6">
-            <a:extLst>
-              <a:ext uri="{FF2B5EF4-FFF2-40B4-BE49-F238E27FC236}">
-                <a16:creationId xmlns:a16="http://schemas.microsoft.com/office/drawing/2014/main" id="{B681C31C-3675-816B-7694-6E40D9D0B2BC}"/>
+          <p:cNvPr id="3" name="Picture 2">
+            <a:extLst>
+              <a:ext uri="{FF2B5EF4-FFF2-40B4-BE49-F238E27FC236}">
+                <a16:creationId xmlns:a16="http://schemas.microsoft.com/office/drawing/2014/main" id="{3CCD611F-24A8-177E-E074-F2E7A61949E2}"/>
               </a:ext>
             </a:extLst>
           </p:cNvPr>
@@ -6236,18 +6510,65 @@
         </p:blipFill>
         <p:spPr>
           <a:xfrm>
-            <a:off x="127122" y="5331211"/>
-            <a:ext cx="8303445" cy="1526789"/>
-          </a:xfrm>
-          <a:prstGeom prst="rect">
-            <a:avLst/>
-          </a:prstGeom>
+            <a:off x="0" y="2592474"/>
+            <a:ext cx="4682125" cy="4185139"/>
+          </a:xfrm>
+          <a:prstGeom prst="rect">
+            <a:avLst/>
+          </a:prstGeom>
+        </p:spPr>
+      </p:pic>
+      <p:pic>
+        <p:nvPicPr>
+          <p:cNvPr id="1026" name="Picture 2">
+            <a:extLst>
+              <a:ext uri="{FF2B5EF4-FFF2-40B4-BE49-F238E27FC236}">
+                <a16:creationId xmlns:a16="http://schemas.microsoft.com/office/drawing/2014/main" id="{2EB94BEA-9B71-2CCD-AAA5-014BEB08004E}"/>
+              </a:ext>
+            </a:extLst>
+          </p:cNvPr>
+          <p:cNvPicPr>
+            <a:picLocks noChangeAspect="1" noChangeArrowheads="1"/>
+          </p:cNvPicPr>
+          <p:nvPr/>
+        </p:nvPicPr>
+        <p:blipFill>
+          <a:blip r:embed="rId4">
+            <a:extLst>
+              <a:ext uri="{28A0092B-C50C-407E-A947-70E740481C1C}">
+                <a14:useLocalDpi xmlns:a14="http://schemas.microsoft.com/office/drawing/2010/main" val="0"/>
+              </a:ext>
+            </a:extLst>
+          </a:blip>
+          <a:srcRect/>
+          <a:stretch>
+            <a:fillRect/>
+          </a:stretch>
+        </p:blipFill>
+        <p:spPr bwMode="auto">
+          <a:xfrm>
+            <a:off x="296384" y="80387"/>
+            <a:ext cx="3705000" cy="2392813"/>
+          </a:xfrm>
+          <a:prstGeom prst="rect">
+            <a:avLst/>
+          </a:prstGeom>
+          <a:noFill/>
+          <a:extLst>
+            <a:ext uri="{909E8E84-426E-40DD-AFC4-6F175D3DCCD1}">
+              <a14:hiddenFill xmlns:a14="http://schemas.microsoft.com/office/drawing/2010/main">
+                <a:solidFill>
+                  <a:srgbClr val="FFFFFF"/>
+                </a:solidFill>
+              </a14:hiddenFill>
+            </a:ext>
+          </a:extLst>
         </p:spPr>
       </p:pic>
     </p:spTree>
     <p:extLst>
       <p:ext uri="{BB962C8B-B14F-4D97-AF65-F5344CB8AC3E}">
-        <p14:creationId xmlns:p14="http://schemas.microsoft.com/office/powerpoint/2010/main" val="2968135174"/>
+        <p14:creationId xmlns:p14="http://schemas.microsoft.com/office/powerpoint/2010/main" val="1176159520"/>
       </p:ext>
     </p:extLst>
   </p:cSld>
@@ -6279,7 +6600,7 @@
           <p:cNvPr id="2" name="Title 1">
             <a:extLst>
               <a:ext uri="{FF2B5EF4-FFF2-40B4-BE49-F238E27FC236}">
-                <a16:creationId xmlns:a16="http://schemas.microsoft.com/office/drawing/2014/main" id="{29BF9EB6-E5A0-73BE-2C20-F78514A6052F}"/>
+                <a16:creationId xmlns:a16="http://schemas.microsoft.com/office/drawing/2014/main" id="{7B26F652-13DF-A803-B009-7D80633B8F5C}"/>
               </a:ext>
             </a:extLst>
           </p:cNvPr>
@@ -6290,92 +6611,47 @@
             <p:ph type="title"/>
           </p:nvPr>
         </p:nvSpPr>
-        <p:spPr>
-          <a:xfrm>
-            <a:off x="93785" y="105559"/>
-            <a:ext cx="10515600" cy="458840"/>
-          </a:xfrm>
-        </p:spPr>
-        <p:txBody>
-          <a:bodyPr>
-            <a:normAutofit fontScale="90000"/>
-          </a:bodyPr>
-          <a:lstStyle/>
-          <a:p>
-            <a:r>
-              <a:rPr lang="en-US" sz="1800" dirty="0" err="1"/>
-              <a:t>xla</a:t>
-            </a:r>
-            <a:r>
-              <a:rPr lang="en-US" sz="1800" dirty="0"/>
-              <a:t>; Chlorpyrifos—Glycine, serine, and threonine </a:t>
-            </a:r>
-            <a:br>
-              <a:rPr lang="en-US" sz="1800" dirty="0"/>
-            </a:br>
-            <a:r>
-              <a:rPr lang="en-US" sz="1800" dirty="0"/>
-              <a:t>metabolism; </a:t>
-            </a:r>
-            <a:r>
-              <a:rPr lang="en-US" sz="1800" dirty="0" err="1"/>
-              <a:t>xla</a:t>
-            </a:r>
-            <a:r>
-              <a:rPr lang="en-US" sz="1800" dirty="0"/>
-              <a:t>=</a:t>
-            </a:r>
-            <a:r>
-              <a:rPr lang="en-US" sz="1800" dirty="0" err="1"/>
-              <a:t>hsa</a:t>
-            </a:r>
-            <a:br>
-              <a:rPr lang="en-US" sz="1800" dirty="0"/>
-            </a:br>
-            <a:endParaRPr lang="en-US" sz="1800" dirty="0"/>
-          </a:p>
-        </p:txBody>
-      </p:sp>
-      <p:pic>
-        <p:nvPicPr>
-          <p:cNvPr id="8" name="Picture 7">
-            <a:extLst>
-              <a:ext uri="{FF2B5EF4-FFF2-40B4-BE49-F238E27FC236}">
-                <a16:creationId xmlns:a16="http://schemas.microsoft.com/office/drawing/2014/main" id="{A544669F-7781-0BF5-794E-100057A1305B}"/>
-              </a:ext>
-            </a:extLst>
-          </p:cNvPr>
-          <p:cNvPicPr>
-            <a:picLocks noChangeAspect="1"/>
-          </p:cNvPicPr>
-          <p:nvPr/>
-        </p:nvPicPr>
-        <p:blipFill>
-          <a:blip r:embed="rId2">
-            <a:extLst>
-              <a:ext uri="{28A0092B-C50C-407E-A947-70E740481C1C}">
-                <a14:useLocalDpi xmlns:a14="http://schemas.microsoft.com/office/drawing/2010/main" val="0"/>
-              </a:ext>
-            </a:extLst>
-          </a:blip>
-          <a:stretch>
-            <a:fillRect/>
-          </a:stretch>
-        </p:blipFill>
-        <p:spPr>
-          <a:xfrm>
-            <a:off x="4376521" y="-123378"/>
-            <a:ext cx="7721694" cy="7104755"/>
-          </a:xfrm>
-          <a:prstGeom prst="rect">
-            <a:avLst/>
-          </a:prstGeom>
-        </p:spPr>
-      </p:pic>
+        <p:spPr/>
+        <p:txBody>
+          <a:bodyPr/>
+          <a:lstStyle/>
+          <a:p>
+            <a:r>
+              <a:rPr lang="en-US" dirty="0"/>
+              <a:t>Glu metabolism</a:t>
+            </a:r>
+          </a:p>
+        </p:txBody>
+      </p:sp>
+      <p:sp>
+        <p:nvSpPr>
+          <p:cNvPr id="3" name="Content Placeholder 2">
+            <a:extLst>
+              <a:ext uri="{FF2B5EF4-FFF2-40B4-BE49-F238E27FC236}">
+                <a16:creationId xmlns:a16="http://schemas.microsoft.com/office/drawing/2014/main" id="{A66CA847-9B96-1DE1-AA71-E14DD4072CD6}"/>
+              </a:ext>
+            </a:extLst>
+          </p:cNvPr>
+          <p:cNvSpPr>
+            <a:spLocks noGrp="1"/>
+          </p:cNvSpPr>
+          <p:nvPr>
+            <p:ph idx="1"/>
+          </p:nvPr>
+        </p:nvSpPr>
+        <p:spPr/>
+        <p:txBody>
+          <a:bodyPr/>
+          <a:lstStyle/>
+          <a:p>
+            <a:endParaRPr lang="en-US"/>
+          </a:p>
+        </p:txBody>
+      </p:sp>
     </p:spTree>
     <p:extLst>
       <p:ext uri="{BB962C8B-B14F-4D97-AF65-F5344CB8AC3E}">
-        <p14:creationId xmlns:p14="http://schemas.microsoft.com/office/powerpoint/2010/main" val="16467550"/>
+        <p14:creationId xmlns:p14="http://schemas.microsoft.com/office/powerpoint/2010/main" val="1443005748"/>
       </p:ext>
     </p:extLst>
   </p:cSld>
@@ -6407,7 +6683,7 @@
           <p:cNvPr id="2" name="Title 1">
             <a:extLst>
               <a:ext uri="{FF2B5EF4-FFF2-40B4-BE49-F238E27FC236}">
-                <a16:creationId xmlns:a16="http://schemas.microsoft.com/office/drawing/2014/main" id="{29BF9EB6-E5A0-73BE-2C20-F78514A6052F}"/>
+                <a16:creationId xmlns:a16="http://schemas.microsoft.com/office/drawing/2014/main" id="{AB57C188-E4D0-7918-28C9-636BB27C30AA}"/>
               </a:ext>
             </a:extLst>
           </p:cNvPr>
@@ -6418,84 +6694,44 @@
             <p:ph type="title"/>
           </p:nvPr>
         </p:nvSpPr>
-        <p:spPr>
-          <a:xfrm>
-            <a:off x="656493" y="75414"/>
-            <a:ext cx="10515600" cy="458840"/>
-          </a:xfrm>
-        </p:spPr>
-        <p:txBody>
-          <a:bodyPr>
-            <a:normAutofit fontScale="90000"/>
-          </a:bodyPr>
-          <a:lstStyle/>
-          <a:p>
-            <a:r>
-              <a:rPr lang="en-US" sz="1800" dirty="0" err="1"/>
-              <a:t>xla</a:t>
-            </a:r>
-            <a:r>
-              <a:rPr lang="en-US" sz="1800" dirty="0"/>
-              <a:t>; Chlorpyrifos—Glucose alanine cycle; </a:t>
-            </a:r>
-            <a:r>
-              <a:rPr lang="en-US" sz="1800" dirty="0" err="1"/>
-              <a:t>xla</a:t>
-            </a:r>
-            <a:r>
-              <a:rPr lang="en-US" sz="1800" dirty="0"/>
-              <a:t>=</a:t>
-            </a:r>
-            <a:r>
-              <a:rPr lang="en-US" sz="1800" dirty="0" err="1"/>
-              <a:t>hsa</a:t>
-            </a:r>
-            <a:br>
-              <a:rPr lang="en-US" sz="1800" dirty="0"/>
-            </a:br>
-            <a:endParaRPr lang="en-US" sz="1800" dirty="0"/>
-          </a:p>
-        </p:txBody>
-      </p:sp>
-      <p:pic>
-        <p:nvPicPr>
-          <p:cNvPr id="5" name="Content Placeholder 4">
-            <a:extLst>
-              <a:ext uri="{FF2B5EF4-FFF2-40B4-BE49-F238E27FC236}">
-                <a16:creationId xmlns:a16="http://schemas.microsoft.com/office/drawing/2014/main" id="{F47F66D7-16CA-9DE2-6523-04A3029BE9F9}"/>
-              </a:ext>
-            </a:extLst>
-          </p:cNvPr>
-          <p:cNvPicPr>
-            <a:picLocks noGrp="1" noChangeAspect="1"/>
-          </p:cNvPicPr>
+        <p:spPr/>
+        <p:txBody>
+          <a:bodyPr/>
+          <a:lstStyle/>
+          <a:p>
+            <a:endParaRPr lang="en-US"/>
+          </a:p>
+        </p:txBody>
+      </p:sp>
+      <p:sp>
+        <p:nvSpPr>
+          <p:cNvPr id="3" name="Content Placeholder 2">
+            <a:extLst>
+              <a:ext uri="{FF2B5EF4-FFF2-40B4-BE49-F238E27FC236}">
+                <a16:creationId xmlns:a16="http://schemas.microsoft.com/office/drawing/2014/main" id="{090CE8FE-8E73-E981-E13B-1B5844622510}"/>
+              </a:ext>
+            </a:extLst>
+          </p:cNvPr>
+          <p:cNvSpPr>
+            <a:spLocks noGrp="1"/>
+          </p:cNvSpPr>
           <p:nvPr>
             <p:ph idx="1"/>
           </p:nvPr>
-        </p:nvPicPr>
-        <p:blipFill>
-          <a:blip r:embed="rId2">
-            <a:extLst>
-              <a:ext uri="{28A0092B-C50C-407E-A947-70E740481C1C}">
-                <a14:useLocalDpi xmlns:a14="http://schemas.microsoft.com/office/drawing/2010/main" val="0"/>
-              </a:ext>
-            </a:extLst>
-          </a:blip>
-          <a:stretch>
-            <a:fillRect/>
-          </a:stretch>
-        </p:blipFill>
-        <p:spPr>
-          <a:xfrm>
-            <a:off x="2471895" y="286812"/>
-            <a:ext cx="7596553" cy="6794252"/>
-          </a:xfrm>
-        </p:spPr>
-      </p:pic>
+        </p:nvSpPr>
+        <p:spPr/>
+        <p:txBody>
+          <a:bodyPr/>
+          <a:lstStyle/>
+          <a:p>
+            <a:endParaRPr lang="en-US"/>
+          </a:p>
+        </p:txBody>
+      </p:sp>
     </p:spTree>
     <p:extLst>
       <p:ext uri="{BB962C8B-B14F-4D97-AF65-F5344CB8AC3E}">
-        <p14:creationId xmlns:p14="http://schemas.microsoft.com/office/powerpoint/2010/main" val="3269587091"/>
+        <p14:creationId xmlns:p14="http://schemas.microsoft.com/office/powerpoint/2010/main" val="1039833111"/>
       </p:ext>
     </p:extLst>
   </p:cSld>
@@ -6527,7 +6763,7 @@
           <p:cNvPr id="2" name="Title 1">
             <a:extLst>
               <a:ext uri="{FF2B5EF4-FFF2-40B4-BE49-F238E27FC236}">
-                <a16:creationId xmlns:a16="http://schemas.microsoft.com/office/drawing/2014/main" id="{29BF9EB6-E5A0-73BE-2C20-F78514A6052F}"/>
+                <a16:creationId xmlns:a16="http://schemas.microsoft.com/office/drawing/2014/main" id="{F2992844-C348-ED8E-D093-9ABAE1B2BF35}"/>
               </a:ext>
             </a:extLst>
           </p:cNvPr>
@@ -6540,72 +6776,87 @@
         </p:nvSpPr>
         <p:spPr>
           <a:xfrm>
-            <a:off x="656493" y="75414"/>
-            <a:ext cx="10515600" cy="458840"/>
+            <a:off x="347435" y="0"/>
+            <a:ext cx="4883498" cy="1325563"/>
           </a:xfrm>
         </p:spPr>
         <p:txBody>
           <a:bodyPr>
-            <a:normAutofit fontScale="90000"/>
+            <a:normAutofit/>
           </a:bodyPr>
           <a:lstStyle/>
           <a:p>
             <a:r>
-              <a:rPr lang="en-US" sz="1800" dirty="0" err="1"/>
-              <a:t>xla</a:t>
-            </a:r>
-            <a:r>
-              <a:rPr lang="en-US" sz="1800" dirty="0"/>
-              <a:t>; 24D—; </a:t>
-            </a:r>
-            <a:r>
-              <a:rPr lang="en-US" sz="1800" dirty="0" err="1"/>
-              <a:t>xla</a:t>
-            </a:r>
-            <a:r>
-              <a:rPr lang="en-US" sz="1800" dirty="0"/>
-              <a:t>=</a:t>
-            </a:r>
-            <a:r>
-              <a:rPr lang="en-US" sz="1800" dirty="0" err="1"/>
-              <a:t>hsa</a:t>
-            </a:r>
-            <a:br>
-              <a:rPr lang="en-US" sz="1800" dirty="0"/>
-            </a:br>
-            <a:endParaRPr lang="en-US" sz="1800" dirty="0"/>
-          </a:p>
-        </p:txBody>
-      </p:sp>
-      <p:sp>
-        <p:nvSpPr>
-          <p:cNvPr id="4" name="Content Placeholder 3">
-            <a:extLst>
-              <a:ext uri="{FF2B5EF4-FFF2-40B4-BE49-F238E27FC236}">
-                <a16:creationId xmlns:a16="http://schemas.microsoft.com/office/drawing/2014/main" id="{36394FF9-9274-D0E9-D3CD-A32446AEAA75}"/>
-              </a:ext>
-            </a:extLst>
-          </p:cNvPr>
-          <p:cNvSpPr>
-            <a:spLocks noGrp="1"/>
-          </p:cNvSpPr>
-          <p:nvPr>
-            <p:ph idx="1"/>
-          </p:nvPr>
-        </p:nvSpPr>
-        <p:spPr/>
-        <p:txBody>
-          <a:bodyPr/>
-          <a:lstStyle/>
-          <a:p>
-            <a:endParaRPr lang="en-US"/>
-          </a:p>
-        </p:txBody>
-      </p:sp>
+              <a:rPr lang="en-US" dirty="0"/>
+              <a:t>Glu metabolism</a:t>
+            </a:r>
+          </a:p>
+        </p:txBody>
+      </p:sp>
+      <p:pic>
+        <p:nvPicPr>
+          <p:cNvPr id="4" name="Picture 3">
+            <a:extLst>
+              <a:ext uri="{FF2B5EF4-FFF2-40B4-BE49-F238E27FC236}">
+                <a16:creationId xmlns:a16="http://schemas.microsoft.com/office/drawing/2014/main" id="{2EC6305B-307E-8F19-1FD8-AC208FA7BC1D}"/>
+              </a:ext>
+            </a:extLst>
+          </p:cNvPr>
+          <p:cNvPicPr>
+            <a:picLocks noChangeAspect="1"/>
+          </p:cNvPicPr>
+          <p:nvPr/>
+        </p:nvPicPr>
+        <p:blipFill>
+          <a:blip r:embed="rId2"/>
+          <a:stretch>
+            <a:fillRect/>
+          </a:stretch>
+        </p:blipFill>
+        <p:spPr>
+          <a:xfrm>
+            <a:off x="80387" y="2150346"/>
+            <a:ext cx="5016149" cy="4577025"/>
+          </a:xfrm>
+          <a:prstGeom prst="rect">
+            <a:avLst/>
+          </a:prstGeom>
+        </p:spPr>
+      </p:pic>
+      <p:pic>
+        <p:nvPicPr>
+          <p:cNvPr id="6" name="Picture 5">
+            <a:extLst>
+              <a:ext uri="{FF2B5EF4-FFF2-40B4-BE49-F238E27FC236}">
+                <a16:creationId xmlns:a16="http://schemas.microsoft.com/office/drawing/2014/main" id="{128E1FEB-74CA-0A13-CE7F-1F51F09DEED0}"/>
+              </a:ext>
+            </a:extLst>
+          </p:cNvPr>
+          <p:cNvPicPr>
+            <a:picLocks noChangeAspect="1"/>
+          </p:cNvPicPr>
+          <p:nvPr/>
+        </p:nvPicPr>
+        <p:blipFill>
+          <a:blip r:embed="rId3"/>
+          <a:stretch>
+            <a:fillRect/>
+          </a:stretch>
+        </p:blipFill>
+        <p:spPr>
+          <a:xfrm>
+            <a:off x="5230933" y="874207"/>
+            <a:ext cx="6521344" cy="5983793"/>
+          </a:xfrm>
+          <a:prstGeom prst="rect">
+            <a:avLst/>
+          </a:prstGeom>
+        </p:spPr>
+      </p:pic>
     </p:spTree>
     <p:extLst>
       <p:ext uri="{BB962C8B-B14F-4D97-AF65-F5344CB8AC3E}">
-        <p14:creationId xmlns:p14="http://schemas.microsoft.com/office/powerpoint/2010/main" val="3199991795"/>
+        <p14:creationId xmlns:p14="http://schemas.microsoft.com/office/powerpoint/2010/main" val="1003902108"/>
       </p:ext>
     </p:extLst>
   </p:cSld>
@@ -6646,7 +6897,7 @@
         </p:nvSpPr>
         <p:spPr>
           <a:xfrm>
-            <a:off x="1176817" y="4797436"/>
+            <a:off x="1176817" y="5481312"/>
             <a:ext cx="9155875" cy="923330"/>
           </a:xfrm>
           <a:prstGeom prst="rect">
@@ -6689,7 +6940,7 @@
         </p:blipFill>
         <p:spPr>
           <a:xfrm>
-            <a:off x="2681519" y="246374"/>
+            <a:off x="2681519" y="930250"/>
             <a:ext cx="7073314" cy="1209563"/>
           </a:xfrm>
           <a:prstGeom prst="rect">
@@ -6719,7 +6970,7 @@
         </p:blipFill>
         <p:spPr>
           <a:xfrm>
-            <a:off x="2681519" y="1746488"/>
+            <a:off x="2681519" y="2430364"/>
             <a:ext cx="7301028" cy="1280882"/>
           </a:xfrm>
           <a:prstGeom prst="rect">
@@ -6749,7 +7000,7 @@
         </p:blipFill>
         <p:spPr>
           <a:xfrm>
-            <a:off x="2777795" y="3317921"/>
+            <a:off x="2777795" y="4001797"/>
             <a:ext cx="7323290" cy="1049798"/>
           </a:xfrm>
           <a:prstGeom prst="rect">
@@ -6757,6 +7008,41 @@
           </a:prstGeom>
         </p:spPr>
       </p:pic>
+      <p:sp>
+        <p:nvSpPr>
+          <p:cNvPr id="2" name="TextBox 1">
+            <a:extLst>
+              <a:ext uri="{FF2B5EF4-FFF2-40B4-BE49-F238E27FC236}">
+                <a16:creationId xmlns:a16="http://schemas.microsoft.com/office/drawing/2014/main" id="{5EDD49BC-554A-F4D4-5C9D-F9AB960FAC88}"/>
+              </a:ext>
+            </a:extLst>
+          </p:cNvPr>
+          <p:cNvSpPr txBox="1"/>
+          <p:nvPr/>
+        </p:nvSpPr>
+        <p:spPr>
+          <a:xfrm>
+            <a:off x="1759644" y="230521"/>
+            <a:ext cx="8573048" cy="369332"/>
+          </a:xfrm>
+          <a:prstGeom prst="rect">
+            <a:avLst/>
+          </a:prstGeom>
+          <a:noFill/>
+        </p:spPr>
+        <p:txBody>
+          <a:bodyPr wrap="square" rtlCol="0">
+            <a:spAutoFit/>
+          </a:bodyPr>
+          <a:lstStyle/>
+          <a:p>
+            <a:r>
+              <a:rPr lang="en-US" dirty="0"/>
+              <a:t>Summary stats for glutathione and acetylcholinesterase (all data)</a:t>
+            </a:r>
+          </a:p>
+        </p:txBody>
+      </p:sp>
     </p:spTree>
     <p:extLst>
       <p:ext uri="{BB962C8B-B14F-4D97-AF65-F5344CB8AC3E}">
@@ -6792,7 +7078,7 @@
           <p:cNvPr id="2" name="Title 1">
             <a:extLst>
               <a:ext uri="{FF2B5EF4-FFF2-40B4-BE49-F238E27FC236}">
-                <a16:creationId xmlns:a16="http://schemas.microsoft.com/office/drawing/2014/main" id="{29BF9EB6-E5A0-73BE-2C20-F78514A6052F}"/>
+                <a16:creationId xmlns:a16="http://schemas.microsoft.com/office/drawing/2014/main" id="{05853105-3E4B-AAF9-0B6D-466A59E81272}"/>
               </a:ext>
             </a:extLst>
           </p:cNvPr>
@@ -6803,51 +7089,24 @@
             <p:ph type="title"/>
           </p:nvPr>
         </p:nvSpPr>
-        <p:spPr>
-          <a:xfrm>
-            <a:off x="656493" y="75414"/>
-            <a:ext cx="10515600" cy="458840"/>
-          </a:xfrm>
-        </p:spPr>
-        <p:txBody>
-          <a:bodyPr>
-            <a:normAutofit fontScale="90000"/>
-          </a:bodyPr>
-          <a:lstStyle/>
-          <a:p>
-            <a:r>
-              <a:rPr lang="en-US" sz="1800" dirty="0" err="1"/>
-              <a:t>xla</a:t>
-            </a:r>
-            <a:r>
-              <a:rPr lang="en-US" sz="1800" dirty="0"/>
-              <a:t>; 24D—; </a:t>
-            </a:r>
-            <a:r>
-              <a:rPr lang="en-US" sz="1800" dirty="0" err="1"/>
-              <a:t>xla</a:t>
-            </a:r>
-            <a:r>
-              <a:rPr lang="en-US" sz="1800" dirty="0"/>
-              <a:t>=</a:t>
-            </a:r>
-            <a:r>
-              <a:rPr lang="en-US" sz="1800" dirty="0" err="1"/>
-              <a:t>hsa</a:t>
-            </a:r>
-            <a:br>
-              <a:rPr lang="en-US" sz="1800" dirty="0"/>
-            </a:br>
-            <a:endParaRPr lang="en-US" sz="1800" dirty="0"/>
-          </a:p>
-        </p:txBody>
-      </p:sp>
-      <p:sp>
-        <p:nvSpPr>
-          <p:cNvPr id="4" name="Content Placeholder 3">
-            <a:extLst>
-              <a:ext uri="{FF2B5EF4-FFF2-40B4-BE49-F238E27FC236}">
-                <a16:creationId xmlns:a16="http://schemas.microsoft.com/office/drawing/2014/main" id="{36394FF9-9274-D0E9-D3CD-A32446AEAA75}"/>
+        <p:spPr/>
+        <p:txBody>
+          <a:bodyPr/>
+          <a:lstStyle/>
+          <a:p>
+            <a:r>
+              <a:rPr lang="en-US" dirty="0"/>
+              <a:t>Gluconeogenesis</a:t>
+            </a:r>
+          </a:p>
+        </p:txBody>
+      </p:sp>
+      <p:sp>
+        <p:nvSpPr>
+          <p:cNvPr id="3" name="Content Placeholder 2">
+            <a:extLst>
+              <a:ext uri="{FF2B5EF4-FFF2-40B4-BE49-F238E27FC236}">
+                <a16:creationId xmlns:a16="http://schemas.microsoft.com/office/drawing/2014/main" id="{ACEA394A-B01C-13E7-AE28-580FC3FACEC4}"/>
               </a:ext>
             </a:extLst>
           </p:cNvPr>
@@ -6870,7 +7129,7 @@
     </p:spTree>
     <p:extLst>
       <p:ext uri="{BB962C8B-B14F-4D97-AF65-F5344CB8AC3E}">
-        <p14:creationId xmlns:p14="http://schemas.microsoft.com/office/powerpoint/2010/main" val="877039883"/>
+        <p14:creationId xmlns:p14="http://schemas.microsoft.com/office/powerpoint/2010/main" val="3579468811"/>
       </p:ext>
     </p:extLst>
   </p:cSld>
@@ -6902,7 +7161,7 @@
           <p:cNvPr id="2" name="Title 1">
             <a:extLst>
               <a:ext uri="{FF2B5EF4-FFF2-40B4-BE49-F238E27FC236}">
-                <a16:creationId xmlns:a16="http://schemas.microsoft.com/office/drawing/2014/main" id="{29BF9EB6-E5A0-73BE-2C20-F78514A6052F}"/>
+                <a16:creationId xmlns:a16="http://schemas.microsoft.com/office/drawing/2014/main" id="{F2992844-C348-ED8E-D093-9ABAE1B2BF35}"/>
               </a:ext>
             </a:extLst>
           </p:cNvPr>
@@ -6915,72 +7174,87 @@
         </p:nvSpPr>
         <p:spPr>
           <a:xfrm>
-            <a:off x="656493" y="75414"/>
-            <a:ext cx="10515600" cy="458840"/>
+            <a:off x="261258" y="86493"/>
+            <a:ext cx="4360984" cy="1325563"/>
           </a:xfrm>
         </p:spPr>
         <p:txBody>
           <a:bodyPr>
-            <a:normAutofit fontScale="90000"/>
+            <a:normAutofit/>
           </a:bodyPr>
           <a:lstStyle/>
           <a:p>
             <a:r>
-              <a:rPr lang="en-US" sz="1800" dirty="0" err="1"/>
-              <a:t>xla</a:t>
-            </a:r>
-            <a:r>
-              <a:rPr lang="en-US" sz="1800" dirty="0"/>
-              <a:t>; 24D—; </a:t>
-            </a:r>
-            <a:r>
-              <a:rPr lang="en-US" sz="1800" dirty="0" err="1"/>
-              <a:t>xla</a:t>
-            </a:r>
-            <a:r>
-              <a:rPr lang="en-US" sz="1800" dirty="0"/>
-              <a:t>=</a:t>
-            </a:r>
-            <a:r>
-              <a:rPr lang="en-US" sz="1800" dirty="0" err="1"/>
-              <a:t>hsa</a:t>
-            </a:r>
-            <a:br>
-              <a:rPr lang="en-US" sz="1800" dirty="0"/>
-            </a:br>
-            <a:endParaRPr lang="en-US" sz="1800" dirty="0"/>
-          </a:p>
-        </p:txBody>
-      </p:sp>
-      <p:sp>
-        <p:nvSpPr>
-          <p:cNvPr id="4" name="Content Placeholder 3">
-            <a:extLst>
-              <a:ext uri="{FF2B5EF4-FFF2-40B4-BE49-F238E27FC236}">
-                <a16:creationId xmlns:a16="http://schemas.microsoft.com/office/drawing/2014/main" id="{36394FF9-9274-D0E9-D3CD-A32446AEAA75}"/>
-              </a:ext>
-            </a:extLst>
-          </p:cNvPr>
-          <p:cNvSpPr>
-            <a:spLocks noGrp="1"/>
-          </p:cNvSpPr>
-          <p:nvPr>
-            <p:ph idx="1"/>
-          </p:nvPr>
-        </p:nvSpPr>
-        <p:spPr/>
-        <p:txBody>
-          <a:bodyPr/>
-          <a:lstStyle/>
-          <a:p>
-            <a:endParaRPr lang="en-US"/>
-          </a:p>
-        </p:txBody>
-      </p:sp>
+              <a:rPr lang="en-US" dirty="0"/>
+              <a:t>Gluconeogenesis</a:t>
+            </a:r>
+          </a:p>
+        </p:txBody>
+      </p:sp>
+      <p:pic>
+        <p:nvPicPr>
+          <p:cNvPr id="4" name="Picture 3">
+            <a:extLst>
+              <a:ext uri="{FF2B5EF4-FFF2-40B4-BE49-F238E27FC236}">
+                <a16:creationId xmlns:a16="http://schemas.microsoft.com/office/drawing/2014/main" id="{E581B02E-B3EF-0FCD-B498-D6682A34A968}"/>
+              </a:ext>
+            </a:extLst>
+          </p:cNvPr>
+          <p:cNvPicPr>
+            <a:picLocks noChangeAspect="1"/>
+          </p:cNvPicPr>
+          <p:nvPr/>
+        </p:nvPicPr>
+        <p:blipFill>
+          <a:blip r:embed="rId2"/>
+          <a:stretch>
+            <a:fillRect/>
+          </a:stretch>
+        </p:blipFill>
+        <p:spPr>
+          <a:xfrm>
+            <a:off x="0" y="1989574"/>
+            <a:ext cx="5260385" cy="4597119"/>
+          </a:xfrm>
+          <a:prstGeom prst="rect">
+            <a:avLst/>
+          </a:prstGeom>
+        </p:spPr>
+      </p:pic>
+      <p:pic>
+        <p:nvPicPr>
+          <p:cNvPr id="6" name="Picture 5">
+            <a:extLst>
+              <a:ext uri="{FF2B5EF4-FFF2-40B4-BE49-F238E27FC236}">
+                <a16:creationId xmlns:a16="http://schemas.microsoft.com/office/drawing/2014/main" id="{61807715-DE3A-15A8-3FA7-1C8B15F80413}"/>
+              </a:ext>
+            </a:extLst>
+          </p:cNvPr>
+          <p:cNvPicPr>
+            <a:picLocks noChangeAspect="1"/>
+          </p:cNvPicPr>
+          <p:nvPr/>
+        </p:nvPicPr>
+        <p:blipFill>
+          <a:blip r:embed="rId3"/>
+          <a:stretch>
+            <a:fillRect/>
+          </a:stretch>
+        </p:blipFill>
+        <p:spPr>
+          <a:xfrm>
+            <a:off x="5064369" y="429436"/>
+            <a:ext cx="7015441" cy="6291742"/>
+          </a:xfrm>
+          <a:prstGeom prst="rect">
+            <a:avLst/>
+          </a:prstGeom>
+        </p:spPr>
+      </p:pic>
     </p:spTree>
     <p:extLst>
       <p:ext uri="{BB962C8B-B14F-4D97-AF65-F5344CB8AC3E}">
-        <p14:creationId xmlns:p14="http://schemas.microsoft.com/office/powerpoint/2010/main" val="3423878622"/>
+        <p14:creationId xmlns:p14="http://schemas.microsoft.com/office/powerpoint/2010/main" val="164740431"/>
       </p:ext>
     </p:extLst>
   </p:cSld>
@@ -7012,7 +7286,7 @@
           <p:cNvPr id="2" name="Title 1">
             <a:extLst>
               <a:ext uri="{FF2B5EF4-FFF2-40B4-BE49-F238E27FC236}">
-                <a16:creationId xmlns:a16="http://schemas.microsoft.com/office/drawing/2014/main" id="{29BF9EB6-E5A0-73BE-2C20-F78514A6052F}"/>
+                <a16:creationId xmlns:a16="http://schemas.microsoft.com/office/drawing/2014/main" id="{F2992844-C348-ED8E-D093-9ABAE1B2BF35}"/>
               </a:ext>
             </a:extLst>
           </p:cNvPr>
@@ -7025,72 +7299,25 @@
         </p:nvSpPr>
         <p:spPr>
           <a:xfrm>
-            <a:off x="656493" y="75414"/>
-            <a:ext cx="10515600" cy="458840"/>
-          </a:xfrm>
-        </p:spPr>
-        <p:txBody>
-          <a:bodyPr>
-            <a:normAutofit fontScale="90000"/>
-          </a:bodyPr>
-          <a:lstStyle/>
-          <a:p>
-            <a:r>
-              <a:rPr lang="en-US" sz="1800" dirty="0" err="1"/>
-              <a:t>xla</a:t>
-            </a:r>
-            <a:r>
-              <a:rPr lang="en-US" sz="1800" dirty="0"/>
-              <a:t>; 24D—; </a:t>
-            </a:r>
-            <a:r>
-              <a:rPr lang="en-US" sz="1800" dirty="0" err="1"/>
-              <a:t>xla</a:t>
-            </a:r>
-            <a:r>
-              <a:rPr lang="en-US" sz="1800" dirty="0"/>
-              <a:t>=</a:t>
-            </a:r>
-            <a:r>
-              <a:rPr lang="en-US" sz="1800" dirty="0" err="1"/>
-              <a:t>hsa</a:t>
-            </a:r>
-            <a:br>
-              <a:rPr lang="en-US" sz="1800" dirty="0"/>
-            </a:br>
-            <a:endParaRPr lang="en-US" sz="1800" dirty="0"/>
-          </a:p>
-        </p:txBody>
-      </p:sp>
-      <p:sp>
-        <p:nvSpPr>
-          <p:cNvPr id="4" name="Content Placeholder 3">
-            <a:extLst>
-              <a:ext uri="{FF2B5EF4-FFF2-40B4-BE49-F238E27FC236}">
-                <a16:creationId xmlns:a16="http://schemas.microsoft.com/office/drawing/2014/main" id="{36394FF9-9274-D0E9-D3CD-A32446AEAA75}"/>
-              </a:ext>
-            </a:extLst>
-          </p:cNvPr>
-          <p:cNvSpPr>
-            <a:spLocks noGrp="1"/>
-          </p:cNvSpPr>
-          <p:nvPr>
-            <p:ph idx="1"/>
-          </p:nvPr>
-        </p:nvSpPr>
-        <p:spPr/>
+            <a:off x="1475925" y="601914"/>
+            <a:ext cx="3265713" cy="998729"/>
+          </a:xfrm>
+        </p:spPr>
         <p:txBody>
           <a:bodyPr/>
           <a:lstStyle/>
           <a:p>
-            <a:endParaRPr lang="en-US"/>
+            <a:r>
+              <a:rPr lang="en-US" dirty="0"/>
+              <a:t>Glu Ala Cycle</a:t>
+            </a:r>
           </a:p>
         </p:txBody>
       </p:sp>
     </p:spTree>
     <p:extLst>
       <p:ext uri="{BB962C8B-B14F-4D97-AF65-F5344CB8AC3E}">
-        <p14:creationId xmlns:p14="http://schemas.microsoft.com/office/powerpoint/2010/main" val="2178064077"/>
+        <p14:creationId xmlns:p14="http://schemas.microsoft.com/office/powerpoint/2010/main" val="2827528181"/>
       </p:ext>
     </p:extLst>
   </p:cSld>
@@ -7151,7 +7378,7 @@
             </a:r>
             <a:r>
               <a:rPr lang="en-US" sz="1800" dirty="0"/>
-              <a:t>; 24D—; </a:t>
+              <a:t>; Chlorpyrifos—; </a:t>
             </a:r>
             <a:r>
               <a:rPr lang="en-US" sz="1800" dirty="0" err="1"/>
@@ -7172,35 +7399,794 @@
           </a:p>
         </p:txBody>
       </p:sp>
-      <p:sp>
-        <p:nvSpPr>
-          <p:cNvPr id="4" name="Content Placeholder 3">
-            <a:extLst>
-              <a:ext uri="{FF2B5EF4-FFF2-40B4-BE49-F238E27FC236}">
-                <a16:creationId xmlns:a16="http://schemas.microsoft.com/office/drawing/2014/main" id="{36394FF9-9274-D0E9-D3CD-A32446AEAA75}"/>
-              </a:ext>
-            </a:extLst>
-          </p:cNvPr>
-          <p:cNvSpPr>
-            <a:spLocks noGrp="1"/>
-          </p:cNvSpPr>
+      <p:pic>
+        <p:nvPicPr>
+          <p:cNvPr id="5" name="Content Placeholder 4">
+            <a:extLst>
+              <a:ext uri="{FF2B5EF4-FFF2-40B4-BE49-F238E27FC236}">
+                <a16:creationId xmlns:a16="http://schemas.microsoft.com/office/drawing/2014/main" id="{A7F5E34B-0BDA-F5BF-245A-CE566D6B237E}"/>
+              </a:ext>
+            </a:extLst>
+          </p:cNvPr>
+          <p:cNvPicPr>
+            <a:picLocks noGrp="1" noChangeAspect="1"/>
+          </p:cNvPicPr>
           <p:nvPr>
             <p:ph idx="1"/>
           </p:nvPr>
-        </p:nvSpPr>
-        <p:spPr/>
-        <p:txBody>
-          <a:bodyPr/>
-          <a:lstStyle/>
-          <a:p>
-            <a:endParaRPr lang="en-US"/>
-          </a:p>
-        </p:txBody>
-      </p:sp>
+        </p:nvPicPr>
+        <p:blipFill>
+          <a:blip r:embed="rId2">
+            <a:extLst>
+              <a:ext uri="{28A0092B-C50C-407E-A947-70E740481C1C}">
+                <a14:useLocalDpi xmlns:a14="http://schemas.microsoft.com/office/drawing/2010/main" val="0"/>
+              </a:ext>
+            </a:extLst>
+          </a:blip>
+          <a:stretch>
+            <a:fillRect/>
+          </a:stretch>
+        </p:blipFill>
+        <p:spPr>
+          <a:xfrm>
+            <a:off x="4612193" y="-32348"/>
+            <a:ext cx="4973934" cy="7120506"/>
+          </a:xfrm>
+        </p:spPr>
+      </p:pic>
     </p:spTree>
     <p:extLst>
       <p:ext uri="{BB962C8B-B14F-4D97-AF65-F5344CB8AC3E}">
-        <p14:creationId xmlns:p14="http://schemas.microsoft.com/office/powerpoint/2010/main" val="547215275"/>
+        <p14:creationId xmlns:p14="http://schemas.microsoft.com/office/powerpoint/2010/main" val="2555528081"/>
+      </p:ext>
+    </p:extLst>
+  </p:cSld>
+  <p:clrMapOvr>
+    <a:masterClrMapping/>
+  </p:clrMapOvr>
+</p:sld>
+</file>
+
+<file path=ppt/slides/slide34.xml><?xml version="1.0" encoding="utf-8"?>
+<p:sld xmlns:a="http://schemas.openxmlformats.org/drawingml/2006/main" xmlns:r="http://schemas.openxmlformats.org/officeDocument/2006/relationships" xmlns:p="http://schemas.openxmlformats.org/presentationml/2006/main">
+  <p:cSld>
+    <p:spTree>
+      <p:nvGrpSpPr>
+        <p:cNvPr id="1" name=""/>
+        <p:cNvGrpSpPr/>
+        <p:nvPr/>
+      </p:nvGrpSpPr>
+      <p:grpSpPr>
+        <a:xfrm>
+          <a:off x="0" y="0"/>
+          <a:ext cx="0" cy="0"/>
+          <a:chOff x="0" y="0"/>
+          <a:chExt cx="0" cy="0"/>
+        </a:xfrm>
+      </p:grpSpPr>
+      <p:pic>
+        <p:nvPicPr>
+          <p:cNvPr id="5" name="Content Placeholder 4">
+            <a:extLst>
+              <a:ext uri="{FF2B5EF4-FFF2-40B4-BE49-F238E27FC236}">
+                <a16:creationId xmlns:a16="http://schemas.microsoft.com/office/drawing/2014/main" id="{05AC57BF-9037-B742-C389-A6B8FC66278C}"/>
+              </a:ext>
+            </a:extLst>
+          </p:cNvPr>
+          <p:cNvPicPr>
+            <a:picLocks noGrp="1" noChangeAspect="1"/>
+          </p:cNvPicPr>
+          <p:nvPr>
+            <p:ph idx="1"/>
+          </p:nvPr>
+        </p:nvPicPr>
+        <p:blipFill>
+          <a:blip r:embed="rId2">
+            <a:extLst>
+              <a:ext uri="{28A0092B-C50C-407E-A947-70E740481C1C}">
+                <a14:useLocalDpi xmlns:a14="http://schemas.microsoft.com/office/drawing/2010/main" val="0"/>
+              </a:ext>
+            </a:extLst>
+          </a:blip>
+          <a:stretch>
+            <a:fillRect/>
+          </a:stretch>
+        </p:blipFill>
+        <p:spPr>
+          <a:xfrm>
+            <a:off x="2140299" y="0"/>
+            <a:ext cx="9646417" cy="5621905"/>
+          </a:xfrm>
+        </p:spPr>
+      </p:pic>
+      <p:sp>
+        <p:nvSpPr>
+          <p:cNvPr id="2" name="Title 1">
+            <a:extLst>
+              <a:ext uri="{FF2B5EF4-FFF2-40B4-BE49-F238E27FC236}">
+                <a16:creationId xmlns:a16="http://schemas.microsoft.com/office/drawing/2014/main" id="{29BF9EB6-E5A0-73BE-2C20-F78514A6052F}"/>
+              </a:ext>
+            </a:extLst>
+          </p:cNvPr>
+          <p:cNvSpPr>
+            <a:spLocks noGrp="1"/>
+          </p:cNvSpPr>
+          <p:nvPr>
+            <p:ph type="title"/>
+          </p:nvPr>
+        </p:nvSpPr>
+        <p:spPr>
+          <a:xfrm>
+            <a:off x="127122" y="75414"/>
+            <a:ext cx="10515600" cy="1291162"/>
+          </a:xfrm>
+        </p:spPr>
+        <p:txBody>
+          <a:bodyPr>
+            <a:normAutofit fontScale="90000"/>
+          </a:bodyPr>
+          <a:lstStyle/>
+          <a:p>
+            <a:r>
+              <a:rPr lang="en-US" sz="1800" dirty="0" err="1"/>
+              <a:t>xla</a:t>
+            </a:r>
+            <a:r>
+              <a:rPr lang="en-US" sz="1800" dirty="0"/>
+              <a:t>; Chlorpyrifos—</a:t>
+            </a:r>
+            <a:br>
+              <a:rPr lang="en-US" sz="1800" dirty="0"/>
+            </a:br>
+            <a:r>
+              <a:rPr lang="en-US" sz="1800" dirty="0" err="1"/>
+              <a:t>Proponoate</a:t>
+            </a:r>
+            <a:r>
+              <a:rPr lang="en-US" sz="1800" dirty="0"/>
+              <a:t> metabolism</a:t>
+            </a:r>
+            <a:br>
+              <a:rPr lang="en-US" sz="1800" dirty="0"/>
+            </a:br>
+            <a:r>
+              <a:rPr lang="en-US" sz="1800" dirty="0"/>
+              <a:t>(Gluconeogenesis); </a:t>
+            </a:r>
+            <a:br>
+              <a:rPr lang="en-US" sz="1800" dirty="0"/>
+            </a:br>
+            <a:r>
+              <a:rPr lang="en-US" sz="1800" dirty="0" err="1"/>
+              <a:t>xla</a:t>
+            </a:r>
+            <a:r>
+              <a:rPr lang="en-US" sz="1800" dirty="0"/>
+              <a:t>=</a:t>
+            </a:r>
+            <a:r>
+              <a:rPr lang="en-US" sz="1800" dirty="0" err="1"/>
+              <a:t>hsa</a:t>
+            </a:r>
+            <a:br>
+              <a:rPr lang="en-US" sz="1800" dirty="0"/>
+            </a:br>
+            <a:endParaRPr lang="en-US" sz="1800" dirty="0"/>
+          </a:p>
+        </p:txBody>
+      </p:sp>
+      <p:pic>
+        <p:nvPicPr>
+          <p:cNvPr id="7" name="Picture 6">
+            <a:extLst>
+              <a:ext uri="{FF2B5EF4-FFF2-40B4-BE49-F238E27FC236}">
+                <a16:creationId xmlns:a16="http://schemas.microsoft.com/office/drawing/2014/main" id="{B681C31C-3675-816B-7694-6E40D9D0B2BC}"/>
+              </a:ext>
+            </a:extLst>
+          </p:cNvPr>
+          <p:cNvPicPr>
+            <a:picLocks noChangeAspect="1"/>
+          </p:cNvPicPr>
+          <p:nvPr/>
+        </p:nvPicPr>
+        <p:blipFill>
+          <a:blip r:embed="rId3"/>
+          <a:stretch>
+            <a:fillRect/>
+          </a:stretch>
+        </p:blipFill>
+        <p:spPr>
+          <a:xfrm>
+            <a:off x="127122" y="5331211"/>
+            <a:ext cx="8303445" cy="1526789"/>
+          </a:xfrm>
+          <a:prstGeom prst="rect">
+            <a:avLst/>
+          </a:prstGeom>
+        </p:spPr>
+      </p:pic>
+    </p:spTree>
+    <p:extLst>
+      <p:ext uri="{BB962C8B-B14F-4D97-AF65-F5344CB8AC3E}">
+        <p14:creationId xmlns:p14="http://schemas.microsoft.com/office/powerpoint/2010/main" val="2968135174"/>
+      </p:ext>
+    </p:extLst>
+  </p:cSld>
+  <p:clrMapOvr>
+    <a:masterClrMapping/>
+  </p:clrMapOvr>
+</p:sld>
+</file>
+
+<file path=ppt/slides/slide35.xml><?xml version="1.0" encoding="utf-8"?>
+<p:sld xmlns:a="http://schemas.openxmlformats.org/drawingml/2006/main" xmlns:r="http://schemas.openxmlformats.org/officeDocument/2006/relationships" xmlns:p="http://schemas.openxmlformats.org/presentationml/2006/main">
+  <p:cSld>
+    <p:spTree>
+      <p:nvGrpSpPr>
+        <p:cNvPr id="1" name=""/>
+        <p:cNvGrpSpPr/>
+        <p:nvPr/>
+      </p:nvGrpSpPr>
+      <p:grpSpPr>
+        <a:xfrm>
+          <a:off x="0" y="0"/>
+          <a:ext cx="0" cy="0"/>
+          <a:chOff x="0" y="0"/>
+          <a:chExt cx="0" cy="0"/>
+        </a:xfrm>
+      </p:grpSpPr>
+      <p:sp>
+        <p:nvSpPr>
+          <p:cNvPr id="2" name="Title 1">
+            <a:extLst>
+              <a:ext uri="{FF2B5EF4-FFF2-40B4-BE49-F238E27FC236}">
+                <a16:creationId xmlns:a16="http://schemas.microsoft.com/office/drawing/2014/main" id="{29BF9EB6-E5A0-73BE-2C20-F78514A6052F}"/>
+              </a:ext>
+            </a:extLst>
+          </p:cNvPr>
+          <p:cNvSpPr>
+            <a:spLocks noGrp="1"/>
+          </p:cNvSpPr>
+          <p:nvPr>
+            <p:ph type="title"/>
+          </p:nvPr>
+        </p:nvSpPr>
+        <p:spPr>
+          <a:xfrm>
+            <a:off x="93785" y="105559"/>
+            <a:ext cx="10515600" cy="458840"/>
+          </a:xfrm>
+        </p:spPr>
+        <p:txBody>
+          <a:bodyPr>
+            <a:normAutofit fontScale="90000"/>
+          </a:bodyPr>
+          <a:lstStyle/>
+          <a:p>
+            <a:r>
+              <a:rPr lang="en-US" sz="1800" dirty="0" err="1"/>
+              <a:t>xla</a:t>
+            </a:r>
+            <a:r>
+              <a:rPr lang="en-US" sz="1800" dirty="0"/>
+              <a:t>; Chlorpyrifos—Glycine, serine, and threonine </a:t>
+            </a:r>
+            <a:br>
+              <a:rPr lang="en-US" sz="1800" dirty="0"/>
+            </a:br>
+            <a:r>
+              <a:rPr lang="en-US" sz="1800" dirty="0"/>
+              <a:t>metabolism; </a:t>
+            </a:r>
+            <a:r>
+              <a:rPr lang="en-US" sz="1800" dirty="0" err="1"/>
+              <a:t>xla</a:t>
+            </a:r>
+            <a:r>
+              <a:rPr lang="en-US" sz="1800" dirty="0"/>
+              <a:t>=</a:t>
+            </a:r>
+            <a:r>
+              <a:rPr lang="en-US" sz="1800" dirty="0" err="1"/>
+              <a:t>hsa</a:t>
+            </a:r>
+            <a:br>
+              <a:rPr lang="en-US" sz="1800" dirty="0"/>
+            </a:br>
+            <a:endParaRPr lang="en-US" sz="1800" dirty="0"/>
+          </a:p>
+        </p:txBody>
+      </p:sp>
+      <p:pic>
+        <p:nvPicPr>
+          <p:cNvPr id="8" name="Picture 7">
+            <a:extLst>
+              <a:ext uri="{FF2B5EF4-FFF2-40B4-BE49-F238E27FC236}">
+                <a16:creationId xmlns:a16="http://schemas.microsoft.com/office/drawing/2014/main" id="{A544669F-7781-0BF5-794E-100057A1305B}"/>
+              </a:ext>
+            </a:extLst>
+          </p:cNvPr>
+          <p:cNvPicPr>
+            <a:picLocks noChangeAspect="1"/>
+          </p:cNvPicPr>
+          <p:nvPr/>
+        </p:nvPicPr>
+        <p:blipFill>
+          <a:blip r:embed="rId2">
+            <a:extLst>
+              <a:ext uri="{28A0092B-C50C-407E-A947-70E740481C1C}">
+                <a14:useLocalDpi xmlns:a14="http://schemas.microsoft.com/office/drawing/2010/main" val="0"/>
+              </a:ext>
+            </a:extLst>
+          </a:blip>
+          <a:stretch>
+            <a:fillRect/>
+          </a:stretch>
+        </p:blipFill>
+        <p:spPr>
+          <a:xfrm>
+            <a:off x="4376521" y="-123378"/>
+            <a:ext cx="7721694" cy="7104755"/>
+          </a:xfrm>
+          <a:prstGeom prst="rect">
+            <a:avLst/>
+          </a:prstGeom>
+        </p:spPr>
+      </p:pic>
+    </p:spTree>
+    <p:extLst>
+      <p:ext uri="{BB962C8B-B14F-4D97-AF65-F5344CB8AC3E}">
+        <p14:creationId xmlns:p14="http://schemas.microsoft.com/office/powerpoint/2010/main" val="16467550"/>
+      </p:ext>
+    </p:extLst>
+  </p:cSld>
+  <p:clrMapOvr>
+    <a:masterClrMapping/>
+  </p:clrMapOvr>
+</p:sld>
+</file>
+
+<file path=ppt/slides/slide36.xml><?xml version="1.0" encoding="utf-8"?>
+<p:sld xmlns:a="http://schemas.openxmlformats.org/drawingml/2006/main" xmlns:r="http://schemas.openxmlformats.org/officeDocument/2006/relationships" xmlns:p="http://schemas.openxmlformats.org/presentationml/2006/main">
+  <p:cSld>
+    <p:spTree>
+      <p:nvGrpSpPr>
+        <p:cNvPr id="1" name=""/>
+        <p:cNvGrpSpPr/>
+        <p:nvPr/>
+      </p:nvGrpSpPr>
+      <p:grpSpPr>
+        <a:xfrm>
+          <a:off x="0" y="0"/>
+          <a:ext cx="0" cy="0"/>
+          <a:chOff x="0" y="0"/>
+          <a:chExt cx="0" cy="0"/>
+        </a:xfrm>
+      </p:grpSpPr>
+      <p:sp>
+        <p:nvSpPr>
+          <p:cNvPr id="2" name="Title 1">
+            <a:extLst>
+              <a:ext uri="{FF2B5EF4-FFF2-40B4-BE49-F238E27FC236}">
+                <a16:creationId xmlns:a16="http://schemas.microsoft.com/office/drawing/2014/main" id="{29BF9EB6-E5A0-73BE-2C20-F78514A6052F}"/>
+              </a:ext>
+            </a:extLst>
+          </p:cNvPr>
+          <p:cNvSpPr>
+            <a:spLocks noGrp="1"/>
+          </p:cNvSpPr>
+          <p:nvPr>
+            <p:ph type="title"/>
+          </p:nvPr>
+        </p:nvSpPr>
+        <p:spPr>
+          <a:xfrm>
+            <a:off x="656493" y="75414"/>
+            <a:ext cx="10515600" cy="458840"/>
+          </a:xfrm>
+        </p:spPr>
+        <p:txBody>
+          <a:bodyPr>
+            <a:normAutofit fontScale="90000"/>
+          </a:bodyPr>
+          <a:lstStyle/>
+          <a:p>
+            <a:r>
+              <a:rPr lang="en-US" sz="1800" dirty="0" err="1"/>
+              <a:t>xla</a:t>
+            </a:r>
+            <a:r>
+              <a:rPr lang="en-US" sz="1800" dirty="0"/>
+              <a:t>; Chlorpyrifos—Glucose alanine cycle; </a:t>
+            </a:r>
+            <a:r>
+              <a:rPr lang="en-US" sz="1800" dirty="0" err="1"/>
+              <a:t>xla</a:t>
+            </a:r>
+            <a:r>
+              <a:rPr lang="en-US" sz="1800" dirty="0"/>
+              <a:t>=</a:t>
+            </a:r>
+            <a:r>
+              <a:rPr lang="en-US" sz="1800" dirty="0" err="1"/>
+              <a:t>hsa</a:t>
+            </a:r>
+            <a:br>
+              <a:rPr lang="en-US" sz="1800" dirty="0"/>
+            </a:br>
+            <a:endParaRPr lang="en-US" sz="1800" dirty="0"/>
+          </a:p>
+        </p:txBody>
+      </p:sp>
+      <p:pic>
+        <p:nvPicPr>
+          <p:cNvPr id="5" name="Content Placeholder 4">
+            <a:extLst>
+              <a:ext uri="{FF2B5EF4-FFF2-40B4-BE49-F238E27FC236}">
+                <a16:creationId xmlns:a16="http://schemas.microsoft.com/office/drawing/2014/main" id="{F47F66D7-16CA-9DE2-6523-04A3029BE9F9}"/>
+              </a:ext>
+            </a:extLst>
+          </p:cNvPr>
+          <p:cNvPicPr>
+            <a:picLocks noGrp="1" noChangeAspect="1"/>
+          </p:cNvPicPr>
+          <p:nvPr>
+            <p:ph idx="1"/>
+          </p:nvPr>
+        </p:nvPicPr>
+        <p:blipFill>
+          <a:blip r:embed="rId2">
+            <a:extLst>
+              <a:ext uri="{28A0092B-C50C-407E-A947-70E740481C1C}">
+                <a14:useLocalDpi xmlns:a14="http://schemas.microsoft.com/office/drawing/2010/main" val="0"/>
+              </a:ext>
+            </a:extLst>
+          </a:blip>
+          <a:stretch>
+            <a:fillRect/>
+          </a:stretch>
+        </p:blipFill>
+        <p:spPr>
+          <a:xfrm>
+            <a:off x="2471895" y="286812"/>
+            <a:ext cx="7596553" cy="6794252"/>
+          </a:xfrm>
+        </p:spPr>
+      </p:pic>
+    </p:spTree>
+    <p:extLst>
+      <p:ext uri="{BB962C8B-B14F-4D97-AF65-F5344CB8AC3E}">
+        <p14:creationId xmlns:p14="http://schemas.microsoft.com/office/powerpoint/2010/main" val="3269587091"/>
+      </p:ext>
+    </p:extLst>
+  </p:cSld>
+  <p:clrMapOvr>
+    <a:masterClrMapping/>
+  </p:clrMapOvr>
+</p:sld>
+</file>
+
+<file path=ppt/slides/slide37.xml><?xml version="1.0" encoding="utf-8"?>
+<p:sld xmlns:a="http://schemas.openxmlformats.org/drawingml/2006/main" xmlns:r="http://schemas.openxmlformats.org/officeDocument/2006/relationships" xmlns:p="http://schemas.openxmlformats.org/presentationml/2006/main">
+  <p:cSld>
+    <p:spTree>
+      <p:nvGrpSpPr>
+        <p:cNvPr id="1" name=""/>
+        <p:cNvGrpSpPr/>
+        <p:nvPr/>
+      </p:nvGrpSpPr>
+      <p:grpSpPr>
+        <a:xfrm>
+          <a:off x="0" y="0"/>
+          <a:ext cx="0" cy="0"/>
+          <a:chOff x="0" y="0"/>
+          <a:chExt cx="0" cy="0"/>
+        </a:xfrm>
+      </p:grpSpPr>
+      <p:sp>
+        <p:nvSpPr>
+          <p:cNvPr id="2" name="Title 1">
+            <a:extLst>
+              <a:ext uri="{FF2B5EF4-FFF2-40B4-BE49-F238E27FC236}">
+                <a16:creationId xmlns:a16="http://schemas.microsoft.com/office/drawing/2014/main" id="{29BF9EB6-E5A0-73BE-2C20-F78514A6052F}"/>
+              </a:ext>
+            </a:extLst>
+          </p:cNvPr>
+          <p:cNvSpPr>
+            <a:spLocks noGrp="1"/>
+          </p:cNvSpPr>
+          <p:nvPr>
+            <p:ph type="title"/>
+          </p:nvPr>
+        </p:nvSpPr>
+        <p:spPr>
+          <a:xfrm>
+            <a:off x="656493" y="75414"/>
+            <a:ext cx="10515600" cy="458840"/>
+          </a:xfrm>
+        </p:spPr>
+        <p:txBody>
+          <a:bodyPr>
+            <a:normAutofit fontScale="90000"/>
+          </a:bodyPr>
+          <a:lstStyle/>
+          <a:p>
+            <a:r>
+              <a:rPr lang="en-US" sz="1800" dirty="0" err="1"/>
+              <a:t>xla</a:t>
+            </a:r>
+            <a:r>
+              <a:rPr lang="en-US" sz="1800" dirty="0"/>
+              <a:t>; 24D—; </a:t>
+            </a:r>
+            <a:r>
+              <a:rPr lang="en-US" sz="1800" dirty="0" err="1"/>
+              <a:t>xla</a:t>
+            </a:r>
+            <a:r>
+              <a:rPr lang="en-US" sz="1800" dirty="0"/>
+              <a:t>=</a:t>
+            </a:r>
+            <a:r>
+              <a:rPr lang="en-US" sz="1800" dirty="0" err="1"/>
+              <a:t>hsa</a:t>
+            </a:r>
+            <a:br>
+              <a:rPr lang="en-US" sz="1800" dirty="0"/>
+            </a:br>
+            <a:endParaRPr lang="en-US" sz="1800" dirty="0"/>
+          </a:p>
+        </p:txBody>
+      </p:sp>
+      <p:sp>
+        <p:nvSpPr>
+          <p:cNvPr id="4" name="Content Placeholder 3">
+            <a:extLst>
+              <a:ext uri="{FF2B5EF4-FFF2-40B4-BE49-F238E27FC236}">
+                <a16:creationId xmlns:a16="http://schemas.microsoft.com/office/drawing/2014/main" id="{36394FF9-9274-D0E9-D3CD-A32446AEAA75}"/>
+              </a:ext>
+            </a:extLst>
+          </p:cNvPr>
+          <p:cNvSpPr>
+            <a:spLocks noGrp="1"/>
+          </p:cNvSpPr>
+          <p:nvPr>
+            <p:ph idx="1"/>
+          </p:nvPr>
+        </p:nvSpPr>
+        <p:spPr/>
+        <p:txBody>
+          <a:bodyPr/>
+          <a:lstStyle/>
+          <a:p>
+            <a:endParaRPr lang="en-US"/>
+          </a:p>
+        </p:txBody>
+      </p:sp>
+    </p:spTree>
+    <p:extLst>
+      <p:ext uri="{BB962C8B-B14F-4D97-AF65-F5344CB8AC3E}">
+        <p14:creationId xmlns:p14="http://schemas.microsoft.com/office/powerpoint/2010/main" val="3199991795"/>
+      </p:ext>
+    </p:extLst>
+  </p:cSld>
+  <p:clrMapOvr>
+    <a:masterClrMapping/>
+  </p:clrMapOvr>
+</p:sld>
+</file>
+
+<file path=ppt/slides/slide38.xml><?xml version="1.0" encoding="utf-8"?>
+<p:sld xmlns:a="http://schemas.openxmlformats.org/drawingml/2006/main" xmlns:r="http://schemas.openxmlformats.org/officeDocument/2006/relationships" xmlns:p="http://schemas.openxmlformats.org/presentationml/2006/main">
+  <p:cSld>
+    <p:spTree>
+      <p:nvGrpSpPr>
+        <p:cNvPr id="1" name=""/>
+        <p:cNvGrpSpPr/>
+        <p:nvPr/>
+      </p:nvGrpSpPr>
+      <p:grpSpPr>
+        <a:xfrm>
+          <a:off x="0" y="0"/>
+          <a:ext cx="0" cy="0"/>
+          <a:chOff x="0" y="0"/>
+          <a:chExt cx="0" cy="0"/>
+        </a:xfrm>
+      </p:grpSpPr>
+      <p:sp>
+        <p:nvSpPr>
+          <p:cNvPr id="2" name="Title 1">
+            <a:extLst>
+              <a:ext uri="{FF2B5EF4-FFF2-40B4-BE49-F238E27FC236}">
+                <a16:creationId xmlns:a16="http://schemas.microsoft.com/office/drawing/2014/main" id="{29BF9EB6-E5A0-73BE-2C20-F78514A6052F}"/>
+              </a:ext>
+            </a:extLst>
+          </p:cNvPr>
+          <p:cNvSpPr>
+            <a:spLocks noGrp="1"/>
+          </p:cNvSpPr>
+          <p:nvPr>
+            <p:ph type="title"/>
+          </p:nvPr>
+        </p:nvSpPr>
+        <p:spPr>
+          <a:xfrm>
+            <a:off x="656493" y="75414"/>
+            <a:ext cx="10515600" cy="458840"/>
+          </a:xfrm>
+        </p:spPr>
+        <p:txBody>
+          <a:bodyPr>
+            <a:normAutofit fontScale="90000"/>
+          </a:bodyPr>
+          <a:lstStyle/>
+          <a:p>
+            <a:r>
+              <a:rPr lang="en-US" sz="1800" dirty="0" err="1"/>
+              <a:t>xla</a:t>
+            </a:r>
+            <a:r>
+              <a:rPr lang="en-US" sz="1800" dirty="0"/>
+              <a:t>; 24D—; </a:t>
+            </a:r>
+            <a:r>
+              <a:rPr lang="en-US" sz="1800" dirty="0" err="1"/>
+              <a:t>xla</a:t>
+            </a:r>
+            <a:r>
+              <a:rPr lang="en-US" sz="1800" dirty="0"/>
+              <a:t>=</a:t>
+            </a:r>
+            <a:r>
+              <a:rPr lang="en-US" sz="1800" dirty="0" err="1"/>
+              <a:t>hsa</a:t>
+            </a:r>
+            <a:br>
+              <a:rPr lang="en-US" sz="1800" dirty="0"/>
+            </a:br>
+            <a:endParaRPr lang="en-US" sz="1800" dirty="0"/>
+          </a:p>
+        </p:txBody>
+      </p:sp>
+      <p:sp>
+        <p:nvSpPr>
+          <p:cNvPr id="4" name="Content Placeholder 3">
+            <a:extLst>
+              <a:ext uri="{FF2B5EF4-FFF2-40B4-BE49-F238E27FC236}">
+                <a16:creationId xmlns:a16="http://schemas.microsoft.com/office/drawing/2014/main" id="{36394FF9-9274-D0E9-D3CD-A32446AEAA75}"/>
+              </a:ext>
+            </a:extLst>
+          </p:cNvPr>
+          <p:cNvSpPr>
+            <a:spLocks noGrp="1"/>
+          </p:cNvSpPr>
+          <p:nvPr>
+            <p:ph idx="1"/>
+          </p:nvPr>
+        </p:nvSpPr>
+        <p:spPr/>
+        <p:txBody>
+          <a:bodyPr/>
+          <a:lstStyle/>
+          <a:p>
+            <a:endParaRPr lang="en-US"/>
+          </a:p>
+        </p:txBody>
+      </p:sp>
+    </p:spTree>
+    <p:extLst>
+      <p:ext uri="{BB962C8B-B14F-4D97-AF65-F5344CB8AC3E}">
+        <p14:creationId xmlns:p14="http://schemas.microsoft.com/office/powerpoint/2010/main" val="877039883"/>
+      </p:ext>
+    </p:extLst>
+  </p:cSld>
+  <p:clrMapOvr>
+    <a:masterClrMapping/>
+  </p:clrMapOvr>
+</p:sld>
+</file>
+
+<file path=ppt/slides/slide39.xml><?xml version="1.0" encoding="utf-8"?>
+<p:sld xmlns:a="http://schemas.openxmlformats.org/drawingml/2006/main" xmlns:r="http://schemas.openxmlformats.org/officeDocument/2006/relationships" xmlns:p="http://schemas.openxmlformats.org/presentationml/2006/main">
+  <p:cSld>
+    <p:spTree>
+      <p:nvGrpSpPr>
+        <p:cNvPr id="1" name=""/>
+        <p:cNvGrpSpPr/>
+        <p:nvPr/>
+      </p:nvGrpSpPr>
+      <p:grpSpPr>
+        <a:xfrm>
+          <a:off x="0" y="0"/>
+          <a:ext cx="0" cy="0"/>
+          <a:chOff x="0" y="0"/>
+          <a:chExt cx="0" cy="0"/>
+        </a:xfrm>
+      </p:grpSpPr>
+      <p:sp>
+        <p:nvSpPr>
+          <p:cNvPr id="2" name="Title 1">
+            <a:extLst>
+              <a:ext uri="{FF2B5EF4-FFF2-40B4-BE49-F238E27FC236}">
+                <a16:creationId xmlns:a16="http://schemas.microsoft.com/office/drawing/2014/main" id="{29BF9EB6-E5A0-73BE-2C20-F78514A6052F}"/>
+              </a:ext>
+            </a:extLst>
+          </p:cNvPr>
+          <p:cNvSpPr>
+            <a:spLocks noGrp="1"/>
+          </p:cNvSpPr>
+          <p:nvPr>
+            <p:ph type="title"/>
+          </p:nvPr>
+        </p:nvSpPr>
+        <p:spPr>
+          <a:xfrm>
+            <a:off x="656493" y="75414"/>
+            <a:ext cx="10515600" cy="458840"/>
+          </a:xfrm>
+        </p:spPr>
+        <p:txBody>
+          <a:bodyPr>
+            <a:normAutofit fontScale="90000"/>
+          </a:bodyPr>
+          <a:lstStyle/>
+          <a:p>
+            <a:r>
+              <a:rPr lang="en-US" sz="1800" dirty="0" err="1"/>
+              <a:t>xla</a:t>
+            </a:r>
+            <a:r>
+              <a:rPr lang="en-US" sz="1800" dirty="0"/>
+              <a:t>; 24D—; </a:t>
+            </a:r>
+            <a:r>
+              <a:rPr lang="en-US" sz="1800" dirty="0" err="1"/>
+              <a:t>xla</a:t>
+            </a:r>
+            <a:r>
+              <a:rPr lang="en-US" sz="1800" dirty="0"/>
+              <a:t>=</a:t>
+            </a:r>
+            <a:r>
+              <a:rPr lang="en-US" sz="1800" dirty="0" err="1"/>
+              <a:t>hsa</a:t>
+            </a:r>
+            <a:br>
+              <a:rPr lang="en-US" sz="1800" dirty="0"/>
+            </a:br>
+            <a:endParaRPr lang="en-US" sz="1800" dirty="0"/>
+          </a:p>
+        </p:txBody>
+      </p:sp>
+      <p:sp>
+        <p:nvSpPr>
+          <p:cNvPr id="4" name="Content Placeholder 3">
+            <a:extLst>
+              <a:ext uri="{FF2B5EF4-FFF2-40B4-BE49-F238E27FC236}">
+                <a16:creationId xmlns:a16="http://schemas.microsoft.com/office/drawing/2014/main" id="{36394FF9-9274-D0E9-D3CD-A32446AEAA75}"/>
+              </a:ext>
+            </a:extLst>
+          </p:cNvPr>
+          <p:cNvSpPr>
+            <a:spLocks noGrp="1"/>
+          </p:cNvSpPr>
+          <p:nvPr>
+            <p:ph idx="1"/>
+          </p:nvPr>
+        </p:nvSpPr>
+        <p:spPr/>
+        <p:txBody>
+          <a:bodyPr/>
+          <a:lstStyle/>
+          <a:p>
+            <a:endParaRPr lang="en-US"/>
+          </a:p>
+        </p:txBody>
+      </p:sp>
+    </p:spTree>
+    <p:extLst>
+      <p:ext uri="{BB962C8B-B14F-4D97-AF65-F5344CB8AC3E}">
+        <p14:creationId xmlns:p14="http://schemas.microsoft.com/office/powerpoint/2010/main" val="3423878622"/>
       </p:ext>
     </p:extLst>
   </p:cSld>
@@ -7290,18 +8276,273 @@
         </p:blipFill>
         <p:spPr>
           <a:xfrm>
-            <a:off x="907556" y="0"/>
-            <a:ext cx="9204110" cy="5259491"/>
+            <a:off x="1680266" y="644979"/>
+            <a:ext cx="8075397" cy="4614512"/>
           </a:xfrm>
           <a:prstGeom prst="rect">
             <a:avLst/>
           </a:prstGeom>
         </p:spPr>
       </p:pic>
+      <p:sp>
+        <p:nvSpPr>
+          <p:cNvPr id="2" name="TextBox 1">
+            <a:extLst>
+              <a:ext uri="{FF2B5EF4-FFF2-40B4-BE49-F238E27FC236}">
+                <a16:creationId xmlns:a16="http://schemas.microsoft.com/office/drawing/2014/main" id="{40B4B219-3583-0CF2-EBEA-03504DC9AFD9}"/>
+              </a:ext>
+            </a:extLst>
+          </p:cNvPr>
+          <p:cNvSpPr txBox="1"/>
+          <p:nvPr/>
+        </p:nvSpPr>
+        <p:spPr>
+          <a:xfrm>
+            <a:off x="2189949" y="121181"/>
+            <a:ext cx="5447980" cy="369332"/>
+          </a:xfrm>
+          <a:prstGeom prst="rect">
+            <a:avLst/>
+          </a:prstGeom>
+          <a:noFill/>
+        </p:spPr>
+        <p:txBody>
+          <a:bodyPr wrap="square" rtlCol="0">
+            <a:spAutoFit/>
+          </a:bodyPr>
+          <a:lstStyle/>
+          <a:p>
+            <a:r>
+              <a:rPr lang="en-US" dirty="0"/>
+              <a:t>Amphibian body weights and SVLs</a:t>
+            </a:r>
+          </a:p>
+        </p:txBody>
+      </p:sp>
     </p:spTree>
     <p:extLst>
       <p:ext uri="{BB962C8B-B14F-4D97-AF65-F5344CB8AC3E}">
         <p14:creationId xmlns:p14="http://schemas.microsoft.com/office/powerpoint/2010/main" val="145575085"/>
+      </p:ext>
+    </p:extLst>
+  </p:cSld>
+  <p:clrMapOvr>
+    <a:masterClrMapping/>
+  </p:clrMapOvr>
+</p:sld>
+</file>
+
+<file path=ppt/slides/slide40.xml><?xml version="1.0" encoding="utf-8"?>
+<p:sld xmlns:a="http://schemas.openxmlformats.org/drawingml/2006/main" xmlns:r="http://schemas.openxmlformats.org/officeDocument/2006/relationships" xmlns:p="http://schemas.openxmlformats.org/presentationml/2006/main">
+  <p:cSld>
+    <p:spTree>
+      <p:nvGrpSpPr>
+        <p:cNvPr id="1" name=""/>
+        <p:cNvGrpSpPr/>
+        <p:nvPr/>
+      </p:nvGrpSpPr>
+      <p:grpSpPr>
+        <a:xfrm>
+          <a:off x="0" y="0"/>
+          <a:ext cx="0" cy="0"/>
+          <a:chOff x="0" y="0"/>
+          <a:chExt cx="0" cy="0"/>
+        </a:xfrm>
+      </p:grpSpPr>
+      <p:sp>
+        <p:nvSpPr>
+          <p:cNvPr id="2" name="Title 1">
+            <a:extLst>
+              <a:ext uri="{FF2B5EF4-FFF2-40B4-BE49-F238E27FC236}">
+                <a16:creationId xmlns:a16="http://schemas.microsoft.com/office/drawing/2014/main" id="{29BF9EB6-E5A0-73BE-2C20-F78514A6052F}"/>
+              </a:ext>
+            </a:extLst>
+          </p:cNvPr>
+          <p:cNvSpPr>
+            <a:spLocks noGrp="1"/>
+          </p:cNvSpPr>
+          <p:nvPr>
+            <p:ph type="title"/>
+          </p:nvPr>
+        </p:nvSpPr>
+        <p:spPr>
+          <a:xfrm>
+            <a:off x="656493" y="75414"/>
+            <a:ext cx="10515600" cy="458840"/>
+          </a:xfrm>
+        </p:spPr>
+        <p:txBody>
+          <a:bodyPr>
+            <a:normAutofit fontScale="90000"/>
+          </a:bodyPr>
+          <a:lstStyle/>
+          <a:p>
+            <a:r>
+              <a:rPr lang="en-US" sz="1800" dirty="0" err="1"/>
+              <a:t>xla</a:t>
+            </a:r>
+            <a:r>
+              <a:rPr lang="en-US" sz="1800" dirty="0"/>
+              <a:t>; 24D—; </a:t>
+            </a:r>
+            <a:r>
+              <a:rPr lang="en-US" sz="1800" dirty="0" err="1"/>
+              <a:t>xla</a:t>
+            </a:r>
+            <a:r>
+              <a:rPr lang="en-US" sz="1800" dirty="0"/>
+              <a:t>=</a:t>
+            </a:r>
+            <a:r>
+              <a:rPr lang="en-US" sz="1800" dirty="0" err="1"/>
+              <a:t>hsa</a:t>
+            </a:r>
+            <a:br>
+              <a:rPr lang="en-US" sz="1800" dirty="0"/>
+            </a:br>
+            <a:endParaRPr lang="en-US" sz="1800" dirty="0"/>
+          </a:p>
+        </p:txBody>
+      </p:sp>
+      <p:sp>
+        <p:nvSpPr>
+          <p:cNvPr id="4" name="Content Placeholder 3">
+            <a:extLst>
+              <a:ext uri="{FF2B5EF4-FFF2-40B4-BE49-F238E27FC236}">
+                <a16:creationId xmlns:a16="http://schemas.microsoft.com/office/drawing/2014/main" id="{36394FF9-9274-D0E9-D3CD-A32446AEAA75}"/>
+              </a:ext>
+            </a:extLst>
+          </p:cNvPr>
+          <p:cNvSpPr>
+            <a:spLocks noGrp="1"/>
+          </p:cNvSpPr>
+          <p:nvPr>
+            <p:ph idx="1"/>
+          </p:nvPr>
+        </p:nvSpPr>
+        <p:spPr/>
+        <p:txBody>
+          <a:bodyPr/>
+          <a:lstStyle/>
+          <a:p>
+            <a:endParaRPr lang="en-US"/>
+          </a:p>
+        </p:txBody>
+      </p:sp>
+    </p:spTree>
+    <p:extLst>
+      <p:ext uri="{BB962C8B-B14F-4D97-AF65-F5344CB8AC3E}">
+        <p14:creationId xmlns:p14="http://schemas.microsoft.com/office/powerpoint/2010/main" val="2178064077"/>
+      </p:ext>
+    </p:extLst>
+  </p:cSld>
+  <p:clrMapOvr>
+    <a:masterClrMapping/>
+  </p:clrMapOvr>
+</p:sld>
+</file>
+
+<file path=ppt/slides/slide41.xml><?xml version="1.0" encoding="utf-8"?>
+<p:sld xmlns:a="http://schemas.openxmlformats.org/drawingml/2006/main" xmlns:r="http://schemas.openxmlformats.org/officeDocument/2006/relationships" xmlns:p="http://schemas.openxmlformats.org/presentationml/2006/main">
+  <p:cSld>
+    <p:spTree>
+      <p:nvGrpSpPr>
+        <p:cNvPr id="1" name=""/>
+        <p:cNvGrpSpPr/>
+        <p:nvPr/>
+      </p:nvGrpSpPr>
+      <p:grpSpPr>
+        <a:xfrm>
+          <a:off x="0" y="0"/>
+          <a:ext cx="0" cy="0"/>
+          <a:chOff x="0" y="0"/>
+          <a:chExt cx="0" cy="0"/>
+        </a:xfrm>
+      </p:grpSpPr>
+      <p:sp>
+        <p:nvSpPr>
+          <p:cNvPr id="2" name="Title 1">
+            <a:extLst>
+              <a:ext uri="{FF2B5EF4-FFF2-40B4-BE49-F238E27FC236}">
+                <a16:creationId xmlns:a16="http://schemas.microsoft.com/office/drawing/2014/main" id="{29BF9EB6-E5A0-73BE-2C20-F78514A6052F}"/>
+              </a:ext>
+            </a:extLst>
+          </p:cNvPr>
+          <p:cNvSpPr>
+            <a:spLocks noGrp="1"/>
+          </p:cNvSpPr>
+          <p:nvPr>
+            <p:ph type="title"/>
+          </p:nvPr>
+        </p:nvSpPr>
+        <p:spPr>
+          <a:xfrm>
+            <a:off x="656493" y="75414"/>
+            <a:ext cx="10515600" cy="458840"/>
+          </a:xfrm>
+        </p:spPr>
+        <p:txBody>
+          <a:bodyPr>
+            <a:normAutofit fontScale="90000"/>
+          </a:bodyPr>
+          <a:lstStyle/>
+          <a:p>
+            <a:r>
+              <a:rPr lang="en-US" sz="1800" dirty="0" err="1"/>
+              <a:t>xla</a:t>
+            </a:r>
+            <a:r>
+              <a:rPr lang="en-US" sz="1800" dirty="0"/>
+              <a:t>; 24D—; </a:t>
+            </a:r>
+            <a:r>
+              <a:rPr lang="en-US" sz="1800" dirty="0" err="1"/>
+              <a:t>xla</a:t>
+            </a:r>
+            <a:r>
+              <a:rPr lang="en-US" sz="1800" dirty="0"/>
+              <a:t>=</a:t>
+            </a:r>
+            <a:r>
+              <a:rPr lang="en-US" sz="1800" dirty="0" err="1"/>
+              <a:t>hsa</a:t>
+            </a:r>
+            <a:br>
+              <a:rPr lang="en-US" sz="1800" dirty="0"/>
+            </a:br>
+            <a:endParaRPr lang="en-US" sz="1800" dirty="0"/>
+          </a:p>
+        </p:txBody>
+      </p:sp>
+      <p:sp>
+        <p:nvSpPr>
+          <p:cNvPr id="4" name="Content Placeholder 3">
+            <a:extLst>
+              <a:ext uri="{FF2B5EF4-FFF2-40B4-BE49-F238E27FC236}">
+                <a16:creationId xmlns:a16="http://schemas.microsoft.com/office/drawing/2014/main" id="{36394FF9-9274-D0E9-D3CD-A32446AEAA75}"/>
+              </a:ext>
+            </a:extLst>
+          </p:cNvPr>
+          <p:cNvSpPr>
+            <a:spLocks noGrp="1"/>
+          </p:cNvSpPr>
+          <p:nvPr>
+            <p:ph idx="1"/>
+          </p:nvPr>
+        </p:nvSpPr>
+        <p:spPr/>
+        <p:txBody>
+          <a:bodyPr/>
+          <a:lstStyle/>
+          <a:p>
+            <a:endParaRPr lang="en-US"/>
+          </a:p>
+        </p:txBody>
+      </p:sp>
+    </p:spTree>
+    <p:extLst>
+      <p:ext uri="{BB962C8B-B14F-4D97-AF65-F5344CB8AC3E}">
+        <p14:creationId xmlns:p14="http://schemas.microsoft.com/office/powerpoint/2010/main" val="547215275"/>
       </p:ext>
     </p:extLst>
   </p:cSld>
@@ -7350,7 +8591,7 @@
         </p:blipFill>
         <p:spPr>
           <a:xfrm>
-            <a:off x="3041591" y="380011"/>
+            <a:off x="3041591" y="817999"/>
             <a:ext cx="5637229" cy="4616594"/>
           </a:xfrm>
           <a:prstGeom prst="rect">
@@ -7372,7 +8613,7 @@
         </p:nvSpPr>
         <p:spPr>
           <a:xfrm>
-            <a:off x="1053779" y="5213073"/>
+            <a:off x="1053779" y="5651061"/>
             <a:ext cx="9155875" cy="646331"/>
           </a:xfrm>
           <a:prstGeom prst="rect">
@@ -7389,6 +8630,41 @@
             <a:r>
               <a:rPr lang="en-US" dirty="0"/>
               <a:t>Snout-vent-length and body weight significantly related (as expected), but not a big deal for treatment</a:t>
+            </a:r>
+          </a:p>
+        </p:txBody>
+      </p:sp>
+      <p:sp>
+        <p:nvSpPr>
+          <p:cNvPr id="2" name="TextBox 1">
+            <a:extLst>
+              <a:ext uri="{FF2B5EF4-FFF2-40B4-BE49-F238E27FC236}">
+                <a16:creationId xmlns:a16="http://schemas.microsoft.com/office/drawing/2014/main" id="{A3184FB3-8349-D8E5-863E-3E29DA6203F0}"/>
+              </a:ext>
+            </a:extLst>
+          </p:cNvPr>
+          <p:cNvSpPr txBox="1"/>
+          <p:nvPr/>
+        </p:nvSpPr>
+        <p:spPr>
+          <a:xfrm>
+            <a:off x="1759644" y="230521"/>
+            <a:ext cx="8573048" cy="369332"/>
+          </a:xfrm>
+          <a:prstGeom prst="rect">
+            <a:avLst/>
+          </a:prstGeom>
+          <a:noFill/>
+        </p:spPr>
+        <p:txBody>
+          <a:bodyPr wrap="square" rtlCol="0">
+            <a:spAutoFit/>
+          </a:bodyPr>
+          <a:lstStyle/>
+          <a:p>
+            <a:r>
+              <a:rPr lang="en-US" dirty="0"/>
+              <a:t>Relationship between body weight and SVL</a:t>
             </a:r>
           </a:p>
         </p:txBody>
@@ -7437,7 +8713,7 @@
         </p:nvSpPr>
         <p:spPr>
           <a:xfrm>
-            <a:off x="940280" y="5142390"/>
+            <a:off x="919249" y="5326807"/>
             <a:ext cx="9908234" cy="1477328"/>
           </a:xfrm>
           <a:prstGeom prst="rect">
@@ -7494,8 +8770,8 @@
         </p:blipFill>
         <p:spPr>
           <a:xfrm>
-            <a:off x="1544669" y="195308"/>
-            <a:ext cx="8657394" cy="4947082"/>
+            <a:off x="1544669" y="835040"/>
+            <a:ext cx="7968165" cy="4553237"/>
           </a:xfrm>
           <a:prstGeom prst="rect">
             <a:avLst/>
@@ -7516,8 +8792,8 @@
         </p:nvSpPr>
         <p:spPr>
           <a:xfrm>
-            <a:off x="1544669" y="195308"/>
-            <a:ext cx="2509746" cy="4947081"/>
+            <a:off x="1544669" y="796622"/>
+            <a:ext cx="2328084" cy="4553237"/>
           </a:xfrm>
           <a:prstGeom prst="rect">
             <a:avLst/>
@@ -7536,6 +8812,41 @@
           <a:lstStyle/>
           <a:p>
             <a:endParaRPr lang="en-US" dirty="0"/>
+          </a:p>
+        </p:txBody>
+      </p:sp>
+      <p:sp>
+        <p:nvSpPr>
+          <p:cNvPr id="3" name="TextBox 2">
+            <a:extLst>
+              <a:ext uri="{FF2B5EF4-FFF2-40B4-BE49-F238E27FC236}">
+                <a16:creationId xmlns:a16="http://schemas.microsoft.com/office/drawing/2014/main" id="{6A8A1C22-2F71-308A-BD7F-C8F30F940724}"/>
+              </a:ext>
+            </a:extLst>
+          </p:cNvPr>
+          <p:cNvSpPr txBox="1"/>
+          <p:nvPr/>
+        </p:nvSpPr>
+        <p:spPr>
+          <a:xfrm>
+            <a:off x="1759644" y="230521"/>
+            <a:ext cx="8573048" cy="369332"/>
+          </a:xfrm>
+          <a:prstGeom prst="rect">
+            <a:avLst/>
+          </a:prstGeom>
+          <a:noFill/>
+        </p:spPr>
+        <p:txBody>
+          <a:bodyPr wrap="square" rtlCol="0">
+            <a:spAutoFit/>
+          </a:bodyPr>
+          <a:lstStyle/>
+          <a:p>
+            <a:r>
+              <a:rPr lang="en-US" dirty="0"/>
+              <a:t>Glutathione concentration variants (different dilutions)</a:t>
+            </a:r>
           </a:p>
         </p:txBody>
       </p:sp>
@@ -7583,8 +8894,8 @@
         </p:nvSpPr>
         <p:spPr>
           <a:xfrm>
-            <a:off x="1111905" y="4396369"/>
-            <a:ext cx="9155875" cy="2585323"/>
+            <a:off x="668511" y="4396369"/>
+            <a:ext cx="10404181" cy="2308324"/>
           </a:xfrm>
           <a:prstGeom prst="rect">
             <a:avLst/>
@@ -7632,7 +8943,7 @@
         </p:blipFill>
         <p:spPr>
           <a:xfrm>
-            <a:off x="1676688" y="625415"/>
+            <a:off x="1710081" y="809832"/>
             <a:ext cx="8321040" cy="3657600"/>
           </a:xfrm>
           <a:prstGeom prst="rect">
@@ -7640,6 +8951,41 @@
           </a:prstGeom>
         </p:spPr>
       </p:pic>
+      <p:sp>
+        <p:nvSpPr>
+          <p:cNvPr id="2" name="TextBox 1">
+            <a:extLst>
+              <a:ext uri="{FF2B5EF4-FFF2-40B4-BE49-F238E27FC236}">
+                <a16:creationId xmlns:a16="http://schemas.microsoft.com/office/drawing/2014/main" id="{D975B401-F01F-316D-FE40-980CC0A8037C}"/>
+              </a:ext>
+            </a:extLst>
+          </p:cNvPr>
+          <p:cNvSpPr txBox="1"/>
+          <p:nvPr/>
+        </p:nvSpPr>
+        <p:spPr>
+          <a:xfrm>
+            <a:off x="1759644" y="230521"/>
+            <a:ext cx="8573048" cy="369332"/>
+          </a:xfrm>
+          <a:prstGeom prst="rect">
+            <a:avLst/>
+          </a:prstGeom>
+          <a:noFill/>
+        </p:spPr>
+        <p:txBody>
+          <a:bodyPr wrap="square" rtlCol="0">
+            <a:spAutoFit/>
+          </a:bodyPr>
+          <a:lstStyle/>
+          <a:p>
+            <a:r>
+              <a:rPr lang="en-US" dirty="0"/>
+              <a:t>Manuscript figure—boxplots for glutathione and acetylcholinesterase (all data)</a:t>
+            </a:r>
+          </a:p>
+        </p:txBody>
+      </p:sp>
     </p:spTree>
     <p:extLst>
       <p:ext uri="{BB962C8B-B14F-4D97-AF65-F5344CB8AC3E}">
@@ -7692,7 +9038,7 @@
         </p:blipFill>
         <p:spPr>
           <a:xfrm>
-            <a:off x="1854555" y="2675385"/>
+            <a:off x="1854555" y="3328525"/>
             <a:ext cx="7281816" cy="1728621"/>
           </a:xfrm>
           <a:prstGeom prst="rect">
@@ -7722,7 +9068,7 @@
         </p:blipFill>
         <p:spPr>
           <a:xfrm>
-            <a:off x="1854555" y="619433"/>
+            <a:off x="1854555" y="1272573"/>
             <a:ext cx="8008537" cy="1883682"/>
           </a:xfrm>
           <a:prstGeom prst="rect">
@@ -7744,7 +9090,7 @@
         </p:nvSpPr>
         <p:spPr>
           <a:xfrm>
-            <a:off x="1077530" y="4797436"/>
+            <a:off x="1077530" y="5450576"/>
             <a:ext cx="9155875" cy="646331"/>
           </a:xfrm>
           <a:prstGeom prst="rect">
@@ -7787,7 +9133,7 @@
         </p:nvSpPr>
         <p:spPr>
           <a:xfrm>
-            <a:off x="4434914" y="1961965"/>
+            <a:off x="4434914" y="2615105"/>
             <a:ext cx="1823844" cy="235199"/>
           </a:xfrm>
           <a:prstGeom prst="rect">
@@ -7824,7 +9170,7 @@
         </p:nvSpPr>
         <p:spPr>
           <a:xfrm>
-            <a:off x="4973719" y="4153259"/>
+            <a:off x="4973719" y="4806399"/>
             <a:ext cx="1823844" cy="235199"/>
           </a:xfrm>
           <a:prstGeom prst="rect">
@@ -7861,7 +9207,7 @@
         </p:nvSpPr>
         <p:spPr>
           <a:xfrm>
-            <a:off x="4946901" y="3762848"/>
+            <a:off x="4946901" y="4415988"/>
             <a:ext cx="1823844" cy="235199"/>
           </a:xfrm>
           <a:prstGeom prst="rect">
@@ -7881,6 +9227,41 @@
           <a:lstStyle/>
           <a:p>
             <a:endParaRPr lang="en-US" dirty="0"/>
+          </a:p>
+        </p:txBody>
+      </p:sp>
+      <p:sp>
+        <p:nvSpPr>
+          <p:cNvPr id="2" name="TextBox 1">
+            <a:extLst>
+              <a:ext uri="{FF2B5EF4-FFF2-40B4-BE49-F238E27FC236}">
+                <a16:creationId xmlns:a16="http://schemas.microsoft.com/office/drawing/2014/main" id="{E61BB692-0652-440F-BCBA-9F0227AEC359}"/>
+              </a:ext>
+            </a:extLst>
+          </p:cNvPr>
+          <p:cNvSpPr txBox="1"/>
+          <p:nvPr/>
+        </p:nvSpPr>
+        <p:spPr>
+          <a:xfrm>
+            <a:off x="1736591" y="230521"/>
+            <a:ext cx="8573048" cy="369332"/>
+          </a:xfrm>
+          <a:prstGeom prst="rect">
+            <a:avLst/>
+          </a:prstGeom>
+          <a:noFill/>
+        </p:spPr>
+        <p:txBody>
+          <a:bodyPr wrap="square" rtlCol="0">
+            <a:spAutoFit/>
+          </a:bodyPr>
+          <a:lstStyle/>
+          <a:p>
+            <a:r>
+              <a:rPr lang="en-US" dirty="0"/>
+              <a:t>Normality tests for glutathione and acetylcholinesterase—liver data</a:t>
+            </a:r>
           </a:p>
         </p:txBody>
       </p:sp>
@@ -8095,6 +9476,41 @@
           <a:lstStyle/>
           <a:p>
             <a:endParaRPr lang="en-US" dirty="0"/>
+          </a:p>
+        </p:txBody>
+      </p:sp>
+      <p:sp>
+        <p:nvSpPr>
+          <p:cNvPr id="2" name="TextBox 1">
+            <a:extLst>
+              <a:ext uri="{FF2B5EF4-FFF2-40B4-BE49-F238E27FC236}">
+                <a16:creationId xmlns:a16="http://schemas.microsoft.com/office/drawing/2014/main" id="{23DE216A-3718-EF14-F8AC-675EB413B268}"/>
+              </a:ext>
+            </a:extLst>
+          </p:cNvPr>
+          <p:cNvSpPr txBox="1"/>
+          <p:nvPr/>
+        </p:nvSpPr>
+        <p:spPr>
+          <a:xfrm>
+            <a:off x="1736591" y="230521"/>
+            <a:ext cx="8573048" cy="369332"/>
+          </a:xfrm>
+          <a:prstGeom prst="rect">
+            <a:avLst/>
+          </a:prstGeom>
+          <a:noFill/>
+        </p:spPr>
+        <p:txBody>
+          <a:bodyPr wrap="square" rtlCol="0">
+            <a:spAutoFit/>
+          </a:bodyPr>
+          <a:lstStyle/>
+          <a:p>
+            <a:r>
+              <a:rPr lang="en-US" dirty="0"/>
+              <a:t>Normality tests for glutathione—swab data</a:t>
+            </a:r>
           </a:p>
         </p:txBody>
       </p:sp>

</xml_diff>